<commit_message>
Updated slide phần Tuấn, gần xong
</commit_message>
<xml_diff>
--- a/Seminar/Software Requirement.pptx
+++ b/Seminar/Software Requirement.pptx
@@ -5,10 +5,10 @@
     <p:sldMasterId id="2147483756" r:id="rId4"/>
   </p:sldMasterIdLst>
   <p:notesMasterIdLst>
-    <p:notesMasterId r:id="rId53"/>
+    <p:notesMasterId r:id="rId59"/>
   </p:notesMasterIdLst>
   <p:handoutMasterIdLst>
-    <p:handoutMasterId r:id="rId54"/>
+    <p:handoutMasterId r:id="rId60"/>
   </p:handoutMasterIdLst>
   <p:sldIdLst>
     <p:sldId id="267" r:id="rId5"/>
@@ -47,18 +47,24 @@
     <p:sldId id="288" r:id="rId38"/>
     <p:sldId id="328" r:id="rId39"/>
     <p:sldId id="330" r:id="rId40"/>
-    <p:sldId id="331" r:id="rId41"/>
-    <p:sldId id="292" r:id="rId42"/>
-    <p:sldId id="326" r:id="rId43"/>
-    <p:sldId id="332" r:id="rId44"/>
-    <p:sldId id="329" r:id="rId45"/>
-    <p:sldId id="327" r:id="rId46"/>
-    <p:sldId id="333" r:id="rId47"/>
-    <p:sldId id="334" r:id="rId48"/>
-    <p:sldId id="325" r:id="rId49"/>
-    <p:sldId id="273" r:id="rId50"/>
-    <p:sldId id="324" r:id="rId51"/>
-    <p:sldId id="317" r:id="rId52"/>
+    <p:sldId id="348" r:id="rId41"/>
+    <p:sldId id="331" r:id="rId42"/>
+    <p:sldId id="349" r:id="rId43"/>
+    <p:sldId id="292" r:id="rId44"/>
+    <p:sldId id="350" r:id="rId45"/>
+    <p:sldId id="326" r:id="rId46"/>
+    <p:sldId id="351" r:id="rId47"/>
+    <p:sldId id="332" r:id="rId48"/>
+    <p:sldId id="353" r:id="rId49"/>
+    <p:sldId id="352" r:id="rId50"/>
+    <p:sldId id="329" r:id="rId51"/>
+    <p:sldId id="327" r:id="rId52"/>
+    <p:sldId id="355" r:id="rId53"/>
+    <p:sldId id="354" r:id="rId54"/>
+    <p:sldId id="325" r:id="rId55"/>
+    <p:sldId id="273" r:id="rId56"/>
+    <p:sldId id="324" r:id="rId57"/>
+    <p:sldId id="317" r:id="rId58"/>
   </p:sldIdLst>
   <p:sldSz cx="9144000" cy="6858000" type="screen4x3"/>
   <p:notesSz cx="6858000" cy="9144000"/>
@@ -2286,9 +2292,6 @@
           <a:p>
             <a:endParaRPr lang="en-US"/>
           </a:p>
-          <a:p>
-            <a:endParaRPr lang="en-US"/>
-          </a:p>
         </p:txBody>
       </p:sp>
       <p:sp>
@@ -2317,7 +2320,7 @@
     </p:spTree>
     <p:extLst>
       <p:ext uri="{BB962C8B-B14F-4D97-AF65-F5344CB8AC3E}">
-        <p14:creationId xmlns:p14="http://schemas.microsoft.com/office/powerpoint/2010/main" val="3957420201"/>
+        <p14:creationId xmlns:p14="http://schemas.microsoft.com/office/powerpoint/2010/main" val="3008294694"/>
       </p:ext>
     </p:extLst>
   </p:cSld>
@@ -2373,6 +2376,9 @@
           <a:p>
             <a:endParaRPr lang="en-US"/>
           </a:p>
+          <a:p>
+            <a:endParaRPr lang="en-US"/>
+          </a:p>
         </p:txBody>
       </p:sp>
       <p:sp>
@@ -2392,7 +2398,91 @@
           <a:p>
             <a:fld id="{C6074690-7256-4BB9-AC0F-97AEAE8CDEC2}" type="slidenum">
               <a:rPr lang="en-US" smtClean="0"/>
-              <a:t>39</a:t>
+              <a:t>40</a:t>
+            </a:fld>
+            <a:endParaRPr lang="en-US"/>
+          </a:p>
+        </p:txBody>
+      </p:sp>
+    </p:spTree>
+    <p:extLst>
+      <p:ext uri="{BB962C8B-B14F-4D97-AF65-F5344CB8AC3E}">
+        <p14:creationId xmlns:p14="http://schemas.microsoft.com/office/powerpoint/2010/main" val="3957420201"/>
+      </p:ext>
+    </p:extLst>
+  </p:cSld>
+  <p:clrMapOvr>
+    <a:masterClrMapping/>
+  </p:clrMapOvr>
+</p:notes>
+</file>
+
+<file path=ppt/notesSlides/notesSlide22.xml><?xml version="1.0" encoding="utf-8"?>
+<p:notes xmlns:a="http://schemas.openxmlformats.org/drawingml/2006/main" xmlns:r="http://schemas.openxmlformats.org/officeDocument/2006/relationships" xmlns:p="http://schemas.openxmlformats.org/presentationml/2006/main">
+  <p:cSld>
+    <p:spTree>
+      <p:nvGrpSpPr>
+        <p:cNvPr id="1" name=""/>
+        <p:cNvGrpSpPr/>
+        <p:nvPr/>
+      </p:nvGrpSpPr>
+      <p:grpSpPr>
+        <a:xfrm>
+          <a:off x="0" y="0"/>
+          <a:ext cx="0" cy="0"/>
+          <a:chOff x="0" y="0"/>
+          <a:chExt cx="0" cy="0"/>
+        </a:xfrm>
+      </p:grpSpPr>
+      <p:sp>
+        <p:nvSpPr>
+          <p:cNvPr id="2" name="Slide Image Placeholder 1"/>
+          <p:cNvSpPr>
+            <a:spLocks noGrp="1" noRot="1" noChangeAspect="1"/>
+          </p:cNvSpPr>
+          <p:nvPr>
+            <p:ph type="sldImg"/>
+          </p:nvPr>
+        </p:nvSpPr>
+        <p:spPr/>
+      </p:sp>
+      <p:sp>
+        <p:nvSpPr>
+          <p:cNvPr id="3" name="Notes Placeholder 2"/>
+          <p:cNvSpPr>
+            <a:spLocks noGrp="1"/>
+          </p:cNvSpPr>
+          <p:nvPr>
+            <p:ph type="body" idx="1"/>
+          </p:nvPr>
+        </p:nvSpPr>
+        <p:spPr/>
+        <p:txBody>
+          <a:bodyPr/>
+          <a:lstStyle/>
+          <a:p>
+            <a:endParaRPr lang="en-US"/>
+          </a:p>
+        </p:txBody>
+      </p:sp>
+      <p:sp>
+        <p:nvSpPr>
+          <p:cNvPr id="4" name="Slide Number Placeholder 3"/>
+          <p:cNvSpPr>
+            <a:spLocks noGrp="1"/>
+          </p:cNvSpPr>
+          <p:nvPr>
+            <p:ph type="sldNum" sz="quarter" idx="10"/>
+          </p:nvPr>
+        </p:nvSpPr>
+        <p:spPr/>
+        <p:txBody>
+          <a:bodyPr/>
+          <a:lstStyle/>
+          <a:p>
+            <a:fld id="{C6074690-7256-4BB9-AC0F-97AEAE8CDEC2}" type="slidenum">
+              <a:rPr lang="en-US" smtClean="0"/>
+              <a:t>42</a:t>
             </a:fld>
             <a:endParaRPr lang="en-US"/>
           </a:p>
@@ -10527,15 +10617,7 @@
             <a:pPr marL="742950" lvl="1" indent="-285750"/>
             <a:r>
               <a:rPr lang="en-US" altLang="en-US" sz="1400"/>
-              <a:t>Áp dụng nhiều kỹ thuật khác nhau trong toàn bộ quá trình (DFD, UML, </a:t>
-            </a:r>
-            <a:r>
-              <a:rPr lang="en-US" altLang="en-US" sz="1400"/>
-              <a:t>...</a:t>
-            </a:r>
-            <a:r>
-              <a:rPr lang="en-US" altLang="en-US" sz="1400"/>
-              <a:t>),</a:t>
+              <a:t>Áp dụng nhiều kỹ thuật khác nhau trong toàn bộ quá trình (DFD, UML, ...),</a:t>
             </a:r>
             <a:endParaRPr lang="en-US"/>
           </a:p>
@@ -12431,11 +12513,7 @@
             </a:pPr>
             <a:r>
               <a:rPr lang="en-US"/>
-              <a:t>Mục tiêu</a:t>
-            </a:r>
-            <a:r>
-              <a:rPr lang="en-US"/>
-              <a:t>: </a:t>
+              <a:t>Mục tiêu: </a:t>
             </a:r>
           </a:p>
           <a:p>
@@ -12485,7 +12563,6 @@
               <a:rPr lang="en-US" sz="1400"/>
               <a:t>Đọc các hướng dẫn (manual)</a:t>
             </a:r>
-            <a:endParaRPr lang="en-US" sz="1400"/>
           </a:p>
           <a:p>
             <a:pPr lvl="1">
@@ -12498,7 +12575,6 @@
               <a:rPr lang="en-US" sz="1400"/>
               <a:t>Học tập hệ thống (mà khách hang đang sử dụng) hiện tại</a:t>
             </a:r>
-            <a:endParaRPr lang="en-US" sz="1400"/>
           </a:p>
           <a:p>
             <a:pPr lvl="1">
@@ -12511,7 +12587,6 @@
               <a:rPr lang="en-US" sz="1400"/>
               <a:t>Giúp khách hàng hiểu được các khả năng có thể xảy ra</a:t>
             </a:r>
-            <a:endParaRPr lang="en-US" sz="1400"/>
           </a:p>
           <a:p>
             <a:pPr lvl="1">
@@ -12532,21 +12607,13 @@
           <a:p>
             <a:r>
               <a:rPr lang="en-US"/>
-              <a:t>Phải hiểu được công việc của tổ chức, khách hàng, người sử </a:t>
-            </a:r>
-            <a:r>
-              <a:rPr lang="en-US"/>
-              <a:t>dụng.</a:t>
+              <a:t>Phải hiểu được công việc của tổ chức, khách hàng, người sử dụng.</a:t>
             </a:r>
           </a:p>
           <a:p>
             <a:r>
               <a:rPr lang="en-US" altLang="en-US"/>
-              <a:t>Kỹ năng giao tiếp là cực  kỳ </a:t>
-            </a:r>
-            <a:r>
-              <a:rPr lang="en-US" altLang="en-US"/>
-              <a:t>quan trọng</a:t>
+              <a:t>Kỹ năng giao tiếp là cực  kỳ quan trọng</a:t>
             </a:r>
           </a:p>
           <a:p>
@@ -12554,7 +12621,6 @@
               <a:rPr lang="en-US" altLang="en-US"/>
               <a:t>Có thể cần phải sử dụng nhiều kỹ thuật khác nhau</a:t>
             </a:r>
-            <a:endParaRPr lang="en-US" altLang="en-US"/>
           </a:p>
           <a:p>
             <a:endParaRPr lang="en-US"/>
@@ -13998,7 +14064,6 @@
               <a:rPr lang="en-US" altLang="en-US"/>
               <a:t>Ngôn ngữ tự nhiên vẫn được sử dụng, tuy nhiên vẫn cần phải kèm theo các cấu trúc trong tài liệu.</a:t>
             </a:r>
-            <a:endParaRPr lang="en-US" altLang="en-US"/>
           </a:p>
           <a:p>
             <a:r>
@@ -14814,25 +14879,7 @@
               <a:rPr lang="vi-VN" altLang="en-US" sz="2900">
                 <a:latin typeface="Constantia" panose="02030602050306030303" pitchFamily="18" charset="0"/>
               </a:rPr>
-              <a:t>Tiêu chuẩn này của </a:t>
-            </a:r>
-            <a:r>
-              <a:rPr lang="vi-VN" altLang="en-US" sz="2900">
-                <a:latin typeface="Constantia" panose="02030602050306030303" pitchFamily="18" charset="0"/>
-              </a:rPr>
-              <a:t>SRS được </a:t>
-            </a:r>
-            <a:r>
-              <a:rPr lang="vi-VN" altLang="en-US" sz="2900">
-                <a:latin typeface="Constantia" panose="02030602050306030303" pitchFamily="18" charset="0"/>
-              </a:rPr>
-              <a:t>đề ra </a:t>
-            </a:r>
-            <a:r>
-              <a:rPr lang="vi-VN" altLang="en-US" sz="2900">
-                <a:latin typeface="Constantia" panose="02030602050306030303" pitchFamily="18" charset="0"/>
-              </a:rPr>
-              <a:t>bởi IEEE</a:t>
+              <a:t>Tiêu chuẩn này của SRS được đề ra bởi IEEE</a:t>
             </a:r>
             <a:r>
               <a:rPr lang="en-US" altLang="en-US" sz="2900">
@@ -14840,9 +14887,6 @@
               </a:rPr>
               <a:t>:</a:t>
             </a:r>
-            <a:endParaRPr lang="en-US" altLang="en-US" sz="2900">
-              <a:latin typeface="Constantia" panose="02030602050306030303" pitchFamily="18" charset="0"/>
-            </a:endParaRPr>
           </a:p>
           <a:p>
             <a:r>
@@ -14865,13 +14909,7 @@
               <a:rPr lang="vi-VN" altLang="en-US" sz="2500">
                 <a:latin typeface="Constantia" panose="02030602050306030303" pitchFamily="18" charset="0"/>
               </a:rPr>
-              <a:t>Phạm vi </a:t>
-            </a:r>
-            <a:r>
-              <a:rPr lang="vi-VN" altLang="en-US" sz="2500">
-                <a:latin typeface="Constantia" panose="02030602050306030303" pitchFamily="18" charset="0"/>
-              </a:rPr>
-              <a:t>của hệ thống</a:t>
+              <a:t>Phạm vi của hệ thống</a:t>
             </a:r>
             <a:r>
               <a:rPr lang="en-US" altLang="en-US" sz="2500">
@@ -14965,13 +15003,7 @@
               <a:rPr lang="vi-VN" altLang="en-US" sz="2500">
                 <a:latin typeface="Constantia" panose="02030602050306030303" pitchFamily="18" charset="0"/>
               </a:rPr>
-              <a:t> </a:t>
-            </a:r>
-            <a:r>
-              <a:rPr lang="vi-VN" altLang="en-US" sz="2500">
-                <a:latin typeface="Constantia" panose="02030602050306030303" pitchFamily="18" charset="0"/>
-              </a:rPr>
-              <a:t>sản phẩm</a:t>
+              <a:t> sản phẩm</a:t>
             </a:r>
           </a:p>
           <a:p>
@@ -14986,13 +15018,7 @@
               <a:rPr lang="vi-VN" altLang="en-US" sz="2500">
                 <a:latin typeface="Constantia" panose="02030602050306030303" pitchFamily="18" charset="0"/>
               </a:rPr>
-              <a:t>hức </a:t>
-            </a:r>
-            <a:r>
-              <a:rPr lang="vi-VN" altLang="en-US" sz="2500">
-                <a:latin typeface="Constantia" panose="02030602050306030303" pitchFamily="18" charset="0"/>
-              </a:rPr>
-              <a:t>năng sản phẩm</a:t>
+              <a:t>hức năng sản phẩm</a:t>
             </a:r>
           </a:p>
           <a:p>
@@ -15007,13 +15033,7 @@
               <a:rPr lang="vi-VN" altLang="en-US" sz="2500">
                 <a:latin typeface="Constantia" panose="02030602050306030303" pitchFamily="18" charset="0"/>
               </a:rPr>
-              <a:t>ặc </a:t>
-            </a:r>
-            <a:r>
-              <a:rPr lang="vi-VN" altLang="en-US" sz="2500">
-                <a:latin typeface="Constantia" panose="02030602050306030303" pitchFamily="18" charset="0"/>
-              </a:rPr>
-              <a:t>điểm người sử dụng</a:t>
+              <a:t>ặc điểm người sử dụng</a:t>
             </a:r>
           </a:p>
           <a:p>
@@ -15038,11 +15058,7 @@
             </a:r>
             <a:r>
               <a:rPr lang="en-US"/>
-              <a:t>Assumptions and </a:t>
-            </a:r>
-            <a:r>
-              <a:rPr lang="en-US"/>
-              <a:t>dependencies</a:t>
+              <a:t>Assumptions and dependencies</a:t>
             </a:r>
             <a:r>
               <a:rPr lang="en-US" sz="2800"/>
@@ -15072,9 +15088,6 @@
               </a:rPr>
               <a:t>rang buộc</a:t>
             </a:r>
-            <a:endParaRPr lang="en-US" altLang="en-US" sz="2500">
-              <a:latin typeface="Constantia" panose="02030602050306030303" pitchFamily="18" charset="0"/>
-            </a:endParaRPr>
           </a:p>
           <a:p>
             <a:pPr>
@@ -15097,11 +15110,7 @@
             </a:pPr>
             <a:r>
               <a:rPr lang="en-US" sz="2500"/>
-              <a:t>Giao tiếp bên </a:t>
-            </a:r>
-            <a:r>
-              <a:rPr lang="en-US" sz="2500"/>
-              <a:t>ngoài</a:t>
+              <a:t>Giao tiếp bên ngoài</a:t>
             </a:r>
           </a:p>
           <a:p>
@@ -15113,11 +15122,7 @@
             </a:pPr>
             <a:r>
               <a:rPr lang="en-US" sz="2500"/>
-              <a:t>Yêu </a:t>
-            </a:r>
-            <a:r>
-              <a:rPr lang="en-US" sz="2500"/>
-              <a:t>cầu chức năng</a:t>
+              <a:t>Yêu cầu chức năng</a:t>
             </a:r>
           </a:p>
           <a:p>
@@ -15131,7 +15136,6 @@
               <a:rPr lang="en-US" sz="2500"/>
               <a:t>Yêu cầu hiệu suất</a:t>
             </a:r>
-            <a:endParaRPr lang="en-US" sz="2500"/>
           </a:p>
           <a:p>
             <a:pPr lvl="1">
@@ -15142,13 +15146,8 @@
             </a:pPr>
             <a:r>
               <a:rPr lang="en-US" sz="2500"/>
-              <a:t>Ràng buộc về thiết </a:t>
-            </a:r>
-            <a:r>
-              <a:rPr lang="en-US" sz="2500"/>
-              <a:t>kế</a:t>
-            </a:r>
-            <a:endParaRPr lang="en-US" sz="2500"/>
+              <a:t>Ràng buộc về thiết kế</a:t>
+            </a:r>
           </a:p>
           <a:p>
             <a:pPr>
@@ -15282,11 +15281,6 @@
               </a:rPr>
               <a:t>Thẩm định</a:t>
             </a:r>
-            <a:endParaRPr lang="en-US" sz="2600" b="1">
-              <a:latin typeface="+mn-lt"/>
-              <a:ea typeface="+mn-ea"/>
-              <a:cs typeface="+mn-cs"/>
-            </a:endParaRPr>
           </a:p>
         </p:txBody>
       </p:sp>
@@ -16000,7 +15994,7 @@
           <a:p>
             <a:r>
               <a:rPr lang="en-US"/>
-              <a:t>Phần loại</a:t>
+              <a:t>Phân loại</a:t>
             </a:r>
           </a:p>
           <a:p>
@@ -16239,7 +16233,52 @@
           <a:p>
             <a:r>
               <a:rPr lang="en-US"/>
-              <a:t>Là ngôn ngữ tự nhiến</a:t>
+              <a:t>Là một hình thức giới hạn của ngôn ngữ tự nhiên được dùng để đặc tả các yêu cầu.</a:t>
+            </a:r>
+          </a:p>
+          <a:p>
+            <a:r>
+              <a:rPr lang="en-US"/>
+              <a:t>Chúng sử dụng một tập từ vựng và ngữ pháp nhất định để thể hiện các yêu cầu dưới một sự kiểm soát chặt chẽ để có thể được phân tích (parse)</a:t>
+            </a:r>
+          </a:p>
+          <a:p>
+            <a:r>
+              <a:rPr lang="en-US"/>
+              <a:t>Ưu điểm: </a:t>
+            </a:r>
+          </a:p>
+          <a:p>
+            <a:pPr lvl="1"/>
+            <a:r>
+              <a:rPr lang="en-US"/>
+              <a:t>Giúp ta loại bỏ các vấn đề phát sinh từ sự mơ hồ và tang mức độ đồng nhất trên tài liệu đặc tả.</a:t>
+            </a:r>
+          </a:p>
+          <a:p>
+            <a:r>
+              <a:rPr lang="en-US"/>
+              <a:t>Nhược điểm:</a:t>
+            </a:r>
+          </a:p>
+          <a:p>
+            <a:pPr lvl="1"/>
+            <a:r>
+              <a:rPr lang="en-US"/>
+              <a:t>Đòi hỏi các bên có liên quan (stakeholder) phải được đào tạo ở một trình độ nhất đỉnh để có thể sử dụng.</a:t>
+            </a:r>
+          </a:p>
+          <a:p>
+            <a:r>
+              <a:rPr lang="en-US"/>
+              <a:t>Cách tiếp cận:</a:t>
+            </a:r>
+          </a:p>
+          <a:p>
+            <a:pPr lvl="1"/>
+            <a:r>
+              <a:rPr lang="en-US"/>
+              <a:t>Sử dụng các template dạng biểu mẫu (form-based template)</a:t>
             </a:r>
           </a:p>
         </p:txBody>
@@ -16302,35 +16341,440 @@
           <a:lstStyle/>
           <a:p>
             <a:r>
-              <a:rPr lang="en-US" b="1"/>
-              <a:t>Ngôn ngữ thiết kế chương trình PDL</a:t>
-            </a:r>
-          </a:p>
-        </p:txBody>
-      </p:sp>
-      <p:sp>
-        <p:nvSpPr>
-          <p:cNvPr id="3" name="Content Placeholder 2"/>
-          <p:cNvSpPr>
-            <a:spLocks noGrp="1"/>
-          </p:cNvSpPr>
+              <a:rPr lang="en-US"/>
+              <a:t>Ví dụ </a:t>
+            </a:r>
+            <a:endParaRPr lang="en-US"/>
+          </a:p>
+        </p:txBody>
+      </p:sp>
+      <p:graphicFrame>
+        <p:nvGraphicFramePr>
+          <p:cNvPr id="4" name="Content Placeholder 3"/>
+          <p:cNvGraphicFramePr>
+            <a:graphicFrameLocks noGrp="1"/>
+          </p:cNvGraphicFramePr>
           <p:nvPr>
             <p:ph idx="1"/>
-          </p:nvPr>
-        </p:nvSpPr>
-        <p:spPr/>
-        <p:txBody>
-          <a:bodyPr/>
-          <a:lstStyle/>
-          <a:p>
-            <a:endParaRPr lang="en-US"/>
-          </a:p>
-        </p:txBody>
-      </p:sp>
+            <p:extLst>
+              <p:ext uri="{D42A27DB-BD31-4B8C-83A1-F6EECF244321}">
+                <p14:modId xmlns:p14="http://schemas.microsoft.com/office/powerpoint/2010/main" val="1745986201"/>
+              </p:ext>
+            </p:extLst>
+          </p:nvPr>
+        </p:nvGraphicFramePr>
+        <p:xfrm>
+          <a:off x="1904999" y="1905000"/>
+          <a:ext cx="5334001" cy="3779517"/>
+        </p:xfrm>
+        <a:graphic>
+          <a:graphicData uri="http://schemas.openxmlformats.org/drawingml/2006/table">
+            <a:tbl>
+              <a:tblPr firstRow="1" bandRow="1">
+                <a:tableStyleId>{5C22544A-7EE6-4342-B048-85BDC9FD1C3A}</a:tableStyleId>
+              </a:tblPr>
+              <a:tblGrid>
+                <a:gridCol w="1524001">
+                  <a:extLst>
+                    <a:ext uri="{9D8B030D-6E8A-4147-A177-3AD203B41FA5}">
+                      <a16:colId xmlns:a16="http://schemas.microsoft.com/office/drawing/2014/main" val="553860462"/>
+                    </a:ext>
+                  </a:extLst>
+                </a:gridCol>
+                <a:gridCol w="3810000">
+                  <a:extLst>
+                    <a:ext uri="{9D8B030D-6E8A-4147-A177-3AD203B41FA5}">
+                      <a16:colId xmlns:a16="http://schemas.microsoft.com/office/drawing/2014/main" val="1646000522"/>
+                    </a:ext>
+                  </a:extLst>
+                </a:gridCol>
+              </a:tblGrid>
+              <a:tr h="375892">
+                <a:tc>
+                  <a:txBody>
+                    <a:bodyPr/>
+                    <a:lstStyle/>
+                    <a:p>
+                      <a:endParaRPr lang="en-US" sz="1400"/>
+                    </a:p>
+                  </a:txBody>
+                  <a:tcPr/>
+                </a:tc>
+                <a:tc>
+                  <a:txBody>
+                    <a:bodyPr/>
+                    <a:lstStyle/>
+                    <a:p>
+                      <a:endParaRPr lang="en-US"/>
+                    </a:p>
+                  </a:txBody>
+                  <a:tcPr/>
+                </a:tc>
+                <a:extLst>
+                  <a:ext uri="{0D108BD9-81ED-4DB2-BD59-A6C34878D82A}">
+                    <a16:rowId xmlns:a16="http://schemas.microsoft.com/office/drawing/2014/main" val="1198104839"/>
+                  </a:ext>
+                </a:extLst>
+              </a:tr>
+              <a:tr h="375892">
+                <a:tc>
+                  <a:txBody>
+                    <a:bodyPr/>
+                    <a:lstStyle/>
+                    <a:p>
+                      <a:r>
+                        <a:rPr lang="en-US" sz="1400" b="1" i="0">
+                          <a:solidFill>
+                            <a:srgbClr val="000000"/>
+                          </a:solidFill>
+                          <a:effectLst/>
+                          <a:latin typeface="WarnockPro-Bold"/>
+                        </a:rPr>
+                        <a:t>Function</a:t>
+                      </a:r>
+                      <a:endParaRPr lang="en-US" sz="1400">
+                        <a:effectLst/>
+                      </a:endParaRPr>
+                    </a:p>
+                  </a:txBody>
+                  <a:tcPr anchor="ctr"/>
+                </a:tc>
+                <a:tc>
+                  <a:txBody>
+                    <a:bodyPr/>
+                    <a:lstStyle/>
+                    <a:p>
+                      <a:endParaRPr lang="en-US"/>
+                    </a:p>
+                  </a:txBody>
+                  <a:tcPr/>
+                </a:tc>
+                <a:extLst>
+                  <a:ext uri="{0D108BD9-81ED-4DB2-BD59-A6C34878D82A}">
+                    <a16:rowId xmlns:a16="http://schemas.microsoft.com/office/drawing/2014/main" val="1066710561"/>
+                  </a:ext>
+                </a:extLst>
+              </a:tr>
+              <a:tr h="375892">
+                <a:tc>
+                  <a:txBody>
+                    <a:bodyPr/>
+                    <a:lstStyle/>
+                    <a:p>
+                      <a:r>
+                        <a:rPr lang="en-US" sz="1400" b="1" i="0">
+                          <a:solidFill>
+                            <a:srgbClr val="000000"/>
+                          </a:solidFill>
+                          <a:effectLst/>
+                          <a:latin typeface="WarnockPro-Bold"/>
+                        </a:rPr>
+                        <a:t>Description</a:t>
+                      </a:r>
+                      <a:endParaRPr lang="en-US" sz="1400">
+                        <a:effectLst/>
+                      </a:endParaRPr>
+                    </a:p>
+                  </a:txBody>
+                  <a:tcPr anchor="ctr"/>
+                </a:tc>
+                <a:tc>
+                  <a:txBody>
+                    <a:bodyPr/>
+                    <a:lstStyle/>
+                    <a:p>
+                      <a:endParaRPr lang="en-US"/>
+                    </a:p>
+                  </a:txBody>
+                  <a:tcPr/>
+                </a:tc>
+                <a:extLst>
+                  <a:ext uri="{0D108BD9-81ED-4DB2-BD59-A6C34878D82A}">
+                    <a16:rowId xmlns:a16="http://schemas.microsoft.com/office/drawing/2014/main" val="1819406728"/>
+                  </a:ext>
+                </a:extLst>
+              </a:tr>
+              <a:tr h="375892">
+                <a:tc>
+                  <a:txBody>
+                    <a:bodyPr/>
+                    <a:lstStyle/>
+                    <a:p>
+                      <a:r>
+                        <a:rPr lang="en-US" sz="1400" b="1" i="0">
+                          <a:solidFill>
+                            <a:srgbClr val="000000"/>
+                          </a:solidFill>
+                          <a:effectLst/>
+                          <a:latin typeface="WarnockPro-Bold"/>
+                        </a:rPr>
+                        <a:t>Inputs</a:t>
+                      </a:r>
+                      <a:endParaRPr lang="en-US" sz="1400">
+                        <a:effectLst/>
+                      </a:endParaRPr>
+                    </a:p>
+                  </a:txBody>
+                  <a:tcPr anchor="ctr"/>
+                </a:tc>
+                <a:tc>
+                  <a:txBody>
+                    <a:bodyPr/>
+                    <a:lstStyle/>
+                    <a:p>
+                      <a:endParaRPr lang="en-US"/>
+                    </a:p>
+                  </a:txBody>
+                  <a:tcPr/>
+                </a:tc>
+                <a:extLst>
+                  <a:ext uri="{0D108BD9-81ED-4DB2-BD59-A6C34878D82A}">
+                    <a16:rowId xmlns:a16="http://schemas.microsoft.com/office/drawing/2014/main" val="2395627147"/>
+                  </a:ext>
+                </a:extLst>
+              </a:tr>
+              <a:tr h="375892">
+                <a:tc>
+                  <a:txBody>
+                    <a:bodyPr/>
+                    <a:lstStyle/>
+                    <a:p>
+                      <a:r>
+                        <a:rPr lang="en-US" sz="1400" b="1" i="0">
+                          <a:solidFill>
+                            <a:srgbClr val="000000"/>
+                          </a:solidFill>
+                          <a:effectLst/>
+                          <a:latin typeface="WarnockPro-Bold"/>
+                        </a:rPr>
+                        <a:t>Outputs</a:t>
+                      </a:r>
+                      <a:endParaRPr lang="en-US" sz="1400">
+                        <a:effectLst/>
+                      </a:endParaRPr>
+                    </a:p>
+                  </a:txBody>
+                  <a:tcPr anchor="ctr"/>
+                </a:tc>
+                <a:tc>
+                  <a:txBody>
+                    <a:bodyPr/>
+                    <a:lstStyle/>
+                    <a:p>
+                      <a:endParaRPr lang="en-US"/>
+                    </a:p>
+                  </a:txBody>
+                  <a:tcPr/>
+                </a:tc>
+                <a:extLst>
+                  <a:ext uri="{0D108BD9-81ED-4DB2-BD59-A6C34878D82A}">
+                    <a16:rowId xmlns:a16="http://schemas.microsoft.com/office/drawing/2014/main" val="4119796087"/>
+                  </a:ext>
+                </a:extLst>
+              </a:tr>
+              <a:tr h="375892">
+                <a:tc>
+                  <a:txBody>
+                    <a:bodyPr/>
+                    <a:lstStyle/>
+                    <a:p>
+                      <a:r>
+                        <a:rPr lang="en-US" sz="1400" b="1" i="0">
+                          <a:solidFill>
+                            <a:srgbClr val="000000"/>
+                          </a:solidFill>
+                          <a:effectLst/>
+                          <a:latin typeface="WarnockPro-Bold"/>
+                        </a:rPr>
+                        <a:t>Destination</a:t>
+                      </a:r>
+                      <a:endParaRPr lang="en-US" sz="1400">
+                        <a:effectLst/>
+                      </a:endParaRPr>
+                    </a:p>
+                  </a:txBody>
+                  <a:tcPr anchor="ctr"/>
+                </a:tc>
+                <a:tc>
+                  <a:txBody>
+                    <a:bodyPr/>
+                    <a:lstStyle/>
+                    <a:p>
+                      <a:endParaRPr lang="en-US"/>
+                    </a:p>
+                  </a:txBody>
+                  <a:tcPr/>
+                </a:tc>
+                <a:extLst>
+                  <a:ext uri="{0D108BD9-81ED-4DB2-BD59-A6C34878D82A}">
+                    <a16:rowId xmlns:a16="http://schemas.microsoft.com/office/drawing/2014/main" val="943454840"/>
+                  </a:ext>
+                </a:extLst>
+              </a:tr>
+              <a:tr h="396489">
+                <a:tc>
+                  <a:txBody>
+                    <a:bodyPr/>
+                    <a:lstStyle/>
+                    <a:p>
+                      <a:r>
+                        <a:rPr lang="en-US" sz="1400" b="1" i="0">
+                          <a:solidFill>
+                            <a:srgbClr val="000000"/>
+                          </a:solidFill>
+                          <a:effectLst/>
+                          <a:latin typeface="WarnockPro-Bold"/>
+                        </a:rPr>
+                        <a:t>Requires</a:t>
+                      </a:r>
+                      <a:endParaRPr lang="en-US" sz="1400">
+                        <a:effectLst/>
+                      </a:endParaRPr>
+                    </a:p>
+                  </a:txBody>
+                  <a:tcPr anchor="ctr"/>
+                </a:tc>
+                <a:tc>
+                  <a:txBody>
+                    <a:bodyPr/>
+                    <a:lstStyle/>
+                    <a:p>
+                      <a:endParaRPr lang="en-US"/>
+                    </a:p>
+                  </a:txBody>
+                  <a:tcPr/>
+                </a:tc>
+                <a:extLst>
+                  <a:ext uri="{0D108BD9-81ED-4DB2-BD59-A6C34878D82A}">
+                    <a16:rowId xmlns:a16="http://schemas.microsoft.com/office/drawing/2014/main" val="3902572225"/>
+                  </a:ext>
+                </a:extLst>
+              </a:tr>
+              <a:tr h="375892">
+                <a:tc>
+                  <a:txBody>
+                    <a:bodyPr/>
+                    <a:lstStyle/>
+                    <a:p>
+                      <a:r>
+                        <a:rPr lang="en-US" sz="1400" b="1" i="0">
+                          <a:solidFill>
+                            <a:srgbClr val="000000"/>
+                          </a:solidFill>
+                          <a:effectLst/>
+                          <a:latin typeface="WarnockPro-Bold"/>
+                        </a:rPr>
+                        <a:t>Precondition</a:t>
+                      </a:r>
+                      <a:endParaRPr lang="en-US" sz="1400">
+                        <a:effectLst/>
+                      </a:endParaRPr>
+                    </a:p>
+                  </a:txBody>
+                  <a:tcPr anchor="ctr"/>
+                </a:tc>
+                <a:tc>
+                  <a:txBody>
+                    <a:bodyPr/>
+                    <a:lstStyle/>
+                    <a:p>
+                      <a:endParaRPr lang="en-US"/>
+                    </a:p>
+                  </a:txBody>
+                  <a:tcPr/>
+                </a:tc>
+                <a:extLst>
+                  <a:ext uri="{0D108BD9-81ED-4DB2-BD59-A6C34878D82A}">
+                    <a16:rowId xmlns:a16="http://schemas.microsoft.com/office/drawing/2014/main" val="2099365865"/>
+                  </a:ext>
+                </a:extLst>
+              </a:tr>
+              <a:tr h="375892">
+                <a:tc>
+                  <a:txBody>
+                    <a:bodyPr/>
+                    <a:lstStyle/>
+                    <a:p>
+                      <a:r>
+                        <a:rPr lang="en-US" sz="1400" b="1" i="0">
+                          <a:solidFill>
+                            <a:srgbClr val="000000"/>
+                          </a:solidFill>
+                          <a:effectLst/>
+                          <a:latin typeface="WarnockPro-Bold"/>
+                        </a:rPr>
+                        <a:t>Postcondition</a:t>
+                      </a:r>
+                      <a:endParaRPr lang="en-US" sz="1400">
+                        <a:effectLst/>
+                      </a:endParaRPr>
+                    </a:p>
+                  </a:txBody>
+                  <a:tcPr anchor="ctr"/>
+                </a:tc>
+                <a:tc>
+                  <a:txBody>
+                    <a:bodyPr/>
+                    <a:lstStyle/>
+                    <a:p>
+                      <a:endParaRPr lang="en-US"/>
+                    </a:p>
+                  </a:txBody>
+                  <a:tcPr/>
+                </a:tc>
+                <a:extLst>
+                  <a:ext uri="{0D108BD9-81ED-4DB2-BD59-A6C34878D82A}">
+                    <a16:rowId xmlns:a16="http://schemas.microsoft.com/office/drawing/2014/main" val="2242024356"/>
+                  </a:ext>
+                </a:extLst>
+              </a:tr>
+              <a:tr h="375892">
+                <a:tc>
+                  <a:txBody>
+                    <a:bodyPr/>
+                    <a:lstStyle/>
+                    <a:p>
+                      <a:r>
+                        <a:rPr lang="en-US" sz="1400" b="1" i="0">
+                          <a:solidFill>
+                            <a:srgbClr val="000000"/>
+                          </a:solidFill>
+                          <a:effectLst/>
+                          <a:latin typeface="WarnockPro-Bold"/>
+                        </a:rPr>
+                        <a:t>Side-effects</a:t>
+                      </a:r>
+                      <a:endParaRPr lang="en-US" sz="1400">
+                        <a:effectLst/>
+                      </a:endParaRPr>
+                    </a:p>
+                  </a:txBody>
+                  <a:tcPr anchor="ctr"/>
+                </a:tc>
+                <a:tc>
+                  <a:txBody>
+                    <a:bodyPr/>
+                    <a:lstStyle/>
+                    <a:p>
+                      <a:endParaRPr lang="en-US"/>
+                    </a:p>
+                  </a:txBody>
+                  <a:tcPr/>
+                </a:tc>
+                <a:extLst>
+                  <a:ext uri="{0D108BD9-81ED-4DB2-BD59-A6C34878D82A}">
+                    <a16:rowId xmlns:a16="http://schemas.microsoft.com/office/drawing/2014/main" val="3477676302"/>
+                  </a:ext>
+                </a:extLst>
+              </a:tr>
+            </a:tbl>
+          </a:graphicData>
+        </a:graphic>
+      </p:graphicFrame>
     </p:spTree>
     <p:extLst>
       <p:ext uri="{BB962C8B-B14F-4D97-AF65-F5344CB8AC3E}">
-        <p14:creationId xmlns:p14="http://schemas.microsoft.com/office/powerpoint/2010/main" val="3671833648"/>
+        <p14:creationId xmlns:p14="http://schemas.microsoft.com/office/powerpoint/2010/main" val="1868243072"/>
       </p:ext>
     </p:extLst>
   </p:cSld>
@@ -16371,7 +16815,7 @@
       </p:grpSpPr>
       <p:sp>
         <p:nvSpPr>
-          <p:cNvPr id="4" name="Title 3"/>
+          <p:cNvPr id="2" name="Title 1"/>
           <p:cNvSpPr>
             <a:spLocks noGrp="1"/>
           </p:cNvSpPr>
@@ -16386,14 +16830,14 @@
           <a:p>
             <a:r>
               <a:rPr lang="en-US" b="1"/>
-              <a:t>Use Case</a:t>
-            </a:r>
-          </a:p>
-        </p:txBody>
-      </p:sp>
-      <p:sp>
-        <p:nvSpPr>
-          <p:cNvPr id="5" name="Content Placeholder 4"/>
+              <a:t>Ngôn ngữ thiết kế chương trình - PDL</a:t>
+            </a:r>
+          </a:p>
+        </p:txBody>
+      </p:sp>
+      <p:sp>
+        <p:nvSpPr>
+          <p:cNvPr id="3" name="Content Placeholder 2"/>
           <p:cNvSpPr>
             <a:spLocks noGrp="1"/>
           </p:cNvSpPr>
@@ -16403,17 +16847,93 @@
         </p:nvSpPr>
         <p:spPr/>
         <p:txBody>
-          <a:bodyPr/>
+          <a:bodyPr>
+            <a:normAutofit fontScale="92500" lnSpcReduction="10000"/>
+          </a:bodyPr>
           <a:lstStyle/>
           <a:p>
+            <a:r>
+              <a:rPr lang="en-US"/>
+              <a:t>Sử dụng các ngôn ngữ tự nhiên giống như là ngôn ngữ lập trình nhưng sự biểu đạt linh hoạt hơn, không bị gò bó như ngôn ngữ lập trình.</a:t>
+            </a:r>
+          </a:p>
+          <a:p>
+            <a:r>
+              <a:rPr lang="en-US"/>
+              <a:t>Gần giống với mã giả (</a:t>
+            </a:r>
+            <a:r>
+              <a:rPr lang="en-US"/>
+              <a:t>Pseudocode) nhưng không phải là mã giả.</a:t>
+            </a:r>
             <a:endParaRPr lang="en-US"/>
+          </a:p>
+          <a:p>
+            <a:r>
+              <a:rPr lang="en-US"/>
+              <a:t>Được sử dụng trong 2 trường hợp:</a:t>
+            </a:r>
+          </a:p>
+          <a:p>
+            <a:pPr lvl="1"/>
+            <a:r>
+              <a:rPr lang="en-US"/>
+              <a:t>Khi một hoạt động được mô tả như là một choỗi các hành động và thứ tự giữa chúng rất quan trọng</a:t>
+            </a:r>
+          </a:p>
+          <a:p>
+            <a:pPr lvl="1"/>
+            <a:r>
+              <a:rPr lang="en-US"/>
+              <a:t>Khi giao tiếp (interface) phần cứng và phần mềm cần phải được quy định.</a:t>
+            </a:r>
+          </a:p>
+          <a:p>
+            <a:r>
+              <a:rPr lang="en-US"/>
+              <a:t>Ưu:</a:t>
+            </a:r>
+          </a:p>
+          <a:p>
+            <a:pPr lvl="1"/>
+            <a:r>
+              <a:rPr lang="en-US"/>
+              <a:t>Có cấu trúc giống như ngôn ngữ lập trình, có vốn từ vựng đa dạng của ngôn ngữ tự nhiên</a:t>
+            </a:r>
+          </a:p>
+          <a:p>
+            <a:r>
+              <a:rPr lang="en-US"/>
+              <a:t>Nhược:</a:t>
+            </a:r>
+          </a:p>
+          <a:p>
+            <a:pPr lvl="1"/>
+            <a:r>
+              <a:rPr lang="en-US"/>
+              <a:t>PDL có thể chưa đủ khả năng để biểu diễn các khái niệm trong miền ứng dụng (domain)</a:t>
+            </a:r>
+          </a:p>
+          <a:p>
+            <a:pPr lvl="1"/>
+            <a:r>
+              <a:rPr lang="en-US"/>
+              <a:t>Đặc tả được tạo ra bởi PDL có thể được dùng cho việc thiết kế hơn là một đặc tả tuần túy.</a:t>
+            </a:r>
+          </a:p>
+          <a:p>
+            <a:pPr lvl="1"/>
+            <a:r>
+              <a:rPr lang="en-US"/>
+              <a:t>Chỉ có thể hiểu được bởi những người có kiến thức về ngôn ngữ lập trình</a:t>
+            </a:r>
           </a:p>
         </p:txBody>
       </p:sp>
     </p:spTree>
     <p:extLst>
       <p:ext uri="{BB962C8B-B14F-4D97-AF65-F5344CB8AC3E}">
-        <p14:creationId xmlns:p14="http://schemas.microsoft.com/office/powerpoint/2010/main" val="956678767"/>
+        <p14:creationId xmlns:p14="http://schemas.microsoft.com/office/powerpoint/2010/main" val="3671833648"/>
       </p:ext>
     </p:extLst>
   </p:cSld>
@@ -16452,51 +16972,77 @@
           <a:chExt cx="0" cy="0"/>
         </a:xfrm>
       </p:grpSpPr>
-      <p:sp>
-        <p:nvSpPr>
-          <p:cNvPr id="2" name="Title 1"/>
-          <p:cNvSpPr>
-            <a:spLocks noGrp="1"/>
-          </p:cNvSpPr>
-          <p:nvPr>
-            <p:ph type="title"/>
-          </p:nvPr>
-        </p:nvSpPr>
-        <p:spPr/>
-        <p:txBody>
-          <a:bodyPr/>
-          <a:lstStyle/>
-          <a:p>
-            <a:r>
-              <a:rPr lang="en-US" b="1"/>
-              <a:t>Use Stories</a:t>
-            </a:r>
-          </a:p>
-        </p:txBody>
-      </p:sp>
-      <p:sp>
-        <p:nvSpPr>
-          <p:cNvPr id="3" name="Content Placeholder 2"/>
-          <p:cNvSpPr>
-            <a:spLocks noGrp="1"/>
-          </p:cNvSpPr>
+      <p:pic>
+        <p:nvPicPr>
+          <p:cNvPr id="1026" name="Picture 2" descr="Kết quả hình ảnh cho program design language"/>
+          <p:cNvPicPr>
+            <a:picLocks noGrp="1" noChangeAspect="1" noChangeArrowheads="1"/>
+          </p:cNvPicPr>
           <p:nvPr>
             <p:ph idx="1"/>
           </p:nvPr>
-        </p:nvSpPr>
-        <p:spPr/>
-        <p:txBody>
-          <a:bodyPr/>
-          <a:lstStyle/>
-          <a:p>
-            <a:endParaRPr lang="en-US"/>
-          </a:p>
-        </p:txBody>
-      </p:sp>
+        </p:nvPicPr>
+        <p:blipFill>
+          <a:blip r:embed="rId2" cstate="print">
+            <a:extLst>
+              <a:ext uri="{28A0092B-C50C-407E-A947-70E740481C1C}">
+                <a14:useLocalDpi xmlns:a14="http://schemas.microsoft.com/office/drawing/2010/main" val="0"/>
+              </a:ext>
+            </a:extLst>
+          </a:blip>
+          <a:srcRect/>
+          <a:stretch>
+            <a:fillRect/>
+          </a:stretch>
+        </p:blipFill>
+        <p:spPr bwMode="auto">
+          <a:xfrm>
+            <a:off x="540571" y="1295400"/>
+            <a:ext cx="4021357" cy="4111388"/>
+          </a:xfrm>
+          <a:prstGeom prst="rect">
+            <a:avLst/>
+          </a:prstGeom>
+          <a:noFill/>
+          <a:extLst>
+            <a:ext uri="{909E8E84-426E-40DD-AFC4-6F175D3DCCD1}">
+              <a14:hiddenFill xmlns:a14="http://schemas.microsoft.com/office/drawing/2010/main">
+                <a:solidFill>
+                  <a:srgbClr val="FFFFFF"/>
+                </a:solidFill>
+              </a14:hiddenFill>
+            </a:ext>
+          </a:extLst>
+        </p:spPr>
+      </p:pic>
+      <p:pic>
+        <p:nvPicPr>
+          <p:cNvPr id="4" name="Picture 3"/>
+          <p:cNvPicPr>
+            <a:picLocks noChangeAspect="1"/>
+          </p:cNvPicPr>
+          <p:nvPr/>
+        </p:nvPicPr>
+        <p:blipFill>
+          <a:blip r:embed="rId3"/>
+          <a:stretch>
+            <a:fillRect/>
+          </a:stretch>
+        </p:blipFill>
+        <p:spPr>
+          <a:xfrm>
+            <a:off x="4561928" y="1295400"/>
+            <a:ext cx="3962400" cy="3924300"/>
+          </a:xfrm>
+          <a:prstGeom prst="rect">
+            <a:avLst/>
+          </a:prstGeom>
+        </p:spPr>
+      </p:pic>
     </p:spTree>
     <p:extLst>
       <p:ext uri="{BB962C8B-B14F-4D97-AF65-F5344CB8AC3E}">
-        <p14:creationId xmlns:p14="http://schemas.microsoft.com/office/powerpoint/2010/main" val="1074246854"/>
+        <p14:creationId xmlns:p14="http://schemas.microsoft.com/office/powerpoint/2010/main" val="921968306"/>
       </p:ext>
     </p:extLst>
   </p:cSld>
@@ -16673,7 +17219,7 @@
       </p:grpSpPr>
       <p:sp>
         <p:nvSpPr>
-          <p:cNvPr id="2" name="Title 1"/>
+          <p:cNvPr id="4" name="Title 3"/>
           <p:cNvSpPr>
             <a:spLocks noGrp="1"/>
           </p:cNvSpPr>
@@ -16688,14 +17234,14 @@
           <a:p>
             <a:r>
               <a:rPr lang="en-US" b="1"/>
-              <a:t>Formal Methods</a:t>
-            </a:r>
-          </a:p>
-        </p:txBody>
-      </p:sp>
-      <p:sp>
-        <p:nvSpPr>
-          <p:cNvPr id="3" name="Content Placeholder 2"/>
+              <a:t>Use Case</a:t>
+            </a:r>
+          </a:p>
+        </p:txBody>
+      </p:sp>
+      <p:sp>
+        <p:nvSpPr>
+          <p:cNvPr id="5" name="Content Placeholder 4"/>
           <p:cNvSpPr>
             <a:spLocks noGrp="1"/>
           </p:cNvSpPr>
@@ -16705,35 +17251,68 @@
         </p:nvSpPr>
         <p:spPr/>
         <p:txBody>
-          <a:bodyPr/>
+          <a:bodyPr>
+            <a:noAutofit/>
+          </a:bodyPr>
           <a:lstStyle/>
           <a:p>
             <a:r>
-              <a:rPr lang="en-US"/>
-              <a:t>Z</a:t>
-            </a:r>
-          </a:p>
-          <a:p>
-            <a:r>
-              <a:rPr lang="en-US"/>
-              <a:t>VDM</a:t>
-            </a:r>
-          </a:p>
-          <a:p>
-            <a:r>
-              <a:rPr lang="en-US"/>
-              <a:t>CS</a:t>
-            </a:r>
-          </a:p>
-          <a:p>
-            <a:endParaRPr lang="en-US"/>
+              <a:rPr lang="vi-VN" sz="1700">
+                <a:latin typeface="Constantia" panose="02030602050306030303" pitchFamily="18" charset="0"/>
+              </a:rPr>
+              <a:t>Use case mô tả sự tương tác đặc trưng giữa người dùng bên ngoài (actor) và hệ thống. Nó thể hiện ứng xử của hệ thống đối với bên ngoài, trong một hoàn cảnh nhất định, xét từ quan điểm của người sử dụng. </a:t>
+            </a:r>
+            <a:endParaRPr lang="en-US" sz="1700">
+              <a:latin typeface="Constantia" panose="02030602050306030303" pitchFamily="18" charset="0"/>
+            </a:endParaRPr>
+          </a:p>
+          <a:p>
+            <a:r>
+              <a:rPr lang="vi-VN" sz="1700">
+                <a:latin typeface="Constantia" panose="02030602050306030303" pitchFamily="18" charset="0"/>
+              </a:rPr>
+              <a:t>Nó mô tả các yêu cầu đối với hệ thống, có nghĩa là những gì hệ thống phải làm chứ không phải mô tả hệ thống làm như thế nào.</a:t>
+            </a:r>
+          </a:p>
+          <a:p>
+            <a:r>
+              <a:rPr lang="vi-VN" sz="1700">
+                <a:latin typeface="Constantia" panose="02030602050306030303" pitchFamily="18" charset="0"/>
+              </a:rPr>
+              <a:t>Mỗi use case mô tả cách thức actor tương tác với hệ thống để đạt được mục tiêu nào đó. </a:t>
+            </a:r>
+            <a:endParaRPr lang="en-US" sz="1700">
+              <a:latin typeface="Constantia" panose="02030602050306030303" pitchFamily="18" charset="0"/>
+            </a:endParaRPr>
+          </a:p>
+          <a:p>
+            <a:r>
+              <a:rPr lang="vi-VN" sz="1700">
+                <a:latin typeface="Constantia" panose="02030602050306030303" pitchFamily="18" charset="0"/>
+              </a:rPr>
+              <a:t>Một hoặc nhiều kịch bản (scenario) có thể được tạo ra từ mỗi use case, tương ứng với chi tiết về mỗi cách thức đạt được mục tiêu nào đó. </a:t>
+            </a:r>
+            <a:endParaRPr lang="en-US" sz="1700">
+              <a:latin typeface="Constantia" panose="02030602050306030303" pitchFamily="18" charset="0"/>
+            </a:endParaRPr>
+          </a:p>
+          <a:p>
+            <a:r>
+              <a:rPr lang="vi-VN" sz="1700">
+                <a:latin typeface="Constantia" panose="02030602050306030303" pitchFamily="18" charset="0"/>
+              </a:rPr>
+              <a:t>Khi mô tả Use case, người ta thường tránh dùng thuật ngữ kỹ thuật, thay vào đó họ sử dụng ngôn ngữ của người dùng cuối hoặc chuyên gia về lĩnh vực đó. </a:t>
+            </a:r>
+            <a:endParaRPr lang="en-US" sz="1700">
+              <a:latin typeface="Constantia" panose="02030602050306030303" pitchFamily="18" charset="0"/>
+            </a:endParaRPr>
           </a:p>
         </p:txBody>
       </p:sp>
     </p:spTree>
     <p:extLst>
       <p:ext uri="{BB962C8B-B14F-4D97-AF65-F5344CB8AC3E}">
-        <p14:creationId xmlns:p14="http://schemas.microsoft.com/office/powerpoint/2010/main" val="4261145615"/>
+        <p14:creationId xmlns:p14="http://schemas.microsoft.com/office/powerpoint/2010/main" val="956678767"/>
       </p:ext>
     </p:extLst>
   </p:cSld>
@@ -16772,54 +17351,51 @@
           <a:chExt cx="0" cy="0"/>
         </a:xfrm>
       </p:grpSpPr>
-      <p:sp>
-        <p:nvSpPr>
-          <p:cNvPr id="2" name="Title 1"/>
-          <p:cNvSpPr>
-            <a:spLocks noGrp="1"/>
-          </p:cNvSpPr>
-          <p:nvPr>
-            <p:ph type="title"/>
-          </p:nvPr>
-        </p:nvSpPr>
-        <p:spPr/>
-        <p:txBody>
-          <a:bodyPr/>
-          <a:lstStyle/>
-          <a:p>
-            <a:r>
-              <a:rPr lang="en-US" b="1"/>
-              <a:t>Informal Methods</a:t>
-            </a:r>
-          </a:p>
-        </p:txBody>
-      </p:sp>
-      <p:sp>
-        <p:nvSpPr>
-          <p:cNvPr id="3" name="Content Placeholder 2"/>
-          <p:cNvSpPr>
-            <a:spLocks noGrp="1"/>
-          </p:cNvSpPr>
-          <p:nvPr>
-            <p:ph idx="1"/>
-          </p:nvPr>
-        </p:nvSpPr>
-        <p:spPr/>
-        <p:txBody>
-          <a:bodyPr/>
-          <a:lstStyle/>
-          <a:p>
-            <a:r>
-              <a:rPr lang="en-US"/>
-              <a:t>DFD</a:t>
-            </a:r>
-          </a:p>
-        </p:txBody>
-      </p:sp>
+      <p:pic>
+        <p:nvPicPr>
+          <p:cNvPr id="2050" name="Picture 2" descr="Kết quả hình ảnh cho use case"/>
+          <p:cNvPicPr>
+            <a:picLocks noChangeAspect="1" noChangeArrowheads="1"/>
+          </p:cNvPicPr>
+          <p:nvPr/>
+        </p:nvPicPr>
+        <p:blipFill>
+          <a:blip r:embed="rId2">
+            <a:extLst>
+              <a:ext uri="{28A0092B-C50C-407E-A947-70E740481C1C}">
+                <a14:useLocalDpi xmlns:a14="http://schemas.microsoft.com/office/drawing/2010/main" val="0"/>
+              </a:ext>
+            </a:extLst>
+          </a:blip>
+          <a:srcRect/>
+          <a:stretch>
+            <a:fillRect/>
+          </a:stretch>
+        </p:blipFill>
+        <p:spPr bwMode="auto">
+          <a:xfrm>
+            <a:off x="1924050" y="900113"/>
+            <a:ext cx="5295900" cy="5057775"/>
+          </a:xfrm>
+          <a:prstGeom prst="rect">
+            <a:avLst/>
+          </a:prstGeom>
+          <a:noFill/>
+          <a:extLst>
+            <a:ext uri="{909E8E84-426E-40DD-AFC4-6F175D3DCCD1}">
+              <a14:hiddenFill xmlns:a14="http://schemas.microsoft.com/office/drawing/2010/main">
+                <a:solidFill>
+                  <a:srgbClr val="FFFFFF"/>
+                </a:solidFill>
+              </a14:hiddenFill>
+            </a:ext>
+          </a:extLst>
+        </p:spPr>
+      </p:pic>
     </p:spTree>
     <p:extLst>
       <p:ext uri="{BB962C8B-B14F-4D97-AF65-F5344CB8AC3E}">
-        <p14:creationId xmlns:p14="http://schemas.microsoft.com/office/powerpoint/2010/main" val="3949951736"/>
+        <p14:creationId xmlns:p14="http://schemas.microsoft.com/office/powerpoint/2010/main" val="2923029827"/>
       </p:ext>
     </p:extLst>
   </p:cSld>
@@ -16875,7 +17451,7 @@
           <a:p>
             <a:r>
               <a:rPr lang="en-US" b="1"/>
-              <a:t>Semiformal Methods</a:t>
+              <a:t>Use Stories</a:t>
             </a:r>
           </a:p>
         </p:txBody>
@@ -16892,20 +17468,182 @@
         </p:nvSpPr>
         <p:spPr/>
         <p:txBody>
-          <a:bodyPr/>
+          <a:bodyPr>
+            <a:normAutofit/>
+          </a:bodyPr>
           <a:lstStyle/>
           <a:p>
             <a:r>
-              <a:rPr lang="en-US"/>
-              <a:t>UML</a:t>
-            </a:r>
+              <a:rPr lang="en-US" sz="1700">
+                <a:latin typeface="+mj-lt"/>
+              </a:rPr>
+              <a:t>L</a:t>
+            </a:r>
+            <a:r>
+              <a:rPr lang="vi-VN" sz="1700">
+                <a:latin typeface="+mj-lt"/>
+              </a:rPr>
+              <a:t>à </a:t>
+            </a:r>
+            <a:r>
+              <a:rPr lang="vi-VN" sz="1700">
+                <a:latin typeface="+mj-lt"/>
+              </a:rPr>
+              <a:t>một tài liệu sơ giản về yêu cầu sản phẩm với góc nhìn người dùng</a:t>
+            </a:r>
+            <a:r>
+              <a:rPr lang="vi-VN" sz="1700">
+                <a:latin typeface="+mj-lt"/>
+              </a:rPr>
+              <a:t>. </a:t>
+            </a:r>
+            <a:endParaRPr lang="en-US" sz="1700">
+              <a:latin typeface="+mj-lt"/>
+            </a:endParaRPr>
+          </a:p>
+          <a:p>
+            <a:r>
+              <a:rPr lang="vi-VN" sz="1700">
+                <a:latin typeface="+mj-lt"/>
+              </a:rPr>
+              <a:t>Thông </a:t>
+            </a:r>
+            <a:r>
+              <a:rPr lang="vi-VN" sz="1700">
+                <a:latin typeface="+mj-lt"/>
+              </a:rPr>
+              <a:t>thường, User Story do khách hàng, hoặc đại điện của khách hàng viết, tuy nhiên nếu có sự cộng </a:t>
+            </a:r>
+            <a:r>
+              <a:rPr lang="vi-VN" sz="1700">
+                <a:latin typeface="+mj-lt"/>
+              </a:rPr>
+              <a:t>tác của</a:t>
+            </a:r>
+            <a:r>
+              <a:rPr lang="en-US" sz="1700">
+                <a:latin typeface="+mj-lt"/>
+              </a:rPr>
+              <a:t> các nhà phát triẻn</a:t>
+            </a:r>
+            <a:r>
+              <a:rPr lang="vi-VN" sz="1700">
+                <a:latin typeface="+mj-lt"/>
+              </a:rPr>
+              <a:t> thì nhóm và khách hàng sẽ có sự chia sẻ hiểu biết về sản phẩm tốt </a:t>
+            </a:r>
+            <a:r>
+              <a:rPr lang="vi-VN" sz="1700">
+                <a:latin typeface="+mj-lt"/>
+              </a:rPr>
+              <a:t>hơn.</a:t>
+            </a:r>
+            <a:endParaRPr lang="en-US" sz="1700">
+              <a:latin typeface="+mj-lt"/>
+            </a:endParaRPr>
+          </a:p>
+          <a:p>
+            <a:r>
+              <a:rPr lang="en-US" sz="1700">
+                <a:latin typeface="+mj-lt"/>
+              </a:rPr>
+              <a:t>Thường được sử dụng trong các phương pháp luận Agile.</a:t>
+            </a:r>
+          </a:p>
+          <a:p>
+            <a:r>
+              <a:rPr lang="en-US" sz="1700">
+                <a:latin typeface="+mj-lt"/>
+              </a:rPr>
+              <a:t>Mô tả hệ thống dưới cái nhìn của người dùng, nói cách khác là hệ thống cần đáp ứng cho họ những gì.</a:t>
+            </a:r>
+          </a:p>
+          <a:p>
+            <a:r>
+              <a:rPr lang="en-US" sz="1700">
+                <a:latin typeface="+mj-lt"/>
+              </a:rPr>
+              <a:t>Thường có dạng:</a:t>
+            </a:r>
+          </a:p>
+          <a:p>
+            <a:pPr lvl="1"/>
+            <a:r>
+              <a:rPr lang="en-US"/>
+              <a:t>“</a:t>
+            </a:r>
+            <a:r>
+              <a:rPr lang="vi-VN"/>
+              <a:t>Là</a:t>
+            </a:r>
+            <a:r>
+              <a:rPr lang="vi-VN"/>
+              <a:t> </a:t>
+            </a:r>
+            <a:r>
+              <a:rPr lang="vi-VN" i="1"/>
+              <a:t>&lt;người dùng </a:t>
+            </a:r>
+            <a:r>
+              <a:rPr lang="vi-VN" i="1"/>
+              <a:t>cụ thể</a:t>
+            </a:r>
+            <a:r>
+              <a:rPr lang="en-US" i="1"/>
+              <a:t>\</a:t>
+            </a:r>
+            <a:r>
+              <a:rPr lang="vi-VN" i="1"/>
+              <a:t>vai </a:t>
+            </a:r>
+            <a:r>
+              <a:rPr lang="vi-VN" i="1"/>
+              <a:t>trò&gt;</a:t>
+            </a:r>
+            <a:r>
+              <a:rPr lang="vi-VN"/>
+              <a:t> , tôi muốn </a:t>
+            </a:r>
+            <a:r>
+              <a:rPr lang="vi-VN" i="1"/>
+              <a:t>&lt;làm gì đó&gt;</a:t>
+            </a:r>
+            <a:r>
+              <a:rPr lang="vi-VN"/>
+              <a:t> để </a:t>
+            </a:r>
+            <a:r>
+              <a:rPr lang="vi-VN" i="1"/>
+              <a:t>&lt;phục vụ mục đích nào </a:t>
+            </a:r>
+            <a:r>
+              <a:rPr lang="vi-VN" i="1"/>
+              <a:t>đó&gt;</a:t>
+            </a:r>
+            <a:r>
+              <a:rPr lang="en-US" i="1"/>
+              <a:t>”</a:t>
+            </a:r>
+            <a:endParaRPr lang="en-US" sz="1400">
+              <a:latin typeface="+mj-lt"/>
+            </a:endParaRPr>
+          </a:p>
+          <a:p>
+            <a:endParaRPr lang="en-US" sz="1700">
+              <a:latin typeface="+mj-lt"/>
+            </a:endParaRPr>
+          </a:p>
+          <a:p>
+            <a:endParaRPr lang="en-US" sz="1700">
+              <a:latin typeface="+mj-lt"/>
+            </a:endParaRPr>
           </a:p>
         </p:txBody>
       </p:sp>
     </p:spTree>
     <p:extLst>
       <p:ext uri="{BB962C8B-B14F-4D97-AF65-F5344CB8AC3E}">
-        <p14:creationId xmlns:p14="http://schemas.microsoft.com/office/powerpoint/2010/main" val="3750338295"/>
+        <p14:creationId xmlns:p14="http://schemas.microsoft.com/office/powerpoint/2010/main" val="1074246854"/>
       </p:ext>
     </p:extLst>
   </p:cSld>
@@ -16944,51 +17682,36 @@
           <a:chExt cx="0" cy="0"/>
         </a:xfrm>
       </p:grpSpPr>
-      <p:sp>
-        <p:nvSpPr>
-          <p:cNvPr id="2" name="Title 1"/>
-          <p:cNvSpPr>
-            <a:spLocks noGrp="1"/>
-          </p:cNvSpPr>
-          <p:nvPr>
-            <p:ph type="title"/>
-          </p:nvPr>
-        </p:nvSpPr>
-        <p:spPr/>
-        <p:txBody>
-          <a:bodyPr/>
-          <a:lstStyle/>
-          <a:p>
-            <a:r>
-              <a:rPr lang="en-US" b="1"/>
-              <a:t>Sơ đồ trạng thái máy - FSM</a:t>
-            </a:r>
-          </a:p>
-        </p:txBody>
-      </p:sp>
-      <p:sp>
-        <p:nvSpPr>
-          <p:cNvPr id="3" name="Content Placeholder 2"/>
-          <p:cNvSpPr>
-            <a:spLocks noGrp="1"/>
-          </p:cNvSpPr>
+      <p:pic>
+        <p:nvPicPr>
+          <p:cNvPr id="4" name="Content Placeholder 3"/>
+          <p:cNvPicPr>
+            <a:picLocks noGrp="1" noChangeAspect="1"/>
+          </p:cNvPicPr>
           <p:nvPr>
             <p:ph idx="1"/>
           </p:nvPr>
-        </p:nvSpPr>
-        <p:spPr/>
-        <p:txBody>
-          <a:bodyPr/>
-          <a:lstStyle/>
-          <a:p>
-            <a:endParaRPr lang="en-US"/>
-          </a:p>
-        </p:txBody>
-      </p:sp>
+        </p:nvPicPr>
+        <p:blipFill>
+          <a:blip r:embed="rId2"/>
+          <a:stretch>
+            <a:fillRect/>
+          </a:stretch>
+        </p:blipFill>
+        <p:spPr>
+          <a:xfrm>
+            <a:off x="1620252" y="1600200"/>
+            <a:ext cx="5903495" cy="3657600"/>
+          </a:xfrm>
+          <a:prstGeom prst="rect">
+            <a:avLst/>
+          </a:prstGeom>
+        </p:spPr>
+      </p:pic>
     </p:spTree>
     <p:extLst>
       <p:ext uri="{BB962C8B-B14F-4D97-AF65-F5344CB8AC3E}">
-        <p14:creationId xmlns:p14="http://schemas.microsoft.com/office/powerpoint/2010/main" val="629876951"/>
+        <p14:creationId xmlns:p14="http://schemas.microsoft.com/office/powerpoint/2010/main" val="590472306"/>
       </p:ext>
     </p:extLst>
   </p:cSld>
@@ -17044,7 +17767,7 @@
           <a:p>
             <a:r>
               <a:rPr lang="en-US" b="1"/>
-              <a:t>Petri net</a:t>
+              <a:t>Formal Methods</a:t>
             </a:r>
           </a:p>
         </p:txBody>
@@ -17063,6 +17786,124 @@
         <p:txBody>
           <a:bodyPr/>
           <a:lstStyle/>
+          <a:p>
+            <a:r>
+              <a:rPr lang="en-US"/>
+              <a:t>Phương pháp hình thức được sử dụng để cải thiện việc xây dựng các yêu cầu bằng cách áp dụng toán học và logic.</a:t>
+            </a:r>
+          </a:p>
+          <a:p>
+            <a:r>
+              <a:rPr lang="en-US"/>
+              <a:t>Phương pháp hình thức sử dụng một số sự kết </a:t>
+            </a:r>
+            <a:r>
+              <a:rPr lang="en-US"/>
+              <a:t>hợp của:</a:t>
+            </a:r>
+          </a:p>
+          <a:p>
+            <a:pPr lvl="1"/>
+            <a:r>
+              <a:rPr lang="en-US"/>
+              <a:t>Tính </a:t>
+            </a:r>
+            <a:r>
+              <a:rPr lang="en-US"/>
+              <a:t>toán vị </a:t>
+            </a:r>
+            <a:r>
+              <a:rPr lang="en-US"/>
+              <a:t>ngữ - </a:t>
+            </a:r>
+            <a:r>
+              <a:rPr lang="en-US"/>
+              <a:t>predicate calculus (first order logic).</a:t>
+            </a:r>
+          </a:p>
+          <a:p>
+            <a:pPr lvl="1"/>
+            <a:r>
+              <a:rPr lang="en-US"/>
+              <a:t>Lý thuyết hàm đệ </a:t>
+            </a:r>
+            <a:r>
+              <a:rPr lang="en-US"/>
+              <a:t>quy - recursive function theory,</a:t>
+            </a:r>
+          </a:p>
+          <a:p>
+            <a:pPr lvl="1"/>
+            <a:r>
+              <a:rPr lang="en-US"/>
+              <a:t>Tính toán Lambda </a:t>
+            </a:r>
+            <a:r>
+              <a:rPr lang="en-US"/>
+              <a:t>- lambda calculus,</a:t>
+            </a:r>
+          </a:p>
+          <a:p>
+            <a:pPr lvl="1"/>
+            <a:r>
+              <a:rPr lang="en-US"/>
+              <a:t>Ngữ nghĩa ngôn ngữ </a:t>
+            </a:r>
+            <a:r>
+              <a:rPr lang="en-US"/>
+              <a:t>lập </a:t>
+            </a:r>
+            <a:r>
+              <a:rPr lang="en-US"/>
+              <a:t>trình - programming </a:t>
+            </a:r>
+            <a:r>
+              <a:rPr lang="en-US"/>
+              <a:t>language semantics,</a:t>
+            </a:r>
+          </a:p>
+          <a:p>
+            <a:pPr lvl="1"/>
+            <a:r>
+              <a:rPr lang="en-US"/>
+              <a:t>Toán rời rạc - </a:t>
+            </a:r>
+            <a:r>
+              <a:rPr lang="en-US"/>
+              <a:t>discrete mathematics,</a:t>
+            </a:r>
+          </a:p>
+          <a:p>
+            <a:pPr lvl="1"/>
+            <a:r>
+              <a:rPr lang="en-US"/>
+              <a:t>Lý thuyết số - number </a:t>
+            </a:r>
+            <a:r>
+              <a:rPr lang="en-US"/>
+              <a:t>theory,</a:t>
+            </a:r>
+          </a:p>
+          <a:p>
+            <a:pPr lvl="1"/>
+            <a:r>
+              <a:rPr lang="en-US"/>
+              <a:t>Đại số trừu tượng - </a:t>
+            </a:r>
+            <a:r>
+              <a:rPr lang="en-US"/>
+              <a:t>abstract algebra.</a:t>
+            </a:r>
+          </a:p>
+          <a:p>
+            <a:r>
+              <a:rPr lang="en-US"/>
+              <a:t>Cách tiếp cận này hấp dẫn bởi vì cung cấp một phương pháp khoa học cho việc đặc tả yêu cầu</a:t>
+            </a:r>
+          </a:p>
+          <a:p>
+            <a:endParaRPr lang="en-US"/>
+          </a:p>
           <a:p>
             <a:endParaRPr lang="en-US"/>
           </a:p>
@@ -17071,7 +17912,7 @@
     </p:spTree>
     <p:extLst>
       <p:ext uri="{BB962C8B-B14F-4D97-AF65-F5344CB8AC3E}">
-        <p14:creationId xmlns:p14="http://schemas.microsoft.com/office/powerpoint/2010/main" val="4174780847"/>
+        <p14:creationId xmlns:p14="http://schemas.microsoft.com/office/powerpoint/2010/main" val="4261145615"/>
       </p:ext>
     </p:extLst>
   </p:cSld>
@@ -17110,55 +17951,51 @@
           <a:chExt cx="0" cy="0"/>
         </a:xfrm>
       </p:grpSpPr>
-      <p:sp>
-        <p:nvSpPr>
-          <p:cNvPr id="4" name="Title 3"/>
-          <p:cNvSpPr>
-            <a:spLocks noGrp="1"/>
-          </p:cNvSpPr>
-          <p:nvPr>
-            <p:ph type="title"/>
-          </p:nvPr>
-        </p:nvSpPr>
-        <p:spPr/>
-        <p:txBody>
-          <a:bodyPr/>
-          <a:lstStyle/>
-          <a:p>
-            <a:r>
-              <a:rPr lang="en-US" sz="3600"/>
-              <a:t>Các tài liệu SRS trong thực tế</a:t>
-            </a:r>
-            <a:endParaRPr lang="en-US"/>
-          </a:p>
-        </p:txBody>
-      </p:sp>
-      <p:sp>
-        <p:nvSpPr>
-          <p:cNvPr id="5" name="Text Placeholder 4"/>
-          <p:cNvSpPr>
-            <a:spLocks noGrp="1"/>
-          </p:cNvSpPr>
-          <p:nvPr>
-            <p:ph type="body" idx="1"/>
-          </p:nvPr>
-        </p:nvSpPr>
-        <p:spPr/>
-        <p:txBody>
-          <a:bodyPr/>
-          <a:lstStyle/>
-          <a:p>
-            <a:r>
-              <a:rPr lang="en-US"/>
-              <a:t>DEMO một số tài liệu đặc tả trong thực tế</a:t>
-            </a:r>
-          </a:p>
-        </p:txBody>
-      </p:sp>
+      <p:pic>
+        <p:nvPicPr>
+          <p:cNvPr id="5" name="Picture 14" descr="forse"/>
+          <p:cNvPicPr>
+            <a:picLocks noChangeAspect="1" noChangeArrowheads="1"/>
+          </p:cNvPicPr>
+          <p:nvPr/>
+        </p:nvPicPr>
+        <p:blipFill>
+          <a:blip r:embed="rId2">
+            <a:extLst>
+              <a:ext uri="{28A0092B-C50C-407E-A947-70E740481C1C}">
+                <a14:useLocalDpi xmlns:a14="http://schemas.microsoft.com/office/drawing/2010/main" val="0"/>
+              </a:ext>
+            </a:extLst>
+          </a:blip>
+          <a:srcRect/>
+          <a:stretch>
+            <a:fillRect/>
+          </a:stretch>
+        </p:blipFill>
+        <p:spPr bwMode="auto">
+          <a:xfrm>
+            <a:off x="1676400" y="685800"/>
+            <a:ext cx="5356225" cy="5486400"/>
+          </a:xfrm>
+          <a:prstGeom prst="rect">
+            <a:avLst/>
+          </a:prstGeom>
+          <a:noFill/>
+          <a:extLst>
+            <a:ext uri="{909E8E84-426E-40DD-AFC4-6F175D3DCCD1}">
+              <a14:hiddenFill xmlns:a14="http://schemas.microsoft.com/office/drawing/2010/main">
+                <a:solidFill>
+                  <a:srgbClr val="FFFFFF"/>
+                </a:solidFill>
+              </a14:hiddenFill>
+            </a:ext>
+          </a:extLst>
+        </p:spPr>
+      </p:pic>
     </p:spTree>
     <p:extLst>
       <p:ext uri="{BB962C8B-B14F-4D97-AF65-F5344CB8AC3E}">
-        <p14:creationId xmlns:p14="http://schemas.microsoft.com/office/powerpoint/2010/main" val="2399078340"/>
+        <p14:creationId xmlns:p14="http://schemas.microsoft.com/office/powerpoint/2010/main" val="1001946931"/>
       </p:ext>
     </p:extLst>
   </p:cSld>
@@ -17212,21 +18049,18 @@
           <a:bodyPr/>
           <a:lstStyle/>
           <a:p>
-            <a:r>
-              <a:rPr lang="en-US"/>
-              <a:t>Tài liệu tham khảo</a:t>
-            </a:r>
-          </a:p>
-        </p:txBody>
-      </p:sp>
-      <p:sp>
-        <p:nvSpPr>
-          <p:cNvPr id="5" name="Text Placeholder 4"/>
+            <a:endParaRPr lang="en-US"/>
+          </a:p>
+        </p:txBody>
+      </p:sp>
+      <p:sp>
+        <p:nvSpPr>
+          <p:cNvPr id="3" name="Content Placeholder 2"/>
           <p:cNvSpPr>
             <a:spLocks noGrp="1"/>
           </p:cNvSpPr>
           <p:nvPr>
-            <p:ph type="body" idx="1"/>
+            <p:ph idx="1"/>
           </p:nvPr>
         </p:nvSpPr>
         <p:spPr/>
@@ -17234,30 +18068,63 @@
           <a:bodyPr/>
           <a:lstStyle/>
           <a:p>
-            <a:pPr marL="285750" indent="-285750">
-              <a:buFontTx/>
-              <a:buChar char="-"/>
-            </a:pPr>
-            <a:r>
-              <a:rPr lang="en-US"/>
-              <a:t>What everything engineer should know</a:t>
-            </a:r>
-          </a:p>
-          <a:p>
-            <a:pPr marL="285750" indent="-285750">
-              <a:buFontTx/>
-              <a:buChar char="-"/>
-            </a:pPr>
-            <a:r>
-              <a:rPr lang="en-US"/>
-              <a:t>Các Slide thầy cho trong mục “đặc tả phần mềm”</a:t>
-            </a:r>
-          </a:p>
-          <a:p>
-            <a:pPr marL="285750" indent="-285750">
-              <a:buFontTx/>
-              <a:buChar char="-"/>
-            </a:pPr>
+            <a:r>
+              <a:rPr lang="en-US"/>
+              <a:t>Các ngôn ngữ thường dùng:</a:t>
+            </a:r>
+          </a:p>
+          <a:p>
+            <a:pPr lvl="1"/>
+            <a:r>
+              <a:rPr lang="en-US"/>
+              <a:t>Ngôn ngữ Z</a:t>
+            </a:r>
+          </a:p>
+          <a:p>
+            <a:pPr lvl="1"/>
+            <a:r>
+              <a:rPr lang="en-US"/>
+              <a:t>Ngôn ngữ VDM</a:t>
+            </a:r>
+          </a:p>
+          <a:p>
+            <a:pPr lvl="1"/>
+            <a:r>
+              <a:rPr lang="en-US"/>
+              <a:t>CSP (cating sequential processes)</a:t>
+            </a:r>
+          </a:p>
+          <a:p>
+            <a:r>
+              <a:rPr lang="en-US"/>
+              <a:t>Được sử dụng trong:</a:t>
+            </a:r>
+          </a:p>
+          <a:p>
+            <a:pPr lvl="1"/>
+            <a:r>
+              <a:rPr lang="en-US"/>
+              <a:t>Kiểm tra tính nhất quán – các  yêu cầu về hành vi hệ thống được mô tả dựa trên các ký hiệu toán học.</a:t>
+            </a:r>
+          </a:p>
+          <a:p>
+            <a:pPr lvl="1"/>
+            <a:r>
+              <a:rPr lang="en-US"/>
+              <a:t>Kiểm tra mô hình – các trạng thái máy (state machine) được sử dụng để xác minh nếu một thuộc tính được cho là thỏa mãn mọi điều kiện</a:t>
+            </a:r>
+          </a:p>
+          <a:p>
+            <a:pPr lvl="1"/>
+            <a:r>
+              <a:rPr lang="en-US"/>
+              <a:t>Chứng minh định lý – tiên đề của hành vi hệ thống được sử dụng để chứng minh rằng hệ thống sẽ hoạt động theo cách định sẵn.</a:t>
+            </a:r>
+          </a:p>
+          <a:p>
+            <a:endParaRPr lang="en-US"/>
+          </a:p>
+          <a:p>
             <a:endParaRPr lang="en-US"/>
           </a:p>
         </p:txBody>
@@ -17265,7 +18132,7 @@
     </p:spTree>
     <p:extLst>
       <p:ext uri="{BB962C8B-B14F-4D97-AF65-F5344CB8AC3E}">
-        <p14:creationId xmlns:p14="http://schemas.microsoft.com/office/powerpoint/2010/main" val="2623819822"/>
+        <p14:creationId xmlns:p14="http://schemas.microsoft.com/office/powerpoint/2010/main" val="621490443"/>
       </p:ext>
     </p:extLst>
   </p:cSld>
@@ -17320,20 +18187,20 @@
           <a:lstStyle/>
           <a:p>
             <a:r>
-              <a:rPr lang="en-US"/>
-              <a:t>Câu hỏi</a:t>
-            </a:r>
-          </a:p>
-        </p:txBody>
-      </p:sp>
-      <p:sp>
-        <p:nvSpPr>
-          <p:cNvPr id="3" name="Text Placeholder 2"/>
+              <a:rPr lang="en-US" b="1"/>
+              <a:t>Informal/Semiformal Methods</a:t>
+            </a:r>
+          </a:p>
+        </p:txBody>
+      </p:sp>
+      <p:sp>
+        <p:nvSpPr>
+          <p:cNvPr id="3" name="Content Placeholder 2"/>
           <p:cNvSpPr>
             <a:spLocks noGrp="1"/>
           </p:cNvSpPr>
           <p:nvPr>
-            <p:ph type="body" idx="1"/>
+            <p:ph idx="1"/>
           </p:nvPr>
         </p:nvSpPr>
         <p:spPr/>
@@ -17343,7 +18210,13 @@
           <a:p>
             <a:r>
               <a:rPr lang="en-US"/>
-              <a:t>Mời thầy và các bạn đặt câu hỏi</a:t>
+              <a:t>Các cách tiếp cận khác không phải phải là phương pháp hình thức thì hoặc là informal (như các biểu đồ dòng chảy – flow-charting) hoặc là semiformal (như UML)</a:t>
+            </a:r>
+          </a:p>
+          <a:p>
+            <a:r>
+              <a:rPr lang="en-US"/>
+              <a:t>Cách tiếp cận semiformal có nghĩa là chúng không xuất hiện dưới dạng các kí hiệu toán học, mà các công cụ mô hình hóa có thể chuyển đổi một phần hoặc toàn bộ chúng thành các biễu diễn toán học khác nhau.</a:t>
             </a:r>
           </a:p>
         </p:txBody>
@@ -17351,7 +18224,7 @@
     </p:spTree>
     <p:extLst>
       <p:ext uri="{BB962C8B-B14F-4D97-AF65-F5344CB8AC3E}">
-        <p14:creationId xmlns:p14="http://schemas.microsoft.com/office/powerpoint/2010/main" val="788291268"/>
+        <p14:creationId xmlns:p14="http://schemas.microsoft.com/office/powerpoint/2010/main" val="3949951736"/>
       </p:ext>
     </p:extLst>
   </p:cSld>
@@ -17392,32 +18265,254 @@
       </p:grpSpPr>
       <p:sp>
         <p:nvSpPr>
-          <p:cNvPr id="4" name="Title 3"/>
+          <p:cNvPr id="2" name="Title 1"/>
           <p:cNvSpPr>
             <a:spLocks noGrp="1"/>
           </p:cNvSpPr>
           <p:nvPr>
-            <p:ph type="ctrTitle"/>
+            <p:ph type="title"/>
           </p:nvPr>
         </p:nvSpPr>
         <p:spPr/>
         <p:txBody>
-          <a:bodyPr>
-            <a:normAutofit/>
-          </a:bodyPr>
+          <a:bodyPr/>
           <a:lstStyle/>
           <a:p>
             <a:r>
-              <a:rPr lang="en-US" sz="3200"/>
-              <a:t>Cảm ơn thầy và các bạn đã lắng nghe!</a:t>
-            </a:r>
+              <a:rPr lang="en-US" i="1"/>
+              <a:t>DFD</a:t>
+            </a:r>
+          </a:p>
+        </p:txBody>
+      </p:sp>
+      <p:sp>
+        <p:nvSpPr>
+          <p:cNvPr id="3" name="Content Placeholder 2"/>
+          <p:cNvSpPr>
+            <a:spLocks noGrp="1"/>
+          </p:cNvSpPr>
+          <p:nvPr>
+            <p:ph idx="1"/>
+          </p:nvPr>
+        </p:nvSpPr>
+        <p:spPr/>
+        <p:txBody>
+          <a:bodyPr/>
+          <a:lstStyle/>
+          <a:p>
+            <a:endParaRPr lang="en-US"/>
           </a:p>
         </p:txBody>
       </p:sp>
     </p:spTree>
     <p:extLst>
       <p:ext uri="{BB962C8B-B14F-4D97-AF65-F5344CB8AC3E}">
-        <p14:creationId xmlns:p14="http://schemas.microsoft.com/office/powerpoint/2010/main" val="612488740"/>
+        <p14:creationId xmlns:p14="http://schemas.microsoft.com/office/powerpoint/2010/main" val="3750338295"/>
+      </p:ext>
+    </p:extLst>
+  </p:cSld>
+  <p:clrMapOvr>
+    <a:masterClrMapping/>
+  </p:clrMapOvr>
+  <mc:AlternateContent xmlns:mc="http://schemas.openxmlformats.org/markup-compatibility/2006" xmlns:p14="http://schemas.microsoft.com/office/powerpoint/2010/main">
+    <mc:Choice Requires="p14">
+      <p:transition spd="med" p14:dur="700">
+        <p:fade/>
+      </p:transition>
+    </mc:Choice>
+    <mc:Fallback xmlns="">
+      <p:transition spd="med">
+        <p:fade/>
+      </p:transition>
+    </mc:Fallback>
+  </mc:AlternateContent>
+</p:sld>
+</file>
+
+<file path=ppt/slides/slide49.xml><?xml version="1.0" encoding="utf-8"?>
+<p:sld xmlns:a="http://schemas.openxmlformats.org/drawingml/2006/main" xmlns:r="http://schemas.openxmlformats.org/officeDocument/2006/relationships" xmlns:p="http://schemas.openxmlformats.org/presentationml/2006/main">
+  <p:cSld>
+    <p:spTree>
+      <p:nvGrpSpPr>
+        <p:cNvPr id="1" name=""/>
+        <p:cNvGrpSpPr/>
+        <p:nvPr/>
+      </p:nvGrpSpPr>
+      <p:grpSpPr>
+        <a:xfrm>
+          <a:off x="0" y="0"/>
+          <a:ext cx="0" cy="0"/>
+          <a:chOff x="0" y="0"/>
+          <a:chExt cx="0" cy="0"/>
+        </a:xfrm>
+      </p:grpSpPr>
+      <p:sp>
+        <p:nvSpPr>
+          <p:cNvPr id="2" name="Title 1"/>
+          <p:cNvSpPr>
+            <a:spLocks noGrp="1"/>
+          </p:cNvSpPr>
+          <p:nvPr>
+            <p:ph type="title"/>
+          </p:nvPr>
+        </p:nvSpPr>
+        <p:spPr/>
+        <p:txBody>
+          <a:bodyPr/>
+          <a:lstStyle/>
+          <a:p>
+            <a:endParaRPr lang="en-US"/>
+          </a:p>
+        </p:txBody>
+      </p:sp>
+      <p:graphicFrame>
+        <p:nvGraphicFramePr>
+          <p:cNvPr id="4" name="Content Placeholder 3"/>
+          <p:cNvGraphicFramePr>
+            <a:graphicFrameLocks noGrp="1" noChangeAspect="1"/>
+          </p:cNvGraphicFramePr>
+          <p:nvPr>
+            <p:ph idx="1"/>
+            <p:extLst>
+              <p:ext uri="{D42A27DB-BD31-4B8C-83A1-F6EECF244321}">
+                <p14:modId xmlns:p14="http://schemas.microsoft.com/office/powerpoint/2010/main" val="1676018348"/>
+              </p:ext>
+            </p:extLst>
+          </p:nvPr>
+        </p:nvGraphicFramePr>
+        <p:xfrm>
+          <a:off x="-685800" y="1600200"/>
+          <a:ext cx="5354320" cy="4724400"/>
+        </p:xfrm>
+        <a:graphic>
+          <a:graphicData uri="http://schemas.openxmlformats.org/presentationml/2006/ole">
+            <mc:AlternateContent xmlns:mc="http://schemas.openxmlformats.org/markup-compatibility/2006">
+              <mc:Choice xmlns:v="urn:schemas-microsoft-com:vml" Requires="v">
+                <p:oleObj spid="_x0000_s3074" r:id="rId3" imgW="3886200" imgH="3429000" progId="Word.Picture.8">
+                  <p:embed/>
+                </p:oleObj>
+              </mc:Choice>
+              <mc:Fallback>
+                <p:oleObj r:id="rId3" imgW="3886200" imgH="3429000" progId="Word.Picture.8">
+                  <p:embed/>
+                  <p:pic>
+                    <p:nvPicPr>
+                      <p:cNvPr id="36867" name="Object 3"/>
+                      <p:cNvPicPr>
+                        <a:picLocks noChangeAspect="1" noChangeArrowheads="1"/>
+                      </p:cNvPicPr>
+                      <p:nvPr/>
+                    </p:nvPicPr>
+                    <p:blipFill>
+                      <a:blip r:embed="rId4">
+                        <a:extLst>
+                          <a:ext uri="{28A0092B-C50C-407E-A947-70E740481C1C}">
+                            <a14:useLocalDpi xmlns:a14="http://schemas.microsoft.com/office/drawing/2010/main" val="0"/>
+                          </a:ext>
+                        </a:extLst>
+                      </a:blip>
+                      <a:srcRect/>
+                      <a:stretch>
+                        <a:fillRect/>
+                      </a:stretch>
+                    </p:blipFill>
+                    <p:spPr bwMode="auto">
+                      <a:xfrm>
+                        <a:off x="-685800" y="1600200"/>
+                        <a:ext cx="5354320" cy="4724400"/>
+                      </a:xfrm>
+                      <a:prstGeom prst="rect">
+                        <a:avLst/>
+                      </a:prstGeom>
+                      <a:noFill/>
+                    </p:spPr>
+                  </p:pic>
+                </p:oleObj>
+              </mc:Fallback>
+            </mc:AlternateContent>
+          </a:graphicData>
+        </a:graphic>
+      </p:graphicFrame>
+      <p:sp>
+        <p:nvSpPr>
+          <p:cNvPr id="5" name="Text Box 5"/>
+          <p:cNvSpPr txBox="1">
+            <a:spLocks noChangeArrowheads="1"/>
+          </p:cNvSpPr>
+          <p:nvPr/>
+        </p:nvSpPr>
+        <p:spPr bwMode="auto">
+          <a:xfrm>
+            <a:off x="4343400" y="2819400"/>
+            <a:ext cx="3753913" cy="646331"/>
+          </a:xfrm>
+          <a:prstGeom prst="rect">
+            <a:avLst/>
+          </a:prstGeom>
+          <a:noFill/>
+          <a:ln>
+            <a:noFill/>
+          </a:ln>
+          <a:effectLst/>
+          <a:extLst>
+            <a:ext uri="{909E8E84-426E-40DD-AFC4-6F175D3DCCD1}">
+              <a14:hiddenFill xmlns:a14="http://schemas.microsoft.com/office/drawing/2010/main">
+                <a:solidFill>
+                  <a:schemeClr val="accent1"/>
+                </a:solidFill>
+              </a14:hiddenFill>
+            </a:ext>
+            <a:ext uri="{91240B29-F687-4F45-9708-019B960494DF}">
+              <a14:hiddenLine xmlns:a14="http://schemas.microsoft.com/office/drawing/2010/main" w="76200">
+                <a:solidFill>
+                  <a:schemeClr val="tx1"/>
+                </a:solidFill>
+                <a:miter lim="800000"/>
+                <a:headEnd/>
+                <a:tailEnd/>
+              </a14:hiddenLine>
+            </a:ext>
+            <a:ext uri="{AF507438-7753-43E0-B8FC-AC1667EBCBE1}">
+              <a14:hiddenEffects xmlns:a14="http://schemas.microsoft.com/office/drawing/2010/main">
+                <a:effectLst>
+                  <a:outerShdw dist="35921" dir="2700000" algn="ctr" rotWithShape="0">
+                    <a:schemeClr val="bg2"/>
+                  </a:outerShdw>
+                </a:effectLst>
+              </a14:hiddenEffects>
+            </a:ext>
+          </a:extLst>
+        </p:spPr>
+        <p:txBody>
+          <a:bodyPr wrap="none">
+            <a:spAutoFit/>
+          </a:bodyPr>
+          <a:lstStyle/>
+          <a:p>
+            <a:r>
+              <a:rPr lang="en-US" altLang="en-US" b="0"/>
+              <a:t>Biểu diễn biểu thức dưới dạng DFD</a:t>
+            </a:r>
+            <a:endParaRPr lang="en-US" altLang="en-US" b="0"/>
+          </a:p>
+          <a:p>
+            <a:r>
+              <a:rPr lang="en-US" altLang="en-US" b="0">
+                <a:cs typeface="Times New Roman" panose="02020603050405020304" pitchFamily="18" charset="0"/>
+              </a:rPr>
+              <a:t>(a + b) * (c + a * d)</a:t>
+            </a:r>
+            <a:r>
+              <a:rPr lang="it-IT" altLang="en-US" b="0"/>
+              <a:t> </a:t>
+            </a:r>
+          </a:p>
+        </p:txBody>
+      </p:sp>
+    </p:spTree>
+    <p:extLst>
+      <p:ext uri="{BB962C8B-B14F-4D97-AF65-F5344CB8AC3E}">
+        <p14:creationId xmlns:p14="http://schemas.microsoft.com/office/powerpoint/2010/main" val="4182079425"/>
       </p:ext>
     </p:extLst>
   </p:cSld>
@@ -17842,6 +18937,436 @@
     <p:extLst>
       <p:ext uri="{BB962C8B-B14F-4D97-AF65-F5344CB8AC3E}">
         <p14:creationId xmlns:p14="http://schemas.microsoft.com/office/powerpoint/2010/main" val="1046438919"/>
+      </p:ext>
+    </p:extLst>
+  </p:cSld>
+  <p:clrMapOvr>
+    <a:masterClrMapping/>
+  </p:clrMapOvr>
+  <mc:AlternateContent xmlns:mc="http://schemas.openxmlformats.org/markup-compatibility/2006" xmlns:p14="http://schemas.microsoft.com/office/powerpoint/2010/main">
+    <mc:Choice Requires="p14">
+      <p:transition spd="med" p14:dur="700">
+        <p:fade/>
+      </p:transition>
+    </mc:Choice>
+    <mc:Fallback xmlns="">
+      <p:transition spd="med">
+        <p:fade/>
+      </p:transition>
+    </mc:Fallback>
+  </mc:AlternateContent>
+</p:sld>
+</file>
+
+<file path=ppt/slides/slide50.xml><?xml version="1.0" encoding="utf-8"?>
+<p:sld xmlns:a="http://schemas.openxmlformats.org/drawingml/2006/main" xmlns:r="http://schemas.openxmlformats.org/officeDocument/2006/relationships" xmlns:p="http://schemas.openxmlformats.org/presentationml/2006/main">
+  <p:cSld>
+    <p:spTree>
+      <p:nvGrpSpPr>
+        <p:cNvPr id="1" name=""/>
+        <p:cNvGrpSpPr/>
+        <p:nvPr/>
+      </p:nvGrpSpPr>
+      <p:grpSpPr>
+        <a:xfrm>
+          <a:off x="0" y="0"/>
+          <a:ext cx="0" cy="0"/>
+          <a:chOff x="0" y="0"/>
+          <a:chExt cx="0" cy="0"/>
+        </a:xfrm>
+      </p:grpSpPr>
+      <p:sp>
+        <p:nvSpPr>
+          <p:cNvPr id="2" name="Title 1"/>
+          <p:cNvSpPr>
+            <a:spLocks noGrp="1"/>
+          </p:cNvSpPr>
+          <p:nvPr>
+            <p:ph type="title"/>
+          </p:nvPr>
+        </p:nvSpPr>
+        <p:spPr/>
+        <p:txBody>
+          <a:bodyPr/>
+          <a:lstStyle/>
+          <a:p>
+            <a:r>
+              <a:rPr lang="en-US" i="1"/>
+              <a:t>UML</a:t>
+            </a:r>
+            <a:endParaRPr lang="en-US" i="1"/>
+          </a:p>
+        </p:txBody>
+      </p:sp>
+      <p:sp>
+        <p:nvSpPr>
+          <p:cNvPr id="3" name="Content Placeholder 2"/>
+          <p:cNvSpPr>
+            <a:spLocks noGrp="1"/>
+          </p:cNvSpPr>
+          <p:nvPr>
+            <p:ph idx="1"/>
+          </p:nvPr>
+        </p:nvSpPr>
+        <p:spPr/>
+        <p:txBody>
+          <a:bodyPr/>
+          <a:lstStyle/>
+          <a:p>
+            <a:endParaRPr lang="en-US"/>
+          </a:p>
+        </p:txBody>
+      </p:sp>
+    </p:spTree>
+    <p:extLst>
+      <p:ext uri="{BB962C8B-B14F-4D97-AF65-F5344CB8AC3E}">
+        <p14:creationId xmlns:p14="http://schemas.microsoft.com/office/powerpoint/2010/main" val="1995920651"/>
+      </p:ext>
+    </p:extLst>
+  </p:cSld>
+  <p:clrMapOvr>
+    <a:masterClrMapping/>
+  </p:clrMapOvr>
+  <mc:AlternateContent xmlns:mc="http://schemas.openxmlformats.org/markup-compatibility/2006" xmlns:p14="http://schemas.microsoft.com/office/powerpoint/2010/main">
+    <mc:Choice Requires="p14">
+      <p:transition spd="med" p14:dur="700">
+        <p:fade/>
+      </p:transition>
+    </mc:Choice>
+    <mc:Fallback xmlns="">
+      <p:transition spd="med">
+        <p:fade/>
+      </p:transition>
+    </mc:Fallback>
+  </mc:AlternateContent>
+</p:sld>
+</file>
+
+<file path=ppt/slides/slide51.xml><?xml version="1.0" encoding="utf-8"?>
+<p:sld xmlns:a="http://schemas.openxmlformats.org/drawingml/2006/main" xmlns:r="http://schemas.openxmlformats.org/officeDocument/2006/relationships" xmlns:p="http://schemas.openxmlformats.org/presentationml/2006/main">
+  <p:cSld>
+    <p:spTree>
+      <p:nvGrpSpPr>
+        <p:cNvPr id="1" name=""/>
+        <p:cNvGrpSpPr/>
+        <p:nvPr/>
+      </p:nvGrpSpPr>
+      <p:grpSpPr>
+        <a:xfrm>
+          <a:off x="0" y="0"/>
+          <a:ext cx="0" cy="0"/>
+          <a:chOff x="0" y="0"/>
+          <a:chExt cx="0" cy="0"/>
+        </a:xfrm>
+      </p:grpSpPr>
+      <p:sp>
+        <p:nvSpPr>
+          <p:cNvPr id="4" name="Title 3"/>
+          <p:cNvSpPr>
+            <a:spLocks noGrp="1"/>
+          </p:cNvSpPr>
+          <p:nvPr>
+            <p:ph type="title"/>
+          </p:nvPr>
+        </p:nvSpPr>
+        <p:spPr/>
+        <p:txBody>
+          <a:bodyPr/>
+          <a:lstStyle/>
+          <a:p>
+            <a:r>
+              <a:rPr lang="en-US" sz="3600"/>
+              <a:t>Các tài liệu SRS trong thực tế</a:t>
+            </a:r>
+            <a:endParaRPr lang="en-US"/>
+          </a:p>
+        </p:txBody>
+      </p:sp>
+      <p:sp>
+        <p:nvSpPr>
+          <p:cNvPr id="5" name="Text Placeholder 4"/>
+          <p:cNvSpPr>
+            <a:spLocks noGrp="1"/>
+          </p:cNvSpPr>
+          <p:nvPr>
+            <p:ph type="body" idx="1"/>
+          </p:nvPr>
+        </p:nvSpPr>
+        <p:spPr/>
+        <p:txBody>
+          <a:bodyPr/>
+          <a:lstStyle/>
+          <a:p>
+            <a:r>
+              <a:rPr lang="en-US"/>
+              <a:t>DEMO một số tài liệu đặc tả trong thực tế</a:t>
+            </a:r>
+          </a:p>
+        </p:txBody>
+      </p:sp>
+    </p:spTree>
+    <p:extLst>
+      <p:ext uri="{BB962C8B-B14F-4D97-AF65-F5344CB8AC3E}">
+        <p14:creationId xmlns:p14="http://schemas.microsoft.com/office/powerpoint/2010/main" val="2399078340"/>
+      </p:ext>
+    </p:extLst>
+  </p:cSld>
+  <p:clrMapOvr>
+    <a:masterClrMapping/>
+  </p:clrMapOvr>
+  <mc:AlternateContent xmlns:mc="http://schemas.openxmlformats.org/markup-compatibility/2006" xmlns:p14="http://schemas.microsoft.com/office/powerpoint/2010/main">
+    <mc:Choice Requires="p14">
+      <p:transition spd="med" p14:dur="700">
+        <p:fade/>
+      </p:transition>
+    </mc:Choice>
+    <mc:Fallback xmlns="">
+      <p:transition spd="med">
+        <p:fade/>
+      </p:transition>
+    </mc:Fallback>
+  </mc:AlternateContent>
+</p:sld>
+</file>
+
+<file path=ppt/slides/slide52.xml><?xml version="1.0" encoding="utf-8"?>
+<p:sld xmlns:a="http://schemas.openxmlformats.org/drawingml/2006/main" xmlns:r="http://schemas.openxmlformats.org/officeDocument/2006/relationships" xmlns:p="http://schemas.openxmlformats.org/presentationml/2006/main">
+  <p:cSld>
+    <p:spTree>
+      <p:nvGrpSpPr>
+        <p:cNvPr id="1" name=""/>
+        <p:cNvGrpSpPr/>
+        <p:nvPr/>
+      </p:nvGrpSpPr>
+      <p:grpSpPr>
+        <a:xfrm>
+          <a:off x="0" y="0"/>
+          <a:ext cx="0" cy="0"/>
+          <a:chOff x="0" y="0"/>
+          <a:chExt cx="0" cy="0"/>
+        </a:xfrm>
+      </p:grpSpPr>
+      <p:sp>
+        <p:nvSpPr>
+          <p:cNvPr id="2" name="Title 1"/>
+          <p:cNvSpPr>
+            <a:spLocks noGrp="1"/>
+          </p:cNvSpPr>
+          <p:nvPr>
+            <p:ph type="title"/>
+          </p:nvPr>
+        </p:nvSpPr>
+        <p:spPr/>
+        <p:txBody>
+          <a:bodyPr/>
+          <a:lstStyle/>
+          <a:p>
+            <a:r>
+              <a:rPr lang="en-US"/>
+              <a:t>Tài liệu tham khảo</a:t>
+            </a:r>
+          </a:p>
+        </p:txBody>
+      </p:sp>
+      <p:sp>
+        <p:nvSpPr>
+          <p:cNvPr id="5" name="Text Placeholder 4"/>
+          <p:cNvSpPr>
+            <a:spLocks noGrp="1"/>
+          </p:cNvSpPr>
+          <p:nvPr>
+            <p:ph type="body" idx="1"/>
+          </p:nvPr>
+        </p:nvSpPr>
+        <p:spPr/>
+        <p:txBody>
+          <a:bodyPr/>
+          <a:lstStyle/>
+          <a:p>
+            <a:pPr marL="285750" indent="-285750">
+              <a:buFontTx/>
+              <a:buChar char="-"/>
+            </a:pPr>
+            <a:r>
+              <a:rPr lang="en-US"/>
+              <a:t>What everything engineer should know</a:t>
+            </a:r>
+          </a:p>
+          <a:p>
+            <a:pPr marL="285750" indent="-285750">
+              <a:buFontTx/>
+              <a:buChar char="-"/>
+            </a:pPr>
+            <a:r>
+              <a:rPr lang="en-US"/>
+              <a:t>Các Slide thầy cho trong mục “đặc tả phần mềm”</a:t>
+            </a:r>
+          </a:p>
+          <a:p>
+            <a:pPr marL="285750" indent="-285750">
+              <a:buFontTx/>
+              <a:buChar char="-"/>
+            </a:pPr>
+            <a:endParaRPr lang="en-US"/>
+          </a:p>
+        </p:txBody>
+      </p:sp>
+    </p:spTree>
+    <p:extLst>
+      <p:ext uri="{BB962C8B-B14F-4D97-AF65-F5344CB8AC3E}">
+        <p14:creationId xmlns:p14="http://schemas.microsoft.com/office/powerpoint/2010/main" val="2623819822"/>
+      </p:ext>
+    </p:extLst>
+  </p:cSld>
+  <p:clrMapOvr>
+    <a:masterClrMapping/>
+  </p:clrMapOvr>
+  <mc:AlternateContent xmlns:mc="http://schemas.openxmlformats.org/markup-compatibility/2006" xmlns:p14="http://schemas.microsoft.com/office/powerpoint/2010/main">
+    <mc:Choice Requires="p14">
+      <p:transition spd="med" p14:dur="700">
+        <p:fade/>
+      </p:transition>
+    </mc:Choice>
+    <mc:Fallback xmlns="">
+      <p:transition spd="med">
+        <p:fade/>
+      </p:transition>
+    </mc:Fallback>
+  </mc:AlternateContent>
+</p:sld>
+</file>
+
+<file path=ppt/slides/slide53.xml><?xml version="1.0" encoding="utf-8"?>
+<p:sld xmlns:a="http://schemas.openxmlformats.org/drawingml/2006/main" xmlns:r="http://schemas.openxmlformats.org/officeDocument/2006/relationships" xmlns:p="http://schemas.openxmlformats.org/presentationml/2006/main">
+  <p:cSld>
+    <p:spTree>
+      <p:nvGrpSpPr>
+        <p:cNvPr id="1" name=""/>
+        <p:cNvGrpSpPr/>
+        <p:nvPr/>
+      </p:nvGrpSpPr>
+      <p:grpSpPr>
+        <a:xfrm>
+          <a:off x="0" y="0"/>
+          <a:ext cx="0" cy="0"/>
+          <a:chOff x="0" y="0"/>
+          <a:chExt cx="0" cy="0"/>
+        </a:xfrm>
+      </p:grpSpPr>
+      <p:sp>
+        <p:nvSpPr>
+          <p:cNvPr id="2" name="Title 1"/>
+          <p:cNvSpPr>
+            <a:spLocks noGrp="1"/>
+          </p:cNvSpPr>
+          <p:nvPr>
+            <p:ph type="title"/>
+          </p:nvPr>
+        </p:nvSpPr>
+        <p:spPr/>
+        <p:txBody>
+          <a:bodyPr/>
+          <a:lstStyle/>
+          <a:p>
+            <a:r>
+              <a:rPr lang="en-US"/>
+              <a:t>Câu hỏi</a:t>
+            </a:r>
+          </a:p>
+        </p:txBody>
+      </p:sp>
+      <p:sp>
+        <p:nvSpPr>
+          <p:cNvPr id="3" name="Text Placeholder 2"/>
+          <p:cNvSpPr>
+            <a:spLocks noGrp="1"/>
+          </p:cNvSpPr>
+          <p:nvPr>
+            <p:ph type="body" idx="1"/>
+          </p:nvPr>
+        </p:nvSpPr>
+        <p:spPr/>
+        <p:txBody>
+          <a:bodyPr/>
+          <a:lstStyle/>
+          <a:p>
+            <a:r>
+              <a:rPr lang="en-US"/>
+              <a:t>Mời thầy và các bạn đặt câu hỏi</a:t>
+            </a:r>
+          </a:p>
+        </p:txBody>
+      </p:sp>
+    </p:spTree>
+    <p:extLst>
+      <p:ext uri="{BB962C8B-B14F-4D97-AF65-F5344CB8AC3E}">
+        <p14:creationId xmlns:p14="http://schemas.microsoft.com/office/powerpoint/2010/main" val="788291268"/>
+      </p:ext>
+    </p:extLst>
+  </p:cSld>
+  <p:clrMapOvr>
+    <a:masterClrMapping/>
+  </p:clrMapOvr>
+  <mc:AlternateContent xmlns:mc="http://schemas.openxmlformats.org/markup-compatibility/2006" xmlns:p14="http://schemas.microsoft.com/office/powerpoint/2010/main">
+    <mc:Choice Requires="p14">
+      <p:transition spd="med" p14:dur="700">
+        <p:fade/>
+      </p:transition>
+    </mc:Choice>
+    <mc:Fallback xmlns="">
+      <p:transition spd="med">
+        <p:fade/>
+      </p:transition>
+    </mc:Fallback>
+  </mc:AlternateContent>
+</p:sld>
+</file>
+
+<file path=ppt/slides/slide54.xml><?xml version="1.0" encoding="utf-8"?>
+<p:sld xmlns:a="http://schemas.openxmlformats.org/drawingml/2006/main" xmlns:r="http://schemas.openxmlformats.org/officeDocument/2006/relationships" xmlns:p="http://schemas.openxmlformats.org/presentationml/2006/main">
+  <p:cSld>
+    <p:spTree>
+      <p:nvGrpSpPr>
+        <p:cNvPr id="1" name=""/>
+        <p:cNvGrpSpPr/>
+        <p:nvPr/>
+      </p:nvGrpSpPr>
+      <p:grpSpPr>
+        <a:xfrm>
+          <a:off x="0" y="0"/>
+          <a:ext cx="0" cy="0"/>
+          <a:chOff x="0" y="0"/>
+          <a:chExt cx="0" cy="0"/>
+        </a:xfrm>
+      </p:grpSpPr>
+      <p:sp>
+        <p:nvSpPr>
+          <p:cNvPr id="4" name="Title 3"/>
+          <p:cNvSpPr>
+            <a:spLocks noGrp="1"/>
+          </p:cNvSpPr>
+          <p:nvPr>
+            <p:ph type="ctrTitle"/>
+          </p:nvPr>
+        </p:nvSpPr>
+        <p:spPr/>
+        <p:txBody>
+          <a:bodyPr>
+            <a:normAutofit/>
+          </a:bodyPr>
+          <a:lstStyle/>
+          <a:p>
+            <a:r>
+              <a:rPr lang="en-US" sz="3200"/>
+              <a:t>Cảm ơn thầy và các bạn đã lắng nghe!</a:t>
+            </a:r>
+          </a:p>
+        </p:txBody>
+      </p:sp>
+    </p:spTree>
+    <p:extLst>
+      <p:ext uri="{BB962C8B-B14F-4D97-AF65-F5344CB8AC3E}">
+        <p14:creationId xmlns:p14="http://schemas.microsoft.com/office/powerpoint/2010/main" val="612488740"/>
       </p:ext>
     </p:extLst>
   </p:cSld>
@@ -19175,6 +20700,132 @@
 </file>
 
 <file path=customXml/item1.xml><?xml version="1.0" encoding="utf-8"?>
+<p:properties xmlns:p="http://schemas.microsoft.com/office/2006/metadata/properties" xmlns:xsi="http://www.w3.org/2001/XMLSchema-instance" xmlns:pc="http://schemas.microsoft.com/office/infopath/2007/PartnerControls">
+  <documentManagement>
+    <DirectSourceMarket xmlns="4873beb7-5857-4685-be1f-d57550cc96cc" xsi:nil="true"/>
+    <ApprovalStatus xmlns="4873beb7-5857-4685-be1f-d57550cc96cc">InProgress</ApprovalStatus>
+    <MarketSpecific xmlns="4873beb7-5857-4685-be1f-d57550cc96cc">false</MarketSpecific>
+    <LocComments xmlns="4873beb7-5857-4685-be1f-d57550cc96cc" xsi:nil="true"/>
+    <ThumbnailAssetId xmlns="4873beb7-5857-4685-be1f-d57550cc96cc" xsi:nil="true"/>
+    <PrimaryImageGen xmlns="4873beb7-5857-4685-be1f-d57550cc96cc">false</PrimaryImageGen>
+    <LegacyData xmlns="4873beb7-5857-4685-be1f-d57550cc96cc" xsi:nil="true"/>
+    <LocRecommendedHandoff xmlns="4873beb7-5857-4685-be1f-d57550cc96cc" xsi:nil="true"/>
+    <BusinessGroup xmlns="4873beb7-5857-4685-be1f-d57550cc96cc" xsi:nil="true"/>
+    <BlockPublish xmlns="4873beb7-5857-4685-be1f-d57550cc96cc">false</BlockPublish>
+    <TPFriendlyName xmlns="4873beb7-5857-4685-be1f-d57550cc96cc" xsi:nil="true"/>
+    <NumericId xmlns="4873beb7-5857-4685-be1f-d57550cc96cc" xsi:nil="true"/>
+    <APEditor xmlns="4873beb7-5857-4685-be1f-d57550cc96cc">
+      <UserInfo>
+        <DisplayName/>
+        <AccountId xsi:nil="true"/>
+        <AccountType/>
+      </UserInfo>
+    </APEditor>
+    <SourceTitle xmlns="4873beb7-5857-4685-be1f-d57550cc96cc" xsi:nil="true"/>
+    <OpenTemplate xmlns="4873beb7-5857-4685-be1f-d57550cc96cc">true</OpenTemplate>
+    <UALocComments xmlns="4873beb7-5857-4685-be1f-d57550cc96cc" xsi:nil="true"/>
+    <ParentAssetId xmlns="4873beb7-5857-4685-be1f-d57550cc96cc" xsi:nil="true"/>
+    <IntlLangReviewDate xmlns="4873beb7-5857-4685-be1f-d57550cc96cc" xsi:nil="true"/>
+    <FeatureTagsTaxHTField0 xmlns="4873beb7-5857-4685-be1f-d57550cc96cc">
+      <Terms xmlns="http://schemas.microsoft.com/office/infopath/2007/PartnerControls"/>
+    </FeatureTagsTaxHTField0>
+    <PublishStatusLookup xmlns="4873beb7-5857-4685-be1f-d57550cc96cc">
+      <Value>1360476</Value>
+    </PublishStatusLookup>
+    <Providers xmlns="4873beb7-5857-4685-be1f-d57550cc96cc" xsi:nil="true"/>
+    <MachineTranslated xmlns="4873beb7-5857-4685-be1f-d57550cc96cc">false</MachineTranslated>
+    <OriginalSourceMarket xmlns="4873beb7-5857-4685-be1f-d57550cc96cc" xsi:nil="true"/>
+    <APDescription xmlns="4873beb7-5857-4685-be1f-d57550cc96cc" xsi:nil="true"/>
+    <ClipArtFilename xmlns="4873beb7-5857-4685-be1f-d57550cc96cc" xsi:nil="true"/>
+    <ContentItem xmlns="4873beb7-5857-4685-be1f-d57550cc96cc" xsi:nil="true"/>
+    <TPInstallLocation xmlns="4873beb7-5857-4685-be1f-d57550cc96cc" xsi:nil="true"/>
+    <PublishTargets xmlns="4873beb7-5857-4685-be1f-d57550cc96cc">OfficeOnlineVNext</PublishTargets>
+    <TimesCloned xmlns="4873beb7-5857-4685-be1f-d57550cc96cc" xsi:nil="true"/>
+    <AssetStart xmlns="4873beb7-5857-4685-be1f-d57550cc96cc">2011-12-12T13:37:00+00:00</AssetStart>
+    <Provider xmlns="4873beb7-5857-4685-be1f-d57550cc96cc" xsi:nil="true"/>
+    <AcquiredFrom xmlns="4873beb7-5857-4685-be1f-d57550cc96cc">Internal MS</AcquiredFrom>
+    <FriendlyTitle xmlns="4873beb7-5857-4685-be1f-d57550cc96cc" xsi:nil="true"/>
+    <LastHandOff xmlns="4873beb7-5857-4685-be1f-d57550cc96cc" xsi:nil="true"/>
+    <TPClientViewer xmlns="4873beb7-5857-4685-be1f-d57550cc96cc" xsi:nil="true"/>
+    <UACurrentWords xmlns="4873beb7-5857-4685-be1f-d57550cc96cc" xsi:nil="true"/>
+    <ArtSampleDocs xmlns="4873beb7-5857-4685-be1f-d57550cc96cc" xsi:nil="true"/>
+    <UALocRecommendation xmlns="4873beb7-5857-4685-be1f-d57550cc96cc">Localize</UALocRecommendation>
+    <Manager xmlns="4873beb7-5857-4685-be1f-d57550cc96cc" xsi:nil="true"/>
+    <ShowIn xmlns="4873beb7-5857-4685-be1f-d57550cc96cc">Show everywhere</ShowIn>
+    <UANotes xmlns="4873beb7-5857-4685-be1f-d57550cc96cc" xsi:nil="true"/>
+    <TemplateStatus xmlns="4873beb7-5857-4685-be1f-d57550cc96cc">Complete</TemplateStatus>
+    <InternalTagsTaxHTField0 xmlns="4873beb7-5857-4685-be1f-d57550cc96cc">
+      <Terms xmlns="http://schemas.microsoft.com/office/infopath/2007/PartnerControls"/>
+    </InternalTagsTaxHTField0>
+    <CSXHash xmlns="4873beb7-5857-4685-be1f-d57550cc96cc" xsi:nil="true"/>
+    <Downloads xmlns="4873beb7-5857-4685-be1f-d57550cc96cc">0</Downloads>
+    <VoteCount xmlns="4873beb7-5857-4685-be1f-d57550cc96cc" xsi:nil="true"/>
+    <OOCacheId xmlns="4873beb7-5857-4685-be1f-d57550cc96cc" xsi:nil="true"/>
+    <IsDeleted xmlns="4873beb7-5857-4685-be1f-d57550cc96cc">false</IsDeleted>
+    <AssetExpire xmlns="4873beb7-5857-4685-be1f-d57550cc96cc">2035-01-01T08:00:00+00:00</AssetExpire>
+    <DSATActionTaken xmlns="4873beb7-5857-4685-be1f-d57550cc96cc" xsi:nil="true"/>
+    <CSXSubmissionMarket xmlns="4873beb7-5857-4685-be1f-d57550cc96cc" xsi:nil="true"/>
+    <TPExecutable xmlns="4873beb7-5857-4685-be1f-d57550cc96cc" xsi:nil="true"/>
+    <SubmitterId xmlns="4873beb7-5857-4685-be1f-d57550cc96cc" xsi:nil="true"/>
+    <EditorialTags xmlns="4873beb7-5857-4685-be1f-d57550cc96cc" xsi:nil="true"/>
+    <ApprovalLog xmlns="4873beb7-5857-4685-be1f-d57550cc96cc" xsi:nil="true"/>
+    <AssetType xmlns="4873beb7-5857-4685-be1f-d57550cc96cc">TP</AssetType>
+    <BugNumber xmlns="4873beb7-5857-4685-be1f-d57550cc96cc" xsi:nil="true"/>
+    <CSXSubmissionDate xmlns="4873beb7-5857-4685-be1f-d57550cc96cc" xsi:nil="true"/>
+    <CSXUpdate xmlns="4873beb7-5857-4685-be1f-d57550cc96cc">false</CSXUpdate>
+    <Milestone xmlns="4873beb7-5857-4685-be1f-d57550cc96cc" xsi:nil="true"/>
+    <RecommendationsModifier xmlns="4873beb7-5857-4685-be1f-d57550cc96cc" xsi:nil="true"/>
+    <OriginAsset xmlns="4873beb7-5857-4685-be1f-d57550cc96cc" xsi:nil="true"/>
+    <TPComponent xmlns="4873beb7-5857-4685-be1f-d57550cc96cc" xsi:nil="true"/>
+    <AssetId xmlns="4873beb7-5857-4685-be1f-d57550cc96cc">TP102801058</AssetId>
+    <IntlLocPriority xmlns="4873beb7-5857-4685-be1f-d57550cc96cc" xsi:nil="true"/>
+    <PolicheckWords xmlns="4873beb7-5857-4685-be1f-d57550cc96cc" xsi:nil="true"/>
+    <TPLaunchHelpLink xmlns="4873beb7-5857-4685-be1f-d57550cc96cc" xsi:nil="true"/>
+    <TPApplication xmlns="4873beb7-5857-4685-be1f-d57550cc96cc" xsi:nil="true"/>
+    <CrawlForDependencies xmlns="4873beb7-5857-4685-be1f-d57550cc96cc">false</CrawlForDependencies>
+    <HandoffToMSDN xmlns="4873beb7-5857-4685-be1f-d57550cc96cc" xsi:nil="true"/>
+    <PlannedPubDate xmlns="4873beb7-5857-4685-be1f-d57550cc96cc" xsi:nil="true"/>
+    <IntlLangReviewer xmlns="4873beb7-5857-4685-be1f-d57550cc96cc" xsi:nil="true"/>
+    <TrustLevel xmlns="4873beb7-5857-4685-be1f-d57550cc96cc">1 Microsoft Managed Content</TrustLevel>
+    <LocLastLocAttemptVersionLookup xmlns="4873beb7-5857-4685-be1f-d57550cc96cc">706496</LocLastLocAttemptVersionLookup>
+    <IsSearchable xmlns="4873beb7-5857-4685-be1f-d57550cc96cc">true</IsSearchable>
+    <TemplateTemplateType xmlns="4873beb7-5857-4685-be1f-d57550cc96cc">PowerPoint Presentation Template</TemplateTemplateType>
+    <CampaignTagsTaxHTField0 xmlns="4873beb7-5857-4685-be1f-d57550cc96cc">
+      <Terms xmlns="http://schemas.microsoft.com/office/infopath/2007/PartnerControls"/>
+    </CampaignTagsTaxHTField0>
+    <TPNamespace xmlns="4873beb7-5857-4685-be1f-d57550cc96cc" xsi:nil="true"/>
+    <TaxCatchAll xmlns="4873beb7-5857-4685-be1f-d57550cc96cc"/>
+    <Markets xmlns="4873beb7-5857-4685-be1f-d57550cc96cc"/>
+    <UAProjectedTotalWords xmlns="4873beb7-5857-4685-be1f-d57550cc96cc" xsi:nil="true"/>
+    <IntlLangReview xmlns="4873beb7-5857-4685-be1f-d57550cc96cc">false</IntlLangReview>
+    <OutputCachingOn xmlns="4873beb7-5857-4685-be1f-d57550cc96cc">false</OutputCachingOn>
+    <AverageRating xmlns="4873beb7-5857-4685-be1f-d57550cc96cc" xsi:nil="true"/>
+    <APAuthor xmlns="4873beb7-5857-4685-be1f-d57550cc96cc">
+      <UserInfo>
+        <DisplayName>REDMOND\v-soujap</DisplayName>
+        <AccountId>1954</AccountId>
+        <AccountType/>
+      </UserInfo>
+    </APAuthor>
+    <LocManualTestRequired xmlns="4873beb7-5857-4685-be1f-d57550cc96cc">false</LocManualTestRequired>
+    <TPCommandLine xmlns="4873beb7-5857-4685-be1f-d57550cc96cc" xsi:nil="true"/>
+    <TPAppVersion xmlns="4873beb7-5857-4685-be1f-d57550cc96cc" xsi:nil="true"/>
+    <EditorialStatus xmlns="4873beb7-5857-4685-be1f-d57550cc96cc">Complete</EditorialStatus>
+    <LastModifiedDateTime xmlns="4873beb7-5857-4685-be1f-d57550cc96cc" xsi:nil="true"/>
+    <ScenarioTagsTaxHTField0 xmlns="4873beb7-5857-4685-be1f-d57550cc96cc">
+      <Terms xmlns="http://schemas.microsoft.com/office/infopath/2007/PartnerControls"/>
+    </ScenarioTagsTaxHTField0>
+    <OriginalRelease xmlns="4873beb7-5857-4685-be1f-d57550cc96cc">14</OriginalRelease>
+    <TPLaunchHelpLinkType xmlns="4873beb7-5857-4685-be1f-d57550cc96cc">Template</TPLaunchHelpLinkType>
+    <LocalizationTagsTaxHTField0 xmlns="4873beb7-5857-4685-be1f-d57550cc96cc">
+      <Terms xmlns="http://schemas.microsoft.com/office/infopath/2007/PartnerControls"/>
+    </LocalizationTagsTaxHTField0>
+    <LocMarketGroupTiers2 xmlns="4873beb7-5857-4685-be1f-d57550cc96cc" xsi:nil="true"/>
+  </documentManagement>
+</p:properties>
+</file>
+
+<file path=customXml/item2.xml><?xml version="1.0" encoding="utf-8"?>
 <ct:contentTypeSchema xmlns:ct="http://schemas.microsoft.com/office/2006/metadata/contentType" xmlns:ma="http://schemas.microsoft.com/office/2006/metadata/properties/metaAttributes" ct:_="" ma:_="" ma:contentTypeName="TemplateFile" ma:contentTypeID="0x0101006EDDDB5EE6D98C44930B742096920B300400F5B6D36B3EF94B4E9A635CDF2A18F5B8" ma:contentTypeVersion="72" ma:contentTypeDescription="Create a new document." ma:contentTypeScope="" ma:versionID="a23e56308344d904b51738559c3d67c9">
   <xsd:schema xmlns:xsd="http://www.w3.org/2001/XMLSchema" xmlns:xs="http://www.w3.org/2001/XMLSchema" xmlns:p="http://schemas.microsoft.com/office/2006/metadata/properties" xmlns:ns2="4873beb7-5857-4685-be1f-d57550cc96cc" targetNamespace="http://schemas.microsoft.com/office/2006/metadata/properties" ma:root="true" ma:fieldsID="cd0908cc4600e77bf5da051303e00c8d" ns2:_="">
     <xsd:import namespace="4873beb7-5857-4685-be1f-d57550cc96cc"/>
@@ -20214,132 +21865,6 @@
 </ct:contentTypeSchema>
 </file>
 
-<file path=customXml/item2.xml><?xml version="1.0" encoding="utf-8"?>
-<p:properties xmlns:p="http://schemas.microsoft.com/office/2006/metadata/properties" xmlns:xsi="http://www.w3.org/2001/XMLSchema-instance" xmlns:pc="http://schemas.microsoft.com/office/infopath/2007/PartnerControls">
-  <documentManagement>
-    <DirectSourceMarket xmlns="4873beb7-5857-4685-be1f-d57550cc96cc" xsi:nil="true"/>
-    <ApprovalStatus xmlns="4873beb7-5857-4685-be1f-d57550cc96cc">InProgress</ApprovalStatus>
-    <MarketSpecific xmlns="4873beb7-5857-4685-be1f-d57550cc96cc">false</MarketSpecific>
-    <LocComments xmlns="4873beb7-5857-4685-be1f-d57550cc96cc" xsi:nil="true"/>
-    <ThumbnailAssetId xmlns="4873beb7-5857-4685-be1f-d57550cc96cc" xsi:nil="true"/>
-    <PrimaryImageGen xmlns="4873beb7-5857-4685-be1f-d57550cc96cc">false</PrimaryImageGen>
-    <LegacyData xmlns="4873beb7-5857-4685-be1f-d57550cc96cc" xsi:nil="true"/>
-    <LocRecommendedHandoff xmlns="4873beb7-5857-4685-be1f-d57550cc96cc" xsi:nil="true"/>
-    <BusinessGroup xmlns="4873beb7-5857-4685-be1f-d57550cc96cc" xsi:nil="true"/>
-    <BlockPublish xmlns="4873beb7-5857-4685-be1f-d57550cc96cc">false</BlockPublish>
-    <TPFriendlyName xmlns="4873beb7-5857-4685-be1f-d57550cc96cc" xsi:nil="true"/>
-    <NumericId xmlns="4873beb7-5857-4685-be1f-d57550cc96cc" xsi:nil="true"/>
-    <APEditor xmlns="4873beb7-5857-4685-be1f-d57550cc96cc">
-      <UserInfo>
-        <DisplayName/>
-        <AccountId xsi:nil="true"/>
-        <AccountType/>
-      </UserInfo>
-    </APEditor>
-    <SourceTitle xmlns="4873beb7-5857-4685-be1f-d57550cc96cc" xsi:nil="true"/>
-    <OpenTemplate xmlns="4873beb7-5857-4685-be1f-d57550cc96cc">true</OpenTemplate>
-    <UALocComments xmlns="4873beb7-5857-4685-be1f-d57550cc96cc" xsi:nil="true"/>
-    <ParentAssetId xmlns="4873beb7-5857-4685-be1f-d57550cc96cc" xsi:nil="true"/>
-    <IntlLangReviewDate xmlns="4873beb7-5857-4685-be1f-d57550cc96cc" xsi:nil="true"/>
-    <FeatureTagsTaxHTField0 xmlns="4873beb7-5857-4685-be1f-d57550cc96cc">
-      <Terms xmlns="http://schemas.microsoft.com/office/infopath/2007/PartnerControls"/>
-    </FeatureTagsTaxHTField0>
-    <PublishStatusLookup xmlns="4873beb7-5857-4685-be1f-d57550cc96cc">
-      <Value>1360476</Value>
-    </PublishStatusLookup>
-    <Providers xmlns="4873beb7-5857-4685-be1f-d57550cc96cc" xsi:nil="true"/>
-    <MachineTranslated xmlns="4873beb7-5857-4685-be1f-d57550cc96cc">false</MachineTranslated>
-    <OriginalSourceMarket xmlns="4873beb7-5857-4685-be1f-d57550cc96cc" xsi:nil="true"/>
-    <APDescription xmlns="4873beb7-5857-4685-be1f-d57550cc96cc" xsi:nil="true"/>
-    <ClipArtFilename xmlns="4873beb7-5857-4685-be1f-d57550cc96cc" xsi:nil="true"/>
-    <ContentItem xmlns="4873beb7-5857-4685-be1f-d57550cc96cc" xsi:nil="true"/>
-    <TPInstallLocation xmlns="4873beb7-5857-4685-be1f-d57550cc96cc" xsi:nil="true"/>
-    <PublishTargets xmlns="4873beb7-5857-4685-be1f-d57550cc96cc">OfficeOnlineVNext</PublishTargets>
-    <TimesCloned xmlns="4873beb7-5857-4685-be1f-d57550cc96cc" xsi:nil="true"/>
-    <AssetStart xmlns="4873beb7-5857-4685-be1f-d57550cc96cc">2011-12-12T13:37:00+00:00</AssetStart>
-    <Provider xmlns="4873beb7-5857-4685-be1f-d57550cc96cc" xsi:nil="true"/>
-    <AcquiredFrom xmlns="4873beb7-5857-4685-be1f-d57550cc96cc">Internal MS</AcquiredFrom>
-    <FriendlyTitle xmlns="4873beb7-5857-4685-be1f-d57550cc96cc" xsi:nil="true"/>
-    <LastHandOff xmlns="4873beb7-5857-4685-be1f-d57550cc96cc" xsi:nil="true"/>
-    <TPClientViewer xmlns="4873beb7-5857-4685-be1f-d57550cc96cc" xsi:nil="true"/>
-    <UACurrentWords xmlns="4873beb7-5857-4685-be1f-d57550cc96cc" xsi:nil="true"/>
-    <ArtSampleDocs xmlns="4873beb7-5857-4685-be1f-d57550cc96cc" xsi:nil="true"/>
-    <UALocRecommendation xmlns="4873beb7-5857-4685-be1f-d57550cc96cc">Localize</UALocRecommendation>
-    <Manager xmlns="4873beb7-5857-4685-be1f-d57550cc96cc" xsi:nil="true"/>
-    <ShowIn xmlns="4873beb7-5857-4685-be1f-d57550cc96cc">Show everywhere</ShowIn>
-    <UANotes xmlns="4873beb7-5857-4685-be1f-d57550cc96cc" xsi:nil="true"/>
-    <TemplateStatus xmlns="4873beb7-5857-4685-be1f-d57550cc96cc">Complete</TemplateStatus>
-    <InternalTagsTaxHTField0 xmlns="4873beb7-5857-4685-be1f-d57550cc96cc">
-      <Terms xmlns="http://schemas.microsoft.com/office/infopath/2007/PartnerControls"/>
-    </InternalTagsTaxHTField0>
-    <CSXHash xmlns="4873beb7-5857-4685-be1f-d57550cc96cc" xsi:nil="true"/>
-    <Downloads xmlns="4873beb7-5857-4685-be1f-d57550cc96cc">0</Downloads>
-    <VoteCount xmlns="4873beb7-5857-4685-be1f-d57550cc96cc" xsi:nil="true"/>
-    <OOCacheId xmlns="4873beb7-5857-4685-be1f-d57550cc96cc" xsi:nil="true"/>
-    <IsDeleted xmlns="4873beb7-5857-4685-be1f-d57550cc96cc">false</IsDeleted>
-    <AssetExpire xmlns="4873beb7-5857-4685-be1f-d57550cc96cc">2035-01-01T08:00:00+00:00</AssetExpire>
-    <DSATActionTaken xmlns="4873beb7-5857-4685-be1f-d57550cc96cc" xsi:nil="true"/>
-    <CSXSubmissionMarket xmlns="4873beb7-5857-4685-be1f-d57550cc96cc" xsi:nil="true"/>
-    <TPExecutable xmlns="4873beb7-5857-4685-be1f-d57550cc96cc" xsi:nil="true"/>
-    <SubmitterId xmlns="4873beb7-5857-4685-be1f-d57550cc96cc" xsi:nil="true"/>
-    <EditorialTags xmlns="4873beb7-5857-4685-be1f-d57550cc96cc" xsi:nil="true"/>
-    <ApprovalLog xmlns="4873beb7-5857-4685-be1f-d57550cc96cc" xsi:nil="true"/>
-    <AssetType xmlns="4873beb7-5857-4685-be1f-d57550cc96cc">TP</AssetType>
-    <BugNumber xmlns="4873beb7-5857-4685-be1f-d57550cc96cc" xsi:nil="true"/>
-    <CSXSubmissionDate xmlns="4873beb7-5857-4685-be1f-d57550cc96cc" xsi:nil="true"/>
-    <CSXUpdate xmlns="4873beb7-5857-4685-be1f-d57550cc96cc">false</CSXUpdate>
-    <Milestone xmlns="4873beb7-5857-4685-be1f-d57550cc96cc" xsi:nil="true"/>
-    <RecommendationsModifier xmlns="4873beb7-5857-4685-be1f-d57550cc96cc" xsi:nil="true"/>
-    <OriginAsset xmlns="4873beb7-5857-4685-be1f-d57550cc96cc" xsi:nil="true"/>
-    <TPComponent xmlns="4873beb7-5857-4685-be1f-d57550cc96cc" xsi:nil="true"/>
-    <AssetId xmlns="4873beb7-5857-4685-be1f-d57550cc96cc">TP102801058</AssetId>
-    <IntlLocPriority xmlns="4873beb7-5857-4685-be1f-d57550cc96cc" xsi:nil="true"/>
-    <PolicheckWords xmlns="4873beb7-5857-4685-be1f-d57550cc96cc" xsi:nil="true"/>
-    <TPLaunchHelpLink xmlns="4873beb7-5857-4685-be1f-d57550cc96cc" xsi:nil="true"/>
-    <TPApplication xmlns="4873beb7-5857-4685-be1f-d57550cc96cc" xsi:nil="true"/>
-    <CrawlForDependencies xmlns="4873beb7-5857-4685-be1f-d57550cc96cc">false</CrawlForDependencies>
-    <HandoffToMSDN xmlns="4873beb7-5857-4685-be1f-d57550cc96cc" xsi:nil="true"/>
-    <PlannedPubDate xmlns="4873beb7-5857-4685-be1f-d57550cc96cc" xsi:nil="true"/>
-    <IntlLangReviewer xmlns="4873beb7-5857-4685-be1f-d57550cc96cc" xsi:nil="true"/>
-    <TrustLevel xmlns="4873beb7-5857-4685-be1f-d57550cc96cc">1 Microsoft Managed Content</TrustLevel>
-    <LocLastLocAttemptVersionLookup xmlns="4873beb7-5857-4685-be1f-d57550cc96cc">706496</LocLastLocAttemptVersionLookup>
-    <IsSearchable xmlns="4873beb7-5857-4685-be1f-d57550cc96cc">true</IsSearchable>
-    <TemplateTemplateType xmlns="4873beb7-5857-4685-be1f-d57550cc96cc">PowerPoint Presentation Template</TemplateTemplateType>
-    <CampaignTagsTaxHTField0 xmlns="4873beb7-5857-4685-be1f-d57550cc96cc">
-      <Terms xmlns="http://schemas.microsoft.com/office/infopath/2007/PartnerControls"/>
-    </CampaignTagsTaxHTField0>
-    <TPNamespace xmlns="4873beb7-5857-4685-be1f-d57550cc96cc" xsi:nil="true"/>
-    <TaxCatchAll xmlns="4873beb7-5857-4685-be1f-d57550cc96cc"/>
-    <Markets xmlns="4873beb7-5857-4685-be1f-d57550cc96cc"/>
-    <UAProjectedTotalWords xmlns="4873beb7-5857-4685-be1f-d57550cc96cc" xsi:nil="true"/>
-    <IntlLangReview xmlns="4873beb7-5857-4685-be1f-d57550cc96cc">false</IntlLangReview>
-    <OutputCachingOn xmlns="4873beb7-5857-4685-be1f-d57550cc96cc">false</OutputCachingOn>
-    <AverageRating xmlns="4873beb7-5857-4685-be1f-d57550cc96cc" xsi:nil="true"/>
-    <APAuthor xmlns="4873beb7-5857-4685-be1f-d57550cc96cc">
-      <UserInfo>
-        <DisplayName>REDMOND\v-soujap</DisplayName>
-        <AccountId>1954</AccountId>
-        <AccountType/>
-      </UserInfo>
-    </APAuthor>
-    <LocManualTestRequired xmlns="4873beb7-5857-4685-be1f-d57550cc96cc">false</LocManualTestRequired>
-    <TPCommandLine xmlns="4873beb7-5857-4685-be1f-d57550cc96cc" xsi:nil="true"/>
-    <TPAppVersion xmlns="4873beb7-5857-4685-be1f-d57550cc96cc" xsi:nil="true"/>
-    <EditorialStatus xmlns="4873beb7-5857-4685-be1f-d57550cc96cc">Complete</EditorialStatus>
-    <LastModifiedDateTime xmlns="4873beb7-5857-4685-be1f-d57550cc96cc" xsi:nil="true"/>
-    <ScenarioTagsTaxHTField0 xmlns="4873beb7-5857-4685-be1f-d57550cc96cc">
-      <Terms xmlns="http://schemas.microsoft.com/office/infopath/2007/PartnerControls"/>
-    </ScenarioTagsTaxHTField0>
-    <OriginalRelease xmlns="4873beb7-5857-4685-be1f-d57550cc96cc">14</OriginalRelease>
-    <TPLaunchHelpLinkType xmlns="4873beb7-5857-4685-be1f-d57550cc96cc">Template</TPLaunchHelpLinkType>
-    <LocalizationTagsTaxHTField0 xmlns="4873beb7-5857-4685-be1f-d57550cc96cc">
-      <Terms xmlns="http://schemas.microsoft.com/office/infopath/2007/PartnerControls"/>
-    </LocalizationTagsTaxHTField0>
-    <LocMarketGroupTiers2 xmlns="4873beb7-5857-4685-be1f-d57550cc96cc" xsi:nil="true"/>
-  </documentManagement>
-</p:properties>
-</file>
-
 <file path=customXml/item3.xml><?xml version="1.0" encoding="utf-8"?>
 <?mso-contentType ?>
 <FormTemplates xmlns="http://schemas.microsoft.com/sharepoint/v3/contenttype/forms">
@@ -20350,6 +21875,22 @@
 </file>
 
 <file path=customXml/itemProps1.xml><?xml version="1.0" encoding="utf-8"?>
+<ds:datastoreItem xmlns:ds="http://schemas.openxmlformats.org/officeDocument/2006/customXml" ds:itemID="{4ED80E12-3BE9-4746-820E-FFB249F467F2}">
+  <ds:schemaRefs>
+    <ds:schemaRef ds:uri="http://purl.org/dc/elements/1.1/"/>
+    <ds:schemaRef ds:uri="http://schemas.microsoft.com/office/2006/metadata/properties"/>
+    <ds:schemaRef ds:uri="4873beb7-5857-4685-be1f-d57550cc96cc"/>
+    <ds:schemaRef ds:uri="http://schemas.openxmlformats.org/package/2006/metadata/core-properties"/>
+    <ds:schemaRef ds:uri="http://purl.org/dc/terms/"/>
+    <ds:schemaRef ds:uri="http://schemas.microsoft.com/office/infopath/2007/PartnerControls"/>
+    <ds:schemaRef ds:uri="http://schemas.microsoft.com/office/2006/documentManagement/types"/>
+    <ds:schemaRef ds:uri="http://www.w3.org/XML/1998/namespace"/>
+    <ds:schemaRef ds:uri="http://purl.org/dc/dcmitype/"/>
+  </ds:schemaRefs>
+</ds:datastoreItem>
+</file>
+
+<file path=customXml/itemProps2.xml><?xml version="1.0" encoding="utf-8"?>
 <ds:datastoreItem xmlns:ds="http://schemas.openxmlformats.org/officeDocument/2006/customXml" ds:itemID="{83ED4759-CFDD-43F0-817C-11D9197192BA}">
   <ds:schemaRefs>
     <ds:schemaRef ds:uri="http://schemas.microsoft.com/office/2006/metadata/contentType"/>
@@ -20367,22 +21908,6 @@
 </ds:datastoreItem>
 </file>
 
-<file path=customXml/itemProps2.xml><?xml version="1.0" encoding="utf-8"?>
-<ds:datastoreItem xmlns:ds="http://schemas.openxmlformats.org/officeDocument/2006/customXml" ds:itemID="{4ED80E12-3BE9-4746-820E-FFB249F467F2}">
-  <ds:schemaRefs>
-    <ds:schemaRef ds:uri="http://purl.org/dc/elements/1.1/"/>
-    <ds:schemaRef ds:uri="http://schemas.microsoft.com/office/2006/metadata/properties"/>
-    <ds:schemaRef ds:uri="4873beb7-5857-4685-be1f-d57550cc96cc"/>
-    <ds:schemaRef ds:uri="http://schemas.openxmlformats.org/package/2006/metadata/core-properties"/>
-    <ds:schemaRef ds:uri="http://purl.org/dc/terms/"/>
-    <ds:schemaRef ds:uri="http://schemas.microsoft.com/office/infopath/2007/PartnerControls"/>
-    <ds:schemaRef ds:uri="http://schemas.microsoft.com/office/2006/documentManagement/types"/>
-    <ds:schemaRef ds:uri="http://www.w3.org/XML/1998/namespace"/>
-    <ds:schemaRef ds:uri="http://purl.org/dc/dcmitype/"/>
-  </ds:schemaRefs>
-</ds:datastoreItem>
-</file>
-
 <file path=customXml/itemProps3.xml><?xml version="1.0" encoding="utf-8"?>
 <ds:datastoreItem xmlns:ds="http://schemas.openxmlformats.org/officeDocument/2006/customXml" ds:itemID="{8D003AC8-209A-4321-A17C-1B7A20643390}">
   <ds:schemaRefs>

</xml_diff>

<commit_message>
Updated slide - done
</commit_message>
<xml_diff>
--- a/Seminar/Software Requirement.pptx
+++ b/Seminar/Software Requirement.pptx
@@ -5,10 +5,10 @@
     <p:sldMasterId id="2147483756" r:id="rId4"/>
   </p:sldMasterIdLst>
   <p:notesMasterIdLst>
-    <p:notesMasterId r:id="rId63"/>
+    <p:notesMasterId r:id="rId67"/>
   </p:notesMasterIdLst>
   <p:handoutMasterIdLst>
-    <p:handoutMasterId r:id="rId64"/>
+    <p:handoutMasterId r:id="rId68"/>
   </p:handoutMasterIdLst>
   <p:sldIdLst>
     <p:sldId id="267" r:id="rId5"/>
@@ -63,12 +63,16 @@
     <p:sldId id="357" r:id="rId54"/>
     <p:sldId id="329" r:id="rId55"/>
     <p:sldId id="327" r:id="rId56"/>
-    <p:sldId id="333" r:id="rId57"/>
-    <p:sldId id="334" r:id="rId58"/>
-    <p:sldId id="325" r:id="rId59"/>
-    <p:sldId id="273" r:id="rId60"/>
-    <p:sldId id="324" r:id="rId61"/>
-    <p:sldId id="317" r:id="rId62"/>
+    <p:sldId id="361" r:id="rId57"/>
+    <p:sldId id="359" r:id="rId58"/>
+    <p:sldId id="333" r:id="rId59"/>
+    <p:sldId id="358" r:id="rId60"/>
+    <p:sldId id="334" r:id="rId61"/>
+    <p:sldId id="360" r:id="rId62"/>
+    <p:sldId id="325" r:id="rId63"/>
+    <p:sldId id="273" r:id="rId64"/>
+    <p:sldId id="324" r:id="rId65"/>
+    <p:sldId id="317" r:id="rId66"/>
   </p:sldIdLst>
   <p:sldSz cx="9144000" cy="6858000" type="screen4x3"/>
   <p:notesSz cx="6858000" cy="9144000"/>
@@ -282,7 +286,7 @@
           <a:p>
             <a:fld id="{30E6E22E-288A-414B-A8DE-E4DBD03D5FC0}" type="datetimeFigureOut">
               <a:rPr lang="en-US"/>
-              <a:t>01/11/2016</a:t>
+              <a:t>11/1/2016</a:t>
             </a:fld>
             <a:endParaRPr/>
           </a:p>
@@ -447,7 +451,7 @@
           <a:p>
             <a:fld id="{39A9AE7E-E0F9-4C51-AD9A-F4C3A6E23BBF}" type="datetimeFigureOut">
               <a:rPr lang="en-US"/>
-              <a:t>01/11/2016</a:t>
+              <a:t>11/1/2016</a:t>
             </a:fld>
             <a:endParaRPr/>
           </a:p>
@@ -5313,7 +5317,7 @@
             <a:fld id="{8E36636D-D922-432D-A958-524484B5923D}" type="datetimeFigureOut">
               <a:rPr lang="en-US"/>
               <a:pPr/>
-              <a:t>01/11/2016</a:t>
+              <a:t>11/1/2016</a:t>
             </a:fld>
             <a:endParaRPr/>
           </a:p>
@@ -5923,7 +5927,7 @@
             <a:fld id="{8E36636D-D922-432D-A958-524484B5923D}" type="datetimeFigureOut">
               <a:rPr lang="en-US"/>
               <a:pPr/>
-              <a:t>01/11/2016</a:t>
+              <a:t>11/1/2016</a:t>
             </a:fld>
             <a:endParaRPr/>
           </a:p>
@@ -6133,7 +6137,7 @@
             <a:fld id="{8E36636D-D922-432D-A958-524484B5923D}" type="datetimeFigureOut">
               <a:rPr lang="en-US"/>
               <a:pPr/>
-              <a:t>01/11/2016</a:t>
+              <a:t>11/1/2016</a:t>
             </a:fld>
             <a:endParaRPr/>
           </a:p>
@@ -6333,7 +6337,7 @@
             <a:fld id="{8E36636D-D922-432D-A958-524484B5923D}" type="datetimeFigureOut">
               <a:rPr lang="en-US"/>
               <a:pPr/>
-              <a:t>01/11/2016</a:t>
+              <a:t>11/1/2016</a:t>
             </a:fld>
             <a:endParaRPr/>
           </a:p>
@@ -6599,7 +6603,7 @@
             <a:fld id="{8E36636D-D922-432D-A958-524484B5923D}" type="datetimeFigureOut">
               <a:rPr lang="en-US"/>
               <a:pPr/>
-              <a:t>01/11/2016</a:t>
+              <a:t>11/1/2016</a:t>
             </a:fld>
             <a:endParaRPr/>
           </a:p>
@@ -7109,7 +7113,7 @@
             <a:fld id="{8E36636D-D922-432D-A958-524484B5923D}" type="datetimeFigureOut">
               <a:rPr lang="en-US"/>
               <a:pPr/>
-              <a:t>01/11/2016</a:t>
+              <a:t>11/1/2016</a:t>
             </a:fld>
             <a:endParaRPr/>
           </a:p>
@@ -7571,7 +7575,7 @@
             <a:fld id="{8E36636D-D922-432D-A958-524484B5923D}" type="datetimeFigureOut">
               <a:rPr lang="en-US"/>
               <a:pPr/>
-              <a:t>01/11/2016</a:t>
+              <a:t>11/1/2016</a:t>
             </a:fld>
             <a:endParaRPr/>
           </a:p>
@@ -7703,7 +7707,7 @@
             <a:fld id="{8E36636D-D922-432D-A958-524484B5923D}" type="datetimeFigureOut">
               <a:rPr lang="en-US"/>
               <a:pPr/>
-              <a:t>01/11/2016</a:t>
+              <a:t>11/1/2016</a:t>
             </a:fld>
             <a:endParaRPr/>
           </a:p>
@@ -7812,7 +7816,7 @@
             <a:fld id="{8E36636D-D922-432D-A958-524484B5923D}" type="datetimeFigureOut">
               <a:rPr lang="en-US"/>
               <a:pPr/>
-              <a:t>01/11/2016</a:t>
+              <a:t>11/1/2016</a:t>
             </a:fld>
             <a:endParaRPr/>
           </a:p>
@@ -8107,7 +8111,7 @@
             <a:fld id="{8E36636D-D922-432D-A958-524484B5923D}" type="datetimeFigureOut">
               <a:rPr lang="en-US"/>
               <a:pPr/>
-              <a:t>01/11/2016</a:t>
+              <a:t>11/1/2016</a:t>
             </a:fld>
             <a:endParaRPr/>
           </a:p>
@@ -8432,7 +8436,7 @@
             <a:fld id="{8E36636D-D922-432D-A958-524484B5923D}" type="datetimeFigureOut">
               <a:rPr lang="en-US"/>
               <a:pPr/>
-              <a:t>01/11/2016</a:t>
+              <a:t>11/1/2016</a:t>
             </a:fld>
             <a:endParaRPr/>
           </a:p>
@@ -8777,7 +8781,7 @@
             <a:fld id="{8E36636D-D922-432D-A958-524484B5923D}" type="datetimeFigureOut">
               <a:rPr lang="en-US"/>
               <a:pPr/>
-              <a:t>01/11/2016</a:t>
+              <a:t>11/1/2016</a:t>
             </a:fld>
             <a:endParaRPr/>
           </a:p>
@@ -10966,12 +10970,8 @@
           <a:lstStyle/>
           <a:p>
             <a:r>
-              <a:rPr lang="en-US" b="1" dirty="0" smtClean="0"/>
-              <a:t>Thiết kế ứng dụng chung (</a:t>
-            </a:r>
-            <a:r>
               <a:rPr lang="en-US" b="1" dirty="0"/>
-              <a:t>Joint Application Design)</a:t>
+              <a:t>Thiết kế ứng dụng chung (Joint Application Design)</a:t>
             </a:r>
           </a:p>
         </p:txBody>
@@ -11137,20 +11137,8 @@
           <a:lstStyle/>
           <a:p>
             <a:r>
-              <a:rPr lang="en-US" b="1" dirty="0" smtClean="0"/>
-              <a:t>Triển khai chức năng chất lượng (Quality </a:t>
-            </a:r>
-            <a:r>
               <a:rPr lang="en-US" b="1" dirty="0"/>
-              <a:t>Function </a:t>
-            </a:r>
-            <a:r>
-              <a:rPr lang="en-US" b="1" dirty="0" smtClean="0"/>
-              <a:t>Deployment</a:t>
-            </a:r>
-            <a:r>
-              <a:rPr lang="en-US" b="1" dirty="0"/>
-              <a:t>)</a:t>
+              <a:t>Triển khai chức năng chất lượng (Quality Function Deployment)</a:t>
             </a:r>
           </a:p>
         </p:txBody>
@@ -11179,15 +11167,7 @@
           <a:p>
             <a:r>
               <a:rPr lang="en-US" dirty="0"/>
-              <a:t>Được giới thiệu vào năm 1966 </a:t>
-            </a:r>
-            <a:r>
-              <a:rPr lang="en-US" dirty="0" smtClean="0"/>
-              <a:t>bởi </a:t>
-            </a:r>
-            <a:r>
-              <a:rPr lang="en-US" dirty="0"/>
-              <a:t>Yoji Akao sử dụng trong sản xuất, công nghiệp nặng và hệ thống kỹ thuật</a:t>
+              <a:t>Được giới thiệu vào năm 1966 bởi Yoji Akao sử dụng trong sản xuất, công nghiệp nặng và hệ thống kỹ thuật</a:t>
             </a:r>
           </a:p>
           <a:p>
@@ -11199,15 +11179,7 @@
           <a:p>
             <a:r>
               <a:rPr lang="en-US" dirty="0"/>
-              <a:t>Cung cấp cấu trúc cho việc lắng nghe cái khách hàng muốn và cần. Sau đó chuyển </a:t>
-            </a:r>
-            <a:r>
-              <a:rPr lang="en-US" dirty="0" smtClean="0"/>
-              <a:t>chúng (tiếng nói của khách hàng) </a:t>
-            </a:r>
-            <a:r>
-              <a:rPr lang="en-US" dirty="0"/>
-              <a:t>thành tài liệu kỹ thuật</a:t>
+              <a:t>Cung cấp cấu trúc cho việc lắng nghe cái khách hàng muốn và cần. Sau đó chuyển chúng (tiếng nói của khách hàng) thành tài liệu kỹ thuật</a:t>
             </a:r>
           </a:p>
           <a:p>
@@ -11294,13 +11266,8 @@
           <a:p>
             <a:r>
               <a:rPr lang="en-US" b="1" dirty="0"/>
-              <a:t>Thiết kế như người học việc </a:t>
-            </a:r>
-            <a:r>
-              <a:rPr lang="en-US" b="1" dirty="0" smtClean="0"/>
-              <a:t>(Designer as apprentice)</a:t>
-            </a:r>
-            <a:endParaRPr lang="en-US" b="1" dirty="0"/>
+              <a:t>Thiết kế như người học việc (Designer as apprentice)</a:t>
+            </a:r>
           </a:p>
         </p:txBody>
       </p:sp>
@@ -12281,7 +12248,7 @@
             </a:pPr>
             <a:r>
               <a:rPr lang="en-US" sz="1600"/>
-              <a:t>Nhà phát triển có thể không biết gì về các hoạt động business, nhưng họ vẫn có thể phát triển được hệ thống.</a:t>
+              <a:t>Nhà phát triển (developer) có thể không biết gì về các hoạt động business, nhưng họ vẫn có thể phát triển được hệ thống.</a:t>
             </a:r>
           </a:p>
           <a:p>
@@ -12701,12 +12668,8 @@
           <a:p>
             <a:pPr marL="742950" lvl="1" indent="-285750"/>
             <a:r>
-              <a:rPr lang="en-US" dirty="0" smtClean="0"/>
-              <a:t>Trong </a:t>
-            </a:r>
-            <a:r>
               <a:rPr lang="en-US" dirty="0"/>
-              <a:t>quá trình đặc tả một yêu cầu cũng có thể giúp ta phân tích được yêu cầu đó.</a:t>
+              <a:t>Trong quá trình đặc tả một yêu cầu cũng có thể giúp ta phân tích được yêu cầu đó.</a:t>
             </a:r>
           </a:p>
           <a:p>
@@ -14734,10 +14697,6 @@
               <a:rPr lang="en-US" dirty="0"/>
               <a:t>Tư vấn khách hàng.</a:t>
             </a:r>
-            <a:r>
-              <a:rPr lang="en-US" sz="1400" dirty="0"/>
-              <a:t/>
-            </a:r>
             <a:br>
               <a:rPr lang="en-US" sz="1400" dirty="0"/>
             </a:br>
@@ -17500,17 +17459,9 @@
               <a:rPr lang="en-US"/>
               <a:t>Mục lục </a:t>
             </a:r>
-            <a:r>
-              <a:rPr lang="en-US" dirty="0"/>
-              <a:t/>
-            </a:r>
             <a:br>
               <a:rPr lang="en-US" dirty="0"/>
             </a:br>
-            <a:r>
-              <a:rPr lang="en-US" dirty="0"/>
-              <a:t/>
-            </a:r>
             <a:br>
               <a:rPr lang="en-US" dirty="0"/>
             </a:br>
@@ -18832,8 +18783,8 @@
           <a:lstStyle/>
           <a:p>
             <a:r>
-              <a:rPr lang="en-US" i="1"/>
-              <a:t>Ví dụ:</a:t>
+              <a:rPr lang="en-US" i="1" u="sng"/>
+              <a:t>Ví dụ về một form mô tả</a:t>
             </a:r>
           </a:p>
         </p:txBody>
@@ -18848,7 +18799,7 @@
             <p:ph idx="1"/>
             <p:extLst>
               <p:ext uri="{D42A27DB-BD31-4B8C-83A1-F6EECF244321}">
-                <p14:modId xmlns:p14="http://schemas.microsoft.com/office/powerpoint/2010/main" val="1833504403"/>
+                <p14:modId xmlns:p14="http://schemas.microsoft.com/office/powerpoint/2010/main" val="2798051913"/>
               </p:ext>
             </p:extLst>
           </p:nvPr>
@@ -18867,14 +18818,14 @@
                 <a:gridCol w="1524001">
                   <a:extLst>
                     <a:ext uri="{9D8B030D-6E8A-4147-A177-3AD203B41FA5}">
-                      <a16:colId xmlns:a16="http://schemas.microsoft.com/office/drawing/2014/main" xmlns="" val="553860462"/>
+                      <a16:colId xmlns:a16="http://schemas.microsoft.com/office/drawing/2014/main" val="553860462"/>
                     </a:ext>
                   </a:extLst>
                 </a:gridCol>
                 <a:gridCol w="3810000">
                   <a:extLst>
                     <a:ext uri="{9D8B030D-6E8A-4147-A177-3AD203B41FA5}">
-                      <a16:colId xmlns:a16="http://schemas.microsoft.com/office/drawing/2014/main" xmlns="" val="1646000522"/>
+                      <a16:colId xmlns:a16="http://schemas.microsoft.com/office/drawing/2014/main" val="1646000522"/>
                     </a:ext>
                   </a:extLst>
                 </a:gridCol>
@@ -18902,7 +18853,7 @@
                 </a:tc>
                 <a:extLst>
                   <a:ext uri="{0D108BD9-81ED-4DB2-BD59-A6C34878D82A}">
-                    <a16:rowId xmlns:a16="http://schemas.microsoft.com/office/drawing/2014/main" xmlns="" val="1198104839"/>
+                    <a16:rowId xmlns:a16="http://schemas.microsoft.com/office/drawing/2014/main" val="1198104839"/>
                   </a:ext>
                 </a:extLst>
               </a:tr>
@@ -18934,14 +18885,17 @@
                     <a:bodyPr/>
                     <a:lstStyle/>
                     <a:p>
-                      <a:endParaRPr lang="en-US"/>
+                      <a:r>
+                        <a:rPr lang="en-US"/>
+                        <a:t> </a:t>
+                      </a:r>
                     </a:p>
                   </a:txBody>
                   <a:tcPr/>
                 </a:tc>
                 <a:extLst>
                   <a:ext uri="{0D108BD9-81ED-4DB2-BD59-A6C34878D82A}">
-                    <a16:rowId xmlns:a16="http://schemas.microsoft.com/office/drawing/2014/main" xmlns="" val="1066710561"/>
+                    <a16:rowId xmlns:a16="http://schemas.microsoft.com/office/drawing/2014/main" val="1066710561"/>
                   </a:ext>
                 </a:extLst>
               </a:tr>
@@ -18980,7 +18934,7 @@
                 </a:tc>
                 <a:extLst>
                   <a:ext uri="{0D108BD9-81ED-4DB2-BD59-A6C34878D82A}">
-                    <a16:rowId xmlns:a16="http://schemas.microsoft.com/office/drawing/2014/main" xmlns="" val="1819406728"/>
+                    <a16:rowId xmlns:a16="http://schemas.microsoft.com/office/drawing/2014/main" val="1819406728"/>
                   </a:ext>
                 </a:extLst>
               </a:tr>
@@ -19019,7 +18973,7 @@
                 </a:tc>
                 <a:extLst>
                   <a:ext uri="{0D108BD9-81ED-4DB2-BD59-A6C34878D82A}">
-                    <a16:rowId xmlns:a16="http://schemas.microsoft.com/office/drawing/2014/main" xmlns="" val="2395627147"/>
+                    <a16:rowId xmlns:a16="http://schemas.microsoft.com/office/drawing/2014/main" val="2395627147"/>
                   </a:ext>
                 </a:extLst>
               </a:tr>
@@ -19058,7 +19012,7 @@
                 </a:tc>
                 <a:extLst>
                   <a:ext uri="{0D108BD9-81ED-4DB2-BD59-A6C34878D82A}">
-                    <a16:rowId xmlns:a16="http://schemas.microsoft.com/office/drawing/2014/main" xmlns="" val="4119796087"/>
+                    <a16:rowId xmlns:a16="http://schemas.microsoft.com/office/drawing/2014/main" val="4119796087"/>
                   </a:ext>
                 </a:extLst>
               </a:tr>
@@ -19097,7 +19051,7 @@
                 </a:tc>
                 <a:extLst>
                   <a:ext uri="{0D108BD9-81ED-4DB2-BD59-A6C34878D82A}">
-                    <a16:rowId xmlns:a16="http://schemas.microsoft.com/office/drawing/2014/main" xmlns="" val="943454840"/>
+                    <a16:rowId xmlns:a16="http://schemas.microsoft.com/office/drawing/2014/main" val="943454840"/>
                   </a:ext>
                 </a:extLst>
               </a:tr>
@@ -19136,7 +19090,7 @@
                 </a:tc>
                 <a:extLst>
                   <a:ext uri="{0D108BD9-81ED-4DB2-BD59-A6C34878D82A}">
-                    <a16:rowId xmlns:a16="http://schemas.microsoft.com/office/drawing/2014/main" xmlns="" val="3902572225"/>
+                    <a16:rowId xmlns:a16="http://schemas.microsoft.com/office/drawing/2014/main" val="3902572225"/>
                   </a:ext>
                 </a:extLst>
               </a:tr>
@@ -19175,7 +19129,7 @@
                 </a:tc>
                 <a:extLst>
                   <a:ext uri="{0D108BD9-81ED-4DB2-BD59-A6C34878D82A}">
-                    <a16:rowId xmlns:a16="http://schemas.microsoft.com/office/drawing/2014/main" xmlns="" val="2099365865"/>
+                    <a16:rowId xmlns:a16="http://schemas.microsoft.com/office/drawing/2014/main" val="2099365865"/>
                   </a:ext>
                 </a:extLst>
               </a:tr>
@@ -19214,7 +19168,7 @@
                 </a:tc>
                 <a:extLst>
                   <a:ext uri="{0D108BD9-81ED-4DB2-BD59-A6C34878D82A}">
-                    <a16:rowId xmlns:a16="http://schemas.microsoft.com/office/drawing/2014/main" xmlns="" val="2242024356"/>
+                    <a16:rowId xmlns:a16="http://schemas.microsoft.com/office/drawing/2014/main" val="2242024356"/>
                   </a:ext>
                 </a:extLst>
               </a:tr>
@@ -19253,7 +19207,7 @@
                 </a:tc>
                 <a:extLst>
                   <a:ext uri="{0D108BD9-81ED-4DB2-BD59-A6C34878D82A}">
-                    <a16:rowId xmlns:a16="http://schemas.microsoft.com/office/drawing/2014/main" xmlns="" val="3477676302"/>
+                    <a16:rowId xmlns:a16="http://schemas.microsoft.com/office/drawing/2014/main" val="3477676302"/>
                   </a:ext>
                 </a:extLst>
               </a:tr>
@@ -19476,7 +19430,7 @@
           <a:lstStyle/>
           <a:p>
             <a:r>
-              <a:rPr lang="en-US" i="1"/>
+              <a:rPr lang="en-US" i="1" u="sng"/>
               <a:t>Ví dụ về PDL và Mã giả</a:t>
             </a:r>
           </a:p>
@@ -19742,8 +19696,8 @@
           <a:lstStyle/>
           <a:p>
             <a:r>
-              <a:rPr lang="en-US" i="1"/>
-              <a:t>Ví dụ về Use case</a:t>
+              <a:rPr lang="en-US" i="1" u="sng"/>
+              <a:t>Ví dụ về Use case của một máy ATM</a:t>
             </a:r>
             <a:r>
               <a:rPr lang="en-US"/>
@@ -20022,8 +19976,8 @@
           <a:lstStyle/>
           <a:p>
             <a:r>
-              <a:rPr lang="en-US"/>
-              <a:t>Ví dụ về một Use Story</a:t>
+              <a:rPr lang="en-US" i="1" u="sng"/>
+              <a:t>Ví dụ về một Use Story cho chức năng trong game</a:t>
             </a:r>
           </a:p>
         </p:txBody>
@@ -20111,7 +20065,7 @@
           <a:p>
             <a:r>
               <a:rPr lang="en-US" b="1"/>
-              <a:t>Formal Methods</a:t>
+              <a:t>Các phương pháp hình thức</a:t>
             </a:r>
           </a:p>
         </p:txBody>
@@ -20824,8 +20778,8 @@
           <a:lstStyle/>
           <a:p>
             <a:r>
-              <a:rPr lang="en-US" i="1"/>
-              <a:t>Ví dụ về ngôn ngữ Z</a:t>
+              <a:rPr lang="en-US" i="1" u="sng"/>
+              <a:t>Ví dụ về đặc tả hoạt động của thang máy bằng ngôn ngữ Z</a:t>
             </a:r>
           </a:p>
         </p:txBody>
@@ -20853,7 +20807,7 @@
         </p:blipFill>
         <p:spPr bwMode="auto">
           <a:xfrm>
-            <a:off x="2247900" y="1676400"/>
+            <a:off x="2247900" y="1617453"/>
             <a:ext cx="4648200" cy="4761167"/>
           </a:xfrm>
           <a:prstGeom prst="rect">
@@ -20930,7 +20884,7 @@
           <a:p>
             <a:r>
               <a:rPr lang="en-US" b="1"/>
-              <a:t>Informal/Semiformal Methods</a:t>
+              <a:t>Các phương pháp không hình thức/bán hình thức (informal/semiformal)</a:t>
             </a:r>
           </a:p>
         </p:txBody>
@@ -20952,13 +20906,13 @@
           <a:p>
             <a:r>
               <a:rPr lang="en-US"/>
-              <a:t>Các cách tiếp cận khác không phải phải là phương pháp hình thức thì hoặc là informal (như các biểu đồ dòng chảy – flow-charting) hoặc là semiformal (như UML)</a:t>
+              <a:t>Các cách tiếp cận khác không phải phải là phương pháp hình thức thì hoặc là không hình thức (như các biểu đồ dòng chảy – flow-charting) hoặc là bán hình thức (như UML)</a:t>
             </a:r>
           </a:p>
           <a:p>
             <a:r>
               <a:rPr lang="en-US"/>
-              <a:t>Cách tiếp cận semiformal có nghĩa là chúng không xuất hiện dưới dạng các kí hiệu toán học, mà các công cụ mô hình hóa có thể chuyển đổi một phần hoặc toàn bộ chúng thành các biễu diễn toán học khác nhau.</a:t>
+              <a:t>Cách tiếp cận bán hình thức có nghĩa là chúng không xuất hiện dưới dạng các kí hiệu toán học, mà các công cụ mô hình hóa có thể chuyển đổi một phần hoặc toàn bộ chúng thành các biễu diễn toán học khác nhau.</a:t>
             </a:r>
           </a:p>
           <a:p>
@@ -21024,8 +20978,8 @@
           <a:lstStyle/>
           <a:p>
             <a:r>
-              <a:rPr lang="en-US" b="1"/>
-              <a:t>UML</a:t>
+              <a:rPr lang="en-US" i="1"/>
+              <a:t>Ngôn ngữ mô hình hóa thống nhất - UML</a:t>
             </a:r>
           </a:p>
         </p:txBody>
@@ -21047,8 +21001,76 @@
           <a:p>
             <a:r>
               <a:rPr lang="en-US"/>
-              <a:t>UML</a:t>
-            </a:r>
+              <a:t>Là một cách tiếp cận bán hình thức.</a:t>
+            </a:r>
+          </a:p>
+          <a:p>
+            <a:r>
+              <a:rPr lang="en-US"/>
+              <a:t>Được sử dụng trong hầu hết các giai đoạn của quá trình phát triển phần mềm.</a:t>
+            </a:r>
+          </a:p>
+          <a:p>
+            <a:r>
+              <a:rPr lang="en-US"/>
+              <a:t>Trong quá trình đặc tả yêu cầu phần mềm người ta thường sử dụng các sơ </a:t>
+            </a:r>
+            <a:r>
+              <a:rPr lang="en-US"/>
+              <a:t>đồ tuần tự và sơ đồ hoạt động</a:t>
+            </a:r>
+          </a:p>
+          <a:p>
+            <a:pPr lvl="1"/>
+            <a:r>
+              <a:rPr lang="en-US"/>
+              <a:t>Sơ đồ tuần tự: </a:t>
+            </a:r>
+            <a:r>
+              <a:rPr lang="vi-VN">
+                <a:latin typeface="Constantia" panose="02030602050306030303" pitchFamily="18" charset="0"/>
+              </a:rPr>
+              <a:t>là </a:t>
+            </a:r>
+            <a:r>
+              <a:rPr lang="vi-VN">
+                <a:latin typeface="Constantia" panose="02030602050306030303" pitchFamily="18" charset="0"/>
+              </a:rPr>
+              <a:t>bản vẽ mô tả sự tương tác của các đối tượng để tạo nên các chức năng của hệ thống. Bản vẽ này mô tả sự tương tác theo thời gian nên rất phù hợp với việc sử dụng để thiết kế và cài đặt chức năng cho hệ thống phần </a:t>
+            </a:r>
+            <a:r>
+              <a:rPr lang="vi-VN">
+                <a:latin typeface="Constantia" panose="02030602050306030303" pitchFamily="18" charset="0"/>
+              </a:rPr>
+              <a:t>mềm.</a:t>
+            </a:r>
+            <a:endParaRPr lang="en-US">
+              <a:latin typeface="Constantia" panose="02030602050306030303" pitchFamily="18" charset="0"/>
+            </a:endParaRPr>
+          </a:p>
+          <a:p>
+            <a:pPr lvl="1"/>
+            <a:r>
+              <a:rPr lang="en-US">
+                <a:latin typeface="Constantia" panose="02030602050306030303" pitchFamily="18" charset="0"/>
+              </a:rPr>
+              <a:t>Sơ đồ hoạt động: </a:t>
+            </a:r>
+            <a:r>
+              <a:rPr lang="vi-VN">
+                <a:latin typeface="Constantia" panose="02030602050306030303" pitchFamily="18" charset="0"/>
+              </a:rPr>
+              <a:t>là bản vẽ tập trung vào mô tả các hoạt động, luồng xử lý bên trong hệ thống. Nó có thể được sử dụng để mô tả các qui trình nghiệp vụ trong hệ thống, các luồng của một chức năng hoặc các hoạt động của một đối tượng.</a:t>
+            </a:r>
+            <a:endParaRPr lang="en-US">
+              <a:latin typeface="Constantia" panose="02030602050306030303" pitchFamily="18" charset="0"/>
+            </a:endParaRPr>
+          </a:p>
+          <a:p>
+            <a:endParaRPr lang="en-US"/>
+          </a:p>
+          <a:p>
+            <a:endParaRPr lang="en-US"/>
           </a:p>
         </p:txBody>
       </p:sp>
@@ -21110,35 +21132,60 @@
           <a:lstStyle/>
           <a:p>
             <a:r>
-              <a:rPr lang="en-US" b="1"/>
-              <a:t>DFD</a:t>
-            </a:r>
-          </a:p>
-        </p:txBody>
-      </p:sp>
-      <p:sp>
-        <p:nvSpPr>
-          <p:cNvPr id="3" name="Content Placeholder 2"/>
-          <p:cNvSpPr>
-            <a:spLocks noGrp="1"/>
-          </p:cNvSpPr>
+              <a:rPr lang="en-US" i="1" u="sng"/>
+              <a:t>Ví dụ về sơ đồ Tuần tự</a:t>
+            </a:r>
+            <a:endParaRPr lang="en-US" i="1" u="sng"/>
+          </a:p>
+        </p:txBody>
+      </p:sp>
+      <p:pic>
+        <p:nvPicPr>
+          <p:cNvPr id="4" name="Picture 4" descr="Kết quả hình ảnh cho ví dụ sơ đồ activity"/>
+          <p:cNvPicPr>
+            <a:picLocks noGrp="1" noChangeAspect="1" noChangeArrowheads="1"/>
+          </p:cNvPicPr>
           <p:nvPr>
             <p:ph idx="1"/>
           </p:nvPr>
-        </p:nvSpPr>
-        <p:spPr/>
-        <p:txBody>
-          <a:bodyPr/>
-          <a:lstStyle/>
-          <a:p>
-            <a:endParaRPr lang="en-US"/>
-          </a:p>
-        </p:txBody>
-      </p:sp>
+        </p:nvPicPr>
+        <p:blipFill>
+          <a:blip r:embed="rId2">
+            <a:extLst>
+              <a:ext uri="{28A0092B-C50C-407E-A947-70E740481C1C}">
+                <a14:useLocalDpi xmlns:a14="http://schemas.microsoft.com/office/drawing/2010/main" val="0"/>
+              </a:ext>
+            </a:extLst>
+          </a:blip>
+          <a:srcRect/>
+          <a:stretch>
+            <a:fillRect/>
+          </a:stretch>
+        </p:blipFill>
+        <p:spPr bwMode="auto">
+          <a:xfrm>
+            <a:off x="914400" y="1843598"/>
+            <a:ext cx="7315200" cy="4186804"/>
+          </a:xfrm>
+          <a:prstGeom prst="rect">
+            <a:avLst/>
+          </a:prstGeom>
+          <a:noFill/>
+          <a:extLst>
+            <a:ext uri="{909E8E84-426E-40DD-AFC4-6F175D3DCCD1}">
+              <a14:hiddenFill xmlns:a14="http://schemas.microsoft.com/office/drawing/2010/main">
+                <a:solidFill>
+                  <a:srgbClr val="FFFFFF"/>
+                </a:solidFill>
+              </a14:hiddenFill>
+            </a:ext>
+          </a:extLst>
+        </p:spPr>
+      </p:pic>
     </p:spTree>
     <p:extLst>
       <p:ext uri="{BB962C8B-B14F-4D97-AF65-F5344CB8AC3E}">
-        <p14:creationId xmlns:p14="http://schemas.microsoft.com/office/powerpoint/2010/main" val="629876951"/>
+        <p14:creationId xmlns:p14="http://schemas.microsoft.com/office/powerpoint/2010/main" val="4223892262"/>
       </p:ext>
     </p:extLst>
   </p:cSld>
@@ -21179,7 +21226,7 @@
       </p:grpSpPr>
       <p:sp>
         <p:nvSpPr>
-          <p:cNvPr id="2" name="Title 1"/>
+          <p:cNvPr id="5" name="Title 4"/>
           <p:cNvSpPr>
             <a:spLocks noGrp="1"/>
           </p:cNvSpPr>
@@ -21193,35 +21240,47 @@
           <a:lstStyle/>
           <a:p>
             <a:r>
-              <a:rPr lang="en-US" b="1"/>
-              <a:t>Petri net</a:t>
-            </a:r>
-          </a:p>
-        </p:txBody>
-      </p:sp>
-      <p:sp>
-        <p:nvSpPr>
-          <p:cNvPr id="3" name="Content Placeholder 2"/>
-          <p:cNvSpPr>
-            <a:spLocks noGrp="1"/>
-          </p:cNvSpPr>
+              <a:rPr lang="en-US" i="1" u="sng"/>
+              <a:t>Ví dụ về sơ đồ Hoạt động</a:t>
+            </a:r>
+            <a:endParaRPr lang="en-US" i="1" u="sng"/>
+          </a:p>
+        </p:txBody>
+      </p:sp>
+      <p:pic>
+        <p:nvPicPr>
+          <p:cNvPr id="1026" name="Picture 2" descr="Kết quả hình ảnh cho ví dụ sơ đồ activity"/>
+          <p:cNvPicPr>
+            <a:picLocks noGrp="1" noChangeAspect="1" noChangeArrowheads="1"/>
+          </p:cNvPicPr>
           <p:nvPr>
             <p:ph idx="1"/>
           </p:nvPr>
-        </p:nvSpPr>
-        <p:spPr/>
-        <p:txBody>
-          <a:bodyPr/>
-          <a:lstStyle/>
-          <a:p>
-            <a:endParaRPr lang="en-US"/>
-          </a:p>
-        </p:txBody>
-      </p:sp>
+        </p:nvPicPr>
+        <p:blipFill>
+          <a:blip r:embed="rId2">
+            <a:extLst>
+              <a:ext uri="{28A0092B-C50C-407E-A947-70E740481C1C}">
+                <a14:useLocalDpi xmlns:a14="http://schemas.microsoft.com/office/drawing/2010/main" val="0"/>
+              </a:ext>
+            </a:extLst>
+          </a:blip>
+          <a:srcRect/>
+          <a:stretch>
+            <a:fillRect/>
+          </a:stretch>
+        </p:blipFill>
+        <p:spPr>
+          <a:xfrm>
+            <a:off x="1666469" y="2403261"/>
+            <a:ext cx="5811061" cy="3067478"/>
+          </a:xfrm>
+        </p:spPr>
+      </p:pic>
     </p:spTree>
     <p:extLst>
       <p:ext uri="{BB962C8B-B14F-4D97-AF65-F5344CB8AC3E}">
-        <p14:creationId xmlns:p14="http://schemas.microsoft.com/office/powerpoint/2010/main" val="4174780847"/>
+        <p14:creationId xmlns:p14="http://schemas.microsoft.com/office/powerpoint/2010/main" val="1524357359"/>
       </p:ext>
     </p:extLst>
   </p:cSld>
@@ -21262,7 +21321,7 @@
       </p:grpSpPr>
       <p:sp>
         <p:nvSpPr>
-          <p:cNvPr id="4" name="Title 3"/>
+          <p:cNvPr id="2" name="Title 1"/>
           <p:cNvSpPr>
             <a:spLocks noGrp="1"/>
           </p:cNvSpPr>
@@ -21276,21 +21335,20 @@
           <a:lstStyle/>
           <a:p>
             <a:r>
-              <a:rPr lang="en-US" sz="3600"/>
-              <a:t>Các tài liệu SRS trong thực tế</a:t>
-            </a:r>
-            <a:endParaRPr lang="en-US"/>
-          </a:p>
-        </p:txBody>
-      </p:sp>
-      <p:sp>
-        <p:nvSpPr>
-          <p:cNvPr id="5" name="Text Placeholder 4"/>
+              <a:rPr lang="en-US" i="1"/>
+              <a:t>Sơ đồ dòng chảy dữ liệu - DFD</a:t>
+            </a:r>
+          </a:p>
+        </p:txBody>
+      </p:sp>
+      <p:sp>
+        <p:nvSpPr>
+          <p:cNvPr id="3" name="Content Placeholder 2"/>
           <p:cNvSpPr>
             <a:spLocks noGrp="1"/>
           </p:cNvSpPr>
           <p:nvPr>
-            <p:ph type="body" idx="1"/>
+            <p:ph idx="1"/>
           </p:nvPr>
         </p:nvSpPr>
         <p:spPr/>
@@ -21300,15 +21358,40 @@
           <a:p>
             <a:r>
               <a:rPr lang="en-US"/>
-              <a:t>DEMO một số tài liệu đặc tả trong thực tế</a:t>
-            </a:r>
+              <a:t>Là một cách tiếp cận không hình thức.</a:t>
+            </a:r>
+          </a:p>
+          <a:p>
+            <a:r>
+              <a:rPr lang="en-US"/>
+              <a:t>Được sử dụng rộng rãi, tập trung vào các chức năng được thực hiện trong hệ thống</a:t>
+            </a:r>
+          </a:p>
+          <a:p>
+            <a:r>
+              <a:rPr lang="en-US"/>
+              <a:t>Xem hệ thống như một mạng lưới các dữ liệu chuyển đổi thông qua các luồng dữ liệu</a:t>
+            </a:r>
+          </a:p>
+          <a:p>
+            <a:r>
+              <a:rPr lang="en-US"/>
+              <a:t>Thường được sử dụng bằng cách chia nhỏ các chức năng cần mô hình hóa và áp dụng DFD cho các phần được chia.</a:t>
+            </a:r>
+          </a:p>
+          <a:p>
+            <a:r>
+              <a:rPr lang="en-US"/>
+              <a:t>Phương pháp Phân tích và Thiết kế hệ thống (SSAD) sử dụng DFD để tổ chức thông tin và hướng dẫn phân tích</a:t>
+            </a:r>
+            <a:endParaRPr lang="en-US"/>
           </a:p>
         </p:txBody>
       </p:sp>
     </p:spTree>
     <p:extLst>
       <p:ext uri="{BB962C8B-B14F-4D97-AF65-F5344CB8AC3E}">
-        <p14:creationId xmlns:p14="http://schemas.microsoft.com/office/powerpoint/2010/main" val="2399078340"/>
+        <p14:creationId xmlns:p14="http://schemas.microsoft.com/office/powerpoint/2010/main" val="629876951"/>
       </p:ext>
     </p:extLst>
   </p:cSld>
@@ -21349,7 +21432,7 @@
       </p:grpSpPr>
       <p:sp>
         <p:nvSpPr>
-          <p:cNvPr id="2" name="Title 1"/>
+          <p:cNvPr id="7" name="Title 6"/>
           <p:cNvSpPr>
             <a:spLocks noGrp="1"/>
           </p:cNvSpPr>
@@ -21363,59 +21446,60 @@
           <a:lstStyle/>
           <a:p>
             <a:r>
-              <a:rPr lang="en-US"/>
-              <a:t>Tài liệu tham khảo</a:t>
-            </a:r>
-          </a:p>
-        </p:txBody>
-      </p:sp>
-      <p:sp>
-        <p:nvSpPr>
-          <p:cNvPr id="5" name="Text Placeholder 4"/>
-          <p:cNvSpPr>
-            <a:spLocks noGrp="1"/>
-          </p:cNvSpPr>
-          <p:nvPr>
-            <p:ph type="body" idx="1"/>
-          </p:nvPr>
-        </p:nvSpPr>
-        <p:spPr/>
-        <p:txBody>
-          <a:bodyPr/>
-          <a:lstStyle/>
-          <a:p>
-            <a:pPr marL="285750" indent="-285750">
-              <a:buFontTx/>
-              <a:buChar char="-"/>
-            </a:pPr>
-            <a:r>
-              <a:rPr lang="en-US"/>
-              <a:t>What everything engineer should know</a:t>
-            </a:r>
-          </a:p>
-          <a:p>
-            <a:pPr marL="285750" indent="-285750">
-              <a:buFontTx/>
-              <a:buChar char="-"/>
-            </a:pPr>
-            <a:r>
-              <a:rPr lang="en-US"/>
-              <a:t>Các Slide thầy cho trong mục “đặc tả phần mềm”</a:t>
-            </a:r>
-          </a:p>
-          <a:p>
-            <a:pPr marL="285750" indent="-285750">
-              <a:buFontTx/>
-              <a:buChar char="-"/>
-            </a:pPr>
-            <a:endParaRPr lang="en-US"/>
-          </a:p>
-        </p:txBody>
-      </p:sp>
+              <a:rPr lang="en-US" i="1" u="sng"/>
+              <a:t>Ví dụ về sơ đồ DFD 2 mức của 1 yêu cầu Đặt vé</a:t>
+            </a:r>
+            <a:endParaRPr lang="en-US" i="1" u="sng"/>
+          </a:p>
+        </p:txBody>
+      </p:sp>
+      <p:pic>
+        <p:nvPicPr>
+          <p:cNvPr id="4" name="Picture 2" descr="Kết quả hình ảnh cho ví dụ dfd"/>
+          <p:cNvPicPr>
+            <a:picLocks noGrp="1" noChangeAspect="1" noChangeArrowheads="1"/>
+          </p:cNvPicPr>
+          <p:nvPr>
+            <p:ph idx="4294967295"/>
+          </p:nvPr>
+        </p:nvPicPr>
+        <p:blipFill>
+          <a:blip r:embed="rId2">
+            <a:extLst>
+              <a:ext uri="{28A0092B-C50C-407E-A947-70E740481C1C}">
+                <a14:useLocalDpi xmlns:a14="http://schemas.microsoft.com/office/drawing/2010/main" val="0"/>
+              </a:ext>
+            </a:extLst>
+          </a:blip>
+          <a:srcRect/>
+          <a:stretch>
+            <a:fillRect/>
+          </a:stretch>
+        </p:blipFill>
+        <p:spPr bwMode="auto">
+          <a:xfrm>
+            <a:off x="1600200" y="1752600"/>
+            <a:ext cx="5943600" cy="4431783"/>
+          </a:xfrm>
+          <a:prstGeom prst="rect">
+            <a:avLst/>
+          </a:prstGeom>
+          <a:noFill/>
+          <a:extLst>
+            <a:ext uri="{909E8E84-426E-40DD-AFC4-6F175D3DCCD1}">
+              <a14:hiddenFill xmlns:a14="http://schemas.microsoft.com/office/drawing/2010/main">
+                <a:solidFill>
+                  <a:srgbClr val="FFFFFF"/>
+                </a:solidFill>
+              </a14:hiddenFill>
+            </a:ext>
+          </a:extLst>
+        </p:spPr>
+      </p:pic>
     </p:spTree>
     <p:extLst>
       <p:ext uri="{BB962C8B-B14F-4D97-AF65-F5344CB8AC3E}">
-        <p14:creationId xmlns:p14="http://schemas.microsoft.com/office/powerpoint/2010/main" val="2623819822"/>
+        <p14:creationId xmlns:p14="http://schemas.microsoft.com/office/powerpoint/2010/main" val="1393398905"/>
       </p:ext>
     </p:extLst>
   </p:cSld>
@@ -21470,20 +21554,20 @@
           <a:lstStyle/>
           <a:p>
             <a:r>
-              <a:rPr lang="en-US"/>
-              <a:t>Câu hỏi</a:t>
-            </a:r>
-          </a:p>
-        </p:txBody>
-      </p:sp>
-      <p:sp>
-        <p:nvSpPr>
-          <p:cNvPr id="3" name="Text Placeholder 2"/>
+              <a:rPr lang="en-US" b="1"/>
+              <a:t>Petri net</a:t>
+            </a:r>
+          </a:p>
+        </p:txBody>
+      </p:sp>
+      <p:sp>
+        <p:nvSpPr>
+          <p:cNvPr id="3" name="Content Placeholder 2"/>
           <p:cNvSpPr>
             <a:spLocks noGrp="1"/>
           </p:cNvSpPr>
           <p:nvPr>
-            <p:ph type="body" idx="1"/>
+            <p:ph idx="1"/>
           </p:nvPr>
         </p:nvSpPr>
         <p:spPr/>
@@ -21493,15 +21577,62 @@
           <a:p>
             <a:r>
               <a:rPr lang="en-US"/>
-              <a:t>Mời thầy và các bạn đặt câu hỏi</a:t>
-            </a:r>
+              <a:t>Là một phương </a:t>
+            </a:r>
+            <a:r>
+              <a:rPr lang="en-US"/>
+              <a:t>pháp hình </a:t>
+            </a:r>
+            <a:r>
+              <a:rPr lang="en-US"/>
+              <a:t>thức (formal) được dùng để xác định các hoạt động sẽ được thực hiện trong môi trường đa xử lý hoặc môi trường đa nhiệm.</a:t>
+            </a:r>
+          </a:p>
+          <a:p>
+            <a:pPr lvl="1"/>
+            <a:r>
+              <a:rPr lang="en-US"/>
+              <a:t>Các bong bóng tròn được gọi là “place” dùng để đại diện cho kho dữ liệu hoặc các xử lý.</a:t>
+            </a:r>
+          </a:p>
+          <a:p>
+            <a:pPr lvl="1"/>
+            <a:r>
+              <a:rPr lang="en-US"/>
+              <a:t>Các hộp chữ nhật đại diện cho các quá trình chuyển đổi hoặc các hoạt động.</a:t>
+            </a:r>
+          </a:p>
+          <a:p>
+            <a:pPr lvl="1"/>
+            <a:r>
+              <a:rPr lang="en-US"/>
+              <a:t>Các quy trình và chuyển tiếp (transition) được đánh số và  được nối bằng các đường vòng cung</a:t>
+            </a:r>
+          </a:p>
+          <a:p>
+            <a:r>
+              <a:rPr lang="en-US"/>
+              <a:t>Được xử dụng cho việc thể hiện các hệ thống đa xử lý và đa tác vụ, đặc  biệt là khi các hàm thực hiện có mức độ phức tạp thấp.</a:t>
+            </a:r>
+          </a:p>
+          <a:p>
+            <a:r>
+              <a:rPr lang="en-US"/>
+              <a:t>Bởi vì chúng thuần túy là toán học, các kỹ thuật cho việc tối ưu và hình thức hóa chương trình có thể được sử dụng.</a:t>
+            </a:r>
+          </a:p>
+          <a:p>
+            <a:endParaRPr lang="en-US"/>
+          </a:p>
+          <a:p>
+            <a:endParaRPr lang="en-US"/>
           </a:p>
         </p:txBody>
       </p:sp>
     </p:spTree>
     <p:extLst>
       <p:ext uri="{BB962C8B-B14F-4D97-AF65-F5344CB8AC3E}">
-        <p14:creationId xmlns:p14="http://schemas.microsoft.com/office/powerpoint/2010/main" val="788291268"/>
+        <p14:creationId xmlns:p14="http://schemas.microsoft.com/office/powerpoint/2010/main" val="4174780847"/>
       </p:ext>
     </p:extLst>
   </p:cSld>
@@ -21542,32 +21673,152 @@
       </p:grpSpPr>
       <p:sp>
         <p:nvSpPr>
-          <p:cNvPr id="4" name="Title 3"/>
+          <p:cNvPr id="2" name="Title 1"/>
           <p:cNvSpPr>
             <a:spLocks noGrp="1"/>
           </p:cNvSpPr>
           <p:nvPr>
-            <p:ph type="ctrTitle"/>
+            <p:ph type="title"/>
           </p:nvPr>
         </p:nvSpPr>
         <p:spPr/>
         <p:txBody>
-          <a:bodyPr>
-            <a:normAutofit/>
-          </a:bodyPr>
+          <a:bodyPr/>
           <a:lstStyle/>
           <a:p>
             <a:r>
-              <a:rPr lang="en-US" sz="3200"/>
-              <a:t>Cảm ơn thầy và các bạn đã lắng nghe!</a:t>
-            </a:r>
-          </a:p>
-        </p:txBody>
-      </p:sp>
+              <a:rPr lang="en-US" i="1" u="sng"/>
+              <a:t>Ví dụ </a:t>
+            </a:r>
+            <a:r>
+              <a:rPr lang="en-US" i="1" u="sng"/>
+              <a:t>cho đặc tả vòng </a:t>
+            </a:r>
+            <a:r>
+              <a:rPr lang="en-US" i="1" u="sng"/>
+              <a:t>lặp while</a:t>
+            </a:r>
+            <a:endParaRPr lang="en-US" i="1" u="sng"/>
+          </a:p>
+        </p:txBody>
+      </p:sp>
+      <p:pic>
+        <p:nvPicPr>
+          <p:cNvPr id="4" name="Content Placeholder 3"/>
+          <p:cNvPicPr>
+            <a:picLocks noGrp="1" noChangeAspect="1"/>
+          </p:cNvPicPr>
+          <p:nvPr>
+            <p:ph idx="1"/>
+          </p:nvPr>
+        </p:nvPicPr>
+        <p:blipFill>
+          <a:blip r:embed="rId2"/>
+          <a:stretch>
+            <a:fillRect/>
+          </a:stretch>
+        </p:blipFill>
+        <p:spPr>
+          <a:xfrm>
+            <a:off x="1223962" y="2151062"/>
+            <a:ext cx="6696075" cy="3571875"/>
+          </a:xfrm>
+          <a:prstGeom prst="rect">
+            <a:avLst/>
+          </a:prstGeom>
+        </p:spPr>
+      </p:pic>
     </p:spTree>
     <p:extLst>
       <p:ext uri="{BB962C8B-B14F-4D97-AF65-F5344CB8AC3E}">
-        <p14:creationId xmlns:p14="http://schemas.microsoft.com/office/powerpoint/2010/main" val="612488740"/>
+        <p14:creationId xmlns:p14="http://schemas.microsoft.com/office/powerpoint/2010/main" val="114365089"/>
+      </p:ext>
+    </p:extLst>
+  </p:cSld>
+  <p:clrMapOvr>
+    <a:masterClrMapping/>
+  </p:clrMapOvr>
+  <mc:AlternateContent xmlns:mc="http://schemas.openxmlformats.org/markup-compatibility/2006" xmlns:p14="http://schemas.microsoft.com/office/powerpoint/2010/main">
+    <mc:Choice Requires="p14">
+      <p:transition spd="med" p14:dur="700">
+        <p:fade/>
+      </p:transition>
+    </mc:Choice>
+    <mc:Fallback xmlns="">
+      <p:transition spd="med">
+        <p:fade/>
+      </p:transition>
+    </mc:Fallback>
+  </mc:AlternateContent>
+</p:sld>
+</file>
+
+<file path=ppt/slides/slide59.xml><?xml version="1.0" encoding="utf-8"?>
+<p:sld xmlns:a="http://schemas.openxmlformats.org/drawingml/2006/main" xmlns:r="http://schemas.openxmlformats.org/officeDocument/2006/relationships" xmlns:p="http://schemas.openxmlformats.org/presentationml/2006/main">
+  <p:cSld>
+    <p:spTree>
+      <p:nvGrpSpPr>
+        <p:cNvPr id="1" name=""/>
+        <p:cNvGrpSpPr/>
+        <p:nvPr/>
+      </p:nvGrpSpPr>
+      <p:grpSpPr>
+        <a:xfrm>
+          <a:off x="0" y="0"/>
+          <a:ext cx="0" cy="0"/>
+          <a:chOff x="0" y="0"/>
+          <a:chExt cx="0" cy="0"/>
+        </a:xfrm>
+      </p:grpSpPr>
+      <p:sp>
+        <p:nvSpPr>
+          <p:cNvPr id="4" name="Title 3"/>
+          <p:cNvSpPr>
+            <a:spLocks noGrp="1"/>
+          </p:cNvSpPr>
+          <p:nvPr>
+            <p:ph type="title"/>
+          </p:nvPr>
+        </p:nvSpPr>
+        <p:spPr/>
+        <p:txBody>
+          <a:bodyPr/>
+          <a:lstStyle/>
+          <a:p>
+            <a:r>
+              <a:rPr lang="en-US" sz="3600"/>
+              <a:t>Các tài liệu SRS trong thực tế</a:t>
+            </a:r>
+            <a:endParaRPr lang="en-US"/>
+          </a:p>
+        </p:txBody>
+      </p:sp>
+      <p:sp>
+        <p:nvSpPr>
+          <p:cNvPr id="5" name="Text Placeholder 4"/>
+          <p:cNvSpPr>
+            <a:spLocks noGrp="1"/>
+          </p:cNvSpPr>
+          <p:nvPr>
+            <p:ph type="body" idx="1"/>
+          </p:nvPr>
+        </p:nvSpPr>
+        <p:spPr/>
+        <p:txBody>
+          <a:bodyPr/>
+          <a:lstStyle/>
+          <a:p>
+            <a:r>
+              <a:rPr lang="en-US"/>
+              <a:t>DEMO một số tài liệu đặc tả trong thực tế</a:t>
+            </a:r>
+          </a:p>
+        </p:txBody>
+      </p:sp>
+    </p:spTree>
+    <p:extLst>
+      <p:ext uri="{BB962C8B-B14F-4D97-AF65-F5344CB8AC3E}">
+        <p14:creationId xmlns:p14="http://schemas.microsoft.com/office/powerpoint/2010/main" val="2399078340"/>
       </p:ext>
     </p:extLst>
   </p:cSld>
@@ -21747,6 +21998,265 @@
     <p:extLst>
       <p:ext uri="{BB962C8B-B14F-4D97-AF65-F5344CB8AC3E}">
         <p14:creationId xmlns:p14="http://schemas.microsoft.com/office/powerpoint/2010/main" val="3253462073"/>
+      </p:ext>
+    </p:extLst>
+  </p:cSld>
+  <p:clrMapOvr>
+    <a:masterClrMapping/>
+  </p:clrMapOvr>
+  <mc:AlternateContent xmlns:mc="http://schemas.openxmlformats.org/markup-compatibility/2006" xmlns:p14="http://schemas.microsoft.com/office/powerpoint/2010/main">
+    <mc:Choice Requires="p14">
+      <p:transition spd="med" p14:dur="700">
+        <p:fade/>
+      </p:transition>
+    </mc:Choice>
+    <mc:Fallback xmlns="">
+      <p:transition spd="med">
+        <p:fade/>
+      </p:transition>
+    </mc:Fallback>
+  </mc:AlternateContent>
+</p:sld>
+</file>
+
+<file path=ppt/slides/slide60.xml><?xml version="1.0" encoding="utf-8"?>
+<p:sld xmlns:a="http://schemas.openxmlformats.org/drawingml/2006/main" xmlns:r="http://schemas.openxmlformats.org/officeDocument/2006/relationships" xmlns:p="http://schemas.openxmlformats.org/presentationml/2006/main">
+  <p:cSld>
+    <p:spTree>
+      <p:nvGrpSpPr>
+        <p:cNvPr id="1" name=""/>
+        <p:cNvGrpSpPr/>
+        <p:nvPr/>
+      </p:nvGrpSpPr>
+      <p:grpSpPr>
+        <a:xfrm>
+          <a:off x="0" y="0"/>
+          <a:ext cx="0" cy="0"/>
+          <a:chOff x="0" y="0"/>
+          <a:chExt cx="0" cy="0"/>
+        </a:xfrm>
+      </p:grpSpPr>
+      <p:sp>
+        <p:nvSpPr>
+          <p:cNvPr id="2" name="Title 1"/>
+          <p:cNvSpPr>
+            <a:spLocks noGrp="1"/>
+          </p:cNvSpPr>
+          <p:nvPr>
+            <p:ph type="title"/>
+          </p:nvPr>
+        </p:nvSpPr>
+        <p:spPr/>
+        <p:txBody>
+          <a:bodyPr/>
+          <a:lstStyle/>
+          <a:p>
+            <a:r>
+              <a:rPr lang="en-US"/>
+              <a:t>Tài liệu tham khảo</a:t>
+            </a:r>
+          </a:p>
+        </p:txBody>
+      </p:sp>
+      <p:sp>
+        <p:nvSpPr>
+          <p:cNvPr id="5" name="Text Placeholder 4"/>
+          <p:cNvSpPr>
+            <a:spLocks noGrp="1"/>
+          </p:cNvSpPr>
+          <p:nvPr>
+            <p:ph type="body" idx="1"/>
+          </p:nvPr>
+        </p:nvSpPr>
+        <p:spPr/>
+        <p:txBody>
+          <a:bodyPr/>
+          <a:lstStyle/>
+          <a:p>
+            <a:pPr marL="285750" indent="-285750">
+              <a:buFontTx/>
+              <a:buChar char="-"/>
+            </a:pPr>
+            <a:r>
+              <a:rPr lang="en-US"/>
+              <a:t>What everything engineer should know</a:t>
+            </a:r>
+          </a:p>
+          <a:p>
+            <a:pPr marL="285750" indent="-285750">
+              <a:buFontTx/>
+              <a:buChar char="-"/>
+            </a:pPr>
+            <a:r>
+              <a:rPr lang="en-US"/>
+              <a:t>Các Slide thầy cho trong mục “đặc tả phần mềm”</a:t>
+            </a:r>
+          </a:p>
+          <a:p>
+            <a:pPr marL="285750" indent="-285750">
+              <a:buFontTx/>
+              <a:buChar char="-"/>
+            </a:pPr>
+            <a:endParaRPr lang="en-US"/>
+          </a:p>
+        </p:txBody>
+      </p:sp>
+    </p:spTree>
+    <p:extLst>
+      <p:ext uri="{BB962C8B-B14F-4D97-AF65-F5344CB8AC3E}">
+        <p14:creationId xmlns:p14="http://schemas.microsoft.com/office/powerpoint/2010/main" val="2623819822"/>
+      </p:ext>
+    </p:extLst>
+  </p:cSld>
+  <p:clrMapOvr>
+    <a:masterClrMapping/>
+  </p:clrMapOvr>
+  <mc:AlternateContent xmlns:mc="http://schemas.openxmlformats.org/markup-compatibility/2006" xmlns:p14="http://schemas.microsoft.com/office/powerpoint/2010/main">
+    <mc:Choice Requires="p14">
+      <p:transition spd="med" p14:dur="700">
+        <p:fade/>
+      </p:transition>
+    </mc:Choice>
+    <mc:Fallback xmlns="">
+      <p:transition spd="med">
+        <p:fade/>
+      </p:transition>
+    </mc:Fallback>
+  </mc:AlternateContent>
+</p:sld>
+</file>
+
+<file path=ppt/slides/slide61.xml><?xml version="1.0" encoding="utf-8"?>
+<p:sld xmlns:a="http://schemas.openxmlformats.org/drawingml/2006/main" xmlns:r="http://schemas.openxmlformats.org/officeDocument/2006/relationships" xmlns:p="http://schemas.openxmlformats.org/presentationml/2006/main">
+  <p:cSld>
+    <p:spTree>
+      <p:nvGrpSpPr>
+        <p:cNvPr id="1" name=""/>
+        <p:cNvGrpSpPr/>
+        <p:nvPr/>
+      </p:nvGrpSpPr>
+      <p:grpSpPr>
+        <a:xfrm>
+          <a:off x="0" y="0"/>
+          <a:ext cx="0" cy="0"/>
+          <a:chOff x="0" y="0"/>
+          <a:chExt cx="0" cy="0"/>
+        </a:xfrm>
+      </p:grpSpPr>
+      <p:sp>
+        <p:nvSpPr>
+          <p:cNvPr id="2" name="Title 1"/>
+          <p:cNvSpPr>
+            <a:spLocks noGrp="1"/>
+          </p:cNvSpPr>
+          <p:nvPr>
+            <p:ph type="title"/>
+          </p:nvPr>
+        </p:nvSpPr>
+        <p:spPr/>
+        <p:txBody>
+          <a:bodyPr/>
+          <a:lstStyle/>
+          <a:p>
+            <a:r>
+              <a:rPr lang="en-US"/>
+              <a:t>Câu hỏi</a:t>
+            </a:r>
+          </a:p>
+        </p:txBody>
+      </p:sp>
+      <p:sp>
+        <p:nvSpPr>
+          <p:cNvPr id="3" name="Text Placeholder 2"/>
+          <p:cNvSpPr>
+            <a:spLocks noGrp="1"/>
+          </p:cNvSpPr>
+          <p:nvPr>
+            <p:ph type="body" idx="1"/>
+          </p:nvPr>
+        </p:nvSpPr>
+        <p:spPr/>
+        <p:txBody>
+          <a:bodyPr/>
+          <a:lstStyle/>
+          <a:p>
+            <a:r>
+              <a:rPr lang="en-US"/>
+              <a:t>Mời thầy và các bạn đặt câu hỏi</a:t>
+            </a:r>
+          </a:p>
+        </p:txBody>
+      </p:sp>
+    </p:spTree>
+    <p:extLst>
+      <p:ext uri="{BB962C8B-B14F-4D97-AF65-F5344CB8AC3E}">
+        <p14:creationId xmlns:p14="http://schemas.microsoft.com/office/powerpoint/2010/main" val="788291268"/>
+      </p:ext>
+    </p:extLst>
+  </p:cSld>
+  <p:clrMapOvr>
+    <a:masterClrMapping/>
+  </p:clrMapOvr>
+  <mc:AlternateContent xmlns:mc="http://schemas.openxmlformats.org/markup-compatibility/2006" xmlns:p14="http://schemas.microsoft.com/office/powerpoint/2010/main">
+    <mc:Choice Requires="p14">
+      <p:transition spd="med" p14:dur="700">
+        <p:fade/>
+      </p:transition>
+    </mc:Choice>
+    <mc:Fallback xmlns="">
+      <p:transition spd="med">
+        <p:fade/>
+      </p:transition>
+    </mc:Fallback>
+  </mc:AlternateContent>
+</p:sld>
+</file>
+
+<file path=ppt/slides/slide62.xml><?xml version="1.0" encoding="utf-8"?>
+<p:sld xmlns:a="http://schemas.openxmlformats.org/drawingml/2006/main" xmlns:r="http://schemas.openxmlformats.org/officeDocument/2006/relationships" xmlns:p="http://schemas.openxmlformats.org/presentationml/2006/main">
+  <p:cSld>
+    <p:spTree>
+      <p:nvGrpSpPr>
+        <p:cNvPr id="1" name=""/>
+        <p:cNvGrpSpPr/>
+        <p:nvPr/>
+      </p:nvGrpSpPr>
+      <p:grpSpPr>
+        <a:xfrm>
+          <a:off x="0" y="0"/>
+          <a:ext cx="0" cy="0"/>
+          <a:chOff x="0" y="0"/>
+          <a:chExt cx="0" cy="0"/>
+        </a:xfrm>
+      </p:grpSpPr>
+      <p:sp>
+        <p:nvSpPr>
+          <p:cNvPr id="4" name="Title 3"/>
+          <p:cNvSpPr>
+            <a:spLocks noGrp="1"/>
+          </p:cNvSpPr>
+          <p:nvPr>
+            <p:ph type="ctrTitle"/>
+          </p:nvPr>
+        </p:nvSpPr>
+        <p:spPr/>
+        <p:txBody>
+          <a:bodyPr>
+            <a:normAutofit/>
+          </a:bodyPr>
+          <a:lstStyle/>
+          <a:p>
+            <a:r>
+              <a:rPr lang="en-US" sz="3200"/>
+              <a:t>Cảm ơn thầy và các bạn đã lắng nghe!</a:t>
+            </a:r>
+          </a:p>
+        </p:txBody>
+      </p:sp>
+    </p:spTree>
+    <p:extLst>
+      <p:ext uri="{BB962C8B-B14F-4D97-AF65-F5344CB8AC3E}">
+        <p14:creationId xmlns:p14="http://schemas.microsoft.com/office/powerpoint/2010/main" val="612488740"/>
       </p:ext>
     </p:extLst>
   </p:cSld>
@@ -22908,6 +23418,132 @@
 </file>
 
 <file path=customXml/item1.xml><?xml version="1.0" encoding="utf-8"?>
+<p:properties xmlns:p="http://schemas.microsoft.com/office/2006/metadata/properties" xmlns:xsi="http://www.w3.org/2001/XMLSchema-instance" xmlns:pc="http://schemas.microsoft.com/office/infopath/2007/PartnerControls">
+  <documentManagement>
+    <DirectSourceMarket xmlns="4873beb7-5857-4685-be1f-d57550cc96cc" xsi:nil="true"/>
+    <ApprovalStatus xmlns="4873beb7-5857-4685-be1f-d57550cc96cc">InProgress</ApprovalStatus>
+    <MarketSpecific xmlns="4873beb7-5857-4685-be1f-d57550cc96cc">false</MarketSpecific>
+    <LocComments xmlns="4873beb7-5857-4685-be1f-d57550cc96cc" xsi:nil="true"/>
+    <ThumbnailAssetId xmlns="4873beb7-5857-4685-be1f-d57550cc96cc" xsi:nil="true"/>
+    <PrimaryImageGen xmlns="4873beb7-5857-4685-be1f-d57550cc96cc">false</PrimaryImageGen>
+    <LegacyData xmlns="4873beb7-5857-4685-be1f-d57550cc96cc" xsi:nil="true"/>
+    <LocRecommendedHandoff xmlns="4873beb7-5857-4685-be1f-d57550cc96cc" xsi:nil="true"/>
+    <BusinessGroup xmlns="4873beb7-5857-4685-be1f-d57550cc96cc" xsi:nil="true"/>
+    <BlockPublish xmlns="4873beb7-5857-4685-be1f-d57550cc96cc">false</BlockPublish>
+    <TPFriendlyName xmlns="4873beb7-5857-4685-be1f-d57550cc96cc" xsi:nil="true"/>
+    <NumericId xmlns="4873beb7-5857-4685-be1f-d57550cc96cc" xsi:nil="true"/>
+    <APEditor xmlns="4873beb7-5857-4685-be1f-d57550cc96cc">
+      <UserInfo>
+        <DisplayName/>
+        <AccountId xsi:nil="true"/>
+        <AccountType/>
+      </UserInfo>
+    </APEditor>
+    <SourceTitle xmlns="4873beb7-5857-4685-be1f-d57550cc96cc" xsi:nil="true"/>
+    <OpenTemplate xmlns="4873beb7-5857-4685-be1f-d57550cc96cc">true</OpenTemplate>
+    <UALocComments xmlns="4873beb7-5857-4685-be1f-d57550cc96cc" xsi:nil="true"/>
+    <ParentAssetId xmlns="4873beb7-5857-4685-be1f-d57550cc96cc" xsi:nil="true"/>
+    <IntlLangReviewDate xmlns="4873beb7-5857-4685-be1f-d57550cc96cc" xsi:nil="true"/>
+    <FeatureTagsTaxHTField0 xmlns="4873beb7-5857-4685-be1f-d57550cc96cc">
+      <Terms xmlns="http://schemas.microsoft.com/office/infopath/2007/PartnerControls"/>
+    </FeatureTagsTaxHTField0>
+    <PublishStatusLookup xmlns="4873beb7-5857-4685-be1f-d57550cc96cc">
+      <Value>1360476</Value>
+    </PublishStatusLookup>
+    <Providers xmlns="4873beb7-5857-4685-be1f-d57550cc96cc" xsi:nil="true"/>
+    <MachineTranslated xmlns="4873beb7-5857-4685-be1f-d57550cc96cc">false</MachineTranslated>
+    <OriginalSourceMarket xmlns="4873beb7-5857-4685-be1f-d57550cc96cc" xsi:nil="true"/>
+    <APDescription xmlns="4873beb7-5857-4685-be1f-d57550cc96cc" xsi:nil="true"/>
+    <ClipArtFilename xmlns="4873beb7-5857-4685-be1f-d57550cc96cc" xsi:nil="true"/>
+    <ContentItem xmlns="4873beb7-5857-4685-be1f-d57550cc96cc" xsi:nil="true"/>
+    <TPInstallLocation xmlns="4873beb7-5857-4685-be1f-d57550cc96cc" xsi:nil="true"/>
+    <PublishTargets xmlns="4873beb7-5857-4685-be1f-d57550cc96cc">OfficeOnlineVNext</PublishTargets>
+    <TimesCloned xmlns="4873beb7-5857-4685-be1f-d57550cc96cc" xsi:nil="true"/>
+    <AssetStart xmlns="4873beb7-5857-4685-be1f-d57550cc96cc">2011-12-12T13:37:00+00:00</AssetStart>
+    <Provider xmlns="4873beb7-5857-4685-be1f-d57550cc96cc" xsi:nil="true"/>
+    <AcquiredFrom xmlns="4873beb7-5857-4685-be1f-d57550cc96cc">Internal MS</AcquiredFrom>
+    <FriendlyTitle xmlns="4873beb7-5857-4685-be1f-d57550cc96cc" xsi:nil="true"/>
+    <LastHandOff xmlns="4873beb7-5857-4685-be1f-d57550cc96cc" xsi:nil="true"/>
+    <TPClientViewer xmlns="4873beb7-5857-4685-be1f-d57550cc96cc" xsi:nil="true"/>
+    <UACurrentWords xmlns="4873beb7-5857-4685-be1f-d57550cc96cc" xsi:nil="true"/>
+    <ArtSampleDocs xmlns="4873beb7-5857-4685-be1f-d57550cc96cc" xsi:nil="true"/>
+    <UALocRecommendation xmlns="4873beb7-5857-4685-be1f-d57550cc96cc">Localize</UALocRecommendation>
+    <Manager xmlns="4873beb7-5857-4685-be1f-d57550cc96cc" xsi:nil="true"/>
+    <ShowIn xmlns="4873beb7-5857-4685-be1f-d57550cc96cc">Show everywhere</ShowIn>
+    <UANotes xmlns="4873beb7-5857-4685-be1f-d57550cc96cc" xsi:nil="true"/>
+    <TemplateStatus xmlns="4873beb7-5857-4685-be1f-d57550cc96cc">Complete</TemplateStatus>
+    <InternalTagsTaxHTField0 xmlns="4873beb7-5857-4685-be1f-d57550cc96cc">
+      <Terms xmlns="http://schemas.microsoft.com/office/infopath/2007/PartnerControls"/>
+    </InternalTagsTaxHTField0>
+    <CSXHash xmlns="4873beb7-5857-4685-be1f-d57550cc96cc" xsi:nil="true"/>
+    <Downloads xmlns="4873beb7-5857-4685-be1f-d57550cc96cc">0</Downloads>
+    <VoteCount xmlns="4873beb7-5857-4685-be1f-d57550cc96cc" xsi:nil="true"/>
+    <OOCacheId xmlns="4873beb7-5857-4685-be1f-d57550cc96cc" xsi:nil="true"/>
+    <IsDeleted xmlns="4873beb7-5857-4685-be1f-d57550cc96cc">false</IsDeleted>
+    <AssetExpire xmlns="4873beb7-5857-4685-be1f-d57550cc96cc">2035-01-01T08:00:00+00:00</AssetExpire>
+    <DSATActionTaken xmlns="4873beb7-5857-4685-be1f-d57550cc96cc" xsi:nil="true"/>
+    <CSXSubmissionMarket xmlns="4873beb7-5857-4685-be1f-d57550cc96cc" xsi:nil="true"/>
+    <TPExecutable xmlns="4873beb7-5857-4685-be1f-d57550cc96cc" xsi:nil="true"/>
+    <SubmitterId xmlns="4873beb7-5857-4685-be1f-d57550cc96cc" xsi:nil="true"/>
+    <EditorialTags xmlns="4873beb7-5857-4685-be1f-d57550cc96cc" xsi:nil="true"/>
+    <ApprovalLog xmlns="4873beb7-5857-4685-be1f-d57550cc96cc" xsi:nil="true"/>
+    <AssetType xmlns="4873beb7-5857-4685-be1f-d57550cc96cc">TP</AssetType>
+    <BugNumber xmlns="4873beb7-5857-4685-be1f-d57550cc96cc" xsi:nil="true"/>
+    <CSXSubmissionDate xmlns="4873beb7-5857-4685-be1f-d57550cc96cc" xsi:nil="true"/>
+    <CSXUpdate xmlns="4873beb7-5857-4685-be1f-d57550cc96cc">false</CSXUpdate>
+    <Milestone xmlns="4873beb7-5857-4685-be1f-d57550cc96cc" xsi:nil="true"/>
+    <RecommendationsModifier xmlns="4873beb7-5857-4685-be1f-d57550cc96cc" xsi:nil="true"/>
+    <OriginAsset xmlns="4873beb7-5857-4685-be1f-d57550cc96cc" xsi:nil="true"/>
+    <TPComponent xmlns="4873beb7-5857-4685-be1f-d57550cc96cc" xsi:nil="true"/>
+    <AssetId xmlns="4873beb7-5857-4685-be1f-d57550cc96cc">TP102801058</AssetId>
+    <IntlLocPriority xmlns="4873beb7-5857-4685-be1f-d57550cc96cc" xsi:nil="true"/>
+    <PolicheckWords xmlns="4873beb7-5857-4685-be1f-d57550cc96cc" xsi:nil="true"/>
+    <TPLaunchHelpLink xmlns="4873beb7-5857-4685-be1f-d57550cc96cc" xsi:nil="true"/>
+    <TPApplication xmlns="4873beb7-5857-4685-be1f-d57550cc96cc" xsi:nil="true"/>
+    <CrawlForDependencies xmlns="4873beb7-5857-4685-be1f-d57550cc96cc">false</CrawlForDependencies>
+    <HandoffToMSDN xmlns="4873beb7-5857-4685-be1f-d57550cc96cc" xsi:nil="true"/>
+    <PlannedPubDate xmlns="4873beb7-5857-4685-be1f-d57550cc96cc" xsi:nil="true"/>
+    <IntlLangReviewer xmlns="4873beb7-5857-4685-be1f-d57550cc96cc" xsi:nil="true"/>
+    <TrustLevel xmlns="4873beb7-5857-4685-be1f-d57550cc96cc">1 Microsoft Managed Content</TrustLevel>
+    <LocLastLocAttemptVersionLookup xmlns="4873beb7-5857-4685-be1f-d57550cc96cc">706496</LocLastLocAttemptVersionLookup>
+    <IsSearchable xmlns="4873beb7-5857-4685-be1f-d57550cc96cc">true</IsSearchable>
+    <TemplateTemplateType xmlns="4873beb7-5857-4685-be1f-d57550cc96cc">PowerPoint Presentation Template</TemplateTemplateType>
+    <CampaignTagsTaxHTField0 xmlns="4873beb7-5857-4685-be1f-d57550cc96cc">
+      <Terms xmlns="http://schemas.microsoft.com/office/infopath/2007/PartnerControls"/>
+    </CampaignTagsTaxHTField0>
+    <TPNamespace xmlns="4873beb7-5857-4685-be1f-d57550cc96cc" xsi:nil="true"/>
+    <TaxCatchAll xmlns="4873beb7-5857-4685-be1f-d57550cc96cc"/>
+    <Markets xmlns="4873beb7-5857-4685-be1f-d57550cc96cc"/>
+    <UAProjectedTotalWords xmlns="4873beb7-5857-4685-be1f-d57550cc96cc" xsi:nil="true"/>
+    <IntlLangReview xmlns="4873beb7-5857-4685-be1f-d57550cc96cc">false</IntlLangReview>
+    <OutputCachingOn xmlns="4873beb7-5857-4685-be1f-d57550cc96cc">false</OutputCachingOn>
+    <AverageRating xmlns="4873beb7-5857-4685-be1f-d57550cc96cc" xsi:nil="true"/>
+    <APAuthor xmlns="4873beb7-5857-4685-be1f-d57550cc96cc">
+      <UserInfo>
+        <DisplayName>REDMOND\v-soujap</DisplayName>
+        <AccountId>1954</AccountId>
+        <AccountType/>
+      </UserInfo>
+    </APAuthor>
+    <LocManualTestRequired xmlns="4873beb7-5857-4685-be1f-d57550cc96cc">false</LocManualTestRequired>
+    <TPCommandLine xmlns="4873beb7-5857-4685-be1f-d57550cc96cc" xsi:nil="true"/>
+    <TPAppVersion xmlns="4873beb7-5857-4685-be1f-d57550cc96cc" xsi:nil="true"/>
+    <EditorialStatus xmlns="4873beb7-5857-4685-be1f-d57550cc96cc">Complete</EditorialStatus>
+    <LastModifiedDateTime xmlns="4873beb7-5857-4685-be1f-d57550cc96cc" xsi:nil="true"/>
+    <ScenarioTagsTaxHTField0 xmlns="4873beb7-5857-4685-be1f-d57550cc96cc">
+      <Terms xmlns="http://schemas.microsoft.com/office/infopath/2007/PartnerControls"/>
+    </ScenarioTagsTaxHTField0>
+    <OriginalRelease xmlns="4873beb7-5857-4685-be1f-d57550cc96cc">14</OriginalRelease>
+    <TPLaunchHelpLinkType xmlns="4873beb7-5857-4685-be1f-d57550cc96cc">Template</TPLaunchHelpLinkType>
+    <LocalizationTagsTaxHTField0 xmlns="4873beb7-5857-4685-be1f-d57550cc96cc">
+      <Terms xmlns="http://schemas.microsoft.com/office/infopath/2007/PartnerControls"/>
+    </LocalizationTagsTaxHTField0>
+    <LocMarketGroupTiers2 xmlns="4873beb7-5857-4685-be1f-d57550cc96cc" xsi:nil="true"/>
+  </documentManagement>
+</p:properties>
+</file>
+
+<file path=customXml/item2.xml><?xml version="1.0" encoding="utf-8"?>
 <ct:contentTypeSchema xmlns:ct="http://schemas.microsoft.com/office/2006/metadata/contentType" xmlns:ma="http://schemas.microsoft.com/office/2006/metadata/properties/metaAttributes" ct:_="" ma:_="" ma:contentTypeName="TemplateFile" ma:contentTypeID="0x0101006EDDDB5EE6D98C44930B742096920B300400F5B6D36B3EF94B4E9A635CDF2A18F5B8" ma:contentTypeVersion="72" ma:contentTypeDescription="Create a new document." ma:contentTypeScope="" ma:versionID="a23e56308344d904b51738559c3d67c9">
   <xsd:schema xmlns:xsd="http://www.w3.org/2001/XMLSchema" xmlns:xs="http://www.w3.org/2001/XMLSchema" xmlns:p="http://schemas.microsoft.com/office/2006/metadata/properties" xmlns:ns2="4873beb7-5857-4685-be1f-d57550cc96cc" targetNamespace="http://schemas.microsoft.com/office/2006/metadata/properties" ma:root="true" ma:fieldsID="cd0908cc4600e77bf5da051303e00c8d" ns2:_="">
     <xsd:import namespace="4873beb7-5857-4685-be1f-d57550cc96cc"/>
@@ -23947,132 +24583,6 @@
 </ct:contentTypeSchema>
 </file>
 
-<file path=customXml/item2.xml><?xml version="1.0" encoding="utf-8"?>
-<p:properties xmlns:p="http://schemas.microsoft.com/office/2006/metadata/properties" xmlns:xsi="http://www.w3.org/2001/XMLSchema-instance" xmlns:pc="http://schemas.microsoft.com/office/infopath/2007/PartnerControls">
-  <documentManagement>
-    <DirectSourceMarket xmlns="4873beb7-5857-4685-be1f-d57550cc96cc" xsi:nil="true"/>
-    <ApprovalStatus xmlns="4873beb7-5857-4685-be1f-d57550cc96cc">InProgress</ApprovalStatus>
-    <MarketSpecific xmlns="4873beb7-5857-4685-be1f-d57550cc96cc">false</MarketSpecific>
-    <LocComments xmlns="4873beb7-5857-4685-be1f-d57550cc96cc" xsi:nil="true"/>
-    <ThumbnailAssetId xmlns="4873beb7-5857-4685-be1f-d57550cc96cc" xsi:nil="true"/>
-    <PrimaryImageGen xmlns="4873beb7-5857-4685-be1f-d57550cc96cc">false</PrimaryImageGen>
-    <LegacyData xmlns="4873beb7-5857-4685-be1f-d57550cc96cc" xsi:nil="true"/>
-    <LocRecommendedHandoff xmlns="4873beb7-5857-4685-be1f-d57550cc96cc" xsi:nil="true"/>
-    <BusinessGroup xmlns="4873beb7-5857-4685-be1f-d57550cc96cc" xsi:nil="true"/>
-    <BlockPublish xmlns="4873beb7-5857-4685-be1f-d57550cc96cc">false</BlockPublish>
-    <TPFriendlyName xmlns="4873beb7-5857-4685-be1f-d57550cc96cc" xsi:nil="true"/>
-    <NumericId xmlns="4873beb7-5857-4685-be1f-d57550cc96cc" xsi:nil="true"/>
-    <APEditor xmlns="4873beb7-5857-4685-be1f-d57550cc96cc">
-      <UserInfo>
-        <DisplayName/>
-        <AccountId xsi:nil="true"/>
-        <AccountType/>
-      </UserInfo>
-    </APEditor>
-    <SourceTitle xmlns="4873beb7-5857-4685-be1f-d57550cc96cc" xsi:nil="true"/>
-    <OpenTemplate xmlns="4873beb7-5857-4685-be1f-d57550cc96cc">true</OpenTemplate>
-    <UALocComments xmlns="4873beb7-5857-4685-be1f-d57550cc96cc" xsi:nil="true"/>
-    <ParentAssetId xmlns="4873beb7-5857-4685-be1f-d57550cc96cc" xsi:nil="true"/>
-    <IntlLangReviewDate xmlns="4873beb7-5857-4685-be1f-d57550cc96cc" xsi:nil="true"/>
-    <FeatureTagsTaxHTField0 xmlns="4873beb7-5857-4685-be1f-d57550cc96cc">
-      <Terms xmlns="http://schemas.microsoft.com/office/infopath/2007/PartnerControls"/>
-    </FeatureTagsTaxHTField0>
-    <PublishStatusLookup xmlns="4873beb7-5857-4685-be1f-d57550cc96cc">
-      <Value>1360476</Value>
-    </PublishStatusLookup>
-    <Providers xmlns="4873beb7-5857-4685-be1f-d57550cc96cc" xsi:nil="true"/>
-    <MachineTranslated xmlns="4873beb7-5857-4685-be1f-d57550cc96cc">false</MachineTranslated>
-    <OriginalSourceMarket xmlns="4873beb7-5857-4685-be1f-d57550cc96cc" xsi:nil="true"/>
-    <APDescription xmlns="4873beb7-5857-4685-be1f-d57550cc96cc" xsi:nil="true"/>
-    <ClipArtFilename xmlns="4873beb7-5857-4685-be1f-d57550cc96cc" xsi:nil="true"/>
-    <ContentItem xmlns="4873beb7-5857-4685-be1f-d57550cc96cc" xsi:nil="true"/>
-    <TPInstallLocation xmlns="4873beb7-5857-4685-be1f-d57550cc96cc" xsi:nil="true"/>
-    <PublishTargets xmlns="4873beb7-5857-4685-be1f-d57550cc96cc">OfficeOnlineVNext</PublishTargets>
-    <TimesCloned xmlns="4873beb7-5857-4685-be1f-d57550cc96cc" xsi:nil="true"/>
-    <AssetStart xmlns="4873beb7-5857-4685-be1f-d57550cc96cc">2011-12-12T13:37:00+00:00</AssetStart>
-    <Provider xmlns="4873beb7-5857-4685-be1f-d57550cc96cc" xsi:nil="true"/>
-    <AcquiredFrom xmlns="4873beb7-5857-4685-be1f-d57550cc96cc">Internal MS</AcquiredFrom>
-    <FriendlyTitle xmlns="4873beb7-5857-4685-be1f-d57550cc96cc" xsi:nil="true"/>
-    <LastHandOff xmlns="4873beb7-5857-4685-be1f-d57550cc96cc" xsi:nil="true"/>
-    <TPClientViewer xmlns="4873beb7-5857-4685-be1f-d57550cc96cc" xsi:nil="true"/>
-    <UACurrentWords xmlns="4873beb7-5857-4685-be1f-d57550cc96cc" xsi:nil="true"/>
-    <ArtSampleDocs xmlns="4873beb7-5857-4685-be1f-d57550cc96cc" xsi:nil="true"/>
-    <UALocRecommendation xmlns="4873beb7-5857-4685-be1f-d57550cc96cc">Localize</UALocRecommendation>
-    <Manager xmlns="4873beb7-5857-4685-be1f-d57550cc96cc" xsi:nil="true"/>
-    <ShowIn xmlns="4873beb7-5857-4685-be1f-d57550cc96cc">Show everywhere</ShowIn>
-    <UANotes xmlns="4873beb7-5857-4685-be1f-d57550cc96cc" xsi:nil="true"/>
-    <TemplateStatus xmlns="4873beb7-5857-4685-be1f-d57550cc96cc">Complete</TemplateStatus>
-    <InternalTagsTaxHTField0 xmlns="4873beb7-5857-4685-be1f-d57550cc96cc">
-      <Terms xmlns="http://schemas.microsoft.com/office/infopath/2007/PartnerControls"/>
-    </InternalTagsTaxHTField0>
-    <CSXHash xmlns="4873beb7-5857-4685-be1f-d57550cc96cc" xsi:nil="true"/>
-    <Downloads xmlns="4873beb7-5857-4685-be1f-d57550cc96cc">0</Downloads>
-    <VoteCount xmlns="4873beb7-5857-4685-be1f-d57550cc96cc" xsi:nil="true"/>
-    <OOCacheId xmlns="4873beb7-5857-4685-be1f-d57550cc96cc" xsi:nil="true"/>
-    <IsDeleted xmlns="4873beb7-5857-4685-be1f-d57550cc96cc">false</IsDeleted>
-    <AssetExpire xmlns="4873beb7-5857-4685-be1f-d57550cc96cc">2035-01-01T08:00:00+00:00</AssetExpire>
-    <DSATActionTaken xmlns="4873beb7-5857-4685-be1f-d57550cc96cc" xsi:nil="true"/>
-    <CSXSubmissionMarket xmlns="4873beb7-5857-4685-be1f-d57550cc96cc" xsi:nil="true"/>
-    <TPExecutable xmlns="4873beb7-5857-4685-be1f-d57550cc96cc" xsi:nil="true"/>
-    <SubmitterId xmlns="4873beb7-5857-4685-be1f-d57550cc96cc" xsi:nil="true"/>
-    <EditorialTags xmlns="4873beb7-5857-4685-be1f-d57550cc96cc" xsi:nil="true"/>
-    <ApprovalLog xmlns="4873beb7-5857-4685-be1f-d57550cc96cc" xsi:nil="true"/>
-    <AssetType xmlns="4873beb7-5857-4685-be1f-d57550cc96cc">TP</AssetType>
-    <BugNumber xmlns="4873beb7-5857-4685-be1f-d57550cc96cc" xsi:nil="true"/>
-    <CSXSubmissionDate xmlns="4873beb7-5857-4685-be1f-d57550cc96cc" xsi:nil="true"/>
-    <CSXUpdate xmlns="4873beb7-5857-4685-be1f-d57550cc96cc">false</CSXUpdate>
-    <Milestone xmlns="4873beb7-5857-4685-be1f-d57550cc96cc" xsi:nil="true"/>
-    <RecommendationsModifier xmlns="4873beb7-5857-4685-be1f-d57550cc96cc" xsi:nil="true"/>
-    <OriginAsset xmlns="4873beb7-5857-4685-be1f-d57550cc96cc" xsi:nil="true"/>
-    <TPComponent xmlns="4873beb7-5857-4685-be1f-d57550cc96cc" xsi:nil="true"/>
-    <AssetId xmlns="4873beb7-5857-4685-be1f-d57550cc96cc">TP102801058</AssetId>
-    <IntlLocPriority xmlns="4873beb7-5857-4685-be1f-d57550cc96cc" xsi:nil="true"/>
-    <PolicheckWords xmlns="4873beb7-5857-4685-be1f-d57550cc96cc" xsi:nil="true"/>
-    <TPLaunchHelpLink xmlns="4873beb7-5857-4685-be1f-d57550cc96cc" xsi:nil="true"/>
-    <TPApplication xmlns="4873beb7-5857-4685-be1f-d57550cc96cc" xsi:nil="true"/>
-    <CrawlForDependencies xmlns="4873beb7-5857-4685-be1f-d57550cc96cc">false</CrawlForDependencies>
-    <HandoffToMSDN xmlns="4873beb7-5857-4685-be1f-d57550cc96cc" xsi:nil="true"/>
-    <PlannedPubDate xmlns="4873beb7-5857-4685-be1f-d57550cc96cc" xsi:nil="true"/>
-    <IntlLangReviewer xmlns="4873beb7-5857-4685-be1f-d57550cc96cc" xsi:nil="true"/>
-    <TrustLevel xmlns="4873beb7-5857-4685-be1f-d57550cc96cc">1 Microsoft Managed Content</TrustLevel>
-    <LocLastLocAttemptVersionLookup xmlns="4873beb7-5857-4685-be1f-d57550cc96cc">706496</LocLastLocAttemptVersionLookup>
-    <IsSearchable xmlns="4873beb7-5857-4685-be1f-d57550cc96cc">true</IsSearchable>
-    <TemplateTemplateType xmlns="4873beb7-5857-4685-be1f-d57550cc96cc">PowerPoint Presentation Template</TemplateTemplateType>
-    <CampaignTagsTaxHTField0 xmlns="4873beb7-5857-4685-be1f-d57550cc96cc">
-      <Terms xmlns="http://schemas.microsoft.com/office/infopath/2007/PartnerControls"/>
-    </CampaignTagsTaxHTField0>
-    <TPNamespace xmlns="4873beb7-5857-4685-be1f-d57550cc96cc" xsi:nil="true"/>
-    <TaxCatchAll xmlns="4873beb7-5857-4685-be1f-d57550cc96cc"/>
-    <Markets xmlns="4873beb7-5857-4685-be1f-d57550cc96cc"/>
-    <UAProjectedTotalWords xmlns="4873beb7-5857-4685-be1f-d57550cc96cc" xsi:nil="true"/>
-    <IntlLangReview xmlns="4873beb7-5857-4685-be1f-d57550cc96cc">false</IntlLangReview>
-    <OutputCachingOn xmlns="4873beb7-5857-4685-be1f-d57550cc96cc">false</OutputCachingOn>
-    <AverageRating xmlns="4873beb7-5857-4685-be1f-d57550cc96cc" xsi:nil="true"/>
-    <APAuthor xmlns="4873beb7-5857-4685-be1f-d57550cc96cc">
-      <UserInfo>
-        <DisplayName>REDMOND\v-soujap</DisplayName>
-        <AccountId>1954</AccountId>
-        <AccountType/>
-      </UserInfo>
-    </APAuthor>
-    <LocManualTestRequired xmlns="4873beb7-5857-4685-be1f-d57550cc96cc">false</LocManualTestRequired>
-    <TPCommandLine xmlns="4873beb7-5857-4685-be1f-d57550cc96cc" xsi:nil="true"/>
-    <TPAppVersion xmlns="4873beb7-5857-4685-be1f-d57550cc96cc" xsi:nil="true"/>
-    <EditorialStatus xmlns="4873beb7-5857-4685-be1f-d57550cc96cc">Complete</EditorialStatus>
-    <LastModifiedDateTime xmlns="4873beb7-5857-4685-be1f-d57550cc96cc" xsi:nil="true"/>
-    <ScenarioTagsTaxHTField0 xmlns="4873beb7-5857-4685-be1f-d57550cc96cc">
-      <Terms xmlns="http://schemas.microsoft.com/office/infopath/2007/PartnerControls"/>
-    </ScenarioTagsTaxHTField0>
-    <OriginalRelease xmlns="4873beb7-5857-4685-be1f-d57550cc96cc">14</OriginalRelease>
-    <TPLaunchHelpLinkType xmlns="4873beb7-5857-4685-be1f-d57550cc96cc">Template</TPLaunchHelpLinkType>
-    <LocalizationTagsTaxHTField0 xmlns="4873beb7-5857-4685-be1f-d57550cc96cc">
-      <Terms xmlns="http://schemas.microsoft.com/office/infopath/2007/PartnerControls"/>
-    </LocalizationTagsTaxHTField0>
-    <LocMarketGroupTiers2 xmlns="4873beb7-5857-4685-be1f-d57550cc96cc" xsi:nil="true"/>
-  </documentManagement>
-</p:properties>
-</file>
-
 <file path=customXml/item3.xml><?xml version="1.0" encoding="utf-8"?>
 <?mso-contentType ?>
 <FormTemplates xmlns="http://schemas.microsoft.com/sharepoint/v3/contenttype/forms">
@@ -24083,6 +24593,22 @@
 </file>
 
 <file path=customXml/itemProps1.xml><?xml version="1.0" encoding="utf-8"?>
+<ds:datastoreItem xmlns:ds="http://schemas.openxmlformats.org/officeDocument/2006/customXml" ds:itemID="{4ED80E12-3BE9-4746-820E-FFB249F467F2}">
+  <ds:schemaRefs>
+    <ds:schemaRef ds:uri="http://purl.org/dc/elements/1.1/"/>
+    <ds:schemaRef ds:uri="http://schemas.microsoft.com/office/2006/metadata/properties"/>
+    <ds:schemaRef ds:uri="4873beb7-5857-4685-be1f-d57550cc96cc"/>
+    <ds:schemaRef ds:uri="http://schemas.openxmlformats.org/package/2006/metadata/core-properties"/>
+    <ds:schemaRef ds:uri="http://purl.org/dc/terms/"/>
+    <ds:schemaRef ds:uri="http://schemas.microsoft.com/office/infopath/2007/PartnerControls"/>
+    <ds:schemaRef ds:uri="http://schemas.microsoft.com/office/2006/documentManagement/types"/>
+    <ds:schemaRef ds:uri="http://www.w3.org/XML/1998/namespace"/>
+    <ds:schemaRef ds:uri="http://purl.org/dc/dcmitype/"/>
+  </ds:schemaRefs>
+</ds:datastoreItem>
+</file>
+
+<file path=customXml/itemProps2.xml><?xml version="1.0" encoding="utf-8"?>
 <ds:datastoreItem xmlns:ds="http://schemas.openxmlformats.org/officeDocument/2006/customXml" ds:itemID="{83ED4759-CFDD-43F0-817C-11D9197192BA}">
   <ds:schemaRefs>
     <ds:schemaRef ds:uri="http://schemas.microsoft.com/office/2006/metadata/contentType"/>
@@ -24100,22 +24626,6 @@
 </ds:datastoreItem>
 </file>
 
-<file path=customXml/itemProps2.xml><?xml version="1.0" encoding="utf-8"?>
-<ds:datastoreItem xmlns:ds="http://schemas.openxmlformats.org/officeDocument/2006/customXml" ds:itemID="{4ED80E12-3BE9-4746-820E-FFB249F467F2}">
-  <ds:schemaRefs>
-    <ds:schemaRef ds:uri="http://purl.org/dc/elements/1.1/"/>
-    <ds:schemaRef ds:uri="http://schemas.microsoft.com/office/2006/metadata/properties"/>
-    <ds:schemaRef ds:uri="4873beb7-5857-4685-be1f-d57550cc96cc"/>
-    <ds:schemaRef ds:uri="http://schemas.openxmlformats.org/package/2006/metadata/core-properties"/>
-    <ds:schemaRef ds:uri="http://purl.org/dc/terms/"/>
-    <ds:schemaRef ds:uri="http://schemas.microsoft.com/office/infopath/2007/PartnerControls"/>
-    <ds:schemaRef ds:uri="http://schemas.microsoft.com/office/2006/documentManagement/types"/>
-    <ds:schemaRef ds:uri="http://www.w3.org/XML/1998/namespace"/>
-    <ds:schemaRef ds:uri="http://purl.org/dc/dcmitype/"/>
-  </ds:schemaRefs>
-</ds:datastoreItem>
-</file>
-
 <file path=customXml/itemProps3.xml><?xml version="1.0" encoding="utf-8"?>
 <ds:datastoreItem xmlns:ds="http://schemas.openxmlformats.org/officeDocument/2006/customXml" ds:itemID="{8D003AC8-209A-4321-A17C-1B7A20643390}">
   <ds:schemaRefs>

</xml_diff>

<commit_message>
Updated sldie phần đặc tả yêu cầu
</commit_message>
<xml_diff>
--- a/Seminar/Software Requirement.pptx
+++ b/Seminar/Software Requirement.pptx
@@ -16126,7 +16126,7 @@
           <a:p>
             <a:r>
               <a:rPr lang="en-US" i="1"/>
-              <a:t>Ngôn ngữ đặc tả</a:t>
+              <a:t>Các loại ngôn ngữ dùng để đặc tả</a:t>
             </a:r>
           </a:p>
         </p:txBody>
@@ -16148,26 +16148,59 @@
           <a:p>
             <a:r>
               <a:rPr lang="en-US" altLang="en-US" dirty="0"/>
-              <a:t>Ngôn ngữ đó phải hỗ trợ các đặc điểm mong muốn của SRS </a:t>
-            </a:r>
-          </a:p>
-          <a:p>
+              <a:t>Ngôn </a:t>
+            </a:r>
+            <a:r>
+              <a:rPr lang="en-US" altLang="en-US"/>
+              <a:t>ngữ tự nhiên nếu được sử dụng cần </a:t>
+            </a:r>
             <a:r>
               <a:rPr lang="en-US" altLang="en-US" dirty="0"/>
-              <a:t>Ngôn ngữ đặc tả (formal languag) có độ chính xác cao và rõ rang nhưng khó để nắm bắt và sử dụng.</a:t>
-            </a:r>
-          </a:p>
-          <a:p>
+              <a:t>phải hỗ trợ các đặc điểm mong muốn </a:t>
+            </a:r>
+            <a:r>
+              <a:rPr lang="en-US" altLang="en-US"/>
+              <a:t>của SRS và phải đi kèm theo các cấu trúc nhất định; thường được dùng để đặc tả các yêu cầu có tình chất đơn giản.</a:t>
+            </a:r>
+          </a:p>
+          <a:p>
+            <a:r>
+              <a:rPr lang="en-US" altLang="en-US"/>
+              <a:t>Ngôn </a:t>
+            </a:r>
             <a:r>
               <a:rPr lang="en-US" altLang="en-US" dirty="0"/>
-              <a:t>Ngôn ngữ tự nhiên vẫn được sử dụng, tuy nhiên vẫn cần phải kèm theo các cấu trúc trong tài liệu.</a:t>
-            </a:r>
-          </a:p>
-          <a:p>
+              <a:t>ngữ đặc </a:t>
+            </a:r>
+            <a:r>
+              <a:rPr lang="en-US" altLang="en-US"/>
+              <a:t>tả chuyên biệt(formal language) </a:t>
+            </a:r>
             <a:r>
               <a:rPr lang="en-US" altLang="en-US" dirty="0"/>
-              <a:t>Ngôn ngữ đặc tả thường được dùng cho tính năng đặc biệt và cực kỳ quan trọng của hệ thống của hệ thống</a:t>
-            </a:r>
+              <a:t>có độ chính xác cao và </a:t>
+            </a:r>
+            <a:r>
+              <a:rPr lang="en-US" altLang="en-US"/>
+              <a:t>rõ ràng </a:t>
+            </a:r>
+            <a:r>
+              <a:rPr lang="en-US" altLang="en-US" dirty="0"/>
+              <a:t>nhưng khó để nắm bắt và </a:t>
+            </a:r>
+            <a:r>
+              <a:rPr lang="en-US" altLang="en-US"/>
+              <a:t>sử dụng; chúng thường được dùng để đặc tả các </a:t>
+            </a:r>
+            <a:r>
+              <a:rPr lang="en-US" altLang="en-US" dirty="0"/>
+              <a:t>tính năng đặc biệt và cực kỳ quan trọng của </a:t>
+            </a:r>
+            <a:r>
+              <a:rPr lang="en-US" altLang="en-US"/>
+              <a:t>hệ thống.</a:t>
+            </a:r>
+            <a:endParaRPr lang="en-US" altLang="en-US" dirty="0"/>
           </a:p>
           <a:p>
             <a:endParaRPr lang="en-US" altLang="en-US" dirty="0"/>
@@ -21013,11 +21046,7 @@
           <a:p>
             <a:r>
               <a:rPr lang="en-US"/>
-              <a:t>Trong quá trình đặc tả yêu cầu phần mềm người ta thường sử dụng các sơ </a:t>
-            </a:r>
-            <a:r>
-              <a:rPr lang="en-US"/>
-              <a:t>đồ tuần tự và sơ đồ hoạt động</a:t>
+              <a:t>Trong quá trình đặc tả yêu cầu phần mềm người ta thường sử dụng các sơ đồ tuần tự và sơ đồ hoạt động</a:t>
             </a:r>
           </a:p>
           <a:p>
@@ -21030,19 +21059,7 @@
               <a:rPr lang="vi-VN">
                 <a:latin typeface="Constantia" panose="02030602050306030303" pitchFamily="18" charset="0"/>
               </a:rPr>
-              <a:t>là </a:t>
-            </a:r>
-            <a:r>
-              <a:rPr lang="vi-VN">
-                <a:latin typeface="Constantia" panose="02030602050306030303" pitchFamily="18" charset="0"/>
-              </a:rPr>
-              <a:t>bản vẽ mô tả sự tương tác của các đối tượng để tạo nên các chức năng của hệ thống. Bản vẽ này mô tả sự tương tác theo thời gian nên rất phù hợp với việc sử dụng để thiết kế và cài đặt chức năng cho hệ thống phần </a:t>
-            </a:r>
-            <a:r>
-              <a:rPr lang="vi-VN">
-                <a:latin typeface="Constantia" panose="02030602050306030303" pitchFamily="18" charset="0"/>
-              </a:rPr>
-              <a:t>mềm.</a:t>
+              <a:t>là bản vẽ mô tả sự tương tác của các đối tượng để tạo nên các chức năng của hệ thống. Bản vẽ này mô tả sự tương tác theo thời gian nên rất phù hợp với việc sử dụng để thiết kế và cài đặt chức năng cho hệ thống phần mềm.</a:t>
             </a:r>
             <a:endParaRPr lang="en-US">
               <a:latin typeface="Constantia" panose="02030602050306030303" pitchFamily="18" charset="0"/>
@@ -21135,7 +21152,6 @@
               <a:rPr lang="en-US" i="1" u="sng"/>
               <a:t>Ví dụ về sơ đồ Tuần tự</a:t>
             </a:r>
-            <a:endParaRPr lang="en-US" i="1" u="sng"/>
           </a:p>
         </p:txBody>
       </p:sp>
@@ -21243,7 +21259,6 @@
               <a:rPr lang="en-US" i="1" u="sng"/>
               <a:t>Ví dụ về sơ đồ Hoạt động</a:t>
             </a:r>
-            <a:endParaRPr lang="en-US" i="1" u="sng"/>
           </a:p>
         </p:txBody>
       </p:sp>
@@ -21384,7 +21399,6 @@
               <a:rPr lang="en-US"/>
               <a:t>Phương pháp Phân tích và Thiết kế hệ thống (SSAD) sử dụng DFD để tổ chức thông tin và hướng dẫn phân tích</a:t>
             </a:r>
-            <a:endParaRPr lang="en-US"/>
           </a:p>
         </p:txBody>
       </p:sp>
@@ -21449,7 +21463,6 @@
               <a:rPr lang="en-US" i="1" u="sng"/>
               <a:t>Ví dụ về sơ đồ DFD 2 mức của 1 yêu cầu Đặt vé</a:t>
             </a:r>
-            <a:endParaRPr lang="en-US" i="1" u="sng"/>
           </a:p>
         </p:txBody>
       </p:sp>
@@ -21577,15 +21590,7 @@
           <a:p>
             <a:r>
               <a:rPr lang="en-US"/>
-              <a:t>Là một phương </a:t>
-            </a:r>
-            <a:r>
-              <a:rPr lang="en-US"/>
-              <a:t>pháp hình </a:t>
-            </a:r>
-            <a:r>
-              <a:rPr lang="en-US"/>
-              <a:t>thức (formal) được dùng để xác định các hoạt động sẽ được thực hiện trong môi trường đa xử lý hoặc môi trường đa nhiệm.</a:t>
+              <a:t>Là một phương pháp hình thức (formal) được dùng để xác định các hoạt động sẽ được thực hiện trong môi trường đa xử lý hoặc môi trường đa nhiệm.</a:t>
             </a:r>
           </a:p>
           <a:p>
@@ -21688,17 +21693,8 @@
           <a:p>
             <a:r>
               <a:rPr lang="en-US" i="1" u="sng"/>
-              <a:t>Ví dụ </a:t>
-            </a:r>
-            <a:r>
-              <a:rPr lang="en-US" i="1" u="sng"/>
-              <a:t>cho đặc tả vòng </a:t>
-            </a:r>
-            <a:r>
-              <a:rPr lang="en-US" i="1" u="sng"/>
-              <a:t>lặp while</a:t>
-            </a:r>
-            <a:endParaRPr lang="en-US" i="1" u="sng"/>
+              <a:t>Ví dụ cho đặc tả vòng lặp while</a:t>
+            </a:r>
           </a:p>
         </p:txBody>
       </p:sp>
@@ -23418,132 +23414,6 @@
 </file>
 
 <file path=customXml/item1.xml><?xml version="1.0" encoding="utf-8"?>
-<p:properties xmlns:p="http://schemas.microsoft.com/office/2006/metadata/properties" xmlns:xsi="http://www.w3.org/2001/XMLSchema-instance" xmlns:pc="http://schemas.microsoft.com/office/infopath/2007/PartnerControls">
-  <documentManagement>
-    <DirectSourceMarket xmlns="4873beb7-5857-4685-be1f-d57550cc96cc" xsi:nil="true"/>
-    <ApprovalStatus xmlns="4873beb7-5857-4685-be1f-d57550cc96cc">InProgress</ApprovalStatus>
-    <MarketSpecific xmlns="4873beb7-5857-4685-be1f-d57550cc96cc">false</MarketSpecific>
-    <LocComments xmlns="4873beb7-5857-4685-be1f-d57550cc96cc" xsi:nil="true"/>
-    <ThumbnailAssetId xmlns="4873beb7-5857-4685-be1f-d57550cc96cc" xsi:nil="true"/>
-    <PrimaryImageGen xmlns="4873beb7-5857-4685-be1f-d57550cc96cc">false</PrimaryImageGen>
-    <LegacyData xmlns="4873beb7-5857-4685-be1f-d57550cc96cc" xsi:nil="true"/>
-    <LocRecommendedHandoff xmlns="4873beb7-5857-4685-be1f-d57550cc96cc" xsi:nil="true"/>
-    <BusinessGroup xmlns="4873beb7-5857-4685-be1f-d57550cc96cc" xsi:nil="true"/>
-    <BlockPublish xmlns="4873beb7-5857-4685-be1f-d57550cc96cc">false</BlockPublish>
-    <TPFriendlyName xmlns="4873beb7-5857-4685-be1f-d57550cc96cc" xsi:nil="true"/>
-    <NumericId xmlns="4873beb7-5857-4685-be1f-d57550cc96cc" xsi:nil="true"/>
-    <APEditor xmlns="4873beb7-5857-4685-be1f-d57550cc96cc">
-      <UserInfo>
-        <DisplayName/>
-        <AccountId xsi:nil="true"/>
-        <AccountType/>
-      </UserInfo>
-    </APEditor>
-    <SourceTitle xmlns="4873beb7-5857-4685-be1f-d57550cc96cc" xsi:nil="true"/>
-    <OpenTemplate xmlns="4873beb7-5857-4685-be1f-d57550cc96cc">true</OpenTemplate>
-    <UALocComments xmlns="4873beb7-5857-4685-be1f-d57550cc96cc" xsi:nil="true"/>
-    <ParentAssetId xmlns="4873beb7-5857-4685-be1f-d57550cc96cc" xsi:nil="true"/>
-    <IntlLangReviewDate xmlns="4873beb7-5857-4685-be1f-d57550cc96cc" xsi:nil="true"/>
-    <FeatureTagsTaxHTField0 xmlns="4873beb7-5857-4685-be1f-d57550cc96cc">
-      <Terms xmlns="http://schemas.microsoft.com/office/infopath/2007/PartnerControls"/>
-    </FeatureTagsTaxHTField0>
-    <PublishStatusLookup xmlns="4873beb7-5857-4685-be1f-d57550cc96cc">
-      <Value>1360476</Value>
-    </PublishStatusLookup>
-    <Providers xmlns="4873beb7-5857-4685-be1f-d57550cc96cc" xsi:nil="true"/>
-    <MachineTranslated xmlns="4873beb7-5857-4685-be1f-d57550cc96cc">false</MachineTranslated>
-    <OriginalSourceMarket xmlns="4873beb7-5857-4685-be1f-d57550cc96cc" xsi:nil="true"/>
-    <APDescription xmlns="4873beb7-5857-4685-be1f-d57550cc96cc" xsi:nil="true"/>
-    <ClipArtFilename xmlns="4873beb7-5857-4685-be1f-d57550cc96cc" xsi:nil="true"/>
-    <ContentItem xmlns="4873beb7-5857-4685-be1f-d57550cc96cc" xsi:nil="true"/>
-    <TPInstallLocation xmlns="4873beb7-5857-4685-be1f-d57550cc96cc" xsi:nil="true"/>
-    <PublishTargets xmlns="4873beb7-5857-4685-be1f-d57550cc96cc">OfficeOnlineVNext</PublishTargets>
-    <TimesCloned xmlns="4873beb7-5857-4685-be1f-d57550cc96cc" xsi:nil="true"/>
-    <AssetStart xmlns="4873beb7-5857-4685-be1f-d57550cc96cc">2011-12-12T13:37:00+00:00</AssetStart>
-    <Provider xmlns="4873beb7-5857-4685-be1f-d57550cc96cc" xsi:nil="true"/>
-    <AcquiredFrom xmlns="4873beb7-5857-4685-be1f-d57550cc96cc">Internal MS</AcquiredFrom>
-    <FriendlyTitle xmlns="4873beb7-5857-4685-be1f-d57550cc96cc" xsi:nil="true"/>
-    <LastHandOff xmlns="4873beb7-5857-4685-be1f-d57550cc96cc" xsi:nil="true"/>
-    <TPClientViewer xmlns="4873beb7-5857-4685-be1f-d57550cc96cc" xsi:nil="true"/>
-    <UACurrentWords xmlns="4873beb7-5857-4685-be1f-d57550cc96cc" xsi:nil="true"/>
-    <ArtSampleDocs xmlns="4873beb7-5857-4685-be1f-d57550cc96cc" xsi:nil="true"/>
-    <UALocRecommendation xmlns="4873beb7-5857-4685-be1f-d57550cc96cc">Localize</UALocRecommendation>
-    <Manager xmlns="4873beb7-5857-4685-be1f-d57550cc96cc" xsi:nil="true"/>
-    <ShowIn xmlns="4873beb7-5857-4685-be1f-d57550cc96cc">Show everywhere</ShowIn>
-    <UANotes xmlns="4873beb7-5857-4685-be1f-d57550cc96cc" xsi:nil="true"/>
-    <TemplateStatus xmlns="4873beb7-5857-4685-be1f-d57550cc96cc">Complete</TemplateStatus>
-    <InternalTagsTaxHTField0 xmlns="4873beb7-5857-4685-be1f-d57550cc96cc">
-      <Terms xmlns="http://schemas.microsoft.com/office/infopath/2007/PartnerControls"/>
-    </InternalTagsTaxHTField0>
-    <CSXHash xmlns="4873beb7-5857-4685-be1f-d57550cc96cc" xsi:nil="true"/>
-    <Downloads xmlns="4873beb7-5857-4685-be1f-d57550cc96cc">0</Downloads>
-    <VoteCount xmlns="4873beb7-5857-4685-be1f-d57550cc96cc" xsi:nil="true"/>
-    <OOCacheId xmlns="4873beb7-5857-4685-be1f-d57550cc96cc" xsi:nil="true"/>
-    <IsDeleted xmlns="4873beb7-5857-4685-be1f-d57550cc96cc">false</IsDeleted>
-    <AssetExpire xmlns="4873beb7-5857-4685-be1f-d57550cc96cc">2035-01-01T08:00:00+00:00</AssetExpire>
-    <DSATActionTaken xmlns="4873beb7-5857-4685-be1f-d57550cc96cc" xsi:nil="true"/>
-    <CSXSubmissionMarket xmlns="4873beb7-5857-4685-be1f-d57550cc96cc" xsi:nil="true"/>
-    <TPExecutable xmlns="4873beb7-5857-4685-be1f-d57550cc96cc" xsi:nil="true"/>
-    <SubmitterId xmlns="4873beb7-5857-4685-be1f-d57550cc96cc" xsi:nil="true"/>
-    <EditorialTags xmlns="4873beb7-5857-4685-be1f-d57550cc96cc" xsi:nil="true"/>
-    <ApprovalLog xmlns="4873beb7-5857-4685-be1f-d57550cc96cc" xsi:nil="true"/>
-    <AssetType xmlns="4873beb7-5857-4685-be1f-d57550cc96cc">TP</AssetType>
-    <BugNumber xmlns="4873beb7-5857-4685-be1f-d57550cc96cc" xsi:nil="true"/>
-    <CSXSubmissionDate xmlns="4873beb7-5857-4685-be1f-d57550cc96cc" xsi:nil="true"/>
-    <CSXUpdate xmlns="4873beb7-5857-4685-be1f-d57550cc96cc">false</CSXUpdate>
-    <Milestone xmlns="4873beb7-5857-4685-be1f-d57550cc96cc" xsi:nil="true"/>
-    <RecommendationsModifier xmlns="4873beb7-5857-4685-be1f-d57550cc96cc" xsi:nil="true"/>
-    <OriginAsset xmlns="4873beb7-5857-4685-be1f-d57550cc96cc" xsi:nil="true"/>
-    <TPComponent xmlns="4873beb7-5857-4685-be1f-d57550cc96cc" xsi:nil="true"/>
-    <AssetId xmlns="4873beb7-5857-4685-be1f-d57550cc96cc">TP102801058</AssetId>
-    <IntlLocPriority xmlns="4873beb7-5857-4685-be1f-d57550cc96cc" xsi:nil="true"/>
-    <PolicheckWords xmlns="4873beb7-5857-4685-be1f-d57550cc96cc" xsi:nil="true"/>
-    <TPLaunchHelpLink xmlns="4873beb7-5857-4685-be1f-d57550cc96cc" xsi:nil="true"/>
-    <TPApplication xmlns="4873beb7-5857-4685-be1f-d57550cc96cc" xsi:nil="true"/>
-    <CrawlForDependencies xmlns="4873beb7-5857-4685-be1f-d57550cc96cc">false</CrawlForDependencies>
-    <HandoffToMSDN xmlns="4873beb7-5857-4685-be1f-d57550cc96cc" xsi:nil="true"/>
-    <PlannedPubDate xmlns="4873beb7-5857-4685-be1f-d57550cc96cc" xsi:nil="true"/>
-    <IntlLangReviewer xmlns="4873beb7-5857-4685-be1f-d57550cc96cc" xsi:nil="true"/>
-    <TrustLevel xmlns="4873beb7-5857-4685-be1f-d57550cc96cc">1 Microsoft Managed Content</TrustLevel>
-    <LocLastLocAttemptVersionLookup xmlns="4873beb7-5857-4685-be1f-d57550cc96cc">706496</LocLastLocAttemptVersionLookup>
-    <IsSearchable xmlns="4873beb7-5857-4685-be1f-d57550cc96cc">true</IsSearchable>
-    <TemplateTemplateType xmlns="4873beb7-5857-4685-be1f-d57550cc96cc">PowerPoint Presentation Template</TemplateTemplateType>
-    <CampaignTagsTaxHTField0 xmlns="4873beb7-5857-4685-be1f-d57550cc96cc">
-      <Terms xmlns="http://schemas.microsoft.com/office/infopath/2007/PartnerControls"/>
-    </CampaignTagsTaxHTField0>
-    <TPNamespace xmlns="4873beb7-5857-4685-be1f-d57550cc96cc" xsi:nil="true"/>
-    <TaxCatchAll xmlns="4873beb7-5857-4685-be1f-d57550cc96cc"/>
-    <Markets xmlns="4873beb7-5857-4685-be1f-d57550cc96cc"/>
-    <UAProjectedTotalWords xmlns="4873beb7-5857-4685-be1f-d57550cc96cc" xsi:nil="true"/>
-    <IntlLangReview xmlns="4873beb7-5857-4685-be1f-d57550cc96cc">false</IntlLangReview>
-    <OutputCachingOn xmlns="4873beb7-5857-4685-be1f-d57550cc96cc">false</OutputCachingOn>
-    <AverageRating xmlns="4873beb7-5857-4685-be1f-d57550cc96cc" xsi:nil="true"/>
-    <APAuthor xmlns="4873beb7-5857-4685-be1f-d57550cc96cc">
-      <UserInfo>
-        <DisplayName>REDMOND\v-soujap</DisplayName>
-        <AccountId>1954</AccountId>
-        <AccountType/>
-      </UserInfo>
-    </APAuthor>
-    <LocManualTestRequired xmlns="4873beb7-5857-4685-be1f-d57550cc96cc">false</LocManualTestRequired>
-    <TPCommandLine xmlns="4873beb7-5857-4685-be1f-d57550cc96cc" xsi:nil="true"/>
-    <TPAppVersion xmlns="4873beb7-5857-4685-be1f-d57550cc96cc" xsi:nil="true"/>
-    <EditorialStatus xmlns="4873beb7-5857-4685-be1f-d57550cc96cc">Complete</EditorialStatus>
-    <LastModifiedDateTime xmlns="4873beb7-5857-4685-be1f-d57550cc96cc" xsi:nil="true"/>
-    <ScenarioTagsTaxHTField0 xmlns="4873beb7-5857-4685-be1f-d57550cc96cc">
-      <Terms xmlns="http://schemas.microsoft.com/office/infopath/2007/PartnerControls"/>
-    </ScenarioTagsTaxHTField0>
-    <OriginalRelease xmlns="4873beb7-5857-4685-be1f-d57550cc96cc">14</OriginalRelease>
-    <TPLaunchHelpLinkType xmlns="4873beb7-5857-4685-be1f-d57550cc96cc">Template</TPLaunchHelpLinkType>
-    <LocalizationTagsTaxHTField0 xmlns="4873beb7-5857-4685-be1f-d57550cc96cc">
-      <Terms xmlns="http://schemas.microsoft.com/office/infopath/2007/PartnerControls"/>
-    </LocalizationTagsTaxHTField0>
-    <LocMarketGroupTiers2 xmlns="4873beb7-5857-4685-be1f-d57550cc96cc" xsi:nil="true"/>
-  </documentManagement>
-</p:properties>
-</file>
-
-<file path=customXml/item2.xml><?xml version="1.0" encoding="utf-8"?>
 <ct:contentTypeSchema xmlns:ct="http://schemas.microsoft.com/office/2006/metadata/contentType" xmlns:ma="http://schemas.microsoft.com/office/2006/metadata/properties/metaAttributes" ct:_="" ma:_="" ma:contentTypeName="TemplateFile" ma:contentTypeID="0x0101006EDDDB5EE6D98C44930B742096920B300400F5B6D36B3EF94B4E9A635CDF2A18F5B8" ma:contentTypeVersion="72" ma:contentTypeDescription="Create a new document." ma:contentTypeScope="" ma:versionID="a23e56308344d904b51738559c3d67c9">
   <xsd:schema xmlns:xsd="http://www.w3.org/2001/XMLSchema" xmlns:xs="http://www.w3.org/2001/XMLSchema" xmlns:p="http://schemas.microsoft.com/office/2006/metadata/properties" xmlns:ns2="4873beb7-5857-4685-be1f-d57550cc96cc" targetNamespace="http://schemas.microsoft.com/office/2006/metadata/properties" ma:root="true" ma:fieldsID="cd0908cc4600e77bf5da051303e00c8d" ns2:_="">
     <xsd:import namespace="4873beb7-5857-4685-be1f-d57550cc96cc"/>
@@ -24583,6 +24453,132 @@
 </ct:contentTypeSchema>
 </file>
 
+<file path=customXml/item2.xml><?xml version="1.0" encoding="utf-8"?>
+<p:properties xmlns:p="http://schemas.microsoft.com/office/2006/metadata/properties" xmlns:xsi="http://www.w3.org/2001/XMLSchema-instance" xmlns:pc="http://schemas.microsoft.com/office/infopath/2007/PartnerControls">
+  <documentManagement>
+    <DirectSourceMarket xmlns="4873beb7-5857-4685-be1f-d57550cc96cc" xsi:nil="true"/>
+    <ApprovalStatus xmlns="4873beb7-5857-4685-be1f-d57550cc96cc">InProgress</ApprovalStatus>
+    <MarketSpecific xmlns="4873beb7-5857-4685-be1f-d57550cc96cc">false</MarketSpecific>
+    <LocComments xmlns="4873beb7-5857-4685-be1f-d57550cc96cc" xsi:nil="true"/>
+    <ThumbnailAssetId xmlns="4873beb7-5857-4685-be1f-d57550cc96cc" xsi:nil="true"/>
+    <PrimaryImageGen xmlns="4873beb7-5857-4685-be1f-d57550cc96cc">false</PrimaryImageGen>
+    <LegacyData xmlns="4873beb7-5857-4685-be1f-d57550cc96cc" xsi:nil="true"/>
+    <LocRecommendedHandoff xmlns="4873beb7-5857-4685-be1f-d57550cc96cc" xsi:nil="true"/>
+    <BusinessGroup xmlns="4873beb7-5857-4685-be1f-d57550cc96cc" xsi:nil="true"/>
+    <BlockPublish xmlns="4873beb7-5857-4685-be1f-d57550cc96cc">false</BlockPublish>
+    <TPFriendlyName xmlns="4873beb7-5857-4685-be1f-d57550cc96cc" xsi:nil="true"/>
+    <NumericId xmlns="4873beb7-5857-4685-be1f-d57550cc96cc" xsi:nil="true"/>
+    <APEditor xmlns="4873beb7-5857-4685-be1f-d57550cc96cc">
+      <UserInfo>
+        <DisplayName/>
+        <AccountId xsi:nil="true"/>
+        <AccountType/>
+      </UserInfo>
+    </APEditor>
+    <SourceTitle xmlns="4873beb7-5857-4685-be1f-d57550cc96cc" xsi:nil="true"/>
+    <OpenTemplate xmlns="4873beb7-5857-4685-be1f-d57550cc96cc">true</OpenTemplate>
+    <UALocComments xmlns="4873beb7-5857-4685-be1f-d57550cc96cc" xsi:nil="true"/>
+    <ParentAssetId xmlns="4873beb7-5857-4685-be1f-d57550cc96cc" xsi:nil="true"/>
+    <IntlLangReviewDate xmlns="4873beb7-5857-4685-be1f-d57550cc96cc" xsi:nil="true"/>
+    <FeatureTagsTaxHTField0 xmlns="4873beb7-5857-4685-be1f-d57550cc96cc">
+      <Terms xmlns="http://schemas.microsoft.com/office/infopath/2007/PartnerControls"/>
+    </FeatureTagsTaxHTField0>
+    <PublishStatusLookup xmlns="4873beb7-5857-4685-be1f-d57550cc96cc">
+      <Value>1360476</Value>
+    </PublishStatusLookup>
+    <Providers xmlns="4873beb7-5857-4685-be1f-d57550cc96cc" xsi:nil="true"/>
+    <MachineTranslated xmlns="4873beb7-5857-4685-be1f-d57550cc96cc">false</MachineTranslated>
+    <OriginalSourceMarket xmlns="4873beb7-5857-4685-be1f-d57550cc96cc" xsi:nil="true"/>
+    <APDescription xmlns="4873beb7-5857-4685-be1f-d57550cc96cc" xsi:nil="true"/>
+    <ClipArtFilename xmlns="4873beb7-5857-4685-be1f-d57550cc96cc" xsi:nil="true"/>
+    <ContentItem xmlns="4873beb7-5857-4685-be1f-d57550cc96cc" xsi:nil="true"/>
+    <TPInstallLocation xmlns="4873beb7-5857-4685-be1f-d57550cc96cc" xsi:nil="true"/>
+    <PublishTargets xmlns="4873beb7-5857-4685-be1f-d57550cc96cc">OfficeOnlineVNext</PublishTargets>
+    <TimesCloned xmlns="4873beb7-5857-4685-be1f-d57550cc96cc" xsi:nil="true"/>
+    <AssetStart xmlns="4873beb7-5857-4685-be1f-d57550cc96cc">2011-12-12T13:37:00+00:00</AssetStart>
+    <Provider xmlns="4873beb7-5857-4685-be1f-d57550cc96cc" xsi:nil="true"/>
+    <AcquiredFrom xmlns="4873beb7-5857-4685-be1f-d57550cc96cc">Internal MS</AcquiredFrom>
+    <FriendlyTitle xmlns="4873beb7-5857-4685-be1f-d57550cc96cc" xsi:nil="true"/>
+    <LastHandOff xmlns="4873beb7-5857-4685-be1f-d57550cc96cc" xsi:nil="true"/>
+    <TPClientViewer xmlns="4873beb7-5857-4685-be1f-d57550cc96cc" xsi:nil="true"/>
+    <UACurrentWords xmlns="4873beb7-5857-4685-be1f-d57550cc96cc" xsi:nil="true"/>
+    <ArtSampleDocs xmlns="4873beb7-5857-4685-be1f-d57550cc96cc" xsi:nil="true"/>
+    <UALocRecommendation xmlns="4873beb7-5857-4685-be1f-d57550cc96cc">Localize</UALocRecommendation>
+    <Manager xmlns="4873beb7-5857-4685-be1f-d57550cc96cc" xsi:nil="true"/>
+    <ShowIn xmlns="4873beb7-5857-4685-be1f-d57550cc96cc">Show everywhere</ShowIn>
+    <UANotes xmlns="4873beb7-5857-4685-be1f-d57550cc96cc" xsi:nil="true"/>
+    <TemplateStatus xmlns="4873beb7-5857-4685-be1f-d57550cc96cc">Complete</TemplateStatus>
+    <InternalTagsTaxHTField0 xmlns="4873beb7-5857-4685-be1f-d57550cc96cc">
+      <Terms xmlns="http://schemas.microsoft.com/office/infopath/2007/PartnerControls"/>
+    </InternalTagsTaxHTField0>
+    <CSXHash xmlns="4873beb7-5857-4685-be1f-d57550cc96cc" xsi:nil="true"/>
+    <Downloads xmlns="4873beb7-5857-4685-be1f-d57550cc96cc">0</Downloads>
+    <VoteCount xmlns="4873beb7-5857-4685-be1f-d57550cc96cc" xsi:nil="true"/>
+    <OOCacheId xmlns="4873beb7-5857-4685-be1f-d57550cc96cc" xsi:nil="true"/>
+    <IsDeleted xmlns="4873beb7-5857-4685-be1f-d57550cc96cc">false</IsDeleted>
+    <AssetExpire xmlns="4873beb7-5857-4685-be1f-d57550cc96cc">2035-01-01T08:00:00+00:00</AssetExpire>
+    <DSATActionTaken xmlns="4873beb7-5857-4685-be1f-d57550cc96cc" xsi:nil="true"/>
+    <CSXSubmissionMarket xmlns="4873beb7-5857-4685-be1f-d57550cc96cc" xsi:nil="true"/>
+    <TPExecutable xmlns="4873beb7-5857-4685-be1f-d57550cc96cc" xsi:nil="true"/>
+    <SubmitterId xmlns="4873beb7-5857-4685-be1f-d57550cc96cc" xsi:nil="true"/>
+    <EditorialTags xmlns="4873beb7-5857-4685-be1f-d57550cc96cc" xsi:nil="true"/>
+    <ApprovalLog xmlns="4873beb7-5857-4685-be1f-d57550cc96cc" xsi:nil="true"/>
+    <AssetType xmlns="4873beb7-5857-4685-be1f-d57550cc96cc">TP</AssetType>
+    <BugNumber xmlns="4873beb7-5857-4685-be1f-d57550cc96cc" xsi:nil="true"/>
+    <CSXSubmissionDate xmlns="4873beb7-5857-4685-be1f-d57550cc96cc" xsi:nil="true"/>
+    <CSXUpdate xmlns="4873beb7-5857-4685-be1f-d57550cc96cc">false</CSXUpdate>
+    <Milestone xmlns="4873beb7-5857-4685-be1f-d57550cc96cc" xsi:nil="true"/>
+    <RecommendationsModifier xmlns="4873beb7-5857-4685-be1f-d57550cc96cc" xsi:nil="true"/>
+    <OriginAsset xmlns="4873beb7-5857-4685-be1f-d57550cc96cc" xsi:nil="true"/>
+    <TPComponent xmlns="4873beb7-5857-4685-be1f-d57550cc96cc" xsi:nil="true"/>
+    <AssetId xmlns="4873beb7-5857-4685-be1f-d57550cc96cc">TP102801058</AssetId>
+    <IntlLocPriority xmlns="4873beb7-5857-4685-be1f-d57550cc96cc" xsi:nil="true"/>
+    <PolicheckWords xmlns="4873beb7-5857-4685-be1f-d57550cc96cc" xsi:nil="true"/>
+    <TPLaunchHelpLink xmlns="4873beb7-5857-4685-be1f-d57550cc96cc" xsi:nil="true"/>
+    <TPApplication xmlns="4873beb7-5857-4685-be1f-d57550cc96cc" xsi:nil="true"/>
+    <CrawlForDependencies xmlns="4873beb7-5857-4685-be1f-d57550cc96cc">false</CrawlForDependencies>
+    <HandoffToMSDN xmlns="4873beb7-5857-4685-be1f-d57550cc96cc" xsi:nil="true"/>
+    <PlannedPubDate xmlns="4873beb7-5857-4685-be1f-d57550cc96cc" xsi:nil="true"/>
+    <IntlLangReviewer xmlns="4873beb7-5857-4685-be1f-d57550cc96cc" xsi:nil="true"/>
+    <TrustLevel xmlns="4873beb7-5857-4685-be1f-d57550cc96cc">1 Microsoft Managed Content</TrustLevel>
+    <LocLastLocAttemptVersionLookup xmlns="4873beb7-5857-4685-be1f-d57550cc96cc">706496</LocLastLocAttemptVersionLookup>
+    <IsSearchable xmlns="4873beb7-5857-4685-be1f-d57550cc96cc">true</IsSearchable>
+    <TemplateTemplateType xmlns="4873beb7-5857-4685-be1f-d57550cc96cc">PowerPoint Presentation Template</TemplateTemplateType>
+    <CampaignTagsTaxHTField0 xmlns="4873beb7-5857-4685-be1f-d57550cc96cc">
+      <Terms xmlns="http://schemas.microsoft.com/office/infopath/2007/PartnerControls"/>
+    </CampaignTagsTaxHTField0>
+    <TPNamespace xmlns="4873beb7-5857-4685-be1f-d57550cc96cc" xsi:nil="true"/>
+    <TaxCatchAll xmlns="4873beb7-5857-4685-be1f-d57550cc96cc"/>
+    <Markets xmlns="4873beb7-5857-4685-be1f-d57550cc96cc"/>
+    <UAProjectedTotalWords xmlns="4873beb7-5857-4685-be1f-d57550cc96cc" xsi:nil="true"/>
+    <IntlLangReview xmlns="4873beb7-5857-4685-be1f-d57550cc96cc">false</IntlLangReview>
+    <OutputCachingOn xmlns="4873beb7-5857-4685-be1f-d57550cc96cc">false</OutputCachingOn>
+    <AverageRating xmlns="4873beb7-5857-4685-be1f-d57550cc96cc" xsi:nil="true"/>
+    <APAuthor xmlns="4873beb7-5857-4685-be1f-d57550cc96cc">
+      <UserInfo>
+        <DisplayName>REDMOND\v-soujap</DisplayName>
+        <AccountId>1954</AccountId>
+        <AccountType/>
+      </UserInfo>
+    </APAuthor>
+    <LocManualTestRequired xmlns="4873beb7-5857-4685-be1f-d57550cc96cc">false</LocManualTestRequired>
+    <TPCommandLine xmlns="4873beb7-5857-4685-be1f-d57550cc96cc" xsi:nil="true"/>
+    <TPAppVersion xmlns="4873beb7-5857-4685-be1f-d57550cc96cc" xsi:nil="true"/>
+    <EditorialStatus xmlns="4873beb7-5857-4685-be1f-d57550cc96cc">Complete</EditorialStatus>
+    <LastModifiedDateTime xmlns="4873beb7-5857-4685-be1f-d57550cc96cc" xsi:nil="true"/>
+    <ScenarioTagsTaxHTField0 xmlns="4873beb7-5857-4685-be1f-d57550cc96cc">
+      <Terms xmlns="http://schemas.microsoft.com/office/infopath/2007/PartnerControls"/>
+    </ScenarioTagsTaxHTField0>
+    <OriginalRelease xmlns="4873beb7-5857-4685-be1f-d57550cc96cc">14</OriginalRelease>
+    <TPLaunchHelpLinkType xmlns="4873beb7-5857-4685-be1f-d57550cc96cc">Template</TPLaunchHelpLinkType>
+    <LocalizationTagsTaxHTField0 xmlns="4873beb7-5857-4685-be1f-d57550cc96cc">
+      <Terms xmlns="http://schemas.microsoft.com/office/infopath/2007/PartnerControls"/>
+    </LocalizationTagsTaxHTField0>
+    <LocMarketGroupTiers2 xmlns="4873beb7-5857-4685-be1f-d57550cc96cc" xsi:nil="true"/>
+  </documentManagement>
+</p:properties>
+</file>
+
 <file path=customXml/item3.xml><?xml version="1.0" encoding="utf-8"?>
 <?mso-contentType ?>
 <FormTemplates xmlns="http://schemas.microsoft.com/sharepoint/v3/contenttype/forms">
@@ -24593,22 +24589,6 @@
 </file>
 
 <file path=customXml/itemProps1.xml><?xml version="1.0" encoding="utf-8"?>
-<ds:datastoreItem xmlns:ds="http://schemas.openxmlformats.org/officeDocument/2006/customXml" ds:itemID="{4ED80E12-3BE9-4746-820E-FFB249F467F2}">
-  <ds:schemaRefs>
-    <ds:schemaRef ds:uri="http://purl.org/dc/elements/1.1/"/>
-    <ds:schemaRef ds:uri="http://schemas.microsoft.com/office/2006/metadata/properties"/>
-    <ds:schemaRef ds:uri="4873beb7-5857-4685-be1f-d57550cc96cc"/>
-    <ds:schemaRef ds:uri="http://schemas.openxmlformats.org/package/2006/metadata/core-properties"/>
-    <ds:schemaRef ds:uri="http://purl.org/dc/terms/"/>
-    <ds:schemaRef ds:uri="http://schemas.microsoft.com/office/infopath/2007/PartnerControls"/>
-    <ds:schemaRef ds:uri="http://schemas.microsoft.com/office/2006/documentManagement/types"/>
-    <ds:schemaRef ds:uri="http://www.w3.org/XML/1998/namespace"/>
-    <ds:schemaRef ds:uri="http://purl.org/dc/dcmitype/"/>
-  </ds:schemaRefs>
-</ds:datastoreItem>
-</file>
-
-<file path=customXml/itemProps2.xml><?xml version="1.0" encoding="utf-8"?>
 <ds:datastoreItem xmlns:ds="http://schemas.openxmlformats.org/officeDocument/2006/customXml" ds:itemID="{83ED4759-CFDD-43F0-817C-11D9197192BA}">
   <ds:schemaRefs>
     <ds:schemaRef ds:uri="http://schemas.microsoft.com/office/2006/metadata/contentType"/>
@@ -24626,6 +24606,22 @@
 </ds:datastoreItem>
 </file>
 
+<file path=customXml/itemProps2.xml><?xml version="1.0" encoding="utf-8"?>
+<ds:datastoreItem xmlns:ds="http://schemas.openxmlformats.org/officeDocument/2006/customXml" ds:itemID="{4ED80E12-3BE9-4746-820E-FFB249F467F2}">
+  <ds:schemaRefs>
+    <ds:schemaRef ds:uri="http://purl.org/dc/elements/1.1/"/>
+    <ds:schemaRef ds:uri="http://schemas.microsoft.com/office/2006/metadata/properties"/>
+    <ds:schemaRef ds:uri="4873beb7-5857-4685-be1f-d57550cc96cc"/>
+    <ds:schemaRef ds:uri="http://schemas.openxmlformats.org/package/2006/metadata/core-properties"/>
+    <ds:schemaRef ds:uri="http://purl.org/dc/terms/"/>
+    <ds:schemaRef ds:uri="http://schemas.microsoft.com/office/infopath/2007/PartnerControls"/>
+    <ds:schemaRef ds:uri="http://schemas.microsoft.com/office/2006/documentManagement/types"/>
+    <ds:schemaRef ds:uri="http://www.w3.org/XML/1998/namespace"/>
+    <ds:schemaRef ds:uri="http://purl.org/dc/dcmitype/"/>
+  </ds:schemaRefs>
+</ds:datastoreItem>
+</file>
+
 <file path=customXml/itemProps3.xml><?xml version="1.0" encoding="utf-8"?>
 <ds:datastoreItem xmlns:ds="http://schemas.openxmlformats.org/officeDocument/2006/customXml" ds:itemID="{8D003AC8-209A-4321-A17C-1B7A20643390}">
   <ds:schemaRefs>

</xml_diff>

<commit_message>
Updated slide - thêm thông tin trang header
</commit_message>
<xml_diff>
--- a/Seminar/Software Requirement.pptx
+++ b/Seminar/Software Requirement.pptx
@@ -286,7 +286,7 @@
           <a:p>
             <a:fld id="{30E6E22E-288A-414B-A8DE-E4DBD03D5FC0}" type="datetimeFigureOut">
               <a:rPr lang="en-US"/>
-              <a:t>11/1/2016</a:t>
+              <a:t>11/8/2016</a:t>
             </a:fld>
             <a:endParaRPr/>
           </a:p>
@@ -451,7 +451,7 @@
           <a:p>
             <a:fld id="{39A9AE7E-E0F9-4C51-AD9A-F4C3A6E23BBF}" type="datetimeFigureOut">
               <a:rPr lang="en-US"/>
-              <a:t>11/1/2016</a:t>
+              <a:t>11/8/2016</a:t>
             </a:fld>
             <a:endParaRPr/>
           </a:p>
@@ -2949,7 +2949,7 @@
               <a:defRPr/>
             </a:pPr>
             <a:r>
-              <a:rPr lang="en-US" baseline="0" dirty="0"/>
+              <a:rPr lang="en-US" baseline="0"/>
               <a:t>JAD:  </a:t>
             </a:r>
           </a:p>
@@ -2972,7 +2972,7 @@
               <a:defRPr/>
             </a:pPr>
             <a:r>
-              <a:rPr lang="en-US" baseline="0" dirty="0"/>
+              <a:rPr lang="en-US" baseline="0"/>
               <a:t>Các group meeting được tổ chức có hệ thống với sự tham gia của các người dùng hệ thống, người sở hưu hệ thống, và các phân tích viên trong một căn phòng trong một khoảng thời gian nào đó.</a:t>
             </a:r>
           </a:p>
@@ -2995,7 +2995,7 @@
               <a:defRPr/>
             </a:pPr>
             <a:r>
-              <a:rPr lang="en-US" baseline="0" dirty="0"/>
+              <a:rPr lang="en-US" baseline="0"/>
               <a:t>Các cuộc hợp này diễn ra từ 4 đến 8 giờ/ngày, và kéo dài từ 1 ngày cho đến 1 vài tuần</a:t>
             </a:r>
           </a:p>
@@ -3018,7 +3018,7 @@
               <a:defRPr/>
             </a:pPr>
             <a:r>
-              <a:rPr lang="en-US" baseline="0" dirty="0"/>
+              <a:rPr lang="en-US" baseline="0"/>
               <a:t>ĐƯợc sử dụng để:</a:t>
             </a:r>
           </a:p>
@@ -3041,7 +3041,7 @@
               <a:defRPr/>
             </a:pPr>
             <a:r>
-              <a:rPr lang="en-US" baseline="0" dirty="0"/>
+              <a:rPr lang="en-US" baseline="0"/>
               <a:t>Tìm ra các yêu cầu cho việc đặc tả yêu cầu phần mềm</a:t>
             </a:r>
           </a:p>
@@ -3064,7 +3064,7 @@
               <a:defRPr/>
             </a:pPr>
             <a:r>
-              <a:rPr lang="en-US" baseline="0" dirty="0"/>
+              <a:rPr lang="en-US" baseline="0"/>
               <a:t>Thiết kế và mô tả thiết kế hệ thống</a:t>
             </a:r>
           </a:p>
@@ -3087,7 +3087,7 @@
               <a:defRPr/>
             </a:pPr>
             <a:r>
-              <a:rPr lang="en-US" baseline="0" dirty="0"/>
+              <a:rPr lang="en-US" baseline="0"/>
               <a:t>Code</a:t>
             </a:r>
           </a:p>
@@ -3110,7 +3110,7 @@
               <a:defRPr/>
             </a:pPr>
             <a:r>
-              <a:rPr lang="en-US" baseline="0" dirty="0"/>
+              <a:rPr lang="en-US" baseline="0"/>
               <a:t>Kiểm thử</a:t>
             </a:r>
           </a:p>
@@ -3133,7 +3133,7 @@
               <a:defRPr/>
             </a:pPr>
             <a:r>
-              <a:rPr lang="en-US" baseline="0" dirty="0"/>
+              <a:rPr lang="en-US" baseline="0"/>
               <a:t>Tài liệu hướng dẫn người dùng</a:t>
             </a:r>
           </a:p>
@@ -3156,7 +3156,7 @@
               <a:defRPr/>
             </a:pPr>
             <a:r>
-              <a:rPr lang="en-US" baseline="0" dirty="0"/>
+              <a:rPr lang="en-US" baseline="0"/>
               <a:t>Các bước cho một JAD:</a:t>
             </a:r>
           </a:p>
@@ -3179,7 +3179,7 @@
               <a:defRPr/>
             </a:pPr>
             <a:r>
-              <a:rPr lang="en-US" baseline="0" dirty="0"/>
+              <a:rPr lang="en-US" baseline="0"/>
               <a:t>Chọn ngày tham gia (nhà đầu tư, team leader, users, thư ký, kỹ thuật viên)</a:t>
             </a:r>
           </a:p>
@@ -3202,7 +3202,7 @@
               <a:defRPr/>
             </a:pPr>
             <a:r>
-              <a:rPr lang="en-US" baseline="0" dirty="0"/>
+              <a:rPr lang="en-US" baseline="0"/>
               <a:t>Chuẩn bị báo cáo (agenda)</a:t>
             </a:r>
           </a:p>
@@ -3225,7 +3225,7 @@
               <a:defRPr/>
             </a:pPr>
             <a:r>
-              <a:rPr lang="en-US" baseline="0" dirty="0"/>
+              <a:rPr lang="en-US" baseline="0"/>
               <a:t>Chọn địa điểm</a:t>
             </a:r>
           </a:p>
@@ -3247,7 +3247,7 @@
               <a:tabLst/>
               <a:defRPr/>
             </a:pPr>
-            <a:endParaRPr lang="en-US" baseline="0" dirty="0"/>
+            <a:endParaRPr lang="en-US" baseline="0"/>
           </a:p>
           <a:p>
             <a:pPr marL="171450" marR="0" lvl="0" indent="-171450" algn="l" defTabSz="914400" rtl="0" eaLnBrk="1" fontAlgn="auto" latinLnBrk="0" hangingPunct="1">
@@ -3268,7 +3268,7 @@
               <a:defRPr/>
             </a:pPr>
             <a:r>
-              <a:rPr lang="en-US" baseline="0" dirty="0"/>
+              <a:rPr lang="en-US" baseline="0"/>
               <a:t>QFD:</a:t>
             </a:r>
           </a:p>
@@ -3290,7 +3290,7 @@
               <a:tabLst/>
               <a:defRPr/>
             </a:pPr>
-            <a:endParaRPr lang="en-US" baseline="0" dirty="0"/>
+            <a:endParaRPr lang="en-US" baseline="0"/>
           </a:p>
           <a:p>
             <a:pPr marL="628650" marR="0" lvl="1" indent="-171450" algn="l" defTabSz="914400" rtl="0" eaLnBrk="1" fontAlgn="auto" latinLnBrk="0" hangingPunct="1">
@@ -3310,7 +3310,7 @@
               <a:tabLst/>
               <a:defRPr/>
             </a:pPr>
-            <a:endParaRPr lang="en-US" baseline="0" dirty="0"/>
+            <a:endParaRPr lang="en-US" baseline="0"/>
           </a:p>
           <a:p>
             <a:pPr marL="1085850" marR="0" lvl="2" indent="-171450" algn="l" defTabSz="914400" rtl="0" eaLnBrk="1" fontAlgn="auto" latinLnBrk="0" hangingPunct="1">
@@ -3330,7 +3330,7 @@
               <a:tabLst/>
               <a:defRPr/>
             </a:pPr>
-            <a:endParaRPr lang="en-US" baseline="0" dirty="0"/>
+            <a:endParaRPr lang="en-US" baseline="0"/>
           </a:p>
           <a:p>
             <a:pPr marL="1543050" marR="0" lvl="3" indent="-171450" algn="l" defTabSz="914400" rtl="0" eaLnBrk="1" fontAlgn="auto" latinLnBrk="0" hangingPunct="1">
@@ -3350,10 +3350,10 @@
               <a:tabLst/>
               <a:defRPr/>
             </a:pPr>
-            <a:endParaRPr lang="en-US" dirty="0"/>
-          </a:p>
-          <a:p>
-            <a:endParaRPr lang="en-US" dirty="0"/>
+            <a:endParaRPr lang="en-US"/>
+          </a:p>
+          <a:p>
+            <a:endParaRPr lang="en-US"/>
           </a:p>
         </p:txBody>
       </p:sp>
@@ -3455,7 +3455,7 @@
               <a:defRPr/>
             </a:pPr>
             <a:r>
-              <a:rPr lang="en-US" baseline="0" dirty="0"/>
+              <a:rPr lang="en-US" baseline="0"/>
               <a:t>JAD:  </a:t>
             </a:r>
           </a:p>
@@ -3478,7 +3478,7 @@
               <a:defRPr/>
             </a:pPr>
             <a:r>
-              <a:rPr lang="en-US" baseline="0" dirty="0"/>
+              <a:rPr lang="en-US" baseline="0"/>
               <a:t>Các group meeting được tổ chức có hệ thống với sự tham gia của các người dùng hệ thống, người sở hưu hệ thống, và các phân tích viên trong một căn phòng trong một khoảng thời gian nào đó.</a:t>
             </a:r>
           </a:p>
@@ -3501,7 +3501,7 @@
               <a:defRPr/>
             </a:pPr>
             <a:r>
-              <a:rPr lang="en-US" baseline="0" dirty="0"/>
+              <a:rPr lang="en-US" baseline="0"/>
               <a:t>Các cuộc hợp này diễn ra từ 4 đến 8 giờ/ngày, và kéo dài từ 1 ngày cho đến 1 vài tuần</a:t>
             </a:r>
           </a:p>
@@ -3524,7 +3524,7 @@
               <a:defRPr/>
             </a:pPr>
             <a:r>
-              <a:rPr lang="en-US" baseline="0" dirty="0"/>
+              <a:rPr lang="en-US" baseline="0"/>
               <a:t>ĐƯợc sử dụng để:</a:t>
             </a:r>
           </a:p>
@@ -3547,7 +3547,7 @@
               <a:defRPr/>
             </a:pPr>
             <a:r>
-              <a:rPr lang="en-US" baseline="0" dirty="0"/>
+              <a:rPr lang="en-US" baseline="0"/>
               <a:t>Tìm ra các yêu cầu cho việc đặc tả yêu cầu phần mềm</a:t>
             </a:r>
           </a:p>
@@ -3570,7 +3570,7 @@
               <a:defRPr/>
             </a:pPr>
             <a:r>
-              <a:rPr lang="en-US" baseline="0" dirty="0"/>
+              <a:rPr lang="en-US" baseline="0"/>
               <a:t>Thiết kế và mô tả thiết kế hệ thống</a:t>
             </a:r>
           </a:p>
@@ -3593,7 +3593,7 @@
               <a:defRPr/>
             </a:pPr>
             <a:r>
-              <a:rPr lang="en-US" baseline="0" dirty="0"/>
+              <a:rPr lang="en-US" baseline="0"/>
               <a:t>Code</a:t>
             </a:r>
           </a:p>
@@ -3616,7 +3616,7 @@
               <a:defRPr/>
             </a:pPr>
             <a:r>
-              <a:rPr lang="en-US" baseline="0" dirty="0"/>
+              <a:rPr lang="en-US" baseline="0"/>
               <a:t>Kiểm thử</a:t>
             </a:r>
           </a:p>
@@ -3639,7 +3639,7 @@
               <a:defRPr/>
             </a:pPr>
             <a:r>
-              <a:rPr lang="en-US" baseline="0" dirty="0"/>
+              <a:rPr lang="en-US" baseline="0"/>
               <a:t>Tài liệu hướng dẫn người dùng</a:t>
             </a:r>
           </a:p>
@@ -3662,7 +3662,7 @@
               <a:defRPr/>
             </a:pPr>
             <a:r>
-              <a:rPr lang="en-US" baseline="0" dirty="0"/>
+              <a:rPr lang="en-US" baseline="0"/>
               <a:t>Các bước cho một JAD:</a:t>
             </a:r>
           </a:p>
@@ -3685,7 +3685,7 @@
               <a:defRPr/>
             </a:pPr>
             <a:r>
-              <a:rPr lang="en-US" baseline="0" dirty="0"/>
+              <a:rPr lang="en-US" baseline="0"/>
               <a:t>Chọn ngày tham gia (nhà đầu tư, team leader, users, thư ký, kỹ thuật viên)</a:t>
             </a:r>
           </a:p>
@@ -3708,7 +3708,7 @@
               <a:defRPr/>
             </a:pPr>
             <a:r>
-              <a:rPr lang="en-US" baseline="0" dirty="0"/>
+              <a:rPr lang="en-US" baseline="0"/>
               <a:t>Chuẩn bị báo cáo (agenda)</a:t>
             </a:r>
           </a:p>
@@ -3731,7 +3731,7 @@
               <a:defRPr/>
             </a:pPr>
             <a:r>
-              <a:rPr lang="en-US" baseline="0" dirty="0"/>
+              <a:rPr lang="en-US" baseline="0"/>
               <a:t>Chọn địa điểm</a:t>
             </a:r>
           </a:p>
@@ -3753,7 +3753,7 @@
               <a:tabLst/>
               <a:defRPr/>
             </a:pPr>
-            <a:endParaRPr lang="en-US" baseline="0" dirty="0"/>
+            <a:endParaRPr lang="en-US" baseline="0"/>
           </a:p>
           <a:p>
             <a:pPr marL="171450" marR="0" lvl="0" indent="-171450" algn="l" defTabSz="914400" rtl="0" eaLnBrk="1" fontAlgn="auto" latinLnBrk="0" hangingPunct="1">
@@ -3774,7 +3774,7 @@
               <a:defRPr/>
             </a:pPr>
             <a:r>
-              <a:rPr lang="en-US" baseline="0" dirty="0"/>
+              <a:rPr lang="en-US" baseline="0"/>
               <a:t>QFD:</a:t>
             </a:r>
           </a:p>
@@ -3796,7 +3796,7 @@
               <a:tabLst/>
               <a:defRPr/>
             </a:pPr>
-            <a:endParaRPr lang="en-US" baseline="0" dirty="0"/>
+            <a:endParaRPr lang="en-US" baseline="0"/>
           </a:p>
           <a:p>
             <a:pPr marL="628650" marR="0" lvl="1" indent="-171450" algn="l" defTabSz="914400" rtl="0" eaLnBrk="1" fontAlgn="auto" latinLnBrk="0" hangingPunct="1">
@@ -3816,7 +3816,7 @@
               <a:tabLst/>
               <a:defRPr/>
             </a:pPr>
-            <a:endParaRPr lang="en-US" baseline="0" dirty="0"/>
+            <a:endParaRPr lang="en-US" baseline="0"/>
           </a:p>
           <a:p>
             <a:pPr marL="1085850" marR="0" lvl="2" indent="-171450" algn="l" defTabSz="914400" rtl="0" eaLnBrk="1" fontAlgn="auto" latinLnBrk="0" hangingPunct="1">
@@ -3836,7 +3836,7 @@
               <a:tabLst/>
               <a:defRPr/>
             </a:pPr>
-            <a:endParaRPr lang="en-US" baseline="0" dirty="0"/>
+            <a:endParaRPr lang="en-US" baseline="0"/>
           </a:p>
           <a:p>
             <a:pPr marL="1543050" marR="0" lvl="3" indent="-171450" algn="l" defTabSz="914400" rtl="0" eaLnBrk="1" fontAlgn="auto" latinLnBrk="0" hangingPunct="1">
@@ -3856,10 +3856,10 @@
               <a:tabLst/>
               <a:defRPr/>
             </a:pPr>
-            <a:endParaRPr lang="en-US" dirty="0"/>
-          </a:p>
-          <a:p>
-            <a:endParaRPr lang="en-US" dirty="0"/>
+            <a:endParaRPr lang="en-US"/>
+          </a:p>
+          <a:p>
+            <a:endParaRPr lang="en-US"/>
           </a:p>
         </p:txBody>
       </p:sp>
@@ -3961,7 +3961,7 @@
               <a:defRPr/>
             </a:pPr>
             <a:r>
-              <a:rPr lang="en-US" baseline="0" dirty="0"/>
+              <a:rPr lang="en-US" baseline="0"/>
               <a:t>JAD:  </a:t>
             </a:r>
           </a:p>
@@ -3984,7 +3984,7 @@
               <a:defRPr/>
             </a:pPr>
             <a:r>
-              <a:rPr lang="en-US" baseline="0" dirty="0"/>
+              <a:rPr lang="en-US" baseline="0"/>
               <a:t>Các group meeting được tổ chức có hệ thống với sự tham gia của các người dùng hệ thống, người sở hưu hệ thống, và các phân tích viên trong một căn phòng trong một khoảng thời gian nào đó.</a:t>
             </a:r>
           </a:p>
@@ -4007,7 +4007,7 @@
               <a:defRPr/>
             </a:pPr>
             <a:r>
-              <a:rPr lang="en-US" baseline="0" dirty="0"/>
+              <a:rPr lang="en-US" baseline="0"/>
               <a:t>Các cuộc hợp này diễn ra từ 4 đến 8 giờ/ngày, và kéo dài từ 1 ngày cho đến 1 vài tuần</a:t>
             </a:r>
           </a:p>
@@ -4030,7 +4030,7 @@
               <a:defRPr/>
             </a:pPr>
             <a:r>
-              <a:rPr lang="en-US" baseline="0" dirty="0"/>
+              <a:rPr lang="en-US" baseline="0"/>
               <a:t>ĐƯợc sử dụng để:</a:t>
             </a:r>
           </a:p>
@@ -4053,7 +4053,7 @@
               <a:defRPr/>
             </a:pPr>
             <a:r>
-              <a:rPr lang="en-US" baseline="0" dirty="0"/>
+              <a:rPr lang="en-US" baseline="0"/>
               <a:t>Tìm ra các yêu cầu cho việc đặc tả yêu cầu phần mềm</a:t>
             </a:r>
           </a:p>
@@ -4076,7 +4076,7 @@
               <a:defRPr/>
             </a:pPr>
             <a:r>
-              <a:rPr lang="en-US" baseline="0" dirty="0"/>
+              <a:rPr lang="en-US" baseline="0"/>
               <a:t>Thiết kế và mô tả thiết kế hệ thống</a:t>
             </a:r>
           </a:p>
@@ -4099,7 +4099,7 @@
               <a:defRPr/>
             </a:pPr>
             <a:r>
-              <a:rPr lang="en-US" baseline="0" dirty="0"/>
+              <a:rPr lang="en-US" baseline="0"/>
               <a:t>Code</a:t>
             </a:r>
           </a:p>
@@ -4122,7 +4122,7 @@
               <a:defRPr/>
             </a:pPr>
             <a:r>
-              <a:rPr lang="en-US" baseline="0" dirty="0"/>
+              <a:rPr lang="en-US" baseline="0"/>
               <a:t>Kiểm thử</a:t>
             </a:r>
           </a:p>
@@ -4145,7 +4145,7 @@
               <a:defRPr/>
             </a:pPr>
             <a:r>
-              <a:rPr lang="en-US" baseline="0" dirty="0"/>
+              <a:rPr lang="en-US" baseline="0"/>
               <a:t>Tài liệu hướng dẫn người dùng</a:t>
             </a:r>
           </a:p>
@@ -4168,7 +4168,7 @@
               <a:defRPr/>
             </a:pPr>
             <a:r>
-              <a:rPr lang="en-US" baseline="0" dirty="0"/>
+              <a:rPr lang="en-US" baseline="0"/>
               <a:t>Các bước cho một JAD:</a:t>
             </a:r>
           </a:p>
@@ -4191,7 +4191,7 @@
               <a:defRPr/>
             </a:pPr>
             <a:r>
-              <a:rPr lang="en-US" baseline="0" dirty="0"/>
+              <a:rPr lang="en-US" baseline="0"/>
               <a:t>Chọn ngày tham gia (nhà đầu tư, team leader, users, thư ký, kỹ thuật viên)</a:t>
             </a:r>
           </a:p>
@@ -4214,7 +4214,7 @@
               <a:defRPr/>
             </a:pPr>
             <a:r>
-              <a:rPr lang="en-US" baseline="0" dirty="0"/>
+              <a:rPr lang="en-US" baseline="0"/>
               <a:t>Chuẩn bị báo cáo (agenda)</a:t>
             </a:r>
           </a:p>
@@ -4237,7 +4237,7 @@
               <a:defRPr/>
             </a:pPr>
             <a:r>
-              <a:rPr lang="en-US" baseline="0" dirty="0"/>
+              <a:rPr lang="en-US" baseline="0"/>
               <a:t>Chọn địa điểm</a:t>
             </a:r>
           </a:p>
@@ -4259,7 +4259,7 @@
               <a:tabLst/>
               <a:defRPr/>
             </a:pPr>
-            <a:endParaRPr lang="en-US" baseline="0" dirty="0"/>
+            <a:endParaRPr lang="en-US" baseline="0"/>
           </a:p>
           <a:p>
             <a:pPr marL="171450" marR="0" lvl="0" indent="-171450" algn="l" defTabSz="914400" rtl="0" eaLnBrk="1" fontAlgn="auto" latinLnBrk="0" hangingPunct="1">
@@ -4280,7 +4280,7 @@
               <a:defRPr/>
             </a:pPr>
             <a:r>
-              <a:rPr lang="en-US" baseline="0" dirty="0"/>
+              <a:rPr lang="en-US" baseline="0"/>
               <a:t>QFD:</a:t>
             </a:r>
           </a:p>
@@ -4302,7 +4302,7 @@
               <a:tabLst/>
               <a:defRPr/>
             </a:pPr>
-            <a:endParaRPr lang="en-US" baseline="0" dirty="0"/>
+            <a:endParaRPr lang="en-US" baseline="0"/>
           </a:p>
           <a:p>
             <a:pPr marL="628650" marR="0" lvl="1" indent="-171450" algn="l" defTabSz="914400" rtl="0" eaLnBrk="1" fontAlgn="auto" latinLnBrk="0" hangingPunct="1">
@@ -4322,7 +4322,7 @@
               <a:tabLst/>
               <a:defRPr/>
             </a:pPr>
-            <a:endParaRPr lang="en-US" baseline="0" dirty="0"/>
+            <a:endParaRPr lang="en-US" baseline="0"/>
           </a:p>
           <a:p>
             <a:pPr marL="1085850" marR="0" lvl="2" indent="-171450" algn="l" defTabSz="914400" rtl="0" eaLnBrk="1" fontAlgn="auto" latinLnBrk="0" hangingPunct="1">
@@ -4342,7 +4342,7 @@
               <a:tabLst/>
               <a:defRPr/>
             </a:pPr>
-            <a:endParaRPr lang="en-US" baseline="0" dirty="0"/>
+            <a:endParaRPr lang="en-US" baseline="0"/>
           </a:p>
           <a:p>
             <a:pPr marL="1543050" marR="0" lvl="3" indent="-171450" algn="l" defTabSz="914400" rtl="0" eaLnBrk="1" fontAlgn="auto" latinLnBrk="0" hangingPunct="1">
@@ -4362,10 +4362,10 @@
               <a:tabLst/>
               <a:defRPr/>
             </a:pPr>
-            <a:endParaRPr lang="en-US" dirty="0"/>
-          </a:p>
-          <a:p>
-            <a:endParaRPr lang="en-US" dirty="0"/>
+            <a:endParaRPr lang="en-US"/>
+          </a:p>
+          <a:p>
+            <a:endParaRPr lang="en-US"/>
           </a:p>
         </p:txBody>
       </p:sp>
@@ -4467,7 +4467,7 @@
               <a:defRPr/>
             </a:pPr>
             <a:r>
-              <a:rPr lang="en-US" baseline="0" dirty="0"/>
+              <a:rPr lang="en-US" baseline="0"/>
               <a:t>JAD:  </a:t>
             </a:r>
           </a:p>
@@ -4490,7 +4490,7 @@
               <a:defRPr/>
             </a:pPr>
             <a:r>
-              <a:rPr lang="en-US" baseline="0" dirty="0"/>
+              <a:rPr lang="en-US" baseline="0"/>
               <a:t>Các group meeting được tổ chức có hệ thống với sự tham gia của các người dùng hệ thống, người sở hưu hệ thống, và các phân tích viên trong một căn phòng trong một khoảng thời gian nào đó.</a:t>
             </a:r>
           </a:p>
@@ -4513,7 +4513,7 @@
               <a:defRPr/>
             </a:pPr>
             <a:r>
-              <a:rPr lang="en-US" baseline="0" dirty="0"/>
+              <a:rPr lang="en-US" baseline="0"/>
               <a:t>Các cuộc hợp này diễn ra từ 4 đến 8 giờ/ngày, và kéo dài từ 1 ngày cho đến 1 vài tuần</a:t>
             </a:r>
           </a:p>
@@ -4536,7 +4536,7 @@
               <a:defRPr/>
             </a:pPr>
             <a:r>
-              <a:rPr lang="en-US" baseline="0" dirty="0"/>
+              <a:rPr lang="en-US" baseline="0"/>
               <a:t>ĐƯợc sử dụng để:</a:t>
             </a:r>
           </a:p>
@@ -4559,7 +4559,7 @@
               <a:defRPr/>
             </a:pPr>
             <a:r>
-              <a:rPr lang="en-US" baseline="0" dirty="0"/>
+              <a:rPr lang="en-US" baseline="0"/>
               <a:t>Tìm ra các yêu cầu cho việc đặc tả yêu cầu phần mềm</a:t>
             </a:r>
           </a:p>
@@ -4582,7 +4582,7 @@
               <a:defRPr/>
             </a:pPr>
             <a:r>
-              <a:rPr lang="en-US" baseline="0" dirty="0"/>
+              <a:rPr lang="en-US" baseline="0"/>
               <a:t>Thiết kế và mô tả thiết kế hệ thống</a:t>
             </a:r>
           </a:p>
@@ -4605,7 +4605,7 @@
               <a:defRPr/>
             </a:pPr>
             <a:r>
-              <a:rPr lang="en-US" baseline="0" dirty="0"/>
+              <a:rPr lang="en-US" baseline="0"/>
               <a:t>Code</a:t>
             </a:r>
           </a:p>
@@ -4628,7 +4628,7 @@
               <a:defRPr/>
             </a:pPr>
             <a:r>
-              <a:rPr lang="en-US" baseline="0" dirty="0"/>
+              <a:rPr lang="en-US" baseline="0"/>
               <a:t>Kiểm thử</a:t>
             </a:r>
           </a:p>
@@ -4651,7 +4651,7 @@
               <a:defRPr/>
             </a:pPr>
             <a:r>
-              <a:rPr lang="en-US" baseline="0" dirty="0"/>
+              <a:rPr lang="en-US" baseline="0"/>
               <a:t>Tài liệu hướng dẫn người dùng</a:t>
             </a:r>
           </a:p>
@@ -4674,7 +4674,7 @@
               <a:defRPr/>
             </a:pPr>
             <a:r>
-              <a:rPr lang="en-US" baseline="0" dirty="0"/>
+              <a:rPr lang="en-US" baseline="0"/>
               <a:t>Các bước cho một JAD:</a:t>
             </a:r>
           </a:p>
@@ -4697,7 +4697,7 @@
               <a:defRPr/>
             </a:pPr>
             <a:r>
-              <a:rPr lang="en-US" baseline="0" dirty="0"/>
+              <a:rPr lang="en-US" baseline="0"/>
               <a:t>Chọn ngày tham gia (nhà đầu tư, team leader, users, thư ký, kỹ thuật viên)</a:t>
             </a:r>
           </a:p>
@@ -4720,7 +4720,7 @@
               <a:defRPr/>
             </a:pPr>
             <a:r>
-              <a:rPr lang="en-US" baseline="0" dirty="0"/>
+              <a:rPr lang="en-US" baseline="0"/>
               <a:t>Chuẩn bị báo cáo (agenda)</a:t>
             </a:r>
           </a:p>
@@ -4743,7 +4743,7 @@
               <a:defRPr/>
             </a:pPr>
             <a:r>
-              <a:rPr lang="en-US" baseline="0" dirty="0"/>
+              <a:rPr lang="en-US" baseline="0"/>
               <a:t>Chọn địa điểm</a:t>
             </a:r>
           </a:p>
@@ -4765,7 +4765,7 @@
               <a:tabLst/>
               <a:defRPr/>
             </a:pPr>
-            <a:endParaRPr lang="en-US" baseline="0" dirty="0"/>
+            <a:endParaRPr lang="en-US" baseline="0"/>
           </a:p>
           <a:p>
             <a:pPr marL="171450" marR="0" lvl="0" indent="-171450" algn="l" defTabSz="914400" rtl="0" eaLnBrk="1" fontAlgn="auto" latinLnBrk="0" hangingPunct="1">
@@ -4786,7 +4786,7 @@
               <a:defRPr/>
             </a:pPr>
             <a:r>
-              <a:rPr lang="en-US" baseline="0" dirty="0"/>
+              <a:rPr lang="en-US" baseline="0"/>
               <a:t>QFD:</a:t>
             </a:r>
           </a:p>
@@ -4808,7 +4808,7 @@
               <a:tabLst/>
               <a:defRPr/>
             </a:pPr>
-            <a:endParaRPr lang="en-US" baseline="0" dirty="0"/>
+            <a:endParaRPr lang="en-US" baseline="0"/>
           </a:p>
           <a:p>
             <a:pPr marL="628650" marR="0" lvl="1" indent="-171450" algn="l" defTabSz="914400" rtl="0" eaLnBrk="1" fontAlgn="auto" latinLnBrk="0" hangingPunct="1">
@@ -4828,7 +4828,7 @@
               <a:tabLst/>
               <a:defRPr/>
             </a:pPr>
-            <a:endParaRPr lang="en-US" baseline="0" dirty="0"/>
+            <a:endParaRPr lang="en-US" baseline="0"/>
           </a:p>
           <a:p>
             <a:pPr marL="1085850" marR="0" lvl="2" indent="-171450" algn="l" defTabSz="914400" rtl="0" eaLnBrk="1" fontAlgn="auto" latinLnBrk="0" hangingPunct="1">
@@ -4848,7 +4848,7 @@
               <a:tabLst/>
               <a:defRPr/>
             </a:pPr>
-            <a:endParaRPr lang="en-US" baseline="0" dirty="0"/>
+            <a:endParaRPr lang="en-US" baseline="0"/>
           </a:p>
           <a:p>
             <a:pPr marL="1543050" marR="0" lvl="3" indent="-171450" algn="l" defTabSz="914400" rtl="0" eaLnBrk="1" fontAlgn="auto" latinLnBrk="0" hangingPunct="1">
@@ -4868,10 +4868,10 @@
               <a:tabLst/>
               <a:defRPr/>
             </a:pPr>
-            <a:endParaRPr lang="en-US" dirty="0"/>
-          </a:p>
-          <a:p>
-            <a:endParaRPr lang="en-US" dirty="0"/>
+            <a:endParaRPr lang="en-US"/>
+          </a:p>
+          <a:p>
+            <a:endParaRPr lang="en-US"/>
           </a:p>
         </p:txBody>
       </p:sp>
@@ -5317,7 +5317,7 @@
             <a:fld id="{8E36636D-D922-432D-A958-524484B5923D}" type="datetimeFigureOut">
               <a:rPr lang="en-US"/>
               <a:pPr/>
-              <a:t>11/1/2016</a:t>
+              <a:t>11/8/2016</a:t>
             </a:fld>
             <a:endParaRPr/>
           </a:p>
@@ -5927,7 +5927,7 @@
             <a:fld id="{8E36636D-D922-432D-A958-524484B5923D}" type="datetimeFigureOut">
               <a:rPr lang="en-US"/>
               <a:pPr/>
-              <a:t>11/1/2016</a:t>
+              <a:t>11/8/2016</a:t>
             </a:fld>
             <a:endParaRPr/>
           </a:p>
@@ -6137,7 +6137,7 @@
             <a:fld id="{8E36636D-D922-432D-A958-524484B5923D}" type="datetimeFigureOut">
               <a:rPr lang="en-US"/>
               <a:pPr/>
-              <a:t>11/1/2016</a:t>
+              <a:t>11/8/2016</a:t>
             </a:fld>
             <a:endParaRPr/>
           </a:p>
@@ -6337,7 +6337,7 @@
             <a:fld id="{8E36636D-D922-432D-A958-524484B5923D}" type="datetimeFigureOut">
               <a:rPr lang="en-US"/>
               <a:pPr/>
-              <a:t>11/1/2016</a:t>
+              <a:t>11/8/2016</a:t>
             </a:fld>
             <a:endParaRPr/>
           </a:p>
@@ -6603,7 +6603,7 @@
             <a:fld id="{8E36636D-D922-432D-A958-524484B5923D}" type="datetimeFigureOut">
               <a:rPr lang="en-US"/>
               <a:pPr/>
-              <a:t>11/1/2016</a:t>
+              <a:t>11/8/2016</a:t>
             </a:fld>
             <a:endParaRPr/>
           </a:p>
@@ -7113,7 +7113,7 @@
             <a:fld id="{8E36636D-D922-432D-A958-524484B5923D}" type="datetimeFigureOut">
               <a:rPr lang="en-US"/>
               <a:pPr/>
-              <a:t>11/1/2016</a:t>
+              <a:t>11/8/2016</a:t>
             </a:fld>
             <a:endParaRPr/>
           </a:p>
@@ -7575,7 +7575,7 @@
             <a:fld id="{8E36636D-D922-432D-A958-524484B5923D}" type="datetimeFigureOut">
               <a:rPr lang="en-US"/>
               <a:pPr/>
-              <a:t>11/1/2016</a:t>
+              <a:t>11/8/2016</a:t>
             </a:fld>
             <a:endParaRPr/>
           </a:p>
@@ -7707,7 +7707,7 @@
             <a:fld id="{8E36636D-D922-432D-A958-524484B5923D}" type="datetimeFigureOut">
               <a:rPr lang="en-US"/>
               <a:pPr/>
-              <a:t>11/1/2016</a:t>
+              <a:t>11/8/2016</a:t>
             </a:fld>
             <a:endParaRPr/>
           </a:p>
@@ -7816,7 +7816,7 @@
             <a:fld id="{8E36636D-D922-432D-A958-524484B5923D}" type="datetimeFigureOut">
               <a:rPr lang="en-US"/>
               <a:pPr/>
-              <a:t>11/1/2016</a:t>
+              <a:t>11/8/2016</a:t>
             </a:fld>
             <a:endParaRPr/>
           </a:p>
@@ -8111,7 +8111,7 @@
             <a:fld id="{8E36636D-D922-432D-A958-524484B5923D}" type="datetimeFigureOut">
               <a:rPr lang="en-US"/>
               <a:pPr/>
-              <a:t>11/1/2016</a:t>
+              <a:t>11/8/2016</a:t>
             </a:fld>
             <a:endParaRPr/>
           </a:p>
@@ -8436,7 +8436,7 @@
             <a:fld id="{8E36636D-D922-432D-A958-524484B5923D}" type="datetimeFigureOut">
               <a:rPr lang="en-US"/>
               <a:pPr/>
-              <a:t>11/1/2016</a:t>
+              <a:t>11/8/2016</a:t>
             </a:fld>
             <a:endParaRPr/>
           </a:p>
@@ -8781,7 +8781,7 @@
             <a:fld id="{8E36636D-D922-432D-A958-524484B5923D}" type="datetimeFigureOut">
               <a:rPr lang="en-US"/>
               <a:pPr/>
-              <a:t>11/1/2016</a:t>
+              <a:t>11/8/2016</a:t>
             </a:fld>
             <a:endParaRPr/>
           </a:p>
@@ -9167,12 +9167,12 @@
   <p:extLst mod="1">
     <p:ext uri="{27BBF7A9-308A-43DC-89C8-2F10F3537804}">
       <p15:sldGuideLst xmlns:p15="http://schemas.microsoft.com/office/powerpoint/2012/main">
-        <p15:guide id="1" orient="horz" pos="2160" userDrawn="1">
+        <p15:guide id="1" orient="horz" pos="2160">
           <p15:clr>
             <a:srgbClr val="F26B43"/>
           </p15:clr>
         </p15:guide>
-        <p15:guide id="2" pos="2880" userDrawn="1">
+        <p15:guide id="2" pos="2880">
           <p15:clr>
             <a:srgbClr val="F26B43"/>
           </p15:clr>
@@ -9202,6 +9202,274 @@
       </p:grpSpPr>
       <p:sp>
         <p:nvSpPr>
+          <p:cNvPr id="4" name="TextBox 3"/>
+          <p:cNvSpPr txBox="1"/>
+          <p:nvPr/>
+        </p:nvSpPr>
+        <p:spPr>
+          <a:xfrm>
+            <a:off x="2556159" y="609600"/>
+            <a:ext cx="4031681" cy="646331"/>
+          </a:xfrm>
+          <a:prstGeom prst="rect">
+            <a:avLst/>
+          </a:prstGeom>
+          <a:noFill/>
+        </p:spPr>
+        <p:txBody>
+          <a:bodyPr wrap="none" rtlCol="0">
+            <a:spAutoFit/>
+          </a:bodyPr>
+          <a:lstStyle/>
+          <a:p>
+            <a:pPr algn="ctr"/>
+            <a:r>
+              <a:rPr lang="en-US" err="1">
+                <a:solidFill>
+                  <a:schemeClr val="tx2"/>
+                </a:solidFill>
+                <a:latin typeface="+mj-lt"/>
+                <a:ea typeface="+mj-ea"/>
+                <a:cs typeface="+mj-cs"/>
+              </a:rPr>
+              <a:t>Trường</a:t>
+            </a:r>
+            <a:r>
+              <a:rPr lang="en-US">
+                <a:solidFill>
+                  <a:schemeClr val="tx2"/>
+                </a:solidFill>
+                <a:latin typeface="+mj-lt"/>
+                <a:ea typeface="+mj-ea"/>
+                <a:cs typeface="+mj-cs"/>
+              </a:rPr>
+              <a:t> </a:t>
+            </a:r>
+            <a:r>
+              <a:rPr lang="en-US" err="1">
+                <a:solidFill>
+                  <a:schemeClr val="tx2"/>
+                </a:solidFill>
+                <a:latin typeface="+mj-lt"/>
+                <a:ea typeface="+mj-ea"/>
+                <a:cs typeface="+mj-cs"/>
+              </a:rPr>
+              <a:t>Đại</a:t>
+            </a:r>
+            <a:r>
+              <a:rPr lang="en-US">
+                <a:solidFill>
+                  <a:schemeClr val="tx2"/>
+                </a:solidFill>
+                <a:latin typeface="+mj-lt"/>
+                <a:ea typeface="+mj-ea"/>
+                <a:cs typeface="+mj-cs"/>
+              </a:rPr>
+              <a:t> </a:t>
+            </a:r>
+            <a:r>
+              <a:rPr lang="en-US" err="1">
+                <a:solidFill>
+                  <a:schemeClr val="tx2"/>
+                </a:solidFill>
+                <a:latin typeface="+mj-lt"/>
+                <a:ea typeface="+mj-ea"/>
+                <a:cs typeface="+mj-cs"/>
+              </a:rPr>
+              <a:t>học</a:t>
+            </a:r>
+            <a:r>
+              <a:rPr lang="en-US">
+                <a:solidFill>
+                  <a:schemeClr val="tx2"/>
+                </a:solidFill>
+                <a:latin typeface="+mj-lt"/>
+                <a:ea typeface="+mj-ea"/>
+                <a:cs typeface="+mj-cs"/>
+              </a:rPr>
+              <a:t> </a:t>
+            </a:r>
+            <a:r>
+              <a:rPr lang="en-US" err="1">
+                <a:solidFill>
+                  <a:schemeClr val="tx2"/>
+                </a:solidFill>
+                <a:latin typeface="+mj-lt"/>
+                <a:ea typeface="+mj-ea"/>
+                <a:cs typeface="+mj-cs"/>
+              </a:rPr>
+              <a:t>Công</a:t>
+            </a:r>
+            <a:r>
+              <a:rPr lang="en-US">
+                <a:solidFill>
+                  <a:schemeClr val="tx2"/>
+                </a:solidFill>
+                <a:latin typeface="+mj-lt"/>
+                <a:ea typeface="+mj-ea"/>
+                <a:cs typeface="+mj-cs"/>
+              </a:rPr>
+              <a:t> </a:t>
+            </a:r>
+            <a:r>
+              <a:rPr lang="en-US" err="1">
+                <a:solidFill>
+                  <a:schemeClr val="tx2"/>
+                </a:solidFill>
+                <a:latin typeface="+mj-lt"/>
+                <a:ea typeface="+mj-ea"/>
+                <a:cs typeface="+mj-cs"/>
+              </a:rPr>
+              <a:t>Nghệ</a:t>
+            </a:r>
+            <a:r>
+              <a:rPr lang="en-US">
+                <a:solidFill>
+                  <a:schemeClr val="tx2"/>
+                </a:solidFill>
+                <a:latin typeface="+mj-lt"/>
+                <a:ea typeface="+mj-ea"/>
+                <a:cs typeface="+mj-cs"/>
+              </a:rPr>
+              <a:t> </a:t>
+            </a:r>
+            <a:r>
+              <a:rPr lang="en-US" err="1">
+                <a:solidFill>
+                  <a:schemeClr val="tx2"/>
+                </a:solidFill>
+                <a:latin typeface="+mj-lt"/>
+                <a:ea typeface="+mj-ea"/>
+                <a:cs typeface="+mj-cs"/>
+              </a:rPr>
+              <a:t>Thông</a:t>
+            </a:r>
+            <a:r>
+              <a:rPr lang="en-US">
+                <a:solidFill>
+                  <a:schemeClr val="tx2"/>
+                </a:solidFill>
+                <a:latin typeface="+mj-lt"/>
+                <a:ea typeface="+mj-ea"/>
+                <a:cs typeface="+mj-cs"/>
+              </a:rPr>
+              <a:t> Tin</a:t>
+            </a:r>
+          </a:p>
+          <a:p>
+            <a:pPr algn="ctr"/>
+            <a:r>
+              <a:rPr lang="en-US" err="1">
+                <a:solidFill>
+                  <a:schemeClr val="tx2"/>
+                </a:solidFill>
+                <a:latin typeface="+mj-lt"/>
+                <a:ea typeface="+mj-ea"/>
+                <a:cs typeface="+mj-cs"/>
+              </a:rPr>
+              <a:t>Khoa</a:t>
+            </a:r>
+            <a:r>
+              <a:rPr lang="en-US">
+                <a:solidFill>
+                  <a:schemeClr val="tx2"/>
+                </a:solidFill>
+                <a:latin typeface="+mj-lt"/>
+                <a:ea typeface="+mj-ea"/>
+                <a:cs typeface="+mj-cs"/>
+              </a:rPr>
+              <a:t> </a:t>
+            </a:r>
+            <a:r>
+              <a:rPr lang="en-US" err="1">
+                <a:solidFill>
+                  <a:schemeClr val="tx2"/>
+                </a:solidFill>
+                <a:latin typeface="+mj-lt"/>
+                <a:ea typeface="+mj-ea"/>
+                <a:cs typeface="+mj-cs"/>
+              </a:rPr>
+              <a:t>Kỹ</a:t>
+            </a:r>
+            <a:r>
+              <a:rPr lang="en-US">
+                <a:solidFill>
+                  <a:schemeClr val="tx2"/>
+                </a:solidFill>
+                <a:latin typeface="+mj-lt"/>
+                <a:ea typeface="+mj-ea"/>
+                <a:cs typeface="+mj-cs"/>
+              </a:rPr>
+              <a:t> </a:t>
+            </a:r>
+            <a:r>
+              <a:rPr lang="en-US" err="1">
+                <a:solidFill>
+                  <a:schemeClr val="tx2"/>
+                </a:solidFill>
+                <a:latin typeface="+mj-lt"/>
+                <a:ea typeface="+mj-ea"/>
+                <a:cs typeface="+mj-cs"/>
+              </a:rPr>
+              <a:t>Thuật</a:t>
+            </a:r>
+            <a:r>
+              <a:rPr lang="en-US">
+                <a:solidFill>
+                  <a:schemeClr val="tx2"/>
+                </a:solidFill>
+                <a:latin typeface="+mj-lt"/>
+                <a:ea typeface="+mj-ea"/>
+                <a:cs typeface="+mj-cs"/>
+              </a:rPr>
+              <a:t> </a:t>
+            </a:r>
+            <a:r>
+              <a:rPr lang="en-US" err="1">
+                <a:solidFill>
+                  <a:schemeClr val="tx2"/>
+                </a:solidFill>
+                <a:latin typeface="+mj-lt"/>
+                <a:ea typeface="+mj-ea"/>
+                <a:cs typeface="+mj-cs"/>
+              </a:rPr>
+              <a:t>Phần</a:t>
+            </a:r>
+            <a:r>
+              <a:rPr lang="en-US">
+                <a:solidFill>
+                  <a:schemeClr val="tx2"/>
+                </a:solidFill>
+                <a:latin typeface="+mj-lt"/>
+                <a:ea typeface="+mj-ea"/>
+                <a:cs typeface="+mj-cs"/>
+              </a:rPr>
+              <a:t> </a:t>
+            </a:r>
+            <a:r>
+              <a:rPr lang="en-US" err="1">
+                <a:solidFill>
+                  <a:schemeClr val="tx2"/>
+                </a:solidFill>
+                <a:latin typeface="+mj-lt"/>
+                <a:ea typeface="+mj-ea"/>
+                <a:cs typeface="+mj-cs"/>
+              </a:rPr>
+              <a:t>Mềm</a:t>
+            </a:r>
+            <a:endParaRPr lang="en-US">
+              <a:solidFill>
+                <a:schemeClr val="tx2"/>
+              </a:solidFill>
+              <a:latin typeface="+mj-lt"/>
+              <a:ea typeface="+mj-ea"/>
+              <a:cs typeface="+mj-cs"/>
+            </a:endParaRPr>
+          </a:p>
+        </p:txBody>
+      </p:sp>
+      <p:sp>
+        <p:nvSpPr>
           <p:cNvPr id="2" name="Title 1"/>
           <p:cNvSpPr>
             <a:spLocks noGrp="1"/>
@@ -9238,9 +9506,10 @@
           <a:lstStyle/>
           <a:p>
             <a:r>
-              <a:rPr lang="en-US"/>
-              <a:t>Nhóm sv:</a:t>
-            </a:r>
+              <a:rPr lang="en-US" smtClean="0"/>
+              <a:t>Nhóm 12:</a:t>
+            </a:r>
+            <a:endParaRPr lang="en-US"/>
           </a:p>
           <a:p>
             <a:r>
@@ -9284,6 +9553,13 @@
       </p:transition>
     </mc:Fallback>
   </mc:AlternateContent>
+  <p:timing>
+    <p:tnLst>
+      <p:par>
+        <p:cTn id="1" dur="indefinite" restart="never" nodeType="tmRoot"/>
+      </p:par>
+    </p:tnLst>
+  </p:timing>
 </p:sld>
 </file>
 
@@ -9342,47 +9618,47 @@
           <a:lstStyle/>
           <a:p>
             <a:r>
-              <a:rPr lang="en-US" dirty="0"/>
+              <a:rPr lang="en-US"/>
               <a:t>Khi nào bắt đầu?</a:t>
             </a:r>
           </a:p>
           <a:p>
             <a:pPr lvl="1"/>
             <a:r>
-              <a:rPr lang="en-US" dirty="0"/>
+              <a:rPr lang="en-US"/>
               <a:t>Theo lý thuyết, R.E bắt đầu với hoạt động nghiên cứu tính khả thi (feasibility study) để sinh ra tài liệu về tính khả thi của dự án (feasibility report).</a:t>
             </a:r>
           </a:p>
           <a:p>
             <a:pPr lvl="1"/>
             <a:r>
-              <a:rPr lang="en-US" dirty="0"/>
+              <a:rPr lang="en-US"/>
               <a:t>Đôi khi nghiên cứu tính khả thi sẽ dẫn đến quyết định không tiếp tục phát triển sản phẩm đó nữa.</a:t>
             </a:r>
           </a:p>
           <a:p>
             <a:pPr lvl="1"/>
             <a:r>
-              <a:rPr lang="en-US" dirty="0"/>
+              <a:rPr lang="en-US"/>
               <a:t>Nếu nghiên cứu tính khả thi đề nghị tiếp tục phát triển sản phẩm thì giai đoạn phân tích yêu cầu sẽ được tiến hành.</a:t>
             </a:r>
           </a:p>
           <a:p>
             <a:r>
-              <a:rPr lang="en-US" dirty="0"/>
+              <a:rPr lang="en-US"/>
               <a:t>Sản phẩm cuối cùng:</a:t>
             </a:r>
           </a:p>
           <a:p>
             <a:pPr lvl="1"/>
             <a:r>
-              <a:rPr lang="en-US" dirty="0"/>
+              <a:rPr lang="en-US"/>
               <a:t>Tài liệu đặc tả yêu cầu phần mềm – SRS.</a:t>
             </a:r>
             <a:br>
-              <a:rPr lang="en-US" dirty="0"/>
+              <a:rPr lang="en-US"/>
             </a:br>
-            <a:endParaRPr lang="en-US" dirty="0"/>
+            <a:endParaRPr lang="en-US"/>
           </a:p>
         </p:txBody>
       </p:sp>
@@ -9466,25 +9742,25 @@
           <a:lstStyle/>
           <a:p>
             <a:r>
-              <a:rPr lang="en-US" dirty="0"/>
+              <a:rPr lang="en-US"/>
               <a:t>SRS cho phép chúng ta biết được động lực cho việc phát triển hệ thống phần mềm</a:t>
             </a:r>
           </a:p>
           <a:p>
             <a:r>
-              <a:rPr lang="en-US" dirty="0"/>
+              <a:rPr lang="en-US"/>
               <a:t>Các yêu cầu phần mềm giúp các kỹ sư quản lý sự phát triển của phần mềm qua thời gian.</a:t>
             </a:r>
           </a:p>
           <a:p>
             <a:r>
-              <a:rPr lang="en-US" dirty="0"/>
+              <a:rPr lang="en-US"/>
               <a:t>Cách tiếp cận này phản ánh thực tế của một thế giới luôn thay đổi và nhu cầu sử dụng lại một phần đặc tả.</a:t>
             </a:r>
             <a:br>
-              <a:rPr lang="en-US" dirty="0"/>
+              <a:rPr lang="en-US"/>
             </a:br>
-            <a:endParaRPr lang="en-US" dirty="0"/>
+            <a:endParaRPr lang="en-US"/>
           </a:p>
         </p:txBody>
       </p:sp>
@@ -10787,7 +11063,20 @@
           <a:lstStyle/>
           <a:p>
             <a:r>
-              <a:rPr lang="en-US" dirty="0"/>
+              <a:rPr lang="en-US"/>
+              <a:t>Định nghĩa:</a:t>
+            </a:r>
+          </a:p>
+          <a:p>
+            <a:pPr lvl="1"/>
+            <a:r>
+              <a:rPr lang="en-US"/>
+              <a:t>Là các công việc liên quan đến việc làm việc với khách hàng để xác định lĩnh vực ứng dụng, các dịch vụ mà hệ thống cần cung cấp cũng như các ràng buộc của hệ thống.</a:t>
+            </a:r>
+          </a:p>
+          <a:p>
+            <a:r>
+              <a:rPr lang="en-US"/>
               <a:t>Vấn đề:</a:t>
             </a:r>
           </a:p>
@@ -10798,7 +11087,7 @@
               </a:spcAft>
             </a:pPr>
             <a:r>
-              <a:rPr lang="en-US" dirty="0"/>
+              <a:rPr lang="en-US"/>
               <a:t>Không phải lúc nào khách hàng cũng hiểu rõ cái mà họ cần, hoặc các yêu cầu thường không rõ ràng, hoặc các bên liên quan (stackholder)  diễn tả không chính xác.</a:t>
             </a:r>
           </a:p>
@@ -10814,7 +11103,7 @@
               <a:defRPr/>
             </a:pPr>
             <a:r>
-              <a:rPr lang="en-US" dirty="0"/>
+              <a:rPr lang="en-US"/>
               <a:t>Giải pháp :</a:t>
             </a:r>
           </a:p>
@@ -10830,7 +11119,7 @@
               <a:defRPr/>
             </a:pPr>
             <a:r>
-              <a:rPr lang="en-US" dirty="0"/>
+              <a:rPr lang="en-US"/>
               <a:t>Các kỹ sư cần phải cảm nhận được yêu cầu của khách hàng và nhắc nhở họ.</a:t>
             </a:r>
           </a:p>
@@ -10846,69 +11135,52 @@
               <a:defRPr/>
             </a:pPr>
             <a:r>
-              <a:rPr lang="en-US" dirty="0"/>
+              <a:rPr lang="en-US"/>
               <a:t>Giao tiếp với khách hàng để tìm ra các yêu cầu của họ là gì.</a:t>
             </a:r>
           </a:p>
           <a:p>
             <a:r>
-              <a:rPr lang="en-US" dirty="0"/>
-              <a:t>Định nghĩa:</a:t>
+              <a:rPr lang="en-US"/>
+              <a:t>Những nhân tố tham gia: </a:t>
             </a:r>
           </a:p>
           <a:p>
             <a:pPr lvl="1"/>
             <a:r>
-              <a:rPr lang="en-US" dirty="0"/>
-              <a:t>Là các công việc liên quan đến việc làm việc với khách hang để xác định lĩnh vực ứng dụng, các dịch vụ mà hệ thống cần cung cấp cũng như các ràng buộc của hệ thống.</a:t>
-            </a:r>
-          </a:p>
-          <a:p>
-            <a:r>
-              <a:rPr lang="en-US" dirty="0"/>
-              <a:t>Những nhân tố tham gia: </a:t>
+              <a:rPr lang="en-US"/>
+              <a:t>Các bên liên quan (Stakeholder): người dùng cuối, quản lý, các kỹ sư, chuyên gia ngành, …</a:t>
+            </a:r>
+          </a:p>
+          <a:p>
+            <a:r>
+              <a:rPr lang="en-US"/>
+              <a:t>Các cách tiếp cận:</a:t>
             </a:r>
           </a:p>
           <a:p>
             <a:pPr lvl="1"/>
             <a:r>
-              <a:rPr lang="en-US" dirty="0"/>
-              <a:t>Các bên liên quan (Stakeholder): người dùng cuối, quản lý, các kỹ sư, chuyên gia ngành, …</a:t>
-            </a:r>
-          </a:p>
-          <a:p>
-            <a:r>
-              <a:rPr lang="en-US" dirty="0"/>
-              <a:t>Các cách tiếp cận:</a:t>
+              <a:rPr lang="en-US"/>
+              <a:t>Thiết kế ứng dụng chung (Joint Application Design – JAD)</a:t>
             </a:r>
           </a:p>
           <a:p>
             <a:pPr lvl="1"/>
             <a:r>
-              <a:rPr lang="en-US" dirty="0"/>
-              <a:t>Joint Application Design – JAD</a:t>
+              <a:rPr lang="en-US"/>
+              <a:t>Triển khai chức năng chất lượng (Quality Function Deployment – QFD)</a:t>
             </a:r>
           </a:p>
           <a:p>
             <a:pPr lvl="1"/>
             <a:r>
-              <a:rPr lang="en-US" dirty="0"/>
-              <a:t>Quality Function Deployment - QFD</a:t>
-            </a:r>
-          </a:p>
-          <a:p>
-            <a:pPr lvl="1"/>
-            <a:r>
-              <a:rPr lang="en-US" dirty="0"/>
-              <a:t>Desginer as apprentice – Thiết kế như người học việc</a:t>
-            </a:r>
-            <a:br>
-              <a:rPr lang="en-US" dirty="0"/>
-            </a:br>
-            <a:endParaRPr lang="en-US" dirty="0"/>
-          </a:p>
-          <a:p>
-            <a:endParaRPr lang="en-US" dirty="0"/>
+              <a:rPr lang="en-US"/>
+              <a:t>Thiết kế như người học việc (Desginer as apprentice)</a:t>
+            </a:r>
+          </a:p>
+          <a:p>
+            <a:endParaRPr lang="en-US"/>
           </a:p>
         </p:txBody>
       </p:sp>
@@ -10970,7 +11242,7 @@
           <a:lstStyle/>
           <a:p>
             <a:r>
-              <a:rPr lang="en-US" b="1" dirty="0"/>
+              <a:rPr lang="en-US" b="1"/>
               <a:t>Thiết kế ứng dụng chung (Joint Application Design)</a:t>
             </a:r>
           </a:p>
@@ -10999,81 +11271,81 @@
           <a:lstStyle/>
           <a:p>
             <a:r>
-              <a:rPr lang="en-US" dirty="0"/>
+              <a:rPr lang="en-US"/>
               <a:t>Được đánh giá cao trong việc tổ chức và thực hiện các cuộc họp nhằm lấy yêu cầu hệ thống</a:t>
             </a:r>
           </a:p>
           <a:p>
             <a:r>
-              <a:rPr lang="en-US" dirty="0"/>
+              <a:rPr lang="en-US"/>
               <a:t>Mỗi cuộc họp có sự tham gia của: người dùng hệ thống, người sử hữu hệ thống và các phân tích viên</a:t>
             </a:r>
           </a:p>
           <a:p>
             <a:r>
-              <a:rPr lang="en-US" dirty="0"/>
+              <a:rPr lang="en-US"/>
               <a:t>Giúp các kỹ sư phần mềm trong việc:</a:t>
             </a:r>
           </a:p>
           <a:p>
             <a:pPr lvl="1"/>
             <a:r>
-              <a:rPr lang="en-US" dirty="0"/>
+              <a:rPr lang="en-US"/>
               <a:t>Tìm ra các yêu cầu cho việc đặc tả yêu cầu phần mềm</a:t>
             </a:r>
           </a:p>
           <a:p>
             <a:pPr lvl="1"/>
             <a:r>
-              <a:rPr lang="en-US" dirty="0"/>
+              <a:rPr lang="en-US"/>
               <a:t>Thiết kế và mô tả thiết kế hệ thống</a:t>
             </a:r>
           </a:p>
           <a:p>
             <a:pPr lvl="1"/>
             <a:r>
-              <a:rPr lang="en-US" dirty="0"/>
+              <a:rPr lang="en-US"/>
               <a:t>Code</a:t>
             </a:r>
           </a:p>
           <a:p>
             <a:pPr lvl="1"/>
             <a:r>
-              <a:rPr lang="en-US" dirty="0"/>
+              <a:rPr lang="en-US"/>
               <a:t>Kiểm thử</a:t>
             </a:r>
           </a:p>
           <a:p>
             <a:pPr lvl="1"/>
             <a:r>
-              <a:rPr lang="en-US" dirty="0"/>
+              <a:rPr lang="en-US"/>
               <a:t>Tài liệu hướng dẫn người dùng</a:t>
             </a:r>
           </a:p>
           <a:p>
             <a:r>
-              <a:rPr lang="en-US" dirty="0"/>
+              <a:rPr lang="en-US"/>
               <a:t>Quy trình thực hiện JAD</a:t>
             </a:r>
           </a:p>
           <a:p>
             <a:pPr lvl="1"/>
             <a:r>
-              <a:rPr lang="en-US" dirty="0"/>
+              <a:rPr lang="en-US"/>
               <a:t>Chọn người tham gia</a:t>
             </a:r>
           </a:p>
           <a:p>
             <a:pPr lvl="1"/>
             <a:r>
-              <a:rPr lang="en-US" dirty="0"/>
+              <a:rPr lang="en-US"/>
               <a:t>Chuẩn bị tài liệu (agenda)</a:t>
             </a:r>
           </a:p>
           <a:p>
             <a:pPr lvl="1"/>
             <a:r>
-              <a:rPr lang="en-US" dirty="0"/>
+              <a:rPr lang="en-US"/>
               <a:t>Chọn địa điểm</a:t>
             </a:r>
           </a:p>
@@ -11137,7 +11409,7 @@
           <a:lstStyle/>
           <a:p>
             <a:r>
-              <a:rPr lang="en-US" b="1" dirty="0"/>
+              <a:rPr lang="en-US" b="1"/>
               <a:t>Triển khai chức năng chất lượng (Quality Function Deployment)</a:t>
             </a:r>
           </a:p>
@@ -11166,37 +11438,37 @@
           <a:lstStyle/>
           <a:p>
             <a:r>
-              <a:rPr lang="en-US" dirty="0"/>
+              <a:rPr lang="en-US"/>
               <a:t>Được giới thiệu vào năm 1966 bởi Yoji Akao sử dụng trong sản xuất, công nghiệp nặng và hệ thống kỹ thuật</a:t>
             </a:r>
           </a:p>
           <a:p>
             <a:r>
-              <a:rPr lang="en-US" dirty="0"/>
+              <a:rPr lang="en-US"/>
               <a:t>Là kỹ thuật để xác định yêu cầu của khách hàng và xác định được các điểm mà chất lượng sản phẩm được đảm bảo trong toàn bộ quá trình phát triển</a:t>
             </a:r>
           </a:p>
           <a:p>
             <a:r>
-              <a:rPr lang="en-US" dirty="0"/>
+              <a:rPr lang="en-US"/>
               <a:t>Cung cấp cấu trúc cho việc lắng nghe cái khách hàng muốn và cần. Sau đó chuyển chúng (tiếng nói của khách hàng) thành tài liệu kỹ thuật</a:t>
             </a:r>
           </a:p>
           <a:p>
             <a:r>
-              <a:rPr lang="en-US" dirty="0"/>
+              <a:rPr lang="en-US"/>
               <a:t>Giúp cải thiện việc tham gia của người dùng và người quản lý</a:t>
             </a:r>
           </a:p>
           <a:p>
             <a:r>
-              <a:rPr lang="en-US" dirty="0"/>
+              <a:rPr lang="en-US"/>
               <a:t>Rút ngắn vòng đời phát triển sản phẩm</a:t>
             </a:r>
           </a:p>
           <a:p>
             <a:r>
-              <a:rPr lang="en-US" dirty="0"/>
+              <a:rPr lang="en-US"/>
               <a:t>Cung cấp công cụ dự phòng trong việc tránh mất mát thông tin trong mỗi giai đoạn phát triển sản phẩm</a:t>
             </a:r>
           </a:p>
@@ -11265,7 +11537,7 @@
           <a:lstStyle/>
           <a:p>
             <a:r>
-              <a:rPr lang="en-US" b="1" dirty="0"/>
+              <a:rPr lang="en-US" b="1"/>
               <a:t>Thiết kế như người học việc (Designer as apprentice)</a:t>
             </a:r>
           </a:p>
@@ -11294,61 +11566,61 @@
           <a:lstStyle/>
           <a:p>
             <a:r>
-              <a:rPr lang="en-US" dirty="0"/>
+              <a:rPr lang="en-US"/>
               <a:t>Người thiết kế phải học tất cả các công việc của khách hàng đã, đang và sẽ làm</a:t>
             </a:r>
           </a:p>
           <a:p>
             <a:r>
-              <a:rPr lang="en-US" dirty="0"/>
+              <a:rPr lang="en-US"/>
               <a:t>Khó khăn:</a:t>
             </a:r>
           </a:p>
           <a:p>
             <a:pPr lvl="1"/>
             <a:r>
-              <a:rPr lang="en-US" dirty="0"/>
+              <a:rPr lang="en-US"/>
               <a:t>Không phải khách hàng nào cũng có khả năng truyền đạt toàn bộ những gì họ hiểu hoặc hoàn toàn không hiểu những gì họ làm</a:t>
             </a:r>
           </a:p>
           <a:p>
             <a:pPr lvl="1"/>
             <a:r>
-              <a:rPr lang="en-US" dirty="0"/>
+              <a:rPr lang="en-US"/>
               <a:t>Cần sự hợp tác chặc chẽ của khách hàng</a:t>
             </a:r>
           </a:p>
           <a:p>
             <a:r>
-              <a:rPr lang="en-US" dirty="0"/>
+              <a:rPr lang="en-US"/>
               <a:t>Thuận lợi:</a:t>
             </a:r>
           </a:p>
           <a:p>
             <a:pPr lvl="1"/>
             <a:r>
-              <a:rPr lang="en-US" dirty="0"/>
+              <a:rPr lang="en-US"/>
               <a:t>Người phân tích sẽ hiểu sâu hơn về cái mình sẽ làm</a:t>
             </a:r>
           </a:p>
           <a:p>
             <a:pPr lvl="1"/>
             <a:r>
-              <a:rPr lang="en-US" dirty="0"/>
+              <a:rPr lang="en-US"/>
               <a:t>Tích lũy kinh nghiệm, học hỏi cái mới</a:t>
             </a:r>
           </a:p>
           <a:p>
             <a:pPr lvl="1"/>
             <a:r>
-              <a:rPr lang="en-US" dirty="0"/>
+              <a:rPr lang="en-US"/>
               <a:t>Khách hàng nhận được sản phẩm sát với yêu cầu nhất</a:t>
             </a:r>
           </a:p>
           <a:p>
             <a:pPr lvl="1"/>
             <a:r>
-              <a:rPr lang="en-US" dirty="0"/>
+              <a:rPr lang="en-US"/>
               <a:t>Rút ngắn thời gian phát triển sản phẩm</a:t>
             </a:r>
           </a:p>
@@ -11376,6 +11648,13 @@
       </p:transition>
     </mc:Fallback>
   </mc:AlternateContent>
+  <p:timing>
+    <p:tnLst>
+      <p:par>
+        <p:cTn id="1" dur="indefinite" restart="never" nodeType="tmRoot"/>
+      </p:par>
+    </p:tnLst>
+  </p:timing>
 </p:sld>
 </file>
 
@@ -11434,25 +11713,25 @@
           <a:lstStyle/>
           <a:p>
             <a:r>
-              <a:rPr lang="en-US" dirty="0"/>
+              <a:rPr lang="en-US"/>
               <a:t>Tìm hiểu xem liệu các yêu cầu được thu thập được có rõ ràng, minh bạch, hoàn chỉnh, v.v… hay không. Sau đó giải quyết các vấn đề trên bằng cách làm việc với khách hàng.</a:t>
             </a:r>
           </a:p>
           <a:p>
             <a:r>
-              <a:rPr lang="en-US" dirty="0"/>
+              <a:rPr lang="en-US"/>
               <a:t>Xác định các nhu cầu/điều kiện đã có để quyết định xem nên làm một sản phẩm mới hay chỉnh sửa một sản phẩm có sẵn.</a:t>
             </a:r>
           </a:p>
           <a:p>
             <a:r>
-              <a:rPr lang="en-US" dirty="0"/>
+              <a:rPr lang="en-US"/>
               <a:t>Các yêu cầu cần đáp ứng các tiêu chí: có thể tiến hành,  có thể đo lường được, có thể kiểm tra được, liên quan đến các nhu cầu kinh doanh, và được định nghĩa ở mức độ chi tiết đủ để thiết kế hệ thống</a:t>
             </a:r>
           </a:p>
           <a:p>
             <a:r>
-              <a:rPr lang="en-US" dirty="0"/>
+              <a:rPr lang="en-US"/>
               <a:t>Yêu cầu sau khi phân tích bao gồm 2 loại: chức năng và phi chức năng</a:t>
             </a:r>
           </a:p>
@@ -11480,6 +11759,13 @@
       </p:transition>
     </mc:Fallback>
   </mc:AlternateContent>
+  <p:timing>
+    <p:tnLst>
+      <p:par>
+        <p:cTn id="1" dur="indefinite" restart="never" nodeType="tmRoot"/>
+      </p:par>
+    </p:tnLst>
+  </p:timing>
 </p:sld>
 </file>
 
@@ -11722,7 +12008,7 @@
             <a:pPr lvl="1"/>
             <a:r>
               <a:rPr lang="en-US"/>
-              <a:t>Khách hang: cho biết làm thế nào để thỏa mãn yêu cầu của họ; tiếp tục quá trình này trong suốt quá trình sản xuất.</a:t>
+              <a:t>Khách hàng: cho biết làm thế nào để thỏa mãn yêu cầu của họ; tiếp tục quá trình này trong suốt quá trình sản xuất.</a:t>
             </a:r>
           </a:p>
           <a:p>
@@ -11840,41 +12126,41 @@
           </a:bodyPr>
           <a:lstStyle/>
           <a:p>
-            <a:endParaRPr lang="en-US" dirty="0"/>
-          </a:p>
-          <a:p>
-            <a:r>
-              <a:rPr lang="en-US" sz="2000" dirty="0"/>
+            <a:endParaRPr lang="en-US"/>
+          </a:p>
+          <a:p>
+            <a:r>
+              <a:rPr lang="en-US" sz="2000"/>
               <a:t>Tổng quan về Công nghệ Phần mềm</a:t>
             </a:r>
           </a:p>
           <a:p>
             <a:r>
-              <a:rPr lang="en-US" sz="2000" dirty="0"/>
-              <a:t>Requirement Engineering</a:t>
-            </a:r>
-          </a:p>
-          <a:p>
-            <a:r>
-              <a:rPr lang="en-US" sz="2000" dirty="0"/>
+              <a:rPr lang="en-US" sz="2000"/>
+              <a:t>Kỹ thuật yêu cầu (Requirement Engineering)</a:t>
+            </a:r>
+          </a:p>
+          <a:p>
+            <a:r>
+              <a:rPr lang="en-US" sz="2000"/>
               <a:t>Đặc tả Yêu cầu Phần mềm - SRS</a:t>
             </a:r>
           </a:p>
           <a:p>
             <a:r>
-              <a:rPr lang="en-US" sz="2000" dirty="0"/>
+              <a:rPr lang="en-US" sz="2000"/>
               <a:t>Các phương pháp đặc tả yêu cầu thường dùng</a:t>
             </a:r>
           </a:p>
           <a:p>
             <a:r>
-              <a:rPr lang="en-US" sz="2000" dirty="0"/>
+              <a:rPr lang="en-US" sz="2000"/>
               <a:t>Các tài liệu SRS trong thực tế</a:t>
             </a:r>
           </a:p>
           <a:p>
             <a:r>
-              <a:rPr lang="en-US" sz="2000" dirty="0"/>
+              <a:rPr lang="en-US" sz="2000"/>
               <a:t>Tài liệu tham khảo</a:t>
             </a:r>
           </a:p>
@@ -11883,13 +12169,12 @@
               <a:rPr lang="en-US" sz="2000"/>
               <a:t>Câu hỏi </a:t>
             </a:r>
-            <a:endParaRPr lang="en-US" sz="2000" dirty="0"/>
           </a:p>
           <a:p>
             <a:pPr marL="0" indent="0">
               <a:buNone/>
             </a:pPr>
-            <a:endParaRPr lang="en-US" dirty="0"/>
+            <a:endParaRPr lang="en-US"/>
           </a:p>
         </p:txBody>
       </p:sp>
@@ -11915,6 +12200,13 @@
       </p:transition>
     </mc:Fallback>
   </mc:AlternateContent>
+  <p:timing>
+    <p:tnLst>
+      <p:par>
+        <p:cTn id="1" dur="indefinite" restart="never" nodeType="tmRoot"/>
+      </p:par>
+    </p:tnLst>
+  </p:timing>
 </p:sld>
 </file>
 
@@ -12063,6 +12355,13 @@
       </p:transition>
     </mc:Fallback>
   </mc:AlternateContent>
+  <p:timing>
+    <p:tnLst>
+      <p:par>
+        <p:cTn id="1" dur="indefinite" restart="never" nodeType="tmRoot"/>
+      </p:par>
+    </p:tnLst>
+  </p:timing>
 </p:sld>
 </file>
 
@@ -12464,105 +12763,105 @@
           <a:lstStyle/>
           <a:p>
             <a:r>
-              <a:rPr lang="en-US" altLang="en-US" dirty="0"/>
+              <a:rPr lang="en-US" altLang="en-US"/>
               <a:t>Theo tiêu chuẩn </a:t>
             </a:r>
             <a:r>
-              <a:rPr lang="en-US" dirty="0"/>
+              <a:rPr lang="en-US"/>
               <a:t>IEEE 830, một tài liệu SRS cần đảm bảo các yêu cầu:</a:t>
             </a:r>
-            <a:endParaRPr lang="en-US" altLang="en-US" dirty="0"/>
+            <a:endParaRPr lang="en-US" altLang="en-US"/>
           </a:p>
           <a:p>
             <a:pPr lvl="1"/>
             <a:r>
-              <a:rPr lang="en-US" altLang="en-US" u="sng" dirty="0"/>
+              <a:rPr lang="en-US" altLang="en-US" u="sng"/>
               <a:t>Correct</a:t>
             </a:r>
             <a:r>
-              <a:rPr lang="en-US" altLang="en-US" dirty="0"/>
+              <a:rPr lang="en-US" altLang="en-US"/>
               <a:t> – Chính xác</a:t>
             </a:r>
           </a:p>
           <a:p>
             <a:pPr lvl="1"/>
             <a:r>
-              <a:rPr lang="en-US" altLang="en-US" u="sng" dirty="0"/>
+              <a:rPr lang="en-US" altLang="en-US" u="sng"/>
               <a:t>Complete</a:t>
             </a:r>
             <a:r>
-              <a:rPr lang="en-US" altLang="en-US" dirty="0"/>
+              <a:rPr lang="en-US" altLang="en-US"/>
               <a:t> – Hoàn thiện</a:t>
             </a:r>
           </a:p>
           <a:p>
             <a:pPr lvl="1"/>
             <a:r>
-              <a:rPr lang="en-US" altLang="en-US" u="sng" dirty="0"/>
+              <a:rPr lang="en-US" altLang="en-US" u="sng"/>
               <a:t>Unambiguous</a:t>
             </a:r>
             <a:r>
-              <a:rPr lang="en-US" altLang="en-US" dirty="0"/>
+              <a:rPr lang="en-US" altLang="en-US"/>
               <a:t> – Rõ  ràng</a:t>
             </a:r>
           </a:p>
           <a:p>
             <a:pPr lvl="1"/>
             <a:r>
-              <a:rPr lang="en-US" altLang="en-US" u="sng" dirty="0"/>
+              <a:rPr lang="en-US" altLang="en-US" u="sng"/>
               <a:t>Consistent</a:t>
             </a:r>
             <a:r>
-              <a:rPr lang="en-US" altLang="en-US" dirty="0"/>
+              <a:rPr lang="en-US" altLang="en-US"/>
               <a:t> – Chặt chẽ</a:t>
             </a:r>
           </a:p>
           <a:p>
             <a:pPr lvl="1"/>
             <a:r>
-              <a:rPr lang="en-US" altLang="en-US" u="sng" dirty="0"/>
+              <a:rPr lang="en-US" altLang="en-US" u="sng"/>
               <a:t>Verifiable</a:t>
             </a:r>
             <a:r>
-              <a:rPr lang="en-US" altLang="en-US" dirty="0"/>
+              <a:rPr lang="en-US" altLang="en-US"/>
               <a:t> – Có thể kiểm chứng</a:t>
             </a:r>
           </a:p>
           <a:p>
             <a:pPr lvl="1"/>
             <a:r>
-              <a:rPr lang="en-US" altLang="en-US" u="sng" dirty="0"/>
+              <a:rPr lang="en-US" altLang="en-US" u="sng"/>
               <a:t>Traceable</a:t>
             </a:r>
             <a:r>
-              <a:rPr lang="en-US" altLang="en-US" dirty="0"/>
+              <a:rPr lang="en-US" altLang="en-US"/>
               <a:t> – Có thể theo dõi </a:t>
             </a:r>
           </a:p>
           <a:p>
             <a:pPr lvl="1"/>
             <a:r>
-              <a:rPr lang="en-US" altLang="en-US" u="sng" dirty="0"/>
+              <a:rPr lang="en-US" altLang="en-US" u="sng"/>
               <a:t>Modifiable</a:t>
             </a:r>
             <a:r>
-              <a:rPr lang="en-US" altLang="en-US" dirty="0"/>
+              <a:rPr lang="en-US" altLang="en-US"/>
               <a:t> – Có thể sửa đổi</a:t>
             </a:r>
           </a:p>
           <a:p>
             <a:pPr lvl="1"/>
             <a:r>
-              <a:rPr lang="en-US" altLang="en-US" u="sng" dirty="0"/>
+              <a:rPr lang="en-US" altLang="en-US" u="sng"/>
               <a:t>Ranked for importance and/or stability</a:t>
             </a:r>
             <a:r>
-              <a:rPr lang="en-US" altLang="en-US" dirty="0"/>
+              <a:rPr lang="en-US" altLang="en-US"/>
               <a:t> – Phân loại theo độ quan trọng/tính ổn định.</a:t>
             </a:r>
           </a:p>
           <a:p>
-            <a:endParaRPr lang="en-US" dirty="0"/>
+            <a:endParaRPr lang="en-US"/>
           </a:p>
         </p:txBody>
       </p:sp>
@@ -12654,35 +12953,35 @@
           <a:p>
             <a:pPr lvl="0"/>
             <a:r>
-              <a:rPr lang="en-US" dirty="0"/>
+              <a:rPr lang="en-US"/>
               <a:t>Đặc điểm: </a:t>
             </a:r>
           </a:p>
           <a:p>
             <a:pPr marL="742950" lvl="1" indent="-285750"/>
             <a:r>
-              <a:rPr lang="en-US" dirty="0"/>
+              <a:rPr lang="en-US"/>
               <a:t>Các hoạt động này không phải tuyến tính, chúng lặp đi lặp lại và song song với nhau</a:t>
             </a:r>
           </a:p>
           <a:p>
             <a:pPr marL="742950" lvl="1" indent="-285750"/>
             <a:r>
-              <a:rPr lang="en-US" dirty="0"/>
+              <a:rPr lang="en-US"/>
               <a:t>Trong quá trình đặc tả một yêu cầu cũng có thể giúp ta phân tích được yêu cầu đó.</a:t>
             </a:r>
           </a:p>
           <a:p>
             <a:pPr marL="742950" lvl="1" indent="-285750"/>
             <a:r>
-              <a:rPr lang="en-US" dirty="0"/>
+              <a:rPr lang="en-US"/>
               <a:t>Thẩm định có thể cho thấy điểm không hợp lý trong quá trình đặc tả, có thể dẫn tới quá trình phân tích sâu hơn.</a:t>
             </a:r>
           </a:p>
           <a:p>
             <a:pPr marL="742950" lvl="1" indent="-285750"/>
             <a:r>
-              <a:rPr lang="en-US" altLang="en-US" dirty="0"/>
+              <a:rPr lang="en-US" altLang="en-US"/>
               <a:t>“Chia để trị” là chiến lược cơ bản</a:t>
             </a:r>
           </a:p>
@@ -12691,14 +12990,14 @@
               <a:buNone/>
             </a:pPr>
             <a:r>
-              <a:rPr lang="en-US" altLang="en-US" dirty="0"/>
+              <a:rPr lang="en-US" altLang="en-US"/>
               <a:t>Chia các phần lớn thành các phần nhỏ hơn, hiểu được mỗi phần làm gì và mối quan hệ giữa các phần</a:t>
             </a:r>
           </a:p>
           <a:p>
             <a:pPr marL="742950" lvl="1" indent="-285750"/>
             <a:r>
-              <a:rPr lang="en-US" altLang="en-US" sz="1400" dirty="0"/>
+              <a:rPr lang="en-US" altLang="en-US" sz="1400"/>
               <a:t>Các quá trình này sẽ sinh ra một lượng lớn tài liệu có liên quan</a:t>
             </a:r>
           </a:p>
@@ -12707,17 +13006,17 @@
               <a:buNone/>
             </a:pPr>
             <a:r>
-              <a:rPr lang="en-US" altLang="en-US" sz="1200" dirty="0"/>
+              <a:rPr lang="en-US" altLang="en-US" sz="1200"/>
               <a:t>	       Cách quản lý tốt các tài liệu này cũng là một thách thức khác.</a:t>
             </a:r>
           </a:p>
           <a:p>
             <a:pPr marL="742950" lvl="1" indent="-285750"/>
             <a:r>
-              <a:rPr lang="en-US" altLang="en-US" sz="1400" dirty="0"/>
+              <a:rPr lang="en-US" altLang="en-US" sz="1400"/>
               <a:t>Áp dụng nhiều kỹ thuật khác nhau trong toàn bộ quá trình (DFD, UML, ...),</a:t>
             </a:r>
-            <a:endParaRPr lang="en-US" dirty="0"/>
+            <a:endParaRPr lang="en-US"/>
           </a:p>
         </p:txBody>
       </p:sp>
@@ -13362,7 +13661,7 @@
               <a:buChar char=""/>
               <a:defRPr/>
             </a:pPr>
-            <a:endParaRPr lang="en-US" sz="2800" dirty="0">
+            <a:endParaRPr lang="en-US" sz="2800">
               <a:latin typeface="+mn-lt"/>
             </a:endParaRPr>
           </a:p>
@@ -14610,7 +14909,7 @@
               <a:defRPr/>
             </a:pPr>
             <a:r>
-              <a:rPr lang="en-US" dirty="0"/>
+              <a:rPr lang="en-US"/>
               <a:t>Mục tiêu: </a:t>
             </a:r>
           </a:p>
@@ -14622,7 +14921,7 @@
               <a:defRPr/>
             </a:pPr>
             <a:r>
-              <a:rPr lang="en-US" sz="1400" dirty="0"/>
+              <a:rPr lang="en-US" sz="1400"/>
               <a:t>Để hiểu được yêu cầu và các rang buộc của hệ thống, tạo tiền đề cho  việc đặc tả chúng.</a:t>
             </a:r>
           </a:p>
@@ -14634,7 +14933,7 @@
               <a:defRPr/>
             </a:pPr>
             <a:r>
-              <a:rPr lang="en-US" dirty="0"/>
+              <a:rPr lang="en-US"/>
               <a:t>Việc phân tích có liên quan đến:</a:t>
             </a:r>
           </a:p>
@@ -14646,7 +14945,7 @@
               <a:defRPr/>
             </a:pPr>
             <a:r>
-              <a:rPr lang="en-US" dirty="0"/>
+              <a:rPr lang="en-US"/>
               <a:t>Phỏng vấn khách hàng.</a:t>
             </a:r>
           </a:p>
@@ -14658,7 +14957,7 @@
               <a:defRPr/>
             </a:pPr>
             <a:r>
-              <a:rPr lang="en-US" dirty="0"/>
+              <a:rPr lang="en-US"/>
               <a:t>Đọc các hướng dẫn (manual)</a:t>
             </a:r>
           </a:p>
@@ -14670,7 +14969,7 @@
               <a:defRPr/>
             </a:pPr>
             <a:r>
-              <a:rPr lang="en-US" dirty="0"/>
+              <a:rPr lang="en-US"/>
               <a:t>Học tập hệ thống (mà khách hang đang sử dụng) hiện tại</a:t>
             </a:r>
           </a:p>
@@ -14682,7 +14981,7 @@
               <a:defRPr/>
             </a:pPr>
             <a:r>
-              <a:rPr lang="en-US" dirty="0"/>
+              <a:rPr lang="en-US"/>
               <a:t>Giúp khách hàng hiểu được các khả năng có thể xảy ra</a:t>
             </a:r>
           </a:p>
@@ -14694,34 +14993,38 @@
               <a:defRPr/>
             </a:pPr>
             <a:r>
-              <a:rPr lang="en-US" dirty="0"/>
+              <a:rPr lang="en-US"/>
               <a:t>Tư vấn khách hàng.</a:t>
             </a:r>
+            <a:r>
+              <a:rPr lang="en-US" sz="1400"/>
+              <a:t/>
+            </a:r>
             <a:br>
-              <a:rPr lang="en-US" sz="1400" dirty="0"/>
+              <a:rPr lang="en-US" sz="1400"/>
             </a:br>
-            <a:endParaRPr lang="en-US" sz="1400" dirty="0"/>
-          </a:p>
-          <a:p>
-            <a:r>
-              <a:rPr lang="en-US" dirty="0"/>
+            <a:endParaRPr lang="en-US" sz="1400"/>
+          </a:p>
+          <a:p>
+            <a:r>
+              <a:rPr lang="en-US"/>
               <a:t>Phải hiểu được công việc của tổ chức, khách hàng, người sử dụng.</a:t>
             </a:r>
           </a:p>
           <a:p>
             <a:r>
-              <a:rPr lang="en-US" altLang="en-US" dirty="0"/>
+              <a:rPr lang="en-US" altLang="en-US"/>
               <a:t>Kỹ năng giao tiếp là cực  kỳ quan trọng</a:t>
             </a:r>
           </a:p>
           <a:p>
             <a:r>
-              <a:rPr lang="en-US" altLang="en-US" dirty="0"/>
+              <a:rPr lang="en-US" altLang="en-US"/>
               <a:t>Có thể cần phải sử dụng nhiều kỹ thuật khác nhau</a:t>
             </a:r>
           </a:p>
           <a:p>
-            <a:endParaRPr lang="en-US" dirty="0"/>
+            <a:endParaRPr lang="en-US"/>
           </a:p>
         </p:txBody>
       </p:sp>
@@ -15348,33 +15651,33 @@
           <a:lstStyle/>
           <a:p>
             <a:r>
-              <a:rPr lang="en-US" dirty="0"/>
+              <a:rPr lang="en-US"/>
               <a:t>Yêu cầu chức năng:</a:t>
             </a:r>
           </a:p>
           <a:p>
             <a:pPr lvl="1"/>
             <a:r>
-              <a:rPr lang="en-US" dirty="0"/>
+              <a:rPr lang="en-US"/>
               <a:t>Các phát biểu về các dịch vụ mà hệ thống cần cung cấp, làm thế nào hệ thống phản ứng lại một đầu vào nhất định, và làm hệ thống nên có hành vi như thế nào trong các tình huống cụ thể</a:t>
             </a:r>
           </a:p>
           <a:p>
             <a:r>
-              <a:rPr lang="en-US" dirty="0"/>
+              <a:rPr lang="en-US"/>
               <a:t>Yêu cầu phi chức năng:</a:t>
             </a:r>
           </a:p>
           <a:p>
             <a:pPr lvl="1"/>
             <a:r>
-              <a:rPr lang="en-US" dirty="0"/>
+              <a:rPr lang="en-US"/>
               <a:t>Các ràng buộc về mặt dịch vụ hoặc chức năng được cung cấp bởi hệ thống, vd như ràng buộc về mặt thời gian, hạn chế về thời gian phát triển, tiêu chuẩn, …</a:t>
             </a:r>
           </a:p>
           <a:p>
             <a:pPr lvl="1"/>
-            <a:endParaRPr lang="en-US" dirty="0"/>
+            <a:endParaRPr lang="en-US"/>
           </a:p>
         </p:txBody>
       </p:sp>
@@ -15473,7 +15776,7 @@
               <a:defRPr/>
             </a:pPr>
             <a:r>
-              <a:rPr lang="en-US" dirty="0"/>
+              <a:rPr lang="en-US"/>
               <a:t>Kết quả sau bước này sẽ là tiền đề để tạo nên tài liệu SRS</a:t>
             </a:r>
           </a:p>
@@ -15487,7 +15790,7 @@
               <a:defRPr/>
             </a:pPr>
             <a:r>
-              <a:rPr lang="en-US" dirty="0"/>
+              <a:rPr lang="en-US"/>
               <a:t>Không dễ dàng gì để chuyển đổi các yêu cầu trực tiếp từ quá trình phân tích thành các đặc tả.</a:t>
             </a:r>
           </a:p>
@@ -15501,7 +15804,7 @@
               <a:defRPr/>
             </a:pPr>
             <a:r>
-              <a:rPr lang="en-US" dirty="0"/>
+              <a:rPr lang="en-US"/>
               <a:t>Các kiến thức được yêu cầu về hệ thống trong quá trình phân tích được sử dụng lại trong quá trình đặc tả</a:t>
             </a:r>
           </a:p>
@@ -15515,12 +15818,12 @@
               <a:defRPr/>
             </a:pPr>
             <a:r>
-              <a:rPr lang="en-US" dirty="0"/>
+              <a:rPr lang="en-US"/>
               <a:t>Lựa chọn phương pháp đặc tả phù hợp với đặc điểm của các yêu cầu.</a:t>
             </a:r>
           </a:p>
           <a:p>
-            <a:endParaRPr lang="en-US" dirty="0"/>
+            <a:endParaRPr lang="en-US"/>
           </a:p>
         </p:txBody>
       </p:sp>
@@ -16147,63 +16450,18 @@
           <a:lstStyle/>
           <a:p>
             <a:r>
-              <a:rPr lang="en-US" altLang="en-US" dirty="0"/>
-              <a:t>Ngôn </a:t>
-            </a:r>
-            <a:r>
               <a:rPr lang="en-US" altLang="en-US"/>
-              <a:t>ngữ tự nhiên nếu được sử dụng cần </a:t>
-            </a:r>
-            <a:r>
-              <a:rPr lang="en-US" altLang="en-US" dirty="0"/>
-              <a:t>phải hỗ trợ các đặc điểm mong muốn </a:t>
-            </a:r>
+              <a:t>Ngôn ngữ tự nhiên nếu được sử dụng cần phải hỗ trợ các đặc điểm mong muốn của SRS và phải đi kèm theo các cấu trúc nhất định; thường được dùng để đặc tả các yêu cầu có tình chất đơn giản.</a:t>
+            </a:r>
+          </a:p>
+          <a:p>
             <a:r>
               <a:rPr lang="en-US" altLang="en-US"/>
-              <a:t>của SRS và phải đi kèm theo các cấu trúc nhất định; thường được dùng để đặc tả các yêu cầu có tình chất đơn giản.</a:t>
-            </a:r>
-          </a:p>
-          <a:p>
-            <a:r>
-              <a:rPr lang="en-US" altLang="en-US"/>
-              <a:t>Ngôn </a:t>
-            </a:r>
-            <a:r>
-              <a:rPr lang="en-US" altLang="en-US" dirty="0"/>
-              <a:t>ngữ đặc </a:t>
-            </a:r>
-            <a:r>
-              <a:rPr lang="en-US" altLang="en-US"/>
-              <a:t>tả chuyên biệt(formal language) </a:t>
-            </a:r>
-            <a:r>
-              <a:rPr lang="en-US" altLang="en-US" dirty="0"/>
-              <a:t>có độ chính xác cao và </a:t>
-            </a:r>
-            <a:r>
-              <a:rPr lang="en-US" altLang="en-US"/>
-              <a:t>rõ ràng </a:t>
-            </a:r>
-            <a:r>
-              <a:rPr lang="en-US" altLang="en-US" dirty="0"/>
-              <a:t>nhưng khó để nắm bắt và </a:t>
-            </a:r>
-            <a:r>
-              <a:rPr lang="en-US" altLang="en-US"/>
-              <a:t>sử dụng; chúng thường được dùng để đặc tả các </a:t>
-            </a:r>
-            <a:r>
-              <a:rPr lang="en-US" altLang="en-US" dirty="0"/>
-              <a:t>tính năng đặc biệt và cực kỳ quan trọng của </a:t>
-            </a:r>
-            <a:r>
-              <a:rPr lang="en-US" altLang="en-US"/>
-              <a:t>hệ thống.</a:t>
-            </a:r>
-            <a:endParaRPr lang="en-US" altLang="en-US" dirty="0"/>
-          </a:p>
-          <a:p>
-            <a:endParaRPr lang="en-US" altLang="en-US" dirty="0"/>
+              <a:t>Ngôn ngữ đặc tả chuyên biệt(formal language) có độ chính xác cao và rõ ràng nhưng khó để nắm bắt và sử dụng; chúng thường được dùng để đặc tả các tính năng đặc biệt và cực kỳ quan trọng của hệ thống.</a:t>
+            </a:r>
+          </a:p>
+          <a:p>
+            <a:endParaRPr lang="en-US" altLang="en-US"/>
           </a:p>
         </p:txBody>
       </p:sp>
@@ -16342,6 +16600,13 @@
       </p:transition>
     </mc:Fallback>
   </mc:AlternateContent>
+  <p:timing>
+    <p:tnLst>
+      <p:par>
+        <p:cTn id="1" dur="indefinite" restart="never" nodeType="tmRoot"/>
+      </p:par>
+    </p:tnLst>
+  </p:timing>
 </p:sld>
 </file>
 
@@ -16400,53 +16665,53 @@
           <a:lstStyle/>
           <a:p>
             <a:r>
-              <a:rPr lang="en-US" altLang="en-US" dirty="0"/>
+              <a:rPr lang="en-US" altLang="en-US"/>
               <a:t>SRS cần chứa những gì?</a:t>
             </a:r>
           </a:p>
           <a:p>
             <a:pPr lvl="1"/>
             <a:r>
-              <a:rPr lang="en-US" altLang="en-US" dirty="0"/>
+              <a:rPr lang="en-US" altLang="en-US"/>
               <a:t>Làm rõ vấn đề này sẽ giúp đảm bảo tính hoàn thiện của tài liệu</a:t>
             </a:r>
           </a:p>
           <a:p>
             <a:r>
-              <a:rPr lang="en-US" altLang="en-US" dirty="0"/>
+              <a:rPr lang="en-US" altLang="en-US"/>
               <a:t>Một tài liệu SRS cần làm ghi rõ các yêu cầu về:</a:t>
             </a:r>
           </a:p>
           <a:p>
             <a:pPr lvl="1"/>
             <a:r>
-              <a:rPr lang="en-US" altLang="en-US" dirty="0"/>
+              <a:rPr lang="en-US" altLang="en-US"/>
               <a:t>Functionality -  Tính năng</a:t>
             </a:r>
           </a:p>
           <a:p>
             <a:pPr lvl="1"/>
             <a:r>
-              <a:rPr lang="en-US" altLang="en-US" dirty="0"/>
+              <a:rPr lang="en-US" altLang="en-US"/>
               <a:t>Performance – Hiệu suất</a:t>
             </a:r>
           </a:p>
           <a:p>
             <a:pPr lvl="1"/>
             <a:r>
-              <a:rPr lang="en-US" altLang="en-US" dirty="0"/>
+              <a:rPr lang="en-US" altLang="en-US"/>
               <a:t>Design constraints – Ràng buộc thiết kế</a:t>
             </a:r>
           </a:p>
           <a:p>
             <a:pPr lvl="1"/>
             <a:r>
-              <a:rPr lang="en-US" altLang="en-US" dirty="0"/>
+              <a:rPr lang="en-US" altLang="en-US"/>
               <a:t>External interfaces – Các giao tiếp bên ngoài</a:t>
             </a:r>
           </a:p>
           <a:p>
-            <a:endParaRPr lang="en-US" dirty="0"/>
+            <a:endParaRPr lang="en-US"/>
           </a:p>
         </p:txBody>
       </p:sp>
@@ -16651,66 +16916,50 @@
           <a:lstStyle/>
           <a:p>
             <a:r>
-              <a:rPr lang="en-US" dirty="0"/>
-              <a:t>Tất cả </a:t>
-            </a:r>
-            <a:r>
-              <a:rPr lang="en-US"/>
-              <a:t>các ràng </a:t>
-            </a:r>
-            <a:r>
-              <a:rPr lang="en-US" dirty="0"/>
-              <a:t>buộc về mặt hiệu suất của hệ thống phần mềm,</a:t>
-            </a:r>
-          </a:p>
-          <a:p>
-            <a:r>
-              <a:rPr lang="en-US" dirty="0"/>
+              <a:rPr lang="en-US"/>
+              <a:t>Tất cả các ràng buộc về mặt hiệu suất của hệ thống phần mềm,</a:t>
+            </a:r>
+          </a:p>
+          <a:p>
+            <a:r>
+              <a:rPr lang="en-US"/>
               <a:t>Thông thường là về thời gian đáp ứng, thông lượng, v.v… (động – có thể thay đổi), dung lượng (tĩnh – cố định),</a:t>
             </a:r>
           </a:p>
           <a:p>
             <a:r>
-              <a:rPr lang="en-US" dirty="0"/>
+              <a:rPr lang="en-US"/>
               <a:t>Cần phải là các khái niệm đo lường được.</a:t>
             </a:r>
           </a:p>
           <a:p>
             <a:r>
-              <a:rPr lang="en-US" dirty="0"/>
+              <a:rPr lang="en-US"/>
               <a:t>Ví dụ: </a:t>
             </a:r>
           </a:p>
           <a:p>
             <a:pPr lvl="1"/>
             <a:r>
-              <a:rPr lang="en-US" dirty="0"/>
-              <a:t>Thời gian phản hồi </a:t>
-            </a:r>
-            <a:r>
-              <a:rPr lang="en-US"/>
-              <a:t>nên ít </a:t>
-            </a:r>
-            <a:r>
-              <a:rPr lang="en-US" dirty="0"/>
-              <a:t>hơn xx giây.</a:t>
+              <a:rPr lang="en-US"/>
+              <a:t>Thời gian phản hồi nên ít hơn xx giây.</a:t>
             </a:r>
           </a:p>
           <a:p>
             <a:pPr lvl="1"/>
             <a:r>
-              <a:rPr lang="en-US" dirty="0"/>
+              <a:rPr lang="en-US"/>
               <a:t>Dung lượng ổ đĩa chiếm dụng ít hơn 1 TB.</a:t>
             </a:r>
           </a:p>
           <a:p>
-            <a:endParaRPr lang="en-US" dirty="0"/>
-          </a:p>
-          <a:p>
-            <a:endParaRPr lang="en-US" dirty="0"/>
-          </a:p>
-          <a:p>
-            <a:endParaRPr lang="en-US" dirty="0"/>
+            <a:endParaRPr lang="en-US"/>
+          </a:p>
+          <a:p>
+            <a:endParaRPr lang="en-US"/>
+          </a:p>
+          <a:p>
+            <a:endParaRPr lang="en-US"/>
           </a:p>
         </p:txBody>
       </p:sp>
@@ -16794,82 +17043,46 @@
           <a:lstStyle/>
           <a:p>
             <a:r>
-              <a:rPr lang="en-US" dirty="0"/>
-              <a:t>Các yếu tố trong </a:t>
-            </a:r>
-            <a:r>
-              <a:rPr lang="en-US"/>
-              <a:t>môi trường mà khách hàng sử dụng hệ thống </a:t>
-            </a:r>
-            <a:r>
-              <a:rPr lang="en-US" dirty="0"/>
-              <a:t>sẽ hạn chế các lựa chọn thiết kế </a:t>
-            </a:r>
-            <a:r>
-              <a:rPr lang="en-US"/>
-              <a:t>hệ thống.</a:t>
-            </a:r>
-            <a:endParaRPr lang="en-US" dirty="0"/>
-          </a:p>
-          <a:p>
-            <a:r>
-              <a:rPr lang="en-US" dirty="0"/>
+              <a:rPr lang="en-US"/>
+              <a:t>Các yếu tố trong môi trường mà khách hàng sử dụng hệ thống sẽ hạn chế các lựa chọn thiết kế hệ thống.</a:t>
+            </a:r>
+          </a:p>
+          <a:p>
+            <a:r>
+              <a:rPr lang="en-US"/>
               <a:t>Một vài ràng buộc:</a:t>
             </a:r>
           </a:p>
           <a:p>
             <a:pPr lvl="1"/>
             <a:r>
-              <a:rPr lang="en-US" dirty="0"/>
-              <a:t>Tuân thủ tiêu </a:t>
-            </a:r>
-            <a:r>
-              <a:rPr lang="en-US"/>
-              <a:t>chuẩn đã có nhằm </a:t>
-            </a:r>
-            <a:r>
-              <a:rPr lang="en-US" dirty="0"/>
-              <a:t>tương thích với hệ </a:t>
-            </a:r>
-            <a:r>
-              <a:rPr lang="en-US"/>
-              <a:t>thống khác.</a:t>
-            </a:r>
-            <a:endParaRPr lang="en-US" dirty="0"/>
+              <a:rPr lang="en-US"/>
+              <a:t>Tuân thủ tiêu chuẩn đã có nhằm tương thích với hệ thống khác.</a:t>
+            </a:r>
           </a:p>
           <a:p>
             <a:pPr lvl="1"/>
             <a:r>
-              <a:rPr lang="en-US" dirty="0"/>
-              <a:t>Hạn </a:t>
-            </a:r>
-            <a:r>
-              <a:rPr lang="en-US"/>
-              <a:t>chế về mặt phần cứng.</a:t>
-            </a:r>
-            <a:endParaRPr lang="en-US" dirty="0"/>
+              <a:rPr lang="en-US"/>
+              <a:t>Hạn chế về mặt phần cứng.</a:t>
+            </a:r>
           </a:p>
           <a:p>
             <a:pPr lvl="1"/>
             <a:r>
-              <a:rPr lang="en-US" dirty="0"/>
-              <a:t>Độ tin cậy, khả năng chịu lỗi, yêu cầu </a:t>
-            </a:r>
-            <a:r>
-              <a:rPr lang="en-US"/>
-              <a:t>sao lưu.</a:t>
-            </a:r>
-            <a:endParaRPr lang="en-US" dirty="0"/>
+              <a:rPr lang="en-US"/>
+              <a:t>Độ tin cậy, khả năng chịu lỗi, yêu cầu sao lưu.</a:t>
+            </a:r>
           </a:p>
           <a:p>
             <a:pPr lvl="1"/>
             <a:r>
-              <a:rPr lang="en-US" dirty="0"/>
+              <a:rPr lang="en-US"/>
               <a:t>Độ bảo mật.</a:t>
             </a:r>
           </a:p>
           <a:p>
-            <a:endParaRPr lang="en-US" dirty="0"/>
+            <a:endParaRPr lang="en-US"/>
           </a:p>
         </p:txBody>
       </p:sp>
@@ -17064,13 +17277,13 @@
           <a:lstStyle/>
           <a:p>
             <a:r>
-              <a:rPr lang="vi-VN" altLang="en-US" dirty="0">
+              <a:rPr lang="vi-VN" altLang="en-US">
                 <a:latin typeface="Constantia" panose="02030602050306030303" pitchFamily="18" charset="0"/>
               </a:rPr>
               <a:t>Tiêu chuẩn này của SRS được đề ra bởi IEEE</a:t>
             </a:r>
             <a:r>
-              <a:rPr lang="en-US" altLang="en-US" dirty="0">
+              <a:rPr lang="en-US" altLang="en-US">
                 <a:latin typeface="Constantia" panose="02030602050306030303" pitchFamily="18" charset="0"/>
               </a:rPr>
               <a:t>:</a:t>
@@ -17078,14 +17291,14 @@
           </a:p>
           <a:p>
             <a:r>
-              <a:rPr lang="en-US" altLang="en-US" dirty="0"/>
+              <a:rPr lang="en-US" altLang="en-US"/>
               <a:t>Giới thiệu</a:t>
             </a:r>
           </a:p>
           <a:p>
             <a:pPr lvl="1"/>
             <a:r>
-              <a:rPr lang="vi-VN" altLang="en-US" dirty="0">
+              <a:rPr lang="vi-VN" altLang="en-US">
                 <a:latin typeface="Constantia" panose="02030602050306030303" pitchFamily="18" charset="0"/>
               </a:rPr>
               <a:t>Mục đích, mục tiêu cơ bản của hệ thống,</a:t>
@@ -17094,37 +17307,37 @@
           <a:p>
             <a:pPr lvl="1"/>
             <a:r>
-              <a:rPr lang="vi-VN" altLang="en-US" dirty="0">
+              <a:rPr lang="vi-VN" altLang="en-US">
                 <a:latin typeface="Constantia" panose="02030602050306030303" pitchFamily="18" charset="0"/>
               </a:rPr>
               <a:t>Phạm vi của hệ thống</a:t>
             </a:r>
             <a:r>
-              <a:rPr lang="en-US" altLang="en-US" dirty="0">
+              <a:rPr lang="en-US" altLang="en-US">
                 <a:latin typeface="Constantia" panose="02030602050306030303" pitchFamily="18" charset="0"/>
               </a:rPr>
               <a:t>:</a:t>
             </a:r>
             <a:r>
-              <a:rPr lang="vi-VN" altLang="en-US" dirty="0">
+              <a:rPr lang="vi-VN" altLang="en-US">
                 <a:latin typeface="Constantia" panose="02030602050306030303" pitchFamily="18" charset="0"/>
               </a:rPr>
               <a:t> làm</a:t>
             </a:r>
             <a:r>
-              <a:rPr lang="en-US" altLang="en-US" dirty="0">
+              <a:rPr lang="en-US" altLang="en-US">
                 <a:latin typeface="Constantia" panose="02030602050306030303" pitchFamily="18" charset="0"/>
               </a:rPr>
               <a:t> những gì</a:t>
             </a:r>
             <a:r>
-              <a:rPr lang="vi-VN" altLang="en-US" dirty="0">
+              <a:rPr lang="vi-VN" altLang="en-US">
                 <a:latin typeface="Constantia" panose="02030602050306030303" pitchFamily="18" charset="0"/>
               </a:rPr>
               <a:t>, không làm</a:t>
             </a:r>
             <a:r>
-              <a:rPr lang="en-US" altLang="en-US" dirty="0">
+              <a:rPr lang="en-US" altLang="en-US">
                 <a:latin typeface="Constantia" panose="02030602050306030303" pitchFamily="18" charset="0"/>
               </a:rPr>
               <a:t> những gì.</a:t>
@@ -17133,7 +17346,7 @@
           <a:p>
             <a:pPr lvl="1"/>
             <a:r>
-              <a:rPr lang="en-US" altLang="en-US" dirty="0">
+              <a:rPr lang="en-US" altLang="en-US">
                 <a:latin typeface="Constantia" panose="02030602050306030303" pitchFamily="18" charset="0"/>
               </a:rPr>
               <a:t>Các định nghĩa và từ viết tắt.</a:t>
@@ -17142,24 +17355,24 @@
           <a:p>
             <a:pPr lvl="1"/>
             <a:r>
-              <a:rPr lang="en-US" altLang="en-US" dirty="0">
+              <a:rPr lang="en-US" altLang="en-US">
                 <a:latin typeface="Constantia" panose="02030602050306030303" pitchFamily="18" charset="0"/>
               </a:rPr>
               <a:t>Các liên kết (references)</a:t>
             </a:r>
-            <a:endParaRPr lang="vi-VN" altLang="en-US" dirty="0">
+            <a:endParaRPr lang="vi-VN" altLang="en-US">
               <a:latin typeface="Constantia" panose="02030602050306030303" pitchFamily="18" charset="0"/>
             </a:endParaRPr>
           </a:p>
           <a:p>
             <a:pPr lvl="1"/>
             <a:r>
-              <a:rPr lang="vi-VN" altLang="en-US" dirty="0">
+              <a:rPr lang="vi-VN" altLang="en-US">
                 <a:latin typeface="Constantia" panose="02030602050306030303" pitchFamily="18" charset="0"/>
               </a:rPr>
               <a:t>Tổng quan</a:t>
             </a:r>
-            <a:endParaRPr lang="en-US" altLang="en-US" dirty="0"/>
+            <a:endParaRPr lang="en-US" altLang="en-US"/>
           </a:p>
         </p:txBody>
       </p:sp>
@@ -17298,32 +17511,32 @@
           <a:lstStyle/>
           <a:p>
             <a:r>
-              <a:rPr lang="en-US" altLang="en-US" dirty="0"/>
+              <a:rPr lang="en-US" altLang="en-US"/>
               <a:t>Mô tả chung</a:t>
             </a:r>
           </a:p>
           <a:p>
             <a:pPr lvl="1"/>
             <a:r>
-              <a:rPr lang="en-US" altLang="en-US" dirty="0">
+              <a:rPr lang="en-US" altLang="en-US">
                 <a:latin typeface="Constantia" panose="02030602050306030303" pitchFamily="18" charset="0"/>
               </a:rPr>
               <a:t>Q</a:t>
             </a:r>
             <a:r>
-              <a:rPr lang="vi-VN" altLang="en-US" dirty="0">
+              <a:rPr lang="vi-VN" altLang="en-US">
                 <a:latin typeface="Constantia" panose="02030602050306030303" pitchFamily="18" charset="0"/>
               </a:rPr>
               <a:t>uan điểm</a:t>
             </a:r>
             <a:r>
-              <a:rPr lang="en-US" altLang="en-US" dirty="0">
+              <a:rPr lang="en-US" altLang="en-US">
                 <a:latin typeface="Constantia" panose="02030602050306030303" pitchFamily="18" charset="0"/>
               </a:rPr>
               <a:t> về</a:t>
             </a:r>
             <a:r>
-              <a:rPr lang="vi-VN" altLang="en-US" dirty="0">
+              <a:rPr lang="vi-VN" altLang="en-US">
                 <a:latin typeface="Constantia" panose="02030602050306030303" pitchFamily="18" charset="0"/>
               </a:rPr>
               <a:t> sản phẩm</a:t>
@@ -17332,13 +17545,13 @@
           <a:p>
             <a:pPr lvl="1"/>
             <a:r>
-              <a:rPr lang="en-US" altLang="en-US" dirty="0">
+              <a:rPr lang="en-US" altLang="en-US">
                 <a:latin typeface="Constantia" panose="02030602050306030303" pitchFamily="18" charset="0"/>
               </a:rPr>
               <a:t>C</a:t>
             </a:r>
             <a:r>
-              <a:rPr lang="vi-VN" altLang="en-US" dirty="0">
+              <a:rPr lang="vi-VN" altLang="en-US">
                 <a:latin typeface="Constantia" panose="02030602050306030303" pitchFamily="18" charset="0"/>
               </a:rPr>
               <a:t>hức năng sản phẩm</a:t>
@@ -17347,13 +17560,13 @@
           <a:p>
             <a:pPr lvl="1"/>
             <a:r>
-              <a:rPr lang="en-US" altLang="en-US" dirty="0">
+              <a:rPr lang="en-US" altLang="en-US">
                 <a:latin typeface="Constantia" panose="02030602050306030303" pitchFamily="18" charset="0"/>
               </a:rPr>
               <a:t>Đ</a:t>
             </a:r>
             <a:r>
-              <a:rPr lang="vi-VN" altLang="en-US" dirty="0">
+              <a:rPr lang="vi-VN" altLang="en-US">
                 <a:latin typeface="Constantia" panose="02030602050306030303" pitchFamily="18" charset="0"/>
               </a:rPr>
               <a:t>ặc điểm người sử dụng</a:t>
@@ -17362,52 +17575,52 @@
           <a:p>
             <a:pPr lvl="1"/>
             <a:r>
-              <a:rPr lang="en-US" altLang="en-US" dirty="0">
+              <a:rPr lang="en-US" altLang="en-US">
                 <a:latin typeface="Constantia" panose="02030602050306030303" pitchFamily="18" charset="0"/>
               </a:rPr>
               <a:t>Các g</a:t>
             </a:r>
             <a:r>
-              <a:rPr lang="vi-VN" altLang="en-US" dirty="0">
+              <a:rPr lang="vi-VN" altLang="en-US">
                 <a:latin typeface="Constantia" panose="02030602050306030303" pitchFamily="18" charset="0"/>
               </a:rPr>
               <a:t>iả định</a:t>
             </a:r>
             <a:r>
-              <a:rPr lang="en-US" altLang="en-US" dirty="0">
+              <a:rPr lang="en-US" altLang="en-US">
                 <a:latin typeface="Constantia" panose="02030602050306030303" pitchFamily="18" charset="0"/>
               </a:rPr>
               <a:t> và sự phụ thuộc (</a:t>
             </a:r>
             <a:r>
-              <a:rPr lang="en-US" dirty="0"/>
+              <a:rPr lang="en-US"/>
               <a:t>Assumptions and dependencies )</a:t>
             </a:r>
-            <a:endParaRPr lang="vi-VN" altLang="en-US" dirty="0">
+            <a:endParaRPr lang="vi-VN" altLang="en-US">
               <a:latin typeface="Constantia" panose="02030602050306030303" pitchFamily="18" charset="0"/>
             </a:endParaRPr>
           </a:p>
           <a:p>
             <a:pPr lvl="1"/>
             <a:r>
-              <a:rPr lang="en-US" altLang="en-US" dirty="0">
+              <a:rPr lang="en-US" altLang="en-US">
                 <a:latin typeface="Constantia" panose="02030602050306030303" pitchFamily="18" charset="0"/>
               </a:rPr>
               <a:t>Các</a:t>
             </a:r>
             <a:r>
-              <a:rPr lang="vi-VN" altLang="en-US" dirty="0">
+              <a:rPr lang="vi-VN" altLang="en-US">
                 <a:latin typeface="Constantia" panose="02030602050306030303" pitchFamily="18" charset="0"/>
               </a:rPr>
               <a:t> </a:t>
             </a:r>
             <a:r>
-              <a:rPr lang="en-US" altLang="en-US" dirty="0">
+              <a:rPr lang="en-US" altLang="en-US">
                 <a:latin typeface="Constantia" panose="02030602050306030303" pitchFamily="18" charset="0"/>
               </a:rPr>
               <a:t>ràng buộc</a:t>
             </a:r>
-            <a:endParaRPr lang="en-US" dirty="0"/>
+            <a:endParaRPr lang="en-US"/>
           </a:p>
           <a:p>
             <a:pPr>
@@ -17417,7 +17630,7 @@
               <a:defRPr/>
             </a:pPr>
             <a:r>
-              <a:rPr lang="en-US" dirty="0"/>
+              <a:rPr lang="en-US"/>
               <a:t>Các yêu cầu cụ thể</a:t>
             </a:r>
           </a:p>
@@ -17429,7 +17642,7 @@
               <a:defRPr/>
             </a:pPr>
             <a:r>
-              <a:rPr lang="en-US" dirty="0"/>
+              <a:rPr lang="en-US"/>
               <a:t>Giao tiếp bên ngoài</a:t>
             </a:r>
           </a:p>
@@ -17441,7 +17654,7 @@
               <a:defRPr/>
             </a:pPr>
             <a:r>
-              <a:rPr lang="en-US" dirty="0"/>
+              <a:rPr lang="en-US"/>
               <a:t>Yêu cầu chức năng</a:t>
             </a:r>
           </a:p>
@@ -17453,7 +17666,7 @@
               <a:defRPr/>
             </a:pPr>
             <a:r>
-              <a:rPr lang="en-US" dirty="0"/>
+              <a:rPr lang="en-US"/>
               <a:t>Yêu cầu hiệu suất</a:t>
             </a:r>
           </a:p>
@@ -17465,7 +17678,7 @@
               <a:defRPr/>
             </a:pPr>
             <a:r>
-              <a:rPr lang="en-US" dirty="0"/>
+              <a:rPr lang="en-US"/>
               <a:t>Ràng buộc về thiết kế</a:t>
             </a:r>
           </a:p>
@@ -17493,12 +17706,16 @@
               <a:t>Mục lục </a:t>
             </a:r>
             <a:br>
-              <a:rPr lang="en-US" dirty="0"/>
+              <a:rPr lang="en-US"/>
             </a:br>
+            <a:r>
+              <a:rPr lang="en-US"/>
+              <a:t/>
+            </a:r>
             <a:br>
-              <a:rPr lang="en-US" dirty="0"/>
+              <a:rPr lang="en-US"/>
             </a:br>
-            <a:endParaRPr lang="en-US" dirty="0"/>
+            <a:endParaRPr lang="en-US"/>
           </a:p>
           <a:p>
             <a:pPr>
@@ -17507,7 +17724,7 @@
               </a:buClr>
               <a:defRPr/>
             </a:pPr>
-            <a:endParaRPr lang="en-US" dirty="0"/>
+            <a:endParaRPr lang="en-US"/>
           </a:p>
         </p:txBody>
       </p:sp>
@@ -18382,28 +18599,28 @@
           <a:lstStyle/>
           <a:p>
             <a:r>
-              <a:rPr lang="en-US" dirty="0"/>
+              <a:rPr lang="en-US"/>
               <a:t>Theo trạng thái ngôn ngữ:</a:t>
             </a:r>
           </a:p>
           <a:p>
             <a:pPr lvl="1"/>
             <a:r>
-              <a:rPr lang="en-US" dirty="0"/>
+              <a:rPr lang="en-US"/>
               <a:t>Ngôn ngữ tự nhiên có cấu trúc</a:t>
             </a:r>
           </a:p>
           <a:p>
             <a:pPr lvl="1"/>
             <a:r>
-              <a:rPr lang="en-US" dirty="0"/>
+              <a:rPr lang="en-US"/>
               <a:t>Ngôn ngữ mô tả thiết kế</a:t>
             </a:r>
           </a:p>
           <a:p>
             <a:pPr lvl="1"/>
             <a:r>
-              <a:rPr lang="en-US" dirty="0"/>
+              <a:rPr lang="en-US"/>
               <a:t>Ký hiệu đồ họa</a:t>
             </a:r>
           </a:p>
@@ -18411,23 +18628,14 @@
             <a:pPr lvl="1"/>
             <a:r>
               <a:rPr lang="en-US"/>
-              <a:t>Đặc </a:t>
-            </a:r>
-            <a:r>
-              <a:rPr lang="en-US" dirty="0"/>
-              <a:t>tả toán học</a:t>
-            </a:r>
-          </a:p>
-          <a:p>
-            <a:r>
-              <a:rPr lang="en-US" dirty="0"/>
-              <a:t>Theo mức </a:t>
-            </a:r>
-            <a:r>
-              <a:rPr lang="en-US"/>
-              <a:t>độ hình thức:</a:t>
-            </a:r>
-            <a:endParaRPr lang="en-US" dirty="0"/>
+              <a:t>Đặc tả toán học</a:t>
+            </a:r>
+          </a:p>
+          <a:p>
+            <a:r>
+              <a:rPr lang="en-US"/>
+              <a:t>Theo mức độ hình thức:</a:t>
+            </a:r>
           </a:p>
           <a:p>
             <a:pPr lvl="1"/>
@@ -18440,29 +18648,21 @@
             <a:pPr lvl="1"/>
             <a:r>
               <a:rPr lang="en-US"/>
-              <a:t>Không hình thức </a:t>
-            </a:r>
-            <a:r>
-              <a:rPr lang="en-US" dirty="0"/>
-              <a:t>– informal </a:t>
+              <a:t>Không hình thức – informal </a:t>
             </a:r>
           </a:p>
           <a:p>
             <a:pPr lvl="1"/>
             <a:r>
               <a:rPr lang="en-US"/>
-              <a:t>Bán hình thức </a:t>
-            </a:r>
-            <a:r>
-              <a:rPr lang="en-US" dirty="0"/>
-              <a:t>– semiformal</a:t>
+              <a:t>Bán hình thức – semiformal</a:t>
             </a:r>
           </a:p>
           <a:p>
             <a:pPr marL="226375" lvl="1" indent="0">
               <a:buNone/>
             </a:pPr>
-            <a:endParaRPr lang="en-US" dirty="0"/>
+            <a:endParaRPr lang="en-US"/>
           </a:p>
         </p:txBody>
       </p:sp>
@@ -18524,7 +18724,7 @@
           <a:lstStyle/>
           <a:p>
             <a:r>
-              <a:rPr lang="en-US" b="1" dirty="0"/>
+              <a:rPr lang="en-US" b="1"/>
               <a:t>Tổng quan về Kỹ nghệ Phần mềm</a:t>
             </a:r>
           </a:p>
@@ -18548,61 +18748,61 @@
           <a:lstStyle/>
           <a:p>
             <a:r>
-              <a:rPr lang="en-US" b="1" i="1" dirty="0">
+              <a:rPr lang="en-US" b="1" i="1">
                 <a:latin typeface="Constantia" panose="02030602050306030303" pitchFamily="18" charset="0"/>
               </a:rPr>
               <a:t>“</a:t>
             </a:r>
             <a:r>
-              <a:rPr lang="vi-VN" b="1" i="1" dirty="0">
+              <a:rPr lang="vi-VN" b="1" i="1">
                 <a:latin typeface="Constantia" panose="02030602050306030303" pitchFamily="18" charset="0"/>
               </a:rPr>
               <a:t>Công nghệ phần mềm</a:t>
             </a:r>
             <a:r>
-              <a:rPr lang="vi-VN" i="1" dirty="0">
+              <a:rPr lang="vi-VN" i="1">
                 <a:latin typeface="Constantia" panose="02030602050306030303" pitchFamily="18" charset="0"/>
               </a:rPr>
               <a:t> hay </a:t>
             </a:r>
             <a:r>
-              <a:rPr lang="vi-VN" b="1" i="1" dirty="0">
+              <a:rPr lang="vi-VN" b="1" i="1">
                 <a:latin typeface="Constantia" panose="02030602050306030303" pitchFamily="18" charset="0"/>
               </a:rPr>
               <a:t>kỹ nghệ phần mềm</a:t>
             </a:r>
             <a:r>
-              <a:rPr lang="vi-VN" i="1" dirty="0">
+              <a:rPr lang="vi-VN" i="1">
                 <a:latin typeface="Constantia" panose="02030602050306030303" pitchFamily="18" charset="0"/>
               </a:rPr>
               <a:t> (</a:t>
             </a:r>
             <a:r>
-              <a:rPr lang="en-US" i="1" dirty="0">
+              <a:rPr lang="en-US" i="1">
                 <a:latin typeface="Constantia" panose="02030602050306030303" pitchFamily="18" charset="0"/>
               </a:rPr>
               <a:t>S</a:t>
             </a:r>
             <a:r>
-              <a:rPr lang="vi-VN" i="1" dirty="0">
+              <a:rPr lang="vi-VN" i="1">
                 <a:latin typeface="Constantia" panose="02030602050306030303" pitchFamily="18" charset="0"/>
               </a:rPr>
               <a:t>oftware </a:t>
             </a:r>
             <a:r>
-              <a:rPr lang="en-US" i="1" dirty="0">
+              <a:rPr lang="en-US" i="1">
                 <a:latin typeface="Constantia" panose="02030602050306030303" pitchFamily="18" charset="0"/>
               </a:rPr>
               <a:t>E</a:t>
             </a:r>
             <a:r>
-              <a:rPr lang="vi-VN" i="1" dirty="0">
+              <a:rPr lang="vi-VN" i="1">
                 <a:latin typeface="Constantia" panose="02030602050306030303" pitchFamily="18" charset="0"/>
               </a:rPr>
               <a:t>ngineering) là sự áp dụng một cách tiếp cận có hệ thống, có kỷ luật, và định lượng được cho việc phát triển, sử dụng và bảo trì phần mềm</a:t>
             </a:r>
             <a:r>
-              <a:rPr lang="en-US" b="1" i="1" dirty="0">
+              <a:rPr lang="en-US" b="1" i="1">
                 <a:latin typeface="Constantia" panose="02030602050306030303" pitchFamily="18" charset="0"/>
               </a:rPr>
               <a:t>” - wikipedia</a:t>
@@ -18610,7 +18810,7 @@
           </a:p>
           <a:p>
             <a:r>
-              <a:rPr lang="vi-VN" dirty="0">
+              <a:rPr lang="vi-VN">
                 <a:latin typeface="Constantia" panose="02030602050306030303" pitchFamily="18" charset="0"/>
               </a:rPr>
               <a:t>Ngành Công nghệ phần mềm bao gồm các kiến thức, công cụ và các phương pháp được áp dụng cho các tác vụ như phân tích, thiết kế, xây dựng, kiểm thử, và bảo trì phần mềm.</a:t>
@@ -18620,7 +18820,7 @@
             <a:pPr marL="0" indent="0">
               <a:buNone/>
             </a:pPr>
-            <a:endParaRPr lang="en-US" sz="1600" i="1" dirty="0"/>
+            <a:endParaRPr lang="en-US" sz="1600" i="1"/>
           </a:p>
         </p:txBody>
       </p:sp>
@@ -18646,6 +18846,13 @@
       </p:transition>
     </mc:Fallback>
   </mc:AlternateContent>
+  <p:timing>
+    <p:tnLst>
+      <p:par>
+        <p:cTn id="1" dur="indefinite" restart="never" nodeType="tmRoot"/>
+      </p:par>
+    </p:tnLst>
+  </p:timing>
 </p:sld>
 </file>
 
@@ -20775,6 +20982,13 @@
       </p:transition>
     </mc:Fallback>
   </mc:AlternateContent>
+  <p:timing>
+    <p:tnLst>
+      <p:par>
+        <p:cTn id="1" dur="indefinite" restart="never" nodeType="tmRoot"/>
+      </p:par>
+    </p:tnLst>
+  </p:timing>
 </p:sld>
 </file>
 
@@ -21893,100 +22107,100 @@
           <a:lstStyle/>
           <a:p>
             <a:r>
-              <a:rPr lang="en-US" dirty="0"/>
+              <a:rPr lang="en-US"/>
               <a:t>Sản phẩm:</a:t>
             </a:r>
           </a:p>
           <a:p>
             <a:pPr lvl="1"/>
             <a:r>
-              <a:rPr lang="en-US" dirty="0"/>
+              <a:rPr lang="en-US"/>
               <a:t>Khách hàng mong muốn một sản phẩm có thể đáp ứng các nhu cầu của họ.</a:t>
             </a:r>
           </a:p>
           <a:p>
             <a:pPr lvl="1"/>
             <a:r>
-              <a:rPr lang="en-US" dirty="0"/>
+              <a:rPr lang="en-US"/>
               <a:t>Các nhà phát triển khó có thể tạo ra một sản phẩm hoàn toàn phù hợp.</a:t>
             </a:r>
           </a:p>
           <a:p>
             <a:r>
-              <a:rPr lang="en-US" dirty="0"/>
+              <a:rPr lang="en-US"/>
               <a:t>Phạm vi dự án:</a:t>
             </a:r>
           </a:p>
           <a:p>
             <a:pPr lvl="1"/>
             <a:r>
-              <a:rPr lang="en-US" dirty="0"/>
+              <a:rPr lang="en-US"/>
               <a:t>Nếu nhỏ: Các yêu cầu thường đơn giản và dễ dàng phát triển.</a:t>
             </a:r>
           </a:p>
           <a:p>
             <a:pPr lvl="1"/>
             <a:r>
-              <a:rPr lang="en-US" dirty="0"/>
+              <a:rPr lang="en-US"/>
               <a:t>Nếu lớn: Khó khăn, đôi khi là rất khó để tạo ra các sản phẩm sạch lỗi và đáp ứng được yêu cầu.</a:t>
             </a:r>
           </a:p>
           <a:p>
             <a:r>
-              <a:rPr lang="en-US" dirty="0"/>
+              <a:rPr lang="en-US"/>
               <a:t>Kiến thức</a:t>
             </a:r>
           </a:p>
           <a:p>
             <a:pPr lvl="1"/>
             <a:r>
-              <a:rPr lang="en-US" dirty="0"/>
+              <a:rPr lang="en-US"/>
               <a:t>Khách hàng: Chủ yếu là kiến thức nghiệp vụ (business) về lĩnh vực của họ.</a:t>
             </a:r>
           </a:p>
           <a:p>
             <a:pPr lvl="1"/>
             <a:r>
-              <a:rPr lang="en-US" dirty="0"/>
+              <a:rPr lang="en-US"/>
               <a:t>Nhà phát triển: Kiến thức chuyên môn về công nghệ, kỹ thuật.</a:t>
             </a:r>
           </a:p>
           <a:p>
             <a:r>
-              <a:rPr lang="en-US" dirty="0"/>
+              <a:rPr lang="en-US"/>
               <a:t>Yêu cầu:</a:t>
             </a:r>
           </a:p>
           <a:p>
             <a:pPr lvl="1"/>
             <a:r>
-              <a:rPr lang="en-US" dirty="0"/>
+              <a:rPr lang="en-US"/>
               <a:t>Trong suy nghĩ của khách hàng về sản phẩm, yêu cầu đó là khả thi</a:t>
             </a:r>
           </a:p>
           <a:p>
             <a:pPr lvl="1"/>
             <a:r>
-              <a:rPr lang="en-US" dirty="0"/>
+              <a:rPr lang="en-US"/>
               <a:t>Sự thay đổi yêu cầu của khách hàng.</a:t>
             </a:r>
           </a:p>
           <a:p>
             <a:pPr lvl="1"/>
-            <a:endParaRPr lang="en-US" dirty="0"/>
+            <a:endParaRPr lang="en-US"/>
           </a:p>
           <a:p>
             <a:pPr lvl="1"/>
-            <a:endParaRPr lang="en-US" dirty="0"/>
-          </a:p>
-          <a:p>
-            <a:endParaRPr lang="en-US" dirty="0"/>
-          </a:p>
-          <a:p>
-            <a:endParaRPr lang="en-US" dirty="0"/>
-          </a:p>
-          <a:p>
-            <a:endParaRPr lang="en-US" dirty="0"/>
+            <a:endParaRPr lang="en-US"/>
+          </a:p>
+          <a:p>
+            <a:endParaRPr lang="en-US"/>
+          </a:p>
+          <a:p>
+            <a:endParaRPr lang="en-US"/>
+          </a:p>
+          <a:p>
+            <a:endParaRPr lang="en-US"/>
           </a:p>
         </p:txBody>
       </p:sp>
@@ -22012,6 +22226,13 @@
       </p:transition>
     </mc:Fallback>
   </mc:AlternateContent>
+  <p:timing>
+    <p:tnLst>
+      <p:par>
+        <p:cTn id="1" dur="indefinite" restart="never" nodeType="tmRoot"/>
+      </p:par>
+    </p:tnLst>
+  </p:timing>
 </p:sld>
 </file>
 
@@ -22380,14 +22601,14 @@
           <a:lstStyle/>
           <a:p>
             <a:r>
-              <a:rPr lang="en-US" sz="3200" dirty="0"/>
+              <a:rPr lang="en-US" sz="3200"/>
               <a:t>Kỹ thuật yêu cầu</a:t>
             </a:r>
             <a:br>
-              <a:rPr lang="en-US" sz="3200" dirty="0"/>
+              <a:rPr lang="en-US" sz="3200"/>
             </a:br>
             <a:r>
-              <a:rPr lang="en-US" sz="3200" dirty="0"/>
+              <a:rPr lang="en-US" sz="3200"/>
               <a:t>(Requirement Engineering)</a:t>
             </a:r>
           </a:p>
@@ -22545,76 +22766,76 @@
           <a:lstStyle/>
           <a:p>
             <a:r>
-              <a:rPr lang="en-US" b="1" dirty="0"/>
+              <a:rPr lang="en-US" b="1"/>
               <a:t>Yêu cầu</a:t>
             </a:r>
             <a:r>
-              <a:rPr lang="en-US" dirty="0"/>
+              <a:rPr lang="en-US"/>
               <a:t> là gì?</a:t>
             </a:r>
           </a:p>
           <a:p>
             <a:pPr lvl="1"/>
             <a:r>
-              <a:rPr lang="en-US" dirty="0"/>
+              <a:rPr lang="en-US"/>
               <a:t>Là một phát biểu có thể mơ hồ, trừu tượng (như các dịch vụ, ràng buộc) cần được chi tiết hóa cụ thể hay là các đặc tả chi tiết, chính thức mà hệ thống phần mềm cần thực hiện được.</a:t>
             </a:r>
           </a:p>
           <a:p>
             <a:pPr lvl="1"/>
             <a:r>
-              <a:rPr lang="en-US" dirty="0"/>
+              <a:rPr lang="en-US"/>
               <a:t>Bởi vì mục đích diễn tả khác nhau nên các yêu cầu có thể có mức độ chi tiết khác nhau.</a:t>
             </a:r>
           </a:p>
           <a:p>
             <a:r>
-              <a:rPr lang="en-US" b="1" dirty="0"/>
+              <a:rPr lang="en-US" b="1"/>
               <a:t>Kỹ thuật Yêu cầu </a:t>
             </a:r>
             <a:r>
-              <a:rPr lang="en-US" dirty="0"/>
+              <a:rPr lang="en-US"/>
               <a:t>(R.E) là gì?</a:t>
             </a:r>
           </a:p>
           <a:p>
             <a:pPr lvl="1"/>
             <a:r>
-              <a:rPr lang="en-US" dirty="0"/>
+              <a:rPr lang="en-US"/>
               <a:t>Là một giai đoạn (subdiscipline) trong Công nghệ phần mềm.</a:t>
             </a:r>
           </a:p>
           <a:p>
             <a:pPr lvl="1"/>
             <a:r>
-              <a:rPr lang="en-US" dirty="0"/>
+              <a:rPr lang="en-US"/>
               <a:t>Tập trung vào việc tìm ra các mục tiêu, chức năng, ràng buộc của hệ thống phần mềm.</a:t>
             </a:r>
           </a:p>
           <a:p>
             <a:pPr lvl="1"/>
             <a:r>
-              <a:rPr lang="en-US" dirty="0"/>
+              <a:rPr lang="en-US"/>
               <a:t>Bao gồm các quá trình tìm hiểu, ghi chép, phân tích, phê chuẩn và quản lý các yêu cầu.</a:t>
             </a:r>
           </a:p>
           <a:p>
             <a:pPr lvl="1"/>
             <a:r>
-              <a:rPr lang="en-US" dirty="0"/>
+              <a:rPr lang="en-US"/>
               <a:t>Có nhiều cách tiếp cận khác nhau, cách này có thể hoàn thiện hơn cách kia.</a:t>
             </a:r>
           </a:p>
           <a:p>
             <a:pPr lvl="1"/>
             <a:r>
-              <a:rPr lang="en-US" dirty="0"/>
+              <a:rPr lang="en-US"/>
               <a:t>Tuy nhiên, bất kỳ cách thức nào cũng đều có phương pháp luận riêng được định nghĩa đầy đủ và các tài liệu cần có cho mỗi giai đoạn.</a:t>
             </a:r>
           </a:p>
           <a:p>
             <a:pPr lvl="1"/>
-            <a:endParaRPr lang="en-US" dirty="0"/>
+            <a:endParaRPr lang="en-US"/>
           </a:p>
         </p:txBody>
       </p:sp>
@@ -24609,15 +24830,15 @@
 <file path=customXml/itemProps2.xml><?xml version="1.0" encoding="utf-8"?>
 <ds:datastoreItem xmlns:ds="http://schemas.openxmlformats.org/officeDocument/2006/customXml" ds:itemID="{4ED80E12-3BE9-4746-820E-FFB249F467F2}">
   <ds:schemaRefs>
+    <ds:schemaRef ds:uri="http://schemas.microsoft.com/office/2006/documentManagement/types"/>
+    <ds:schemaRef ds:uri="http://purl.org/dc/terms/"/>
+    <ds:schemaRef ds:uri="http://purl.org/dc/dcmitype/"/>
     <ds:schemaRef ds:uri="http://purl.org/dc/elements/1.1/"/>
+    <ds:schemaRef ds:uri="http://schemas.microsoft.com/office/infopath/2007/PartnerControls"/>
     <ds:schemaRef ds:uri="http://schemas.microsoft.com/office/2006/metadata/properties"/>
+    <ds:schemaRef ds:uri="http://schemas.openxmlformats.org/package/2006/metadata/core-properties"/>
     <ds:schemaRef ds:uri="4873beb7-5857-4685-be1f-d57550cc96cc"/>
-    <ds:schemaRef ds:uri="http://schemas.openxmlformats.org/package/2006/metadata/core-properties"/>
-    <ds:schemaRef ds:uri="http://purl.org/dc/terms/"/>
-    <ds:schemaRef ds:uri="http://schemas.microsoft.com/office/infopath/2007/PartnerControls"/>
-    <ds:schemaRef ds:uri="http://schemas.microsoft.com/office/2006/documentManagement/types"/>
     <ds:schemaRef ds:uri="http://www.w3.org/XML/1998/namespace"/>
-    <ds:schemaRef ds:uri="http://purl.org/dc/dcmitype/"/>
   </ds:schemaRefs>
 </ds:datastoreItem>
 </file>

</xml_diff>